<commit_message>
added exp1 images to powerpoint, as well as formatting beginnings for the references slide.
</commit_message>
<xml_diff>
--- a/GPP_Defense.pptx
+++ b/GPP_Defense.pptx
@@ -5,10 +5,10 @@
     <p:sldMasterId id="2147483648" r:id="rId2"/>
   </p:sldMasterIdLst>
   <p:notesMasterIdLst>
-    <p:notesMasterId r:id="rId17"/>
+    <p:notesMasterId r:id="rId16"/>
   </p:notesMasterIdLst>
   <p:handoutMasterIdLst>
-    <p:handoutMasterId r:id="rId18"/>
+    <p:handoutMasterId r:id="rId17"/>
   </p:handoutMasterIdLst>
   <p:sldIdLst>
     <p:sldId id="256" r:id="rId3"/>
@@ -17,14 +17,13 @@
     <p:sldId id="259" r:id="rId6"/>
     <p:sldId id="269" r:id="rId7"/>
     <p:sldId id="270" r:id="rId8"/>
-    <p:sldId id="260" r:id="rId9"/>
-    <p:sldId id="266" r:id="rId10"/>
-    <p:sldId id="268" r:id="rId11"/>
-    <p:sldId id="261" r:id="rId12"/>
-    <p:sldId id="262" r:id="rId13"/>
-    <p:sldId id="263" r:id="rId14"/>
-    <p:sldId id="264" r:id="rId15"/>
-    <p:sldId id="265" r:id="rId16"/>
+    <p:sldId id="271" r:id="rId9"/>
+    <p:sldId id="273" r:id="rId10"/>
+    <p:sldId id="260" r:id="rId11"/>
+    <p:sldId id="275" r:id="rId12"/>
+    <p:sldId id="277" r:id="rId13"/>
+    <p:sldId id="278" r:id="rId14"/>
+    <p:sldId id="274" r:id="rId15"/>
   </p:sldIdLst>
   <p:sldSz cx="12192000" cy="6858000"/>
   <p:notesSz cx="6858000" cy="9144000"/>
@@ -124,6 +123,31 @@
     </a:lvl9pPr>
   </p:defaultTextStyle>
   <p:extLst>
+    <p:ext uri="{521415D9-36F7-43E2-AB2F-B90AF26B5E84}">
+      <p14:sectionLst xmlns:p14="http://schemas.microsoft.com/office/powerpoint/2010/main">
+        <p14:section name="Default Section" id="{B4AB9BCE-E6F7-4797-A2C3-4799EDFFCFEA}">
+          <p14:sldIdLst>
+            <p14:sldId id="256"/>
+            <p14:sldId id="257"/>
+            <p14:sldId id="258"/>
+            <p14:sldId id="259"/>
+            <p14:sldId id="269"/>
+            <p14:sldId id="270"/>
+            <p14:sldId id="271"/>
+            <p14:sldId id="273"/>
+          </p14:sldIdLst>
+        </p14:section>
+        <p14:section name="Untitled Section" id="{FBD56B9C-EBAB-494B-BED3-D1E668B607C5}">
+          <p14:sldIdLst>
+            <p14:sldId id="260"/>
+            <p14:sldId id="275"/>
+            <p14:sldId id="277"/>
+            <p14:sldId id="278"/>
+            <p14:sldId id="274"/>
+          </p14:sldIdLst>
+        </p14:section>
+      </p14:sectionLst>
+    </p:ext>
     <p:ext uri="{EFAFB233-063F-42B5-8137-9DF3F51BA10A}">
       <p15:sldGuideLst xmlns:p15="http://schemas.microsoft.com/office/powerpoint/2012/main">
         <p15:guide id="1" orient="horz" pos="2160" userDrawn="1">
@@ -227,7 +251,7 @@
           <a:p>
             <a:fld id="{23CEAAF3-9831-450B-8D59-2C09DB96C8FC}" type="datetimeFigureOut">
               <a:rPr lang="en-US"/>
-              <a:t>4/29/2016</a:t>
+              <a:t>5/1/2016</a:t>
             </a:fld>
             <a:endParaRPr/>
           </a:p>
@@ -392,7 +416,7 @@
           <a:p>
             <a:fld id="{2D50CD79-FC16-4410-AB61-17F26E6D3BC8}" type="datetimeFigureOut">
               <a:rPr lang="en-US"/>
-              <a:t>4/29/2016</a:t>
+              <a:t>5/1/2016</a:t>
             </a:fld>
             <a:endParaRPr/>
           </a:p>
@@ -851,6 +875,174 @@
 </p:notes>
 </file>
 
+<file path=ppt/notesSlides/notesSlide3.xml><?xml version="1.0" encoding="utf-8"?>
+<p:notes xmlns:a="http://schemas.openxmlformats.org/drawingml/2006/main" xmlns:r="http://schemas.openxmlformats.org/officeDocument/2006/relationships" xmlns:p="http://schemas.openxmlformats.org/presentationml/2006/main">
+  <p:cSld>
+    <p:spTree>
+      <p:nvGrpSpPr>
+        <p:cNvPr id="1" name=""/>
+        <p:cNvGrpSpPr/>
+        <p:nvPr/>
+      </p:nvGrpSpPr>
+      <p:grpSpPr>
+        <a:xfrm>
+          <a:off x="0" y="0"/>
+          <a:ext cx="0" cy="0"/>
+          <a:chOff x="0" y="0"/>
+          <a:chExt cx="0" cy="0"/>
+        </a:xfrm>
+      </p:grpSpPr>
+      <p:sp>
+        <p:nvSpPr>
+          <p:cNvPr id="2" name="Slide Image Placeholder 1"/>
+          <p:cNvSpPr>
+            <a:spLocks noGrp="1" noRot="1" noChangeAspect="1"/>
+          </p:cNvSpPr>
+          <p:nvPr>
+            <p:ph type="sldImg"/>
+          </p:nvPr>
+        </p:nvSpPr>
+        <p:spPr/>
+      </p:sp>
+      <p:sp>
+        <p:nvSpPr>
+          <p:cNvPr id="3" name="Notes Placeholder 2"/>
+          <p:cNvSpPr>
+            <a:spLocks noGrp="1"/>
+          </p:cNvSpPr>
+          <p:nvPr>
+            <p:ph type="body" idx="1"/>
+          </p:nvPr>
+        </p:nvSpPr>
+        <p:spPr/>
+        <p:txBody>
+          <a:bodyPr/>
+          <a:lstStyle/>
+          <a:p>
+            <a:endParaRPr lang="en-CA" dirty="0"/>
+          </a:p>
+        </p:txBody>
+      </p:sp>
+      <p:sp>
+        <p:nvSpPr>
+          <p:cNvPr id="4" name="Slide Number Placeholder 3"/>
+          <p:cNvSpPr>
+            <a:spLocks noGrp="1"/>
+          </p:cNvSpPr>
+          <p:nvPr>
+            <p:ph type="sldNum" sz="quarter" idx="10"/>
+          </p:nvPr>
+        </p:nvSpPr>
+        <p:spPr/>
+        <p:txBody>
+          <a:bodyPr/>
+          <a:lstStyle/>
+          <a:p>
+            <a:fld id="{0A3C37BE-C303-496D-B5CD-85F2937540FC}" type="slidenum">
+              <a:rPr lang="en-CA" smtClean="0"/>
+              <a:t>7</a:t>
+            </a:fld>
+            <a:endParaRPr lang="en-CA"/>
+          </a:p>
+        </p:txBody>
+      </p:sp>
+    </p:spTree>
+    <p:extLst>
+      <p:ext uri="{BB962C8B-B14F-4D97-AF65-F5344CB8AC3E}">
+        <p14:creationId xmlns:p14="http://schemas.microsoft.com/office/powerpoint/2010/main" val="4013550486"/>
+      </p:ext>
+    </p:extLst>
+  </p:cSld>
+  <p:clrMapOvr>
+    <a:masterClrMapping/>
+  </p:clrMapOvr>
+</p:notes>
+</file>
+
+<file path=ppt/notesSlides/notesSlide4.xml><?xml version="1.0" encoding="utf-8"?>
+<p:notes xmlns:a="http://schemas.openxmlformats.org/drawingml/2006/main" xmlns:r="http://schemas.openxmlformats.org/officeDocument/2006/relationships" xmlns:p="http://schemas.openxmlformats.org/presentationml/2006/main">
+  <p:cSld>
+    <p:spTree>
+      <p:nvGrpSpPr>
+        <p:cNvPr id="1" name=""/>
+        <p:cNvGrpSpPr/>
+        <p:nvPr/>
+      </p:nvGrpSpPr>
+      <p:grpSpPr>
+        <a:xfrm>
+          <a:off x="0" y="0"/>
+          <a:ext cx="0" cy="0"/>
+          <a:chOff x="0" y="0"/>
+          <a:chExt cx="0" cy="0"/>
+        </a:xfrm>
+      </p:grpSpPr>
+      <p:sp>
+        <p:nvSpPr>
+          <p:cNvPr id="2" name="Slide Image Placeholder 1"/>
+          <p:cNvSpPr>
+            <a:spLocks noGrp="1" noRot="1" noChangeAspect="1"/>
+          </p:cNvSpPr>
+          <p:nvPr>
+            <p:ph type="sldImg"/>
+          </p:nvPr>
+        </p:nvSpPr>
+        <p:spPr/>
+      </p:sp>
+      <p:sp>
+        <p:nvSpPr>
+          <p:cNvPr id="3" name="Notes Placeholder 2"/>
+          <p:cNvSpPr>
+            <a:spLocks noGrp="1"/>
+          </p:cNvSpPr>
+          <p:nvPr>
+            <p:ph type="body" idx="1"/>
+          </p:nvPr>
+        </p:nvSpPr>
+        <p:spPr/>
+        <p:txBody>
+          <a:bodyPr/>
+          <a:lstStyle/>
+          <a:p>
+            <a:endParaRPr lang="en-CA" dirty="0"/>
+          </a:p>
+        </p:txBody>
+      </p:sp>
+      <p:sp>
+        <p:nvSpPr>
+          <p:cNvPr id="4" name="Slide Number Placeholder 3"/>
+          <p:cNvSpPr>
+            <a:spLocks noGrp="1"/>
+          </p:cNvSpPr>
+          <p:nvPr>
+            <p:ph type="sldNum" sz="quarter" idx="10"/>
+          </p:nvPr>
+        </p:nvSpPr>
+        <p:spPr/>
+        <p:txBody>
+          <a:bodyPr/>
+          <a:lstStyle/>
+          <a:p>
+            <a:fld id="{0A3C37BE-C303-496D-B5CD-85F2937540FC}" type="slidenum">
+              <a:rPr lang="en-CA" smtClean="0"/>
+              <a:t>11</a:t>
+            </a:fld>
+            <a:endParaRPr lang="en-CA"/>
+          </a:p>
+        </p:txBody>
+      </p:sp>
+    </p:spTree>
+    <p:extLst>
+      <p:ext uri="{BB962C8B-B14F-4D97-AF65-F5344CB8AC3E}">
+        <p14:creationId xmlns:p14="http://schemas.microsoft.com/office/powerpoint/2010/main" val="3702126950"/>
+      </p:ext>
+    </p:extLst>
+  </p:cSld>
+  <p:clrMapOvr>
+    <a:masterClrMapping/>
+  </p:clrMapOvr>
+</p:notes>
+</file>
+
 <file path=ppt/slideLayouts/slideLayout1.xml><?xml version="1.0" encoding="utf-8"?>
 <p:sldLayout xmlns:a="http://schemas.openxmlformats.org/drawingml/2006/main" xmlns:r="http://schemas.openxmlformats.org/officeDocument/2006/relationships" xmlns:p="http://schemas.openxmlformats.org/presentationml/2006/main" showMasterSp="0" type="title" preserve="1">
   <p:cSld name="Title Slide">
@@ -1075,7 +1267,7 @@
           <a:p>
             <a:fld id="{402B9795-92DC-40DC-A1CA-9A4B349D7824}" type="datetimeFigureOut">
               <a:rPr lang="en-US"/>
-              <a:t>4/29/2016</a:t>
+              <a:t>5/1/2016</a:t>
             </a:fld>
             <a:endParaRPr/>
           </a:p>
@@ -1391,7 +1583,7 @@
           <a:p>
             <a:fld id="{402B9795-92DC-40DC-A1CA-9A4B349D7824}" type="datetimeFigureOut">
               <a:rPr lang="en-US"/>
-              <a:t>4/29/2016</a:t>
+              <a:t>5/1/2016</a:t>
             </a:fld>
             <a:endParaRPr/>
           </a:p>
@@ -1573,7 +1765,7 @@
           <a:p>
             <a:fld id="{402B9795-92DC-40DC-A1CA-9A4B349D7824}" type="datetimeFigureOut">
               <a:rPr lang="en-US"/>
-              <a:t>4/29/2016</a:t>
+              <a:t>5/1/2016</a:t>
             </a:fld>
             <a:endParaRPr/>
           </a:p>
@@ -1765,7 +1957,7 @@
           <a:p>
             <a:fld id="{402B9795-92DC-40DC-A1CA-9A4B349D7824}" type="datetimeFigureOut">
               <a:rPr lang="en-US"/>
-              <a:t>4/29/2016</a:t>
+              <a:t>5/1/2016</a:t>
             </a:fld>
             <a:endParaRPr/>
           </a:p>
@@ -2034,7 +2226,7 @@
           <a:p>
             <a:fld id="{402B9795-92DC-40DC-A1CA-9A4B349D7824}" type="datetimeFigureOut">
               <a:rPr lang="en-US"/>
-              <a:t>4/29/2016</a:t>
+              <a:t>5/1/2016</a:t>
             </a:fld>
             <a:endParaRPr/>
           </a:p>
@@ -3093,7 +3285,7 @@
           <a:p>
             <a:fld id="{402B9795-92DC-40DC-A1CA-9A4B349D7824}" type="datetimeFigureOut">
               <a:rPr lang="en-US"/>
-              <a:t>4/29/2016</a:t>
+              <a:t>5/1/2016</a:t>
             </a:fld>
             <a:endParaRPr/>
           </a:p>
@@ -3403,7 +3595,7 @@
           <a:p>
             <a:fld id="{402B9795-92DC-40DC-A1CA-9A4B349D7824}" type="datetimeFigureOut">
               <a:rPr lang="en-US"/>
-              <a:t>4/29/2016</a:t>
+              <a:t>5/1/2016</a:t>
             </a:fld>
             <a:endParaRPr/>
           </a:p>
@@ -3783,7 +3975,7 @@
           <a:p>
             <a:fld id="{402B9795-92DC-40DC-A1CA-9A4B349D7824}" type="datetimeFigureOut">
               <a:rPr lang="en-US"/>
-              <a:t>4/29/2016</a:t>
+              <a:t>5/1/2016</a:t>
             </a:fld>
             <a:endParaRPr/>
           </a:p>
@@ -3913,7 +4105,7 @@
           <a:p>
             <a:fld id="{402B9795-92DC-40DC-A1CA-9A4B349D7824}" type="datetimeFigureOut">
               <a:rPr lang="en-US"/>
-              <a:t>4/29/2016</a:t>
+              <a:t>5/1/2016</a:t>
             </a:fld>
             <a:endParaRPr/>
           </a:p>
@@ -4020,7 +4212,7 @@
           <a:p>
             <a:fld id="{402B9795-92DC-40DC-A1CA-9A4B349D7824}" type="datetimeFigureOut">
               <a:rPr lang="en-US"/>
-              <a:t>4/29/2016</a:t>
+              <a:t>5/1/2016</a:t>
             </a:fld>
             <a:endParaRPr/>
           </a:p>
@@ -4311,7 +4503,7 @@
           <a:p>
             <a:fld id="{402B9795-92DC-40DC-A1CA-9A4B349D7824}" type="datetimeFigureOut">
               <a:rPr lang="en-US"/>
-              <a:t>4/29/2016</a:t>
+              <a:t>5/1/2016</a:t>
             </a:fld>
             <a:endParaRPr/>
           </a:p>
@@ -4538,7 +4730,7 @@
             <a:fld id="{402B9795-92DC-40DC-A1CA-9A4B349D7824}" type="datetimeFigureOut">
               <a:rPr lang="en-US"/>
               <a:pPr/>
-              <a:t>4/29/2016</a:t>
+              <a:t>5/1/2016</a:t>
             </a:fld>
             <a:endParaRPr/>
           </a:p>
@@ -5207,7 +5399,22 @@
           <a:bodyPr/>
           <a:lstStyle/>
           <a:p>
-            <a:endParaRPr lang="en-US"/>
+            <a:r>
+              <a:rPr lang="en-CA" b="1" i="1" dirty="0"/>
+              <a:t>L</a:t>
+            </a:r>
+            <a:r>
+              <a:rPr lang="en-CA" dirty="0"/>
+              <a:t>:</a:t>
+            </a:r>
+            <a:r>
+              <a:rPr lang="en-CA" b="1" i="1" dirty="0"/>
+              <a:t> </a:t>
+            </a:r>
+            <a:r>
+              <a:rPr lang="en-CA" dirty="0"/>
+              <a:t>Comparison of Individual Models</a:t>
+            </a:r>
           </a:p>
         </p:txBody>
       </p:sp>
@@ -5221,19 +5428,112 @@
             <p:ph type="body" idx="1"/>
           </p:nvPr>
         </p:nvSpPr>
-        <p:spPr/>
+        <p:spPr>
+          <a:xfrm>
+            <a:off x="750806" y="1223962"/>
+            <a:ext cx="4919472" cy="823912"/>
+          </a:xfrm>
+        </p:spPr>
         <p:txBody>
           <a:bodyPr/>
           <a:lstStyle/>
           <a:p>
-            <a:endParaRPr lang="en-US"/>
-          </a:p>
-        </p:txBody>
-      </p:sp>
+            <a:r>
+              <a:rPr lang="en-CA" dirty="0"/>
+              <a:t>Best &amp; Average Models (Training)</a:t>
+            </a:r>
+          </a:p>
+        </p:txBody>
+      </p:sp>
+      <p:pic>
+        <p:nvPicPr>
+          <p:cNvPr id="7" name="Content Placeholder 6"/>
+          <p:cNvPicPr>
+            <a:picLocks noGrp="1" noChangeAspect="1"/>
+          </p:cNvPicPr>
+          <p:nvPr>
+            <p:ph sz="half" idx="2"/>
+          </p:nvPr>
+        </p:nvPicPr>
+        <p:blipFill>
+          <a:blip r:embed="rId2">
+            <a:extLst>
+              <a:ext uri="{28A0092B-C50C-407E-A947-70E740481C1C}">
+                <a14:useLocalDpi xmlns:a14="http://schemas.microsoft.com/office/drawing/2010/main" val="0"/>
+              </a:ext>
+            </a:extLst>
+          </a:blip>
+          <a:stretch>
+            <a:fillRect/>
+          </a:stretch>
+        </p:blipFill>
+        <p:spPr>
+          <a:xfrm>
+            <a:off x="255044" y="2103438"/>
+            <a:ext cx="5910997" cy="4297362"/>
+          </a:xfrm>
+        </p:spPr>
+      </p:pic>
+      <p:sp>
+        <p:nvSpPr>
+          <p:cNvPr id="5" name="Text Placeholder 4"/>
+          <p:cNvSpPr>
+            <a:spLocks noGrp="1"/>
+          </p:cNvSpPr>
+          <p:nvPr>
+            <p:ph type="body" sz="quarter" idx="3"/>
+          </p:nvPr>
+        </p:nvSpPr>
+        <p:spPr>
+          <a:xfrm>
+            <a:off x="6656578" y="1223962"/>
+            <a:ext cx="4919472" cy="823912"/>
+          </a:xfrm>
+        </p:spPr>
+        <p:txBody>
+          <a:bodyPr/>
+          <a:lstStyle/>
+          <a:p>
+            <a:r>
+              <a:rPr lang="en-CA" dirty="0"/>
+              <a:t>Best &amp; Average Models (Testing)</a:t>
+            </a:r>
+          </a:p>
+        </p:txBody>
+      </p:sp>
+      <p:pic>
+        <p:nvPicPr>
+          <p:cNvPr id="8" name="Content Placeholder 7"/>
+          <p:cNvPicPr>
+            <a:picLocks noGrp="1" noChangeAspect="1"/>
+          </p:cNvPicPr>
+          <p:nvPr>
+            <p:ph sz="quarter" idx="4"/>
+          </p:nvPr>
+        </p:nvPicPr>
+        <p:blipFill>
+          <a:blip r:embed="rId3">
+            <a:extLst>
+              <a:ext uri="{28A0092B-C50C-407E-A947-70E740481C1C}">
+                <a14:useLocalDpi xmlns:a14="http://schemas.microsoft.com/office/drawing/2010/main" val="0"/>
+              </a:ext>
+            </a:extLst>
+          </a:blip>
+          <a:stretch>
+            <a:fillRect/>
+          </a:stretch>
+        </p:blipFill>
+        <p:spPr>
+          <a:xfrm>
+            <a:off x="6166041" y="2098674"/>
+            <a:ext cx="5900546" cy="4302126"/>
+          </a:xfrm>
+        </p:spPr>
+      </p:pic>
     </p:spTree>
     <p:extLst>
       <p:ext uri="{BB962C8B-B14F-4D97-AF65-F5344CB8AC3E}">
-        <p14:creationId xmlns:p14="http://schemas.microsoft.com/office/powerpoint/2010/main" val="132884364"/>
+        <p14:creationId xmlns:p14="http://schemas.microsoft.com/office/powerpoint/2010/main" val="1761602331"/>
       </p:ext>
     </p:extLst>
   </p:cSld>
@@ -5287,7 +5587,26 @@
           <a:bodyPr/>
           <a:lstStyle/>
           <a:p>
-            <a:endParaRPr lang="en-US"/>
+            <a:r>
+              <a:rPr lang="en-CA" b="1" i="1" dirty="0"/>
+              <a:t>L</a:t>
+            </a:r>
+            <a:r>
+              <a:rPr lang="en-CA" b="1" i="1" baseline="-25000" dirty="0"/>
+              <a:t>IF</a:t>
+            </a:r>
+            <a:r>
+              <a:rPr lang="en-CA" dirty="0"/>
+              <a:t>:</a:t>
+            </a:r>
+            <a:r>
+              <a:rPr lang="en-CA" b="1" i="1" dirty="0"/>
+              <a:t> </a:t>
+            </a:r>
+            <a:r>
+              <a:rPr lang="en-CA" dirty="0"/>
+              <a:t>Comparison of Individual Models</a:t>
+            </a:r>
           </a:p>
         </p:txBody>
       </p:sp>
@@ -5301,76 +5620,112 @@
             <p:ph type="body" idx="1"/>
           </p:nvPr>
         </p:nvSpPr>
-        <p:spPr/>
+        <p:spPr>
+          <a:xfrm>
+            <a:off x="750806" y="1223962"/>
+            <a:ext cx="4919472" cy="823912"/>
+          </a:xfrm>
+        </p:spPr>
         <p:txBody>
           <a:bodyPr/>
           <a:lstStyle/>
           <a:p>
-            <a:endParaRPr lang="en-US"/>
-          </a:p>
-        </p:txBody>
-      </p:sp>
-      <p:sp>
-        <p:nvSpPr>
-          <p:cNvPr id="4" name="Content Placeholder 3"/>
-          <p:cNvSpPr>
-            <a:spLocks noGrp="1"/>
-          </p:cNvSpPr>
+            <a:r>
+              <a:rPr lang="en-CA" dirty="0"/>
+              <a:t>Best &amp; Average Models (Training)</a:t>
+            </a:r>
+          </a:p>
+        </p:txBody>
+      </p:sp>
+      <p:pic>
+        <p:nvPicPr>
+          <p:cNvPr id="7" name="Content Placeholder 6"/>
+          <p:cNvPicPr>
+            <a:picLocks noGrp="1" noChangeAspect="1"/>
+          </p:cNvPicPr>
           <p:nvPr>
             <p:ph sz="half" idx="2"/>
           </p:nvPr>
-        </p:nvSpPr>
-        <p:spPr/>
+        </p:nvPicPr>
+        <p:blipFill>
+          <a:blip r:embed="rId3">
+            <a:extLst>
+              <a:ext uri="{28A0092B-C50C-407E-A947-70E740481C1C}">
+                <a14:useLocalDpi xmlns:a14="http://schemas.microsoft.com/office/drawing/2010/main" val="0"/>
+              </a:ext>
+            </a:extLst>
+          </a:blip>
+          <a:stretch>
+            <a:fillRect/>
+          </a:stretch>
+        </p:blipFill>
+        <p:spPr>
+          <a:xfrm>
+            <a:off x="264147" y="2103438"/>
+            <a:ext cx="5892790" cy="4297362"/>
+          </a:xfrm>
+        </p:spPr>
+      </p:pic>
+      <p:sp>
+        <p:nvSpPr>
+          <p:cNvPr id="5" name="Text Placeholder 4"/>
+          <p:cNvSpPr>
+            <a:spLocks noGrp="1"/>
+          </p:cNvSpPr>
+          <p:nvPr>
+            <p:ph type="body" sz="quarter" idx="3"/>
+          </p:nvPr>
+        </p:nvSpPr>
+        <p:spPr>
+          <a:xfrm>
+            <a:off x="6656578" y="1223962"/>
+            <a:ext cx="4919472" cy="823912"/>
+          </a:xfrm>
+        </p:spPr>
         <p:txBody>
           <a:bodyPr/>
           <a:lstStyle/>
           <a:p>
-            <a:endParaRPr lang="en-US"/>
-          </a:p>
-        </p:txBody>
-      </p:sp>
-      <p:sp>
-        <p:nvSpPr>
-          <p:cNvPr id="5" name="Text Placeholder 4"/>
-          <p:cNvSpPr>
-            <a:spLocks noGrp="1"/>
-          </p:cNvSpPr>
-          <p:nvPr>
-            <p:ph type="body" sz="quarter" idx="3"/>
-          </p:nvPr>
-        </p:nvSpPr>
-        <p:spPr/>
-        <p:txBody>
-          <a:bodyPr/>
-          <a:lstStyle/>
-          <a:p>
-            <a:endParaRPr lang="en-US"/>
-          </a:p>
-        </p:txBody>
-      </p:sp>
-      <p:sp>
-        <p:nvSpPr>
-          <p:cNvPr id="6" name="Content Placeholder 5"/>
-          <p:cNvSpPr>
-            <a:spLocks noGrp="1"/>
-          </p:cNvSpPr>
+            <a:r>
+              <a:rPr lang="en-CA" dirty="0"/>
+              <a:t>Best &amp; Average Models (Testing)</a:t>
+            </a:r>
+          </a:p>
+        </p:txBody>
+      </p:sp>
+      <p:pic>
+        <p:nvPicPr>
+          <p:cNvPr id="8" name="Content Placeholder 7"/>
+          <p:cNvPicPr>
+            <a:picLocks noGrp="1" noChangeAspect="1"/>
+          </p:cNvPicPr>
           <p:nvPr>
             <p:ph sz="quarter" idx="4"/>
           </p:nvPr>
-        </p:nvSpPr>
-        <p:spPr/>
-        <p:txBody>
-          <a:bodyPr/>
-          <a:lstStyle/>
-          <a:p>
-            <a:endParaRPr lang="en-US"/>
-          </a:p>
-        </p:txBody>
-      </p:sp>
+        </p:nvPicPr>
+        <p:blipFill>
+          <a:blip r:embed="rId4">
+            <a:extLst>
+              <a:ext uri="{28A0092B-C50C-407E-A947-70E740481C1C}">
+                <a14:useLocalDpi xmlns:a14="http://schemas.microsoft.com/office/drawing/2010/main" val="0"/>
+              </a:ext>
+            </a:extLst>
+          </a:blip>
+          <a:stretch>
+            <a:fillRect/>
+          </a:stretch>
+        </p:blipFill>
+        <p:spPr>
+          <a:xfrm>
+            <a:off x="6166041" y="2111000"/>
+            <a:ext cx="5900546" cy="4277473"/>
+          </a:xfrm>
+        </p:spPr>
+      </p:pic>
     </p:spTree>
     <p:extLst>
       <p:ext uri="{BB962C8B-B14F-4D97-AF65-F5344CB8AC3E}">
-        <p14:creationId xmlns:p14="http://schemas.microsoft.com/office/powerpoint/2010/main" val="2224495804"/>
+        <p14:creationId xmlns:p14="http://schemas.microsoft.com/office/powerpoint/2010/main" val="2530631003"/>
       </p:ext>
     </p:extLst>
   </p:cSld>
@@ -5424,14 +5779,134 @@
           <a:bodyPr/>
           <a:lstStyle/>
           <a:p>
-            <a:endParaRPr lang="en-US"/>
-          </a:p>
-        </p:txBody>
-      </p:sp>
+            <a:r>
+              <a:rPr lang="en-CA" dirty="0"/>
+              <a:t>Ensemble Performance</a:t>
+            </a:r>
+          </a:p>
+        </p:txBody>
+      </p:sp>
+      <p:sp>
+        <p:nvSpPr>
+          <p:cNvPr id="3" name="Text Placeholder 2"/>
+          <p:cNvSpPr>
+            <a:spLocks noGrp="1"/>
+          </p:cNvSpPr>
+          <p:nvPr>
+            <p:ph type="body" idx="1"/>
+          </p:nvPr>
+        </p:nvSpPr>
+        <p:spPr>
+          <a:xfrm>
+            <a:off x="3386931" y="1396548"/>
+            <a:ext cx="355600" cy="442912"/>
+          </a:xfrm>
+        </p:spPr>
+        <p:txBody>
+          <a:bodyPr/>
+          <a:lstStyle/>
+          <a:p>
+            <a:r>
+              <a:rPr lang="en-CA" i="1" dirty="0"/>
+              <a:t>L</a:t>
+            </a:r>
+          </a:p>
+        </p:txBody>
+      </p:sp>
+      <p:pic>
+        <p:nvPicPr>
+          <p:cNvPr id="7" name="Content Placeholder 6"/>
+          <p:cNvPicPr>
+            <a:picLocks noGrp="1" noChangeAspect="1"/>
+          </p:cNvPicPr>
+          <p:nvPr>
+            <p:ph sz="half" idx="2"/>
+          </p:nvPr>
+        </p:nvPicPr>
+        <p:blipFill>
+          <a:blip r:embed="rId2">
+            <a:extLst>
+              <a:ext uri="{28A0092B-C50C-407E-A947-70E740481C1C}">
+                <a14:useLocalDpi xmlns:a14="http://schemas.microsoft.com/office/drawing/2010/main" val="0"/>
+              </a:ext>
+            </a:extLst>
+          </a:blip>
+          <a:stretch>
+            <a:fillRect/>
+          </a:stretch>
+        </p:blipFill>
+        <p:spPr>
+          <a:xfrm>
+            <a:off x="252738" y="1839460"/>
+            <a:ext cx="5771826" cy="4205740"/>
+          </a:xfrm>
+        </p:spPr>
+      </p:pic>
+      <p:sp>
+        <p:nvSpPr>
+          <p:cNvPr id="5" name="Text Placeholder 4"/>
+          <p:cNvSpPr>
+            <a:spLocks noGrp="1"/>
+          </p:cNvSpPr>
+          <p:nvPr>
+            <p:ph type="body" sz="quarter" idx="3"/>
+          </p:nvPr>
+        </p:nvSpPr>
+        <p:spPr>
+          <a:xfrm>
+            <a:off x="8394036" y="1396548"/>
+            <a:ext cx="463290" cy="442912"/>
+          </a:xfrm>
+        </p:spPr>
+        <p:txBody>
+          <a:bodyPr/>
+          <a:lstStyle/>
+          <a:p>
+            <a:r>
+              <a:rPr lang="en-CA" i="1" dirty="0"/>
+              <a:t>L</a:t>
+            </a:r>
+            <a:r>
+              <a:rPr lang="en-CA" i="1" baseline="-25000" dirty="0"/>
+              <a:t>IF</a:t>
+            </a:r>
+            <a:endParaRPr lang="en-CA" i="1" dirty="0"/>
+          </a:p>
+        </p:txBody>
+      </p:sp>
+      <p:pic>
+        <p:nvPicPr>
+          <p:cNvPr id="8" name="Content Placeholder 7"/>
+          <p:cNvPicPr>
+            <a:picLocks noGrp="1" noChangeAspect="1"/>
+          </p:cNvPicPr>
+          <p:nvPr>
+            <p:ph sz="quarter" idx="4"/>
+          </p:nvPr>
+        </p:nvPicPr>
+        <p:blipFill>
+          <a:blip r:embed="rId3">
+            <a:extLst>
+              <a:ext uri="{28A0092B-C50C-407E-A947-70E740481C1C}">
+                <a14:useLocalDpi xmlns:a14="http://schemas.microsoft.com/office/drawing/2010/main" val="0"/>
+              </a:ext>
+            </a:extLst>
+          </a:blip>
+          <a:stretch>
+            <a:fillRect/>
+          </a:stretch>
+        </p:blipFill>
+        <p:spPr>
+          <a:xfrm>
+            <a:off x="6165849" y="1839460"/>
+            <a:ext cx="5805029" cy="4205740"/>
+          </a:xfrm>
+        </p:spPr>
+      </p:pic>
     </p:spTree>
     <p:extLst>
       <p:ext uri="{BB962C8B-B14F-4D97-AF65-F5344CB8AC3E}">
-        <p14:creationId xmlns:p14="http://schemas.microsoft.com/office/powerpoint/2010/main" val="1527004159"/>
+        <p14:creationId xmlns:p14="http://schemas.microsoft.com/office/powerpoint/2010/main" val="1640480973"/>
       </p:ext>
     </p:extLst>
   </p:cSld>
@@ -5470,109 +5945,77 @@
           <a:chExt cx="0" cy="0"/>
         </a:xfrm>
       </p:grpSpPr>
+      <p:sp>
+        <p:nvSpPr>
+          <p:cNvPr id="2" name="Title 1"/>
+          <p:cNvSpPr>
+            <a:spLocks noGrp="1"/>
+          </p:cNvSpPr>
+          <p:nvPr>
+            <p:ph type="title"/>
+          </p:nvPr>
+        </p:nvSpPr>
+        <p:spPr/>
+        <p:txBody>
+          <a:bodyPr/>
+          <a:lstStyle/>
+          <a:p>
+            <a:r>
+              <a:rPr lang="en-CA" dirty="0"/>
+              <a:t>References</a:t>
+            </a:r>
+          </a:p>
+        </p:txBody>
+      </p:sp>
+      <p:sp>
+        <p:nvSpPr>
+          <p:cNvPr id="3" name="Content Placeholder 2"/>
+          <p:cNvSpPr>
+            <a:spLocks noGrp="1"/>
+          </p:cNvSpPr>
+          <p:nvPr>
+            <p:ph idx="1"/>
+          </p:nvPr>
+        </p:nvSpPr>
+        <p:spPr/>
+        <p:txBody>
+          <a:bodyPr/>
+          <a:lstStyle/>
+          <a:p>
+            <a:r>
+              <a:rPr lang="en-CA" dirty="0" err="1"/>
+              <a:t>Minkyu</a:t>
+            </a:r>
+            <a:r>
+              <a:rPr lang="en-CA" dirty="0"/>
+              <a:t> Kim, Ying L. Becker, Peng </a:t>
+            </a:r>
+            <a:r>
+              <a:rPr lang="en-CA" dirty="0" err="1"/>
+              <a:t>Fei</a:t>
+            </a:r>
+            <a:r>
+              <a:rPr lang="en-CA" dirty="0"/>
+              <a:t>, and Una-May O’Reilly. Constrained genetic programming to minimize overfitting in stock selection. </a:t>
+            </a:r>
+            <a:r>
+              <a:rPr lang="en-CA" i="1" dirty="0"/>
+              <a:t>Genetic Programming Theory and Practice,</a:t>
+            </a:r>
+            <a:r>
+              <a:rPr lang="en-CA" dirty="0"/>
+              <a:t> 6:178-194, 2009</a:t>
+            </a:r>
+          </a:p>
+          <a:p>
+            <a:endParaRPr lang="en-CA" dirty="0"/>
+          </a:p>
+        </p:txBody>
+      </p:sp>
     </p:spTree>
     <p:extLst>
       <p:ext uri="{BB962C8B-B14F-4D97-AF65-F5344CB8AC3E}">
-        <p14:creationId xmlns:p14="http://schemas.microsoft.com/office/powerpoint/2010/main" val="1800380133"/>
-      </p:ext>
-    </p:extLst>
-  </p:cSld>
-  <p:clrMapOvr>
-    <a:masterClrMapping/>
-  </p:clrMapOvr>
-  <mc:AlternateContent xmlns:mc="http://schemas.openxmlformats.org/markup-compatibility/2006" xmlns:p14="http://schemas.microsoft.com/office/powerpoint/2010/main">
-    <mc:Choice Requires="p14">
-      <p:transition spd="med" p14:dur="700">
-        <p:fade/>
-      </p:transition>
-    </mc:Choice>
-    <mc:Fallback xmlns="">
-      <p:transition spd="med">
-        <p:fade/>
-      </p:transition>
-    </mc:Fallback>
-  </mc:AlternateContent>
-</p:sld>
-</file>
-
-<file path=ppt/slides/slide14.xml><?xml version="1.0" encoding="utf-8"?>
-<p:sld xmlns:a="http://schemas.openxmlformats.org/drawingml/2006/main" xmlns:r="http://schemas.openxmlformats.org/officeDocument/2006/relationships" xmlns:p="http://schemas.openxmlformats.org/presentationml/2006/main">
-  <p:cSld>
-    <p:spTree>
-      <p:nvGrpSpPr>
-        <p:cNvPr id="1" name=""/>
-        <p:cNvGrpSpPr/>
-        <p:nvPr/>
-      </p:nvGrpSpPr>
-      <p:grpSpPr>
-        <a:xfrm>
-          <a:off x="0" y="0"/>
-          <a:ext cx="0" cy="0"/>
-          <a:chOff x="0" y="0"/>
-          <a:chExt cx="0" cy="0"/>
-        </a:xfrm>
-      </p:grpSpPr>
-      <p:sp>
-        <p:nvSpPr>
-          <p:cNvPr id="2" name="Title 1"/>
-          <p:cNvSpPr>
-            <a:spLocks noGrp="1"/>
-          </p:cNvSpPr>
-          <p:nvPr>
-            <p:ph type="title"/>
-          </p:nvPr>
-        </p:nvSpPr>
-        <p:spPr/>
-        <p:txBody>
-          <a:bodyPr/>
-          <a:lstStyle/>
-          <a:p>
-            <a:endParaRPr lang="en-US"/>
-          </a:p>
-        </p:txBody>
-      </p:sp>
-      <p:sp>
-        <p:nvSpPr>
-          <p:cNvPr id="3" name="Content Placeholder 2"/>
-          <p:cNvSpPr>
-            <a:spLocks noGrp="1"/>
-          </p:cNvSpPr>
-          <p:nvPr>
-            <p:ph idx="1"/>
-          </p:nvPr>
-        </p:nvSpPr>
-        <p:spPr/>
-        <p:txBody>
-          <a:bodyPr/>
-          <a:lstStyle/>
-          <a:p>
-            <a:endParaRPr lang="en-US"/>
-          </a:p>
-        </p:txBody>
-      </p:sp>
-      <p:sp>
-        <p:nvSpPr>
-          <p:cNvPr id="4" name="Text Placeholder 3"/>
-          <p:cNvSpPr>
-            <a:spLocks noGrp="1"/>
-          </p:cNvSpPr>
-          <p:nvPr>
-            <p:ph type="body" sz="half" idx="2"/>
-          </p:nvPr>
-        </p:nvSpPr>
-        <p:spPr/>
-        <p:txBody>
-          <a:bodyPr/>
-          <a:lstStyle/>
-          <a:p>
-            <a:endParaRPr lang="en-US"/>
-          </a:p>
-        </p:txBody>
-      </p:sp>
-    </p:spTree>
-    <p:extLst>
-      <p:ext uri="{BB962C8B-B14F-4D97-AF65-F5344CB8AC3E}">
-        <p14:creationId xmlns:p14="http://schemas.microsoft.com/office/powerpoint/2010/main" val="3197023440"/>
+        <p14:creationId xmlns:p14="http://schemas.microsoft.com/office/powerpoint/2010/main" val="4294613089"/>
       </p:ext>
     </p:extLst>
   </p:cSld>
@@ -7154,7 +7597,14 @@
           <a:p>
             <a:r>
               <a:rPr lang="en-CA" dirty="0"/>
-              <a:t>Stacking 20 GP runs using average and median fusion techniques</a:t>
+              <a:t>Stacking 20 GP runs</a:t>
+            </a:r>
+          </a:p>
+          <a:p>
+            <a:pPr lvl="1"/>
+            <a:r>
+              <a:rPr lang="en-CA" dirty="0"/>
+              <a:t>Average vs. Median Fusion</a:t>
             </a:r>
           </a:p>
           <a:p>
@@ -7311,33 +7761,15 @@
                                   </p:childTnLst>
                                 </p:cTn>
                               </p:par>
-                            </p:childTnLst>
-                          </p:cTn>
-                        </p:par>
-                      </p:childTnLst>
-                    </p:cTn>
-                  </p:par>
-                  <p:par>
-                    <p:cTn id="13" fill="hold">
-                      <p:stCondLst>
-                        <p:cond delay="indefinite"/>
-                      </p:stCondLst>
-                      <p:childTnLst>
-                        <p:par>
-                          <p:cTn id="14" fill="hold">
-                            <p:stCondLst>
-                              <p:cond delay="0"/>
-                            </p:stCondLst>
-                            <p:childTnLst>
                               <p:par>
-                                <p:cTn id="15" presetID="10" presetClass="entr" presetSubtype="0" fill="hold" grpId="0" nodeType="clickEffect">
+                                <p:cTn id="13" presetID="10" presetClass="entr" presetSubtype="0" fill="hold" grpId="0" nodeType="withEffect">
                                   <p:stCondLst>
                                     <p:cond delay="0"/>
                                   </p:stCondLst>
                                   <p:childTnLst>
                                     <p:set>
                                       <p:cBhvr>
-                                        <p:cTn id="16" dur="1" fill="hold">
+                                        <p:cTn id="14" dur="1" fill="hold">
                                           <p:stCondLst>
                                             <p:cond delay="0"/>
                                           </p:stCondLst>
@@ -7359,11 +7791,72 @@
                                     </p:set>
                                     <p:animEffect transition="in" filter="fade">
                                       <p:cBhvr>
-                                        <p:cTn id="17" dur="500"/>
+                                        <p:cTn id="15" dur="500"/>
                                         <p:tgtEl>
                                           <p:spTgt spid="3">
                                             <p:txEl>
                                               <p:pRg st="2" end="2"/>
+                                            </p:txEl>
+                                          </p:spTgt>
+                                        </p:tgtEl>
+                                      </p:cBhvr>
+                                    </p:animEffect>
+                                  </p:childTnLst>
+                                </p:cTn>
+                              </p:par>
+                            </p:childTnLst>
+                          </p:cTn>
+                        </p:par>
+                      </p:childTnLst>
+                    </p:cTn>
+                  </p:par>
+                  <p:par>
+                    <p:cTn id="16" fill="hold">
+                      <p:stCondLst>
+                        <p:cond delay="indefinite"/>
+                      </p:stCondLst>
+                      <p:childTnLst>
+                        <p:par>
+                          <p:cTn id="17" fill="hold">
+                            <p:stCondLst>
+                              <p:cond delay="0"/>
+                            </p:stCondLst>
+                            <p:childTnLst>
+                              <p:par>
+                                <p:cTn id="18" presetID="10" presetClass="entr" presetSubtype="0" fill="hold" grpId="0" nodeType="clickEffect">
+                                  <p:stCondLst>
+                                    <p:cond delay="0"/>
+                                  </p:stCondLst>
+                                  <p:childTnLst>
+                                    <p:set>
+                                      <p:cBhvr>
+                                        <p:cTn id="19" dur="1" fill="hold">
+                                          <p:stCondLst>
+                                            <p:cond delay="0"/>
+                                          </p:stCondLst>
+                                        </p:cTn>
+                                        <p:tgtEl>
+                                          <p:spTgt spid="3">
+                                            <p:txEl>
+                                              <p:pRg st="3" end="3"/>
+                                            </p:txEl>
+                                          </p:spTgt>
+                                        </p:tgtEl>
+                                        <p:attrNameLst>
+                                          <p:attrName>style.visibility</p:attrName>
+                                        </p:attrNameLst>
+                                      </p:cBhvr>
+                                      <p:to>
+                                        <p:strVal val="visible"/>
+                                      </p:to>
+                                    </p:set>
+                                    <p:animEffect transition="in" filter="fade">
+                                      <p:cBhvr>
+                                        <p:cTn id="20" dur="500"/>
+                                        <p:tgtEl>
+                                          <p:spTgt spid="3">
+                                            <p:txEl>
+                                              <p:pRg st="3" end="3"/>
                                             </p:txEl>
                                           </p:spTgt>
                                         </p:tgtEl>
@@ -7600,6 +8093,232 @@
       </p:transition>
     </mc:Fallback>
   </mc:AlternateContent>
+  <p:timing>
+    <p:tnLst>
+      <p:par>
+        <p:cTn id="1" dur="indefinite" restart="never" nodeType="tmRoot">
+          <p:childTnLst>
+            <p:seq concurrent="1" nextAc="seek">
+              <p:cTn id="2" dur="indefinite" nodeType="mainSeq">
+                <p:childTnLst>
+                  <p:par>
+                    <p:cTn id="3" fill="hold">
+                      <p:stCondLst>
+                        <p:cond delay="indefinite"/>
+                      </p:stCondLst>
+                      <p:childTnLst>
+                        <p:par>
+                          <p:cTn id="4" fill="hold">
+                            <p:stCondLst>
+                              <p:cond delay="0"/>
+                            </p:stCondLst>
+                            <p:childTnLst>
+                              <p:par>
+                                <p:cTn id="5" presetID="10" presetClass="entr" presetSubtype="0" fill="hold" nodeType="clickEffect">
+                                  <p:stCondLst>
+                                    <p:cond delay="0"/>
+                                  </p:stCondLst>
+                                  <p:childTnLst>
+                                    <p:set>
+                                      <p:cBhvr>
+                                        <p:cTn id="6" dur="1" fill="hold">
+                                          <p:stCondLst>
+                                            <p:cond delay="0"/>
+                                          </p:stCondLst>
+                                        </p:cTn>
+                                        <p:tgtEl>
+                                          <p:spTgt spid="7"/>
+                                        </p:tgtEl>
+                                        <p:attrNameLst>
+                                          <p:attrName>style.visibility</p:attrName>
+                                        </p:attrNameLst>
+                                      </p:cBhvr>
+                                      <p:to>
+                                        <p:strVal val="visible"/>
+                                      </p:to>
+                                    </p:set>
+                                    <p:animEffect transition="in" filter="fade">
+                                      <p:cBhvr>
+                                        <p:cTn id="7" dur="500"/>
+                                        <p:tgtEl>
+                                          <p:spTgt spid="7"/>
+                                        </p:tgtEl>
+                                      </p:cBhvr>
+                                    </p:animEffect>
+                                  </p:childTnLst>
+                                </p:cTn>
+                              </p:par>
+                              <p:par>
+                                <p:cTn id="8" presetID="10" presetClass="entr" presetSubtype="0" fill="hold" grpId="0" nodeType="withEffect">
+                                  <p:stCondLst>
+                                    <p:cond delay="0"/>
+                                  </p:stCondLst>
+                                  <p:childTnLst>
+                                    <p:set>
+                                      <p:cBhvr>
+                                        <p:cTn id="9" dur="1" fill="hold">
+                                          <p:stCondLst>
+                                            <p:cond delay="0"/>
+                                          </p:stCondLst>
+                                        </p:cTn>
+                                        <p:tgtEl>
+                                          <p:spTgt spid="3">
+                                            <p:txEl>
+                                              <p:pRg st="0" end="0"/>
+                                            </p:txEl>
+                                          </p:spTgt>
+                                        </p:tgtEl>
+                                        <p:attrNameLst>
+                                          <p:attrName>style.visibility</p:attrName>
+                                        </p:attrNameLst>
+                                      </p:cBhvr>
+                                      <p:to>
+                                        <p:strVal val="visible"/>
+                                      </p:to>
+                                    </p:set>
+                                    <p:animEffect transition="in" filter="fade">
+                                      <p:cBhvr>
+                                        <p:cTn id="10" dur="500"/>
+                                        <p:tgtEl>
+                                          <p:spTgt spid="3">
+                                            <p:txEl>
+                                              <p:pRg st="0" end="0"/>
+                                            </p:txEl>
+                                          </p:spTgt>
+                                        </p:tgtEl>
+                                      </p:cBhvr>
+                                    </p:animEffect>
+                                  </p:childTnLst>
+                                </p:cTn>
+                              </p:par>
+                            </p:childTnLst>
+                          </p:cTn>
+                        </p:par>
+                      </p:childTnLst>
+                    </p:cTn>
+                  </p:par>
+                  <p:par>
+                    <p:cTn id="11" fill="hold">
+                      <p:stCondLst>
+                        <p:cond delay="indefinite"/>
+                      </p:stCondLst>
+                      <p:childTnLst>
+                        <p:par>
+                          <p:cTn id="12" fill="hold">
+                            <p:stCondLst>
+                              <p:cond delay="0"/>
+                            </p:stCondLst>
+                            <p:childTnLst>
+                              <p:par>
+                                <p:cTn id="13" presetID="10" presetClass="entr" presetSubtype="0" fill="hold" nodeType="clickEffect">
+                                  <p:stCondLst>
+                                    <p:cond delay="0"/>
+                                  </p:stCondLst>
+                                  <p:childTnLst>
+                                    <p:set>
+                                      <p:cBhvr>
+                                        <p:cTn id="14" dur="1" fill="hold">
+                                          <p:stCondLst>
+                                            <p:cond delay="0"/>
+                                          </p:stCondLst>
+                                        </p:cTn>
+                                        <p:tgtEl>
+                                          <p:spTgt spid="8"/>
+                                        </p:tgtEl>
+                                        <p:attrNameLst>
+                                          <p:attrName>style.visibility</p:attrName>
+                                        </p:attrNameLst>
+                                      </p:cBhvr>
+                                      <p:to>
+                                        <p:strVal val="visible"/>
+                                      </p:to>
+                                    </p:set>
+                                    <p:animEffect transition="in" filter="fade">
+                                      <p:cBhvr>
+                                        <p:cTn id="15" dur="500"/>
+                                        <p:tgtEl>
+                                          <p:spTgt spid="8"/>
+                                        </p:tgtEl>
+                                      </p:cBhvr>
+                                    </p:animEffect>
+                                  </p:childTnLst>
+                                </p:cTn>
+                              </p:par>
+                              <p:par>
+                                <p:cTn id="16" presetID="10" presetClass="entr" presetSubtype="0" fill="hold" grpId="0" nodeType="withEffect">
+                                  <p:stCondLst>
+                                    <p:cond delay="0"/>
+                                  </p:stCondLst>
+                                  <p:childTnLst>
+                                    <p:set>
+                                      <p:cBhvr>
+                                        <p:cTn id="17" dur="1" fill="hold">
+                                          <p:stCondLst>
+                                            <p:cond delay="0"/>
+                                          </p:stCondLst>
+                                        </p:cTn>
+                                        <p:tgtEl>
+                                          <p:spTgt spid="5">
+                                            <p:txEl>
+                                              <p:pRg st="0" end="0"/>
+                                            </p:txEl>
+                                          </p:spTgt>
+                                        </p:tgtEl>
+                                        <p:attrNameLst>
+                                          <p:attrName>style.visibility</p:attrName>
+                                        </p:attrNameLst>
+                                      </p:cBhvr>
+                                      <p:to>
+                                        <p:strVal val="visible"/>
+                                      </p:to>
+                                    </p:set>
+                                    <p:animEffect transition="in" filter="fade">
+                                      <p:cBhvr>
+                                        <p:cTn id="18" dur="500"/>
+                                        <p:tgtEl>
+                                          <p:spTgt spid="5">
+                                            <p:txEl>
+                                              <p:pRg st="0" end="0"/>
+                                            </p:txEl>
+                                          </p:spTgt>
+                                        </p:tgtEl>
+                                      </p:cBhvr>
+                                    </p:animEffect>
+                                  </p:childTnLst>
+                                </p:cTn>
+                              </p:par>
+                            </p:childTnLst>
+                          </p:cTn>
+                        </p:par>
+                      </p:childTnLst>
+                    </p:cTn>
+                  </p:par>
+                </p:childTnLst>
+              </p:cTn>
+              <p:prevCondLst>
+                <p:cond evt="onPrev" delay="0">
+                  <p:tgtEl>
+                    <p:sldTgt/>
+                  </p:tgtEl>
+                </p:cond>
+              </p:prevCondLst>
+              <p:nextCondLst>
+                <p:cond evt="onNext" delay="0">
+                  <p:tgtEl>
+                    <p:sldTgt/>
+                  </p:tgtEl>
+                </p:cond>
+              </p:nextCondLst>
+            </p:seq>
+          </p:childTnLst>
+        </p:cTn>
+      </p:par>
+    </p:tnLst>
+    <p:bldLst>
+      <p:bldP spid="3" grpId="0" build="p"/>
+      <p:bldP spid="5" grpId="0" build="p"/>
+    </p:bldLst>
+  </p:timing>
 </p:sld>
 </file>
 
@@ -7636,8 +8355,8 @@
           <a:lstStyle/>
           <a:p>
             <a:r>
-              <a:rPr lang="en-US" dirty="0"/>
-              <a:t>Results &amp; Discussion</a:t>
+              <a:rPr lang="en-CA" dirty="0"/>
+              <a:t>Data &amp; Preliminary Trials</a:t>
             </a:r>
           </a:p>
         </p:txBody>
@@ -7655,7 +8374,7 @@
         <p:spPr>
           <a:xfrm>
             <a:off x="1104900" y="1600200"/>
-            <a:ext cx="4889500" cy="4572000"/>
+            <a:ext cx="4434723" cy="4572000"/>
           </a:xfrm>
         </p:spPr>
         <p:txBody>
@@ -7664,23 +8383,69 @@
           <a:p>
             <a:r>
               <a:rPr lang="en-CA" dirty="0"/>
-              <a:t>Use of </a:t>
-            </a:r>
-            <a:r>
-              <a:rPr lang="en-CA" i="1" dirty="0"/>
-              <a:t>IFLT</a:t>
-            </a:r>
+              <a:t>Chosen Data Dow Jones Industrial Average</a:t>
+            </a:r>
+          </a:p>
+          <a:p>
             <a:r>
               <a:rPr lang="en-CA" dirty="0"/>
-              <a:t> comparatively improved a simple math language</a:t>
-            </a:r>
-          </a:p>
-        </p:txBody>
-      </p:sp>
+              <a:t>Jan. 1, 2013 – Jan. 1, 2016</a:t>
+            </a:r>
+          </a:p>
+          <a:p>
+            <a:r>
+              <a:rPr lang="en-CA" dirty="0"/>
+              <a:t>3 Fiscal Years of variant growth patterns</a:t>
+            </a:r>
+          </a:p>
+          <a:p>
+            <a:r>
+              <a:rPr lang="en-CA" dirty="0"/>
+              <a:t>Normalized to [0, 1]</a:t>
+            </a:r>
+          </a:p>
+          <a:p>
+            <a:pPr marL="0" indent="0">
+              <a:buNone/>
+            </a:pPr>
+            <a:endParaRPr lang="en-CA" dirty="0"/>
+          </a:p>
+        </p:txBody>
+      </p:sp>
+      <p:pic>
+        <p:nvPicPr>
+          <p:cNvPr id="4" name="Picture 3"/>
+          <p:cNvPicPr>
+            <a:picLocks noChangeAspect="1"/>
+          </p:cNvPicPr>
+          <p:nvPr/>
+        </p:nvPicPr>
+        <p:blipFill>
+          <a:blip r:embed="rId3">
+            <a:extLst>
+              <a:ext uri="{28A0092B-C50C-407E-A947-70E740481C1C}">
+                <a14:useLocalDpi xmlns:a14="http://schemas.microsoft.com/office/drawing/2010/main" val="0"/>
+              </a:ext>
+            </a:extLst>
+          </a:blip>
+          <a:stretch>
+            <a:fillRect/>
+          </a:stretch>
+        </p:blipFill>
+        <p:spPr>
+          <a:xfrm>
+            <a:off x="5539623" y="1866113"/>
+            <a:ext cx="5910980" cy="4306087"/>
+          </a:xfrm>
+          <a:prstGeom prst="rect">
+            <a:avLst/>
+          </a:prstGeom>
+        </p:spPr>
+      </p:pic>
     </p:spTree>
     <p:extLst>
       <p:ext uri="{BB962C8B-B14F-4D97-AF65-F5344CB8AC3E}">
-        <p14:creationId xmlns:p14="http://schemas.microsoft.com/office/powerpoint/2010/main" val="4224509479"/>
+        <p14:creationId xmlns:p14="http://schemas.microsoft.com/office/powerpoint/2010/main" val="4188258239"/>
       </p:ext>
     </p:extLst>
   </p:cSld>
@@ -7699,6 +8464,333 @@
       </p:transition>
     </mc:Fallback>
   </mc:AlternateContent>
+  <p:timing>
+    <p:tnLst>
+      <p:par>
+        <p:cTn id="1" dur="indefinite" restart="never" nodeType="tmRoot">
+          <p:childTnLst>
+            <p:seq concurrent="1" nextAc="seek">
+              <p:cTn id="2" dur="indefinite" nodeType="mainSeq">
+                <p:childTnLst>
+                  <p:par>
+                    <p:cTn id="3" fill="hold">
+                      <p:stCondLst>
+                        <p:cond delay="indefinite"/>
+                      </p:stCondLst>
+                      <p:childTnLst>
+                        <p:par>
+                          <p:cTn id="4" fill="hold">
+                            <p:stCondLst>
+                              <p:cond delay="0"/>
+                            </p:stCondLst>
+                            <p:childTnLst>
+                              <p:par>
+                                <p:cTn id="5" presetID="10" presetClass="entr" presetSubtype="0" fill="hold" nodeType="clickEffect">
+                                  <p:stCondLst>
+                                    <p:cond delay="0"/>
+                                  </p:stCondLst>
+                                  <p:childTnLst>
+                                    <p:set>
+                                      <p:cBhvr>
+                                        <p:cTn id="6" dur="1" fill="hold">
+                                          <p:stCondLst>
+                                            <p:cond delay="0"/>
+                                          </p:stCondLst>
+                                        </p:cTn>
+                                        <p:tgtEl>
+                                          <p:spTgt spid="3">
+                                            <p:txEl>
+                                              <p:pRg st="0" end="0"/>
+                                            </p:txEl>
+                                          </p:spTgt>
+                                        </p:tgtEl>
+                                        <p:attrNameLst>
+                                          <p:attrName>style.visibility</p:attrName>
+                                        </p:attrNameLst>
+                                      </p:cBhvr>
+                                      <p:to>
+                                        <p:strVal val="visible"/>
+                                      </p:to>
+                                    </p:set>
+                                    <p:animEffect transition="in" filter="fade">
+                                      <p:cBhvr>
+                                        <p:cTn id="7" dur="500"/>
+                                        <p:tgtEl>
+                                          <p:spTgt spid="3">
+                                            <p:txEl>
+                                              <p:pRg st="0" end="0"/>
+                                            </p:txEl>
+                                          </p:spTgt>
+                                        </p:tgtEl>
+                                      </p:cBhvr>
+                                    </p:animEffect>
+                                  </p:childTnLst>
+                                </p:cTn>
+                              </p:par>
+                            </p:childTnLst>
+                          </p:cTn>
+                        </p:par>
+                      </p:childTnLst>
+                    </p:cTn>
+                  </p:par>
+                  <p:par>
+                    <p:cTn id="8" fill="hold">
+                      <p:stCondLst>
+                        <p:cond delay="indefinite"/>
+                      </p:stCondLst>
+                      <p:childTnLst>
+                        <p:par>
+                          <p:cTn id="9" fill="hold">
+                            <p:stCondLst>
+                              <p:cond delay="0"/>
+                            </p:stCondLst>
+                            <p:childTnLst>
+                              <p:par>
+                                <p:cTn id="10" presetID="10" presetClass="entr" presetSubtype="0" fill="hold" nodeType="clickEffect">
+                                  <p:stCondLst>
+                                    <p:cond delay="0"/>
+                                  </p:stCondLst>
+                                  <p:childTnLst>
+                                    <p:set>
+                                      <p:cBhvr>
+                                        <p:cTn id="11" dur="1" fill="hold">
+                                          <p:stCondLst>
+                                            <p:cond delay="0"/>
+                                          </p:stCondLst>
+                                        </p:cTn>
+                                        <p:tgtEl>
+                                          <p:spTgt spid="3">
+                                            <p:txEl>
+                                              <p:pRg st="1" end="1"/>
+                                            </p:txEl>
+                                          </p:spTgt>
+                                        </p:tgtEl>
+                                        <p:attrNameLst>
+                                          <p:attrName>style.visibility</p:attrName>
+                                        </p:attrNameLst>
+                                      </p:cBhvr>
+                                      <p:to>
+                                        <p:strVal val="visible"/>
+                                      </p:to>
+                                    </p:set>
+                                    <p:animEffect transition="in" filter="fade">
+                                      <p:cBhvr>
+                                        <p:cTn id="12" dur="500"/>
+                                        <p:tgtEl>
+                                          <p:spTgt spid="3">
+                                            <p:txEl>
+                                              <p:pRg st="1" end="1"/>
+                                            </p:txEl>
+                                          </p:spTgt>
+                                        </p:tgtEl>
+                                      </p:cBhvr>
+                                    </p:animEffect>
+                                  </p:childTnLst>
+                                </p:cTn>
+                              </p:par>
+                            </p:childTnLst>
+                          </p:cTn>
+                        </p:par>
+                      </p:childTnLst>
+                    </p:cTn>
+                  </p:par>
+                  <p:par>
+                    <p:cTn id="13" fill="hold">
+                      <p:stCondLst>
+                        <p:cond delay="indefinite"/>
+                      </p:stCondLst>
+                      <p:childTnLst>
+                        <p:par>
+                          <p:cTn id="14" fill="hold">
+                            <p:stCondLst>
+                              <p:cond delay="0"/>
+                            </p:stCondLst>
+                            <p:childTnLst>
+                              <p:par>
+                                <p:cTn id="15" presetID="10" presetClass="entr" presetSubtype="0" fill="hold" nodeType="clickEffect">
+                                  <p:stCondLst>
+                                    <p:cond delay="0"/>
+                                  </p:stCondLst>
+                                  <p:childTnLst>
+                                    <p:set>
+                                      <p:cBhvr>
+                                        <p:cTn id="16" dur="1" fill="hold">
+                                          <p:stCondLst>
+                                            <p:cond delay="0"/>
+                                          </p:stCondLst>
+                                        </p:cTn>
+                                        <p:tgtEl>
+                                          <p:spTgt spid="3">
+                                            <p:txEl>
+                                              <p:pRg st="2" end="2"/>
+                                            </p:txEl>
+                                          </p:spTgt>
+                                        </p:tgtEl>
+                                        <p:attrNameLst>
+                                          <p:attrName>style.visibility</p:attrName>
+                                        </p:attrNameLst>
+                                      </p:cBhvr>
+                                      <p:to>
+                                        <p:strVal val="visible"/>
+                                      </p:to>
+                                    </p:set>
+                                    <p:animEffect transition="in" filter="fade">
+                                      <p:cBhvr>
+                                        <p:cTn id="17" dur="500"/>
+                                        <p:tgtEl>
+                                          <p:spTgt spid="3">
+                                            <p:txEl>
+                                              <p:pRg st="2" end="2"/>
+                                            </p:txEl>
+                                          </p:spTgt>
+                                        </p:tgtEl>
+                                      </p:cBhvr>
+                                    </p:animEffect>
+                                  </p:childTnLst>
+                                </p:cTn>
+                              </p:par>
+                            </p:childTnLst>
+                          </p:cTn>
+                        </p:par>
+                      </p:childTnLst>
+                    </p:cTn>
+                  </p:par>
+                  <p:par>
+                    <p:cTn id="18" fill="hold">
+                      <p:stCondLst>
+                        <p:cond delay="indefinite"/>
+                      </p:stCondLst>
+                      <p:childTnLst>
+                        <p:par>
+                          <p:cTn id="19" fill="hold">
+                            <p:stCondLst>
+                              <p:cond delay="0"/>
+                            </p:stCondLst>
+                            <p:childTnLst>
+                              <p:par>
+                                <p:cTn id="20" presetID="10" presetClass="entr" presetSubtype="0" fill="hold" nodeType="clickEffect">
+                                  <p:stCondLst>
+                                    <p:cond delay="0"/>
+                                  </p:stCondLst>
+                                  <p:childTnLst>
+                                    <p:set>
+                                      <p:cBhvr>
+                                        <p:cTn id="21" dur="1" fill="hold">
+                                          <p:stCondLst>
+                                            <p:cond delay="0"/>
+                                          </p:stCondLst>
+                                        </p:cTn>
+                                        <p:tgtEl>
+                                          <p:spTgt spid="4"/>
+                                        </p:tgtEl>
+                                        <p:attrNameLst>
+                                          <p:attrName>style.visibility</p:attrName>
+                                        </p:attrNameLst>
+                                      </p:cBhvr>
+                                      <p:to>
+                                        <p:strVal val="visible"/>
+                                      </p:to>
+                                    </p:set>
+                                    <p:animEffect transition="in" filter="fade">
+                                      <p:cBhvr>
+                                        <p:cTn id="22" dur="500"/>
+                                        <p:tgtEl>
+                                          <p:spTgt spid="4"/>
+                                        </p:tgtEl>
+                                      </p:cBhvr>
+                                    </p:animEffect>
+                                  </p:childTnLst>
+                                </p:cTn>
+                              </p:par>
+                            </p:childTnLst>
+                          </p:cTn>
+                        </p:par>
+                      </p:childTnLst>
+                    </p:cTn>
+                  </p:par>
+                  <p:par>
+                    <p:cTn id="23" fill="hold">
+                      <p:stCondLst>
+                        <p:cond delay="indefinite"/>
+                      </p:stCondLst>
+                      <p:childTnLst>
+                        <p:par>
+                          <p:cTn id="24" fill="hold">
+                            <p:stCondLst>
+                              <p:cond delay="0"/>
+                            </p:stCondLst>
+                            <p:childTnLst>
+                              <p:par>
+                                <p:cTn id="25" presetID="10" presetClass="entr" presetSubtype="0" fill="hold" nodeType="clickEffect">
+                                  <p:stCondLst>
+                                    <p:cond delay="0"/>
+                                  </p:stCondLst>
+                                  <p:childTnLst>
+                                    <p:set>
+                                      <p:cBhvr>
+                                        <p:cTn id="26" dur="1" fill="hold">
+                                          <p:stCondLst>
+                                            <p:cond delay="0"/>
+                                          </p:stCondLst>
+                                        </p:cTn>
+                                        <p:tgtEl>
+                                          <p:spTgt spid="3">
+                                            <p:txEl>
+                                              <p:pRg st="3" end="3"/>
+                                            </p:txEl>
+                                          </p:spTgt>
+                                        </p:tgtEl>
+                                        <p:attrNameLst>
+                                          <p:attrName>style.visibility</p:attrName>
+                                        </p:attrNameLst>
+                                      </p:cBhvr>
+                                      <p:to>
+                                        <p:strVal val="visible"/>
+                                      </p:to>
+                                    </p:set>
+                                    <p:animEffect transition="in" filter="fade">
+                                      <p:cBhvr>
+                                        <p:cTn id="27" dur="500"/>
+                                        <p:tgtEl>
+                                          <p:spTgt spid="3">
+                                            <p:txEl>
+                                              <p:pRg st="3" end="3"/>
+                                            </p:txEl>
+                                          </p:spTgt>
+                                        </p:tgtEl>
+                                      </p:cBhvr>
+                                    </p:animEffect>
+                                  </p:childTnLst>
+                                </p:cTn>
+                              </p:par>
+                            </p:childTnLst>
+                          </p:cTn>
+                        </p:par>
+                      </p:childTnLst>
+                    </p:cTn>
+                  </p:par>
+                </p:childTnLst>
+              </p:cTn>
+              <p:prevCondLst>
+                <p:cond evt="onPrev" delay="0">
+                  <p:tgtEl>
+                    <p:sldTgt/>
+                  </p:tgtEl>
+                </p:cond>
+              </p:prevCondLst>
+              <p:nextCondLst>
+                <p:cond evt="onNext" delay="0">
+                  <p:tgtEl>
+                    <p:sldTgt/>
+                  </p:tgtEl>
+                </p:cond>
+              </p:nextCondLst>
+            </p:seq>
+          </p:childTnLst>
+        </p:cTn>
+      </p:par>
+    </p:tnLst>
+  </p:timing>
 </p:sld>
 </file>
 
@@ -7735,45 +8827,20 @@
           <a:lstStyle/>
           <a:p>
             <a:r>
-              <a:rPr lang="en-US" dirty="0"/>
-              <a:t>Picture with Caption Layout</a:t>
-            </a:r>
-          </a:p>
-        </p:txBody>
-      </p:sp>
-      <p:pic>
-        <p:nvPicPr>
-          <p:cNvPr id="5" name="Picture Placeholder 4" descr="Closeup of books on shelves with more books blurred in foreground and background" title="Sample Picture"/>
-          <p:cNvPicPr>
-            <a:picLocks noGrp="1" noChangeAspect="1"/>
-          </p:cNvPicPr>
-          <p:nvPr>
-            <p:ph type="pic" idx="1"/>
-          </p:nvPr>
-        </p:nvPicPr>
-        <p:blipFill>
-          <a:blip r:embed="rId2" cstate="print">
-            <a:extLst>
-              <a:ext uri="{28A0092B-C50C-407E-A947-70E740481C1C}">
-                <a14:useLocalDpi xmlns:a14="http://schemas.microsoft.com/office/drawing/2010/main" val="0"/>
-              </a:ext>
-            </a:extLst>
-          </a:blip>
-          <a:srcRect l="3155" r="3155"/>
-          <a:stretch>
-            <a:fillRect/>
-          </a:stretch>
-        </p:blipFill>
-        <p:spPr/>
-      </p:pic>
-      <p:sp>
-        <p:nvSpPr>
-          <p:cNvPr id="4" name="Text Placeholder 3"/>
-          <p:cNvSpPr>
-            <a:spLocks noGrp="1"/>
-          </p:cNvSpPr>
-          <p:nvPr>
-            <p:ph type="body" sz="half" idx="2"/>
+              <a:rPr lang="en-CA" dirty="0"/>
+              <a:t>Data &amp; Preliminary Trials</a:t>
+            </a:r>
+          </a:p>
+        </p:txBody>
+      </p:sp>
+      <p:sp>
+        <p:nvSpPr>
+          <p:cNvPr id="3" name="Content Placeholder 2"/>
+          <p:cNvSpPr>
+            <a:spLocks noGrp="1"/>
+          </p:cNvSpPr>
+          <p:nvPr>
+            <p:ph sz="half" idx="1"/>
           </p:nvPr>
         </p:nvSpPr>
         <p:spPr/>
@@ -7782,16 +8849,352 @@
           <a:lstStyle/>
           <a:p>
             <a:r>
-              <a:rPr lang="en-US" dirty="0"/>
-              <a:t>Caption</a:t>
-            </a:r>
-          </a:p>
-        </p:txBody>
-      </p:sp>
+              <a:rPr lang="en-CA" dirty="0"/>
+              <a:t>Chosen Parameters in early examples yielded the strongest ensemble</a:t>
+            </a:r>
+          </a:p>
+          <a:p>
+            <a:r>
+              <a:rPr lang="en-CA" dirty="0"/>
+              <a:t>Similar to the results of Kim </a:t>
+            </a:r>
+            <a:r>
+              <a:rPr lang="en-CA" i="1" dirty="0"/>
+              <a:t>et al. [1]</a:t>
+            </a:r>
+            <a:endParaRPr lang="en-CA" dirty="0"/>
+          </a:p>
+        </p:txBody>
+      </p:sp>
+      <p:graphicFrame>
+        <p:nvGraphicFramePr>
+          <p:cNvPr id="5" name="Content Placeholder 3"/>
+          <p:cNvGraphicFramePr>
+            <a:graphicFrameLocks noGrp="1"/>
+          </p:cNvGraphicFramePr>
+          <p:nvPr>
+            <p:ph idx="1"/>
+            <p:extLst>
+              <p:ext uri="{D42A27DB-BD31-4B8C-83A1-F6EECF244321}">
+                <p14:modId xmlns:p14="http://schemas.microsoft.com/office/powerpoint/2010/main" val="641632042"/>
+              </p:ext>
+            </p:extLst>
+          </p:nvPr>
+        </p:nvGraphicFramePr>
+        <p:xfrm>
+          <a:off x="6246882" y="1600200"/>
+          <a:ext cx="4978400" cy="2966720"/>
+        </p:xfrm>
+        <a:graphic>
+          <a:graphicData uri="http://schemas.openxmlformats.org/drawingml/2006/table">
+            <a:tbl>
+              <a:tblPr firstRow="1" bandRow="1">
+                <a:tableStyleId>{5C22544A-7EE6-4342-B048-85BDC9FD1C3A}</a:tableStyleId>
+              </a:tblPr>
+              <a:tblGrid>
+                <a:gridCol w="2489200">
+                  <a:extLst>
+                    <a:ext uri="{9D8B030D-6E8A-4147-A177-3AD203B41FA5}">
+                      <a16:colId xmlns:a16="http://schemas.microsoft.com/office/drawing/2014/main" val="3042923453"/>
+                    </a:ext>
+                  </a:extLst>
+                </a:gridCol>
+                <a:gridCol w="2489200">
+                  <a:extLst>
+                    <a:ext uri="{9D8B030D-6E8A-4147-A177-3AD203B41FA5}">
+                      <a16:colId xmlns:a16="http://schemas.microsoft.com/office/drawing/2014/main" val="3668010245"/>
+                    </a:ext>
+                  </a:extLst>
+                </a:gridCol>
+              </a:tblGrid>
+              <a:tr h="370840">
+                <a:tc>
+                  <a:txBody>
+                    <a:bodyPr/>
+                    <a:lstStyle/>
+                    <a:p>
+                      <a:pPr algn="ctr"/>
+                      <a:r>
+                        <a:rPr lang="en-CA" dirty="0"/>
+                        <a:t>Parameter</a:t>
+                      </a:r>
+                    </a:p>
+                  </a:txBody>
+                  <a:tcPr/>
+                </a:tc>
+                <a:tc>
+                  <a:txBody>
+                    <a:bodyPr/>
+                    <a:lstStyle/>
+                    <a:p>
+                      <a:pPr algn="ctr"/>
+                      <a:r>
+                        <a:rPr lang="en-CA" dirty="0"/>
+                        <a:t>Value</a:t>
+                      </a:r>
+                    </a:p>
+                  </a:txBody>
+                  <a:tcPr/>
+                </a:tc>
+                <a:extLst>
+                  <a:ext uri="{0D108BD9-81ED-4DB2-BD59-A6C34878D82A}">
+                    <a16:rowId xmlns:a16="http://schemas.microsoft.com/office/drawing/2014/main" val="3599683607"/>
+                  </a:ext>
+                </a:extLst>
+              </a:tr>
+              <a:tr h="370840">
+                <a:tc>
+                  <a:txBody>
+                    <a:bodyPr/>
+                    <a:lstStyle/>
+                    <a:p>
+                      <a:pPr algn="ctr"/>
+                      <a:r>
+                        <a:rPr lang="en-CA" dirty="0"/>
+                        <a:t>Crossover</a:t>
+                      </a:r>
+                    </a:p>
+                  </a:txBody>
+                  <a:tcPr/>
+                </a:tc>
+                <a:tc>
+                  <a:txBody>
+                    <a:bodyPr/>
+                    <a:lstStyle/>
+                    <a:p>
+                      <a:pPr algn="ctr"/>
+                      <a:r>
+                        <a:rPr lang="en-CA" dirty="0"/>
+                        <a:t>90%</a:t>
+                      </a:r>
+                    </a:p>
+                  </a:txBody>
+                  <a:tcPr/>
+                </a:tc>
+                <a:extLst>
+                  <a:ext uri="{0D108BD9-81ED-4DB2-BD59-A6C34878D82A}">
+                    <a16:rowId xmlns:a16="http://schemas.microsoft.com/office/drawing/2014/main" val="3871596754"/>
+                  </a:ext>
+                </a:extLst>
+              </a:tr>
+              <a:tr h="370840">
+                <a:tc>
+                  <a:txBody>
+                    <a:bodyPr/>
+                    <a:lstStyle/>
+                    <a:p>
+                      <a:pPr algn="ctr"/>
+                      <a:r>
+                        <a:rPr lang="en-CA" dirty="0"/>
+                        <a:t>Mutation</a:t>
+                      </a:r>
+                    </a:p>
+                  </a:txBody>
+                  <a:tcPr/>
+                </a:tc>
+                <a:tc>
+                  <a:txBody>
+                    <a:bodyPr/>
+                    <a:lstStyle/>
+                    <a:p>
+                      <a:pPr algn="ctr"/>
+                      <a:r>
+                        <a:rPr lang="en-CA" dirty="0"/>
+                        <a:t>10%</a:t>
+                      </a:r>
+                    </a:p>
+                  </a:txBody>
+                  <a:tcPr/>
+                </a:tc>
+                <a:extLst>
+                  <a:ext uri="{0D108BD9-81ED-4DB2-BD59-A6C34878D82A}">
+                    <a16:rowId xmlns:a16="http://schemas.microsoft.com/office/drawing/2014/main" val="1511813508"/>
+                  </a:ext>
+                </a:extLst>
+              </a:tr>
+              <a:tr h="370840">
+                <a:tc>
+                  <a:txBody>
+                    <a:bodyPr/>
+                    <a:lstStyle/>
+                    <a:p>
+                      <a:pPr algn="ctr"/>
+                      <a:r>
+                        <a:rPr lang="en-CA" dirty="0"/>
+                        <a:t>Elitism</a:t>
+                      </a:r>
+                    </a:p>
+                  </a:txBody>
+                  <a:tcPr/>
+                </a:tc>
+                <a:tc>
+                  <a:txBody>
+                    <a:bodyPr/>
+                    <a:lstStyle/>
+                    <a:p>
+                      <a:pPr algn="ctr"/>
+                      <a:r>
+                        <a:rPr lang="en-CA" dirty="0"/>
+                        <a:t>0</a:t>
+                      </a:r>
+                    </a:p>
+                  </a:txBody>
+                  <a:tcPr/>
+                </a:tc>
+                <a:extLst>
+                  <a:ext uri="{0D108BD9-81ED-4DB2-BD59-A6C34878D82A}">
+                    <a16:rowId xmlns:a16="http://schemas.microsoft.com/office/drawing/2014/main" val="1970786246"/>
+                  </a:ext>
+                </a:extLst>
+              </a:tr>
+              <a:tr h="370840">
+                <a:tc>
+                  <a:txBody>
+                    <a:bodyPr/>
+                    <a:lstStyle/>
+                    <a:p>
+                      <a:pPr algn="ctr"/>
+                      <a:r>
+                        <a:rPr lang="en-CA" dirty="0"/>
+                        <a:t>Tournament Size</a:t>
+                      </a:r>
+                    </a:p>
+                  </a:txBody>
+                  <a:tcPr/>
+                </a:tc>
+                <a:tc>
+                  <a:txBody>
+                    <a:bodyPr/>
+                    <a:lstStyle/>
+                    <a:p>
+                      <a:pPr algn="ctr"/>
+                      <a:r>
+                        <a:rPr lang="en-CA" dirty="0"/>
+                        <a:t>2</a:t>
+                      </a:r>
+                    </a:p>
+                  </a:txBody>
+                  <a:tcPr/>
+                </a:tc>
+                <a:extLst>
+                  <a:ext uri="{0D108BD9-81ED-4DB2-BD59-A6C34878D82A}">
+                    <a16:rowId xmlns:a16="http://schemas.microsoft.com/office/drawing/2014/main" val="620376632"/>
+                  </a:ext>
+                </a:extLst>
+              </a:tr>
+              <a:tr h="370840">
+                <a:tc>
+                  <a:txBody>
+                    <a:bodyPr/>
+                    <a:lstStyle/>
+                    <a:p>
+                      <a:pPr algn="ctr"/>
+                      <a:r>
+                        <a:rPr lang="en-CA" dirty="0"/>
+                        <a:t>Max Tree Depth</a:t>
+                      </a:r>
+                    </a:p>
+                  </a:txBody>
+                  <a:tcPr/>
+                </a:tc>
+                <a:tc>
+                  <a:txBody>
+                    <a:bodyPr/>
+                    <a:lstStyle/>
+                    <a:p>
+                      <a:pPr algn="ctr"/>
+                      <a:r>
+                        <a:rPr lang="en-CA" dirty="0"/>
+                        <a:t>17</a:t>
+                      </a:r>
+                    </a:p>
+                  </a:txBody>
+                  <a:tcPr/>
+                </a:tc>
+                <a:extLst>
+                  <a:ext uri="{0D108BD9-81ED-4DB2-BD59-A6C34878D82A}">
+                    <a16:rowId xmlns:a16="http://schemas.microsoft.com/office/drawing/2014/main" val="1613152120"/>
+                  </a:ext>
+                </a:extLst>
+              </a:tr>
+              <a:tr h="370840">
+                <a:tc>
+                  <a:txBody>
+                    <a:bodyPr/>
+                    <a:lstStyle/>
+                    <a:p>
+                      <a:pPr algn="ctr"/>
+                      <a:r>
+                        <a:rPr lang="en-CA" dirty="0"/>
+                        <a:t>Pop. Size</a:t>
+                      </a:r>
+                    </a:p>
+                  </a:txBody>
+                  <a:tcPr/>
+                </a:tc>
+                <a:tc>
+                  <a:txBody>
+                    <a:bodyPr/>
+                    <a:lstStyle/>
+                    <a:p>
+                      <a:pPr algn="ctr"/>
+                      <a:r>
+                        <a:rPr lang="en-CA" dirty="0"/>
+                        <a:t>1000</a:t>
+                      </a:r>
+                    </a:p>
+                  </a:txBody>
+                  <a:tcPr/>
+                </a:tc>
+                <a:extLst>
+                  <a:ext uri="{0D108BD9-81ED-4DB2-BD59-A6C34878D82A}">
+                    <a16:rowId xmlns:a16="http://schemas.microsoft.com/office/drawing/2014/main" val="2745308558"/>
+                  </a:ext>
+                </a:extLst>
+              </a:tr>
+              <a:tr h="370840">
+                <a:tc>
+                  <a:txBody>
+                    <a:bodyPr/>
+                    <a:lstStyle/>
+                    <a:p>
+                      <a:pPr algn="ctr"/>
+                      <a:r>
+                        <a:rPr lang="en-CA" dirty="0"/>
+                        <a:t>Generations</a:t>
+                      </a:r>
+                    </a:p>
+                  </a:txBody>
+                  <a:tcPr/>
+                </a:tc>
+                <a:tc>
+                  <a:txBody>
+                    <a:bodyPr/>
+                    <a:lstStyle/>
+                    <a:p>
+                      <a:pPr algn="ctr"/>
+                      <a:r>
+                        <a:rPr lang="en-CA" dirty="0"/>
+                        <a:t>100</a:t>
+                      </a:r>
+                    </a:p>
+                  </a:txBody>
+                  <a:tcPr/>
+                </a:tc>
+                <a:extLst>
+                  <a:ext uri="{0D108BD9-81ED-4DB2-BD59-A6C34878D82A}">
+                    <a16:rowId xmlns:a16="http://schemas.microsoft.com/office/drawing/2014/main" val="3619237203"/>
+                  </a:ext>
+                </a:extLst>
+              </a:tr>
+            </a:tbl>
+          </a:graphicData>
+        </a:graphic>
+      </p:graphicFrame>
     </p:spTree>
     <p:extLst>
       <p:ext uri="{BB962C8B-B14F-4D97-AF65-F5344CB8AC3E}">
-        <p14:creationId xmlns:p14="http://schemas.microsoft.com/office/powerpoint/2010/main" val="3683544629"/>
+        <p14:creationId xmlns:p14="http://schemas.microsoft.com/office/powerpoint/2010/main" val="3809092575"/>
       </p:ext>
     </p:extLst>
   </p:cSld>
@@ -7837,7 +9240,7 @@
             <a:spLocks noGrp="1"/>
           </p:cNvSpPr>
           <p:nvPr>
-            <p:ph type="ctrTitle"/>
+            <p:ph type="title"/>
           </p:nvPr>
         </p:nvSpPr>
         <p:spPr/>
@@ -7845,33 +9248,93 @@
           <a:bodyPr/>
           <a:lstStyle/>
           <a:p>
-            <a:endParaRPr lang="en-US"/>
-          </a:p>
-        </p:txBody>
-      </p:sp>
-      <p:sp>
-        <p:nvSpPr>
-          <p:cNvPr id="3" name="Subtitle 2"/>
-          <p:cNvSpPr>
-            <a:spLocks noGrp="1"/>
-          </p:cNvSpPr>
-          <p:nvPr>
-            <p:ph type="subTitle" idx="1"/>
-          </p:nvPr>
-        </p:nvSpPr>
-        <p:spPr/>
+            <a:r>
+              <a:rPr lang="en-US" dirty="0"/>
+              <a:t>Results &amp; Discussion</a:t>
+            </a:r>
+          </a:p>
+        </p:txBody>
+      </p:sp>
+      <p:sp>
+        <p:nvSpPr>
+          <p:cNvPr id="3" name="Content Placeholder 2"/>
+          <p:cNvSpPr>
+            <a:spLocks noGrp="1"/>
+          </p:cNvSpPr>
+          <p:nvPr>
+            <p:ph idx="1"/>
+          </p:nvPr>
+        </p:nvSpPr>
+        <p:spPr>
+          <a:xfrm>
+            <a:off x="1104900" y="1600200"/>
+            <a:ext cx="4889500" cy="4572000"/>
+          </a:xfrm>
+        </p:spPr>
         <p:txBody>
           <a:bodyPr/>
           <a:lstStyle/>
           <a:p>
-            <a:endParaRPr lang="en-US"/>
+            <a:r>
+              <a:rPr lang="en-CA" dirty="0"/>
+              <a:t>Without </a:t>
+            </a:r>
+            <a:r>
+              <a:rPr lang="en-CA" i="1" dirty="0"/>
+              <a:t>IFLT</a:t>
+            </a:r>
+            <a:r>
+              <a:rPr lang="en-CA" dirty="0"/>
+              <a:t> in a math-based language</a:t>
+            </a:r>
+          </a:p>
+          <a:p>
+            <a:pPr lvl="1"/>
+            <a:r>
+              <a:rPr lang="en-CA" dirty="0"/>
+              <a:t>Language: </a:t>
+            </a:r>
+            <a:r>
+              <a:rPr lang="en-CA" b="1" i="1" dirty="0"/>
+              <a:t>L</a:t>
+            </a:r>
+          </a:p>
+          <a:p>
+            <a:r>
+              <a:rPr lang="en-CA" dirty="0"/>
+              <a:t>With </a:t>
+            </a:r>
+            <a:r>
+              <a:rPr lang="en-CA" i="1" dirty="0"/>
+              <a:t>IFLT</a:t>
+            </a:r>
+            <a:r>
+              <a:rPr lang="en-CA" dirty="0"/>
+              <a:t> in a math-based language</a:t>
+            </a:r>
+          </a:p>
+          <a:p>
+            <a:pPr lvl="1"/>
+            <a:r>
+              <a:rPr lang="en-CA" dirty="0"/>
+              <a:t>Language: </a:t>
+            </a:r>
+            <a:r>
+              <a:rPr lang="en-CA" b="1" i="1" dirty="0"/>
+              <a:t>L</a:t>
+            </a:r>
+            <a:r>
+              <a:rPr lang="en-CA" b="1" i="1" baseline="-25000" dirty="0"/>
+              <a:t>IF</a:t>
+            </a:r>
+            <a:endParaRPr lang="en-CA" b="1" i="1" dirty="0"/>
           </a:p>
         </p:txBody>
       </p:sp>
     </p:spTree>
     <p:extLst>
       <p:ext uri="{BB962C8B-B14F-4D97-AF65-F5344CB8AC3E}">
-        <p14:creationId xmlns:p14="http://schemas.microsoft.com/office/powerpoint/2010/main" val="1315647518"/>
+        <p14:creationId xmlns:p14="http://schemas.microsoft.com/office/powerpoint/2010/main" val="4224509479"/>
       </p:ext>
     </p:extLst>
   </p:cSld>

</xml_diff>

<commit_message>
more graphs, all langs in one table but results will be dispersed and then fitness in one final table comparatively
</commit_message>
<xml_diff>
--- a/GPP_Defense.pptx
+++ b/GPP_Defense.pptx
@@ -5,10 +5,10 @@
     <p:sldMasterId id="2147483648" r:id="rId2"/>
   </p:sldMasterIdLst>
   <p:notesMasterIdLst>
-    <p:notesMasterId r:id="rId16"/>
+    <p:notesMasterId r:id="rId18"/>
   </p:notesMasterIdLst>
   <p:handoutMasterIdLst>
-    <p:handoutMasterId r:id="rId17"/>
+    <p:handoutMasterId r:id="rId19"/>
   </p:handoutMasterIdLst>
   <p:sldIdLst>
     <p:sldId id="256" r:id="rId3"/>
@@ -23,7 +23,9 @@
     <p:sldId id="275" r:id="rId12"/>
     <p:sldId id="277" r:id="rId13"/>
     <p:sldId id="278" r:id="rId14"/>
-    <p:sldId id="274" r:id="rId15"/>
+    <p:sldId id="279" r:id="rId15"/>
+    <p:sldId id="280" r:id="rId16"/>
+    <p:sldId id="274" r:id="rId17"/>
   </p:sldIdLst>
   <p:sldSz cx="12192000" cy="6858000"/>
   <p:notesSz cx="6858000" cy="9144000"/>
@@ -135,14 +137,12 @@
             <p14:sldId id="270"/>
             <p14:sldId id="271"/>
             <p14:sldId id="273"/>
-          </p14:sldIdLst>
-        </p14:section>
-        <p14:section name="Untitled Section" id="{FBD56B9C-EBAB-494B-BED3-D1E668B607C5}">
-          <p14:sldIdLst>
             <p14:sldId id="260"/>
             <p14:sldId id="275"/>
             <p14:sldId id="277"/>
             <p14:sldId id="278"/>
+            <p14:sldId id="279"/>
+            <p14:sldId id="280"/>
             <p14:sldId id="274"/>
           </p14:sldIdLst>
         </p14:section>
@@ -1024,6 +1024,90 @@
           <a:p>
             <a:fld id="{0A3C37BE-C303-496D-B5CD-85F2937540FC}" type="slidenum">
               <a:rPr lang="en-CA" smtClean="0"/>
+              <a:t>9</a:t>
+            </a:fld>
+            <a:endParaRPr lang="en-CA"/>
+          </a:p>
+        </p:txBody>
+      </p:sp>
+    </p:spTree>
+    <p:extLst>
+      <p:ext uri="{BB962C8B-B14F-4D97-AF65-F5344CB8AC3E}">
+        <p14:creationId xmlns:p14="http://schemas.microsoft.com/office/powerpoint/2010/main" val="1334549329"/>
+      </p:ext>
+    </p:extLst>
+  </p:cSld>
+  <p:clrMapOvr>
+    <a:masterClrMapping/>
+  </p:clrMapOvr>
+</p:notes>
+</file>
+
+<file path=ppt/notesSlides/notesSlide5.xml><?xml version="1.0" encoding="utf-8"?>
+<p:notes xmlns:a="http://schemas.openxmlformats.org/drawingml/2006/main" xmlns:r="http://schemas.openxmlformats.org/officeDocument/2006/relationships" xmlns:p="http://schemas.openxmlformats.org/presentationml/2006/main">
+  <p:cSld>
+    <p:spTree>
+      <p:nvGrpSpPr>
+        <p:cNvPr id="1" name=""/>
+        <p:cNvGrpSpPr/>
+        <p:nvPr/>
+      </p:nvGrpSpPr>
+      <p:grpSpPr>
+        <a:xfrm>
+          <a:off x="0" y="0"/>
+          <a:ext cx="0" cy="0"/>
+          <a:chOff x="0" y="0"/>
+          <a:chExt cx="0" cy="0"/>
+        </a:xfrm>
+      </p:grpSpPr>
+      <p:sp>
+        <p:nvSpPr>
+          <p:cNvPr id="2" name="Slide Image Placeholder 1"/>
+          <p:cNvSpPr>
+            <a:spLocks noGrp="1" noRot="1" noChangeAspect="1"/>
+          </p:cNvSpPr>
+          <p:nvPr>
+            <p:ph type="sldImg"/>
+          </p:nvPr>
+        </p:nvSpPr>
+        <p:spPr/>
+      </p:sp>
+      <p:sp>
+        <p:nvSpPr>
+          <p:cNvPr id="3" name="Notes Placeholder 2"/>
+          <p:cNvSpPr>
+            <a:spLocks noGrp="1"/>
+          </p:cNvSpPr>
+          <p:nvPr>
+            <p:ph type="body" idx="1"/>
+          </p:nvPr>
+        </p:nvSpPr>
+        <p:spPr/>
+        <p:txBody>
+          <a:bodyPr/>
+          <a:lstStyle/>
+          <a:p>
+            <a:endParaRPr lang="en-CA" dirty="0"/>
+          </a:p>
+        </p:txBody>
+      </p:sp>
+      <p:sp>
+        <p:nvSpPr>
+          <p:cNvPr id="4" name="Slide Number Placeholder 3"/>
+          <p:cNvSpPr>
+            <a:spLocks noGrp="1"/>
+          </p:cNvSpPr>
+          <p:nvPr>
+            <p:ph type="sldNum" sz="quarter" idx="10"/>
+          </p:nvPr>
+        </p:nvSpPr>
+        <p:spPr/>
+        <p:txBody>
+          <a:bodyPr/>
+          <a:lstStyle/>
+          <a:p>
+            <a:fld id="{0A3C37BE-C303-496D-B5CD-85F2937540FC}" type="slidenum">
+              <a:rPr lang="en-CA" smtClean="0"/>
               <a:t>11</a:t>
             </a:fld>
             <a:endParaRPr lang="en-CA"/>
@@ -1034,6 +1118,186 @@
     <p:extLst>
       <p:ext uri="{BB962C8B-B14F-4D97-AF65-F5344CB8AC3E}">
         <p14:creationId xmlns:p14="http://schemas.microsoft.com/office/powerpoint/2010/main" val="3702126950"/>
+      </p:ext>
+    </p:extLst>
+  </p:cSld>
+  <p:clrMapOvr>
+    <a:masterClrMapping/>
+  </p:clrMapOvr>
+</p:notes>
+</file>
+
+<file path=ppt/notesSlides/notesSlide6.xml><?xml version="1.0" encoding="utf-8"?>
+<p:notes xmlns:a="http://schemas.openxmlformats.org/drawingml/2006/main" xmlns:r="http://schemas.openxmlformats.org/officeDocument/2006/relationships" xmlns:p="http://schemas.openxmlformats.org/presentationml/2006/main">
+  <p:cSld>
+    <p:spTree>
+      <p:nvGrpSpPr>
+        <p:cNvPr id="1" name=""/>
+        <p:cNvGrpSpPr/>
+        <p:nvPr/>
+      </p:nvGrpSpPr>
+      <p:grpSpPr>
+        <a:xfrm>
+          <a:off x="0" y="0"/>
+          <a:ext cx="0" cy="0"/>
+          <a:chOff x="0" y="0"/>
+          <a:chExt cx="0" cy="0"/>
+        </a:xfrm>
+      </p:grpSpPr>
+      <p:sp>
+        <p:nvSpPr>
+          <p:cNvPr id="2" name="Slide Image Placeholder 1"/>
+          <p:cNvSpPr>
+            <a:spLocks noGrp="1" noRot="1" noChangeAspect="1"/>
+          </p:cNvSpPr>
+          <p:nvPr>
+            <p:ph type="sldImg"/>
+          </p:nvPr>
+        </p:nvSpPr>
+        <p:spPr/>
+      </p:sp>
+      <p:sp>
+        <p:nvSpPr>
+          <p:cNvPr id="3" name="Notes Placeholder 2"/>
+          <p:cNvSpPr>
+            <a:spLocks noGrp="1"/>
+          </p:cNvSpPr>
+          <p:nvPr>
+            <p:ph type="body" idx="1"/>
+          </p:nvPr>
+        </p:nvSpPr>
+        <p:spPr/>
+        <p:txBody>
+          <a:bodyPr/>
+          <a:lstStyle/>
+          <a:p>
+            <a:r>
+              <a:rPr lang="en-CA" baseline="0" dirty="0"/>
+              <a:t>L</a:t>
+            </a:r>
+            <a:r>
+              <a:rPr lang="en-CA" baseline="-25000" dirty="0"/>
+              <a:t>IF</a:t>
+            </a:r>
+            <a:r>
+              <a:rPr lang="en-CA" baseline="0" dirty="0"/>
+              <a:t> performs better in all cases, but also yields more outliers</a:t>
+            </a:r>
+            <a:endParaRPr lang="en-CA" dirty="0"/>
+          </a:p>
+        </p:txBody>
+      </p:sp>
+      <p:sp>
+        <p:nvSpPr>
+          <p:cNvPr id="4" name="Slide Number Placeholder 3"/>
+          <p:cNvSpPr>
+            <a:spLocks noGrp="1"/>
+          </p:cNvSpPr>
+          <p:nvPr>
+            <p:ph type="sldNum" sz="quarter" idx="10"/>
+          </p:nvPr>
+        </p:nvSpPr>
+        <p:spPr/>
+        <p:txBody>
+          <a:bodyPr/>
+          <a:lstStyle/>
+          <a:p>
+            <a:fld id="{0A3C37BE-C303-496D-B5CD-85F2937540FC}" type="slidenum">
+              <a:rPr lang="en-CA" smtClean="0"/>
+              <a:t>13</a:t>
+            </a:fld>
+            <a:endParaRPr lang="en-CA"/>
+          </a:p>
+        </p:txBody>
+      </p:sp>
+    </p:spTree>
+    <p:extLst>
+      <p:ext uri="{BB962C8B-B14F-4D97-AF65-F5344CB8AC3E}">
+        <p14:creationId xmlns:p14="http://schemas.microsoft.com/office/powerpoint/2010/main" val="2108097607"/>
+      </p:ext>
+    </p:extLst>
+  </p:cSld>
+  <p:clrMapOvr>
+    <a:masterClrMapping/>
+  </p:clrMapOvr>
+</p:notes>
+</file>
+
+<file path=ppt/notesSlides/notesSlide7.xml><?xml version="1.0" encoding="utf-8"?>
+<p:notes xmlns:a="http://schemas.openxmlformats.org/drawingml/2006/main" xmlns:r="http://schemas.openxmlformats.org/officeDocument/2006/relationships" xmlns:p="http://schemas.openxmlformats.org/presentationml/2006/main">
+  <p:cSld>
+    <p:spTree>
+      <p:nvGrpSpPr>
+        <p:cNvPr id="1" name=""/>
+        <p:cNvGrpSpPr/>
+        <p:nvPr/>
+      </p:nvGrpSpPr>
+      <p:grpSpPr>
+        <a:xfrm>
+          <a:off x="0" y="0"/>
+          <a:ext cx="0" cy="0"/>
+          <a:chOff x="0" y="0"/>
+          <a:chExt cx="0" cy="0"/>
+        </a:xfrm>
+      </p:grpSpPr>
+      <p:sp>
+        <p:nvSpPr>
+          <p:cNvPr id="2" name="Slide Image Placeholder 1"/>
+          <p:cNvSpPr>
+            <a:spLocks noGrp="1" noRot="1" noChangeAspect="1"/>
+          </p:cNvSpPr>
+          <p:nvPr>
+            <p:ph type="sldImg"/>
+          </p:nvPr>
+        </p:nvSpPr>
+        <p:spPr/>
+      </p:sp>
+      <p:sp>
+        <p:nvSpPr>
+          <p:cNvPr id="3" name="Notes Placeholder 2"/>
+          <p:cNvSpPr>
+            <a:spLocks noGrp="1"/>
+          </p:cNvSpPr>
+          <p:nvPr>
+            <p:ph type="body" idx="1"/>
+          </p:nvPr>
+        </p:nvSpPr>
+        <p:spPr/>
+        <p:txBody>
+          <a:bodyPr/>
+          <a:lstStyle/>
+          <a:p>
+            <a:endParaRPr lang="en-CA" dirty="0"/>
+          </a:p>
+        </p:txBody>
+      </p:sp>
+      <p:sp>
+        <p:nvSpPr>
+          <p:cNvPr id="4" name="Slide Number Placeholder 3"/>
+          <p:cNvSpPr>
+            <a:spLocks noGrp="1"/>
+          </p:cNvSpPr>
+          <p:nvPr>
+            <p:ph type="sldNum" sz="quarter" idx="10"/>
+          </p:nvPr>
+        </p:nvSpPr>
+        <p:spPr/>
+        <p:txBody>
+          <a:bodyPr/>
+          <a:lstStyle/>
+          <a:p>
+            <a:fld id="{0A3C37BE-C303-496D-B5CD-85F2937540FC}" type="slidenum">
+              <a:rPr lang="en-CA" smtClean="0"/>
+              <a:t>14</a:t>
+            </a:fld>
+            <a:endParaRPr lang="en-CA"/>
+          </a:p>
+        </p:txBody>
+      </p:sp>
+    </p:spTree>
+    <p:extLst>
+      <p:ext uri="{BB962C8B-B14F-4D97-AF65-F5344CB8AC3E}">
+        <p14:creationId xmlns:p14="http://schemas.microsoft.com/office/powerpoint/2010/main" val="1423042962"/>
       </p:ext>
     </p:extLst>
   </p:cSld>
@@ -5929,6 +6193,878 @@
 </file>
 
 <file path=ppt/slides/slide13.xml><?xml version="1.0" encoding="utf-8"?>
+<p:sld xmlns:a="http://schemas.openxmlformats.org/drawingml/2006/main" xmlns:r="http://schemas.openxmlformats.org/officeDocument/2006/relationships" xmlns:p="http://schemas.openxmlformats.org/presentationml/2006/main">
+  <p:cSld>
+    <p:spTree>
+      <p:nvGrpSpPr>
+        <p:cNvPr id="1" name=""/>
+        <p:cNvGrpSpPr/>
+        <p:nvPr/>
+      </p:nvGrpSpPr>
+      <p:grpSpPr>
+        <a:xfrm>
+          <a:off x="0" y="0"/>
+          <a:ext cx="0" cy="0"/>
+          <a:chOff x="0" y="0"/>
+          <a:chExt cx="0" cy="0"/>
+        </a:xfrm>
+      </p:grpSpPr>
+      <p:sp>
+        <p:nvSpPr>
+          <p:cNvPr id="2" name="Title 1"/>
+          <p:cNvSpPr>
+            <a:spLocks noGrp="1"/>
+          </p:cNvSpPr>
+          <p:nvPr>
+            <p:ph type="title"/>
+          </p:nvPr>
+        </p:nvSpPr>
+        <p:spPr/>
+        <p:txBody>
+          <a:bodyPr/>
+          <a:lstStyle/>
+          <a:p>
+            <a:r>
+              <a:rPr lang="en-CA" dirty="0"/>
+              <a:t>Ensemble Fitness</a:t>
+            </a:r>
+          </a:p>
+        </p:txBody>
+      </p:sp>
+      <p:graphicFrame>
+        <p:nvGraphicFramePr>
+          <p:cNvPr id="4" name="Content Placeholder 3"/>
+          <p:cNvGraphicFramePr>
+            <a:graphicFrameLocks noGrp="1"/>
+          </p:cNvGraphicFramePr>
+          <p:nvPr>
+            <p:ph idx="1"/>
+            <p:extLst>
+              <p:ext uri="{D42A27DB-BD31-4B8C-83A1-F6EECF244321}">
+                <p14:modId xmlns:p14="http://schemas.microsoft.com/office/powerpoint/2010/main" val="2776639724"/>
+              </p:ext>
+            </p:extLst>
+          </p:nvPr>
+        </p:nvGraphicFramePr>
+        <p:xfrm>
+          <a:off x="1104900" y="1600200"/>
+          <a:ext cx="9982200" cy="2091690"/>
+        </p:xfrm>
+        <a:graphic>
+          <a:graphicData uri="http://schemas.openxmlformats.org/drawingml/2006/table">
+            <a:tbl>
+              <a:tblPr firstRow="1" bandRow="1">
+                <a:tableStyleId>{5C22544A-7EE6-4342-B048-85BDC9FD1C3A}</a:tableStyleId>
+              </a:tblPr>
+              <a:tblGrid>
+                <a:gridCol w="2495550">
+                  <a:extLst>
+                    <a:ext uri="{9D8B030D-6E8A-4147-A177-3AD203B41FA5}">
+                      <a16:colId xmlns:a16="http://schemas.microsoft.com/office/drawing/2014/main" val="1063830725"/>
+                    </a:ext>
+                  </a:extLst>
+                </a:gridCol>
+                <a:gridCol w="2495550">
+                  <a:extLst>
+                    <a:ext uri="{9D8B030D-6E8A-4147-A177-3AD203B41FA5}">
+                      <a16:colId xmlns:a16="http://schemas.microsoft.com/office/drawing/2014/main" val="2742314196"/>
+                    </a:ext>
+                  </a:extLst>
+                </a:gridCol>
+                <a:gridCol w="2495550">
+                  <a:extLst>
+                    <a:ext uri="{9D8B030D-6E8A-4147-A177-3AD203B41FA5}">
+                      <a16:colId xmlns:a16="http://schemas.microsoft.com/office/drawing/2014/main" val="1344616909"/>
+                    </a:ext>
+                  </a:extLst>
+                </a:gridCol>
+                <a:gridCol w="2495550">
+                  <a:extLst>
+                    <a:ext uri="{9D8B030D-6E8A-4147-A177-3AD203B41FA5}">
+                      <a16:colId xmlns:a16="http://schemas.microsoft.com/office/drawing/2014/main" val="4178842973"/>
+                    </a:ext>
+                  </a:extLst>
+                </a:gridCol>
+              </a:tblGrid>
+              <a:tr h="697230">
+                <a:tc>
+                  <a:txBody>
+                    <a:bodyPr/>
+                    <a:lstStyle/>
+                    <a:p>
+                      <a:pPr algn="ctr"/>
+                      <a:r>
+                        <a:rPr lang="en-CA" dirty="0"/>
+                        <a:t>Language</a:t>
+                      </a:r>
+                    </a:p>
+                  </a:txBody>
+                  <a:tcPr anchor="ctr"/>
+                </a:tc>
+                <a:tc>
+                  <a:txBody>
+                    <a:bodyPr/>
+                    <a:lstStyle/>
+                    <a:p>
+                      <a:pPr algn="ctr"/>
+                      <a:r>
+                        <a:rPr lang="en-CA" dirty="0"/>
+                        <a:t>Ensemble (</a:t>
+                      </a:r>
+                      <a:r>
+                        <a:rPr lang="en-CA" dirty="0" err="1"/>
+                        <a:t>Avg</a:t>
+                      </a:r>
+                      <a:r>
+                        <a:rPr lang="en-CA" dirty="0"/>
+                        <a:t>) Fit</a:t>
+                      </a:r>
+                    </a:p>
+                  </a:txBody>
+                  <a:tcPr anchor="ctr"/>
+                </a:tc>
+                <a:tc>
+                  <a:txBody>
+                    <a:bodyPr/>
+                    <a:lstStyle/>
+                    <a:p>
+                      <a:pPr algn="ctr"/>
+                      <a:r>
+                        <a:rPr lang="en-CA" dirty="0"/>
+                        <a:t>Ensemble (Med)</a:t>
+                      </a:r>
+                      <a:r>
+                        <a:rPr lang="en-CA" baseline="0" dirty="0"/>
+                        <a:t> Fit</a:t>
+                      </a:r>
+                      <a:endParaRPr lang="en-CA" dirty="0"/>
+                    </a:p>
+                  </a:txBody>
+                  <a:tcPr anchor="ctr"/>
+                </a:tc>
+                <a:tc>
+                  <a:txBody>
+                    <a:bodyPr/>
+                    <a:lstStyle/>
+                    <a:p>
+                      <a:pPr algn="ctr"/>
+                      <a:r>
+                        <a:rPr lang="en-CA" dirty="0"/>
+                        <a:t>Outliers Removed</a:t>
+                      </a:r>
+                    </a:p>
+                  </a:txBody>
+                  <a:tcPr anchor="ctr"/>
+                </a:tc>
+                <a:extLst>
+                  <a:ext uri="{0D108BD9-81ED-4DB2-BD59-A6C34878D82A}">
+                    <a16:rowId xmlns:a16="http://schemas.microsoft.com/office/drawing/2014/main" val="4032793956"/>
+                  </a:ext>
+                </a:extLst>
+              </a:tr>
+              <a:tr h="697230">
+                <a:tc>
+                  <a:txBody>
+                    <a:bodyPr/>
+                    <a:lstStyle/>
+                    <a:p>
+                      <a:pPr algn="ctr"/>
+                      <a:r>
+                        <a:rPr lang="en-CA" b="1" i="1" dirty="0"/>
+                        <a:t>L</a:t>
+                      </a:r>
+                    </a:p>
+                  </a:txBody>
+                  <a:tcPr anchor="ctr"/>
+                </a:tc>
+                <a:tc>
+                  <a:txBody>
+                    <a:bodyPr/>
+                    <a:lstStyle/>
+                    <a:p>
+                      <a:pPr algn="ctr"/>
+                      <a:r>
+                        <a:rPr lang="en-CA" b="1" dirty="0"/>
+                        <a:t>0.194444</a:t>
+                      </a:r>
+                    </a:p>
+                  </a:txBody>
+                  <a:tcPr anchor="ctr"/>
+                </a:tc>
+                <a:tc>
+                  <a:txBody>
+                    <a:bodyPr/>
+                    <a:lstStyle/>
+                    <a:p>
+                      <a:pPr algn="ctr"/>
+                      <a:r>
+                        <a:rPr lang="en-CA" b="1" dirty="0"/>
+                        <a:t>0.200982</a:t>
+                      </a:r>
+                    </a:p>
+                  </a:txBody>
+                  <a:tcPr anchor="ctr"/>
+                </a:tc>
+                <a:tc>
+                  <a:txBody>
+                    <a:bodyPr/>
+                    <a:lstStyle/>
+                    <a:p>
+                      <a:pPr algn="ctr"/>
+                      <a:r>
+                        <a:rPr lang="en-CA" b="1" dirty="0"/>
+                        <a:t>35</a:t>
+                      </a:r>
+                    </a:p>
+                  </a:txBody>
+                  <a:tcPr anchor="ctr"/>
+                </a:tc>
+                <a:extLst>
+                  <a:ext uri="{0D108BD9-81ED-4DB2-BD59-A6C34878D82A}">
+                    <a16:rowId xmlns:a16="http://schemas.microsoft.com/office/drawing/2014/main" val="3865386210"/>
+                  </a:ext>
+                </a:extLst>
+              </a:tr>
+              <a:tr h="697230">
+                <a:tc>
+                  <a:txBody>
+                    <a:bodyPr/>
+                    <a:lstStyle/>
+                    <a:p>
+                      <a:pPr algn="ctr"/>
+                      <a:r>
+                        <a:rPr lang="en-CA" b="1" i="1" dirty="0"/>
+                        <a:t>L</a:t>
+                      </a:r>
+                      <a:r>
+                        <a:rPr lang="en-CA" b="1" i="1" baseline="-25000" dirty="0"/>
+                        <a:t>IF</a:t>
+                      </a:r>
+                      <a:endParaRPr lang="en-CA" b="1" i="1" dirty="0"/>
+                    </a:p>
+                  </a:txBody>
+                  <a:tcPr anchor="ctr"/>
+                </a:tc>
+                <a:tc>
+                  <a:txBody>
+                    <a:bodyPr/>
+                    <a:lstStyle/>
+                    <a:p>
+                      <a:pPr algn="ctr"/>
+                      <a:r>
+                        <a:rPr lang="en-CA" b="1" dirty="0"/>
+                        <a:t>0.185474</a:t>
+                      </a:r>
+                    </a:p>
+                  </a:txBody>
+                  <a:tcPr anchor="ctr"/>
+                </a:tc>
+                <a:tc>
+                  <a:txBody>
+                    <a:bodyPr/>
+                    <a:lstStyle/>
+                    <a:p>
+                      <a:pPr algn="ctr"/>
+                      <a:r>
+                        <a:rPr lang="en-CA" b="1" dirty="0"/>
+                        <a:t>0.179552</a:t>
+                      </a:r>
+                    </a:p>
+                  </a:txBody>
+                  <a:tcPr anchor="ctr"/>
+                </a:tc>
+                <a:tc>
+                  <a:txBody>
+                    <a:bodyPr/>
+                    <a:lstStyle/>
+                    <a:p>
+                      <a:pPr algn="ctr"/>
+                      <a:r>
+                        <a:rPr lang="en-CA" b="1" dirty="0"/>
+                        <a:t>43</a:t>
+                      </a:r>
+                    </a:p>
+                  </a:txBody>
+                  <a:tcPr anchor="ctr"/>
+                </a:tc>
+                <a:extLst>
+                  <a:ext uri="{0D108BD9-81ED-4DB2-BD59-A6C34878D82A}">
+                    <a16:rowId xmlns:a16="http://schemas.microsoft.com/office/drawing/2014/main" val="331165827"/>
+                  </a:ext>
+                </a:extLst>
+              </a:tr>
+            </a:tbl>
+          </a:graphicData>
+        </a:graphic>
+      </p:graphicFrame>
+    </p:spTree>
+    <p:extLst>
+      <p:ext uri="{BB962C8B-B14F-4D97-AF65-F5344CB8AC3E}">
+        <p14:creationId xmlns:p14="http://schemas.microsoft.com/office/powerpoint/2010/main" val="1569074856"/>
+      </p:ext>
+    </p:extLst>
+  </p:cSld>
+  <p:clrMapOvr>
+    <a:masterClrMapping/>
+  </p:clrMapOvr>
+  <mc:AlternateContent xmlns:mc="http://schemas.openxmlformats.org/markup-compatibility/2006" xmlns:p14="http://schemas.microsoft.com/office/powerpoint/2010/main">
+    <mc:Choice Requires="p14">
+      <p:transition spd="med" p14:dur="700">
+        <p:fade/>
+      </p:transition>
+    </mc:Choice>
+    <mc:Fallback xmlns="">
+      <p:transition spd="med">
+        <p:fade/>
+      </p:transition>
+    </mc:Fallback>
+  </mc:AlternateContent>
+</p:sld>
+</file>
+
+<file path=ppt/slides/slide14.xml><?xml version="1.0" encoding="utf-8"?>
+<p:sld xmlns:a="http://schemas.openxmlformats.org/drawingml/2006/main" xmlns:r="http://schemas.openxmlformats.org/officeDocument/2006/relationships" xmlns:p="http://schemas.openxmlformats.org/presentationml/2006/main">
+  <p:cSld>
+    <p:spTree>
+      <p:nvGrpSpPr>
+        <p:cNvPr id="1" name=""/>
+        <p:cNvGrpSpPr/>
+        <p:nvPr/>
+      </p:nvGrpSpPr>
+      <p:grpSpPr>
+        <a:xfrm>
+          <a:off x="0" y="0"/>
+          <a:ext cx="0" cy="0"/>
+          <a:chOff x="0" y="0"/>
+          <a:chExt cx="0" cy="0"/>
+        </a:xfrm>
+      </p:grpSpPr>
+      <p:sp>
+        <p:nvSpPr>
+          <p:cNvPr id="2" name="Title 1"/>
+          <p:cNvSpPr>
+            <a:spLocks noGrp="1"/>
+          </p:cNvSpPr>
+          <p:nvPr>
+            <p:ph type="title"/>
+          </p:nvPr>
+        </p:nvSpPr>
+        <p:spPr/>
+        <p:txBody>
+          <a:bodyPr/>
+          <a:lstStyle/>
+          <a:p>
+            <a:r>
+              <a:rPr lang="en-US" dirty="0"/>
+              <a:t>Results &amp; Discussion</a:t>
+            </a:r>
+          </a:p>
+        </p:txBody>
+      </p:sp>
+      <mc:AlternateContent xmlns:mc="http://schemas.openxmlformats.org/markup-compatibility/2006">
+        <mc:Choice xmlns:a14="http://schemas.microsoft.com/office/drawing/2010/main" Requires="a14">
+          <p:graphicFrame>
+            <p:nvGraphicFramePr>
+              <p:cNvPr id="4" name="Content Placeholder 3"/>
+              <p:cNvGraphicFramePr>
+                <a:graphicFrameLocks noGrp="1"/>
+              </p:cNvGraphicFramePr>
+              <p:nvPr>
+                <p:ph idx="1"/>
+                <p:extLst>
+                  <p:ext uri="{D42A27DB-BD31-4B8C-83A1-F6EECF244321}">
+                    <p14:modId xmlns:p14="http://schemas.microsoft.com/office/powerpoint/2010/main" val="2179313020"/>
+                  </p:ext>
+                </p:extLst>
+              </p:nvPr>
+            </p:nvGraphicFramePr>
+            <p:xfrm>
+              <a:off x="1104900" y="1600200"/>
+              <a:ext cx="9980614" cy="2354580"/>
+            </p:xfrm>
+            <a:graphic>
+              <a:graphicData uri="http://schemas.openxmlformats.org/drawingml/2006/table">
+                <a:tbl>
+                  <a:tblPr firstRow="1" bandRow="1">
+                    <a:tableStyleId>{5C22544A-7EE6-4342-B048-85BDC9FD1C3A}</a:tableStyleId>
+                  </a:tblPr>
+                  <a:tblGrid>
+                    <a:gridCol w="4990307">
+                      <a:extLst>
+                        <a:ext uri="{9D8B030D-6E8A-4147-A177-3AD203B41FA5}">
+                          <a16:colId xmlns:a16="http://schemas.microsoft.com/office/drawing/2014/main" val="452220581"/>
+                        </a:ext>
+                      </a:extLst>
+                    </a:gridCol>
+                    <a:gridCol w="4990307">
+                      <a:extLst>
+                        <a:ext uri="{9D8B030D-6E8A-4147-A177-3AD203B41FA5}">
+                          <a16:colId xmlns:a16="http://schemas.microsoft.com/office/drawing/2014/main" val="82609379"/>
+                        </a:ext>
+                      </a:extLst>
+                    </a:gridCol>
+                  </a:tblGrid>
+                  <a:tr h="784860">
+                    <a:tc>
+                      <a:txBody>
+                        <a:bodyPr/>
+                        <a:lstStyle/>
+                        <a:p>
+                          <a:pPr algn="ctr"/>
+                          <a:r>
+                            <a:rPr lang="en-CA" sz="1800" dirty="0"/>
+                            <a:t>Language Variation</a:t>
+                          </a:r>
+                        </a:p>
+                      </a:txBody>
+                      <a:tcPr anchor="ctr"/>
+                    </a:tc>
+                    <a:tc>
+                      <a:txBody>
+                        <a:bodyPr/>
+                        <a:lstStyle/>
+                        <a:p>
+                          <a:pPr algn="ctr"/>
+                          <a:r>
+                            <a:rPr lang="en-CA" sz="1800" dirty="0"/>
+                            <a:t>Function &amp; Terminal Set</a:t>
+                          </a:r>
+                        </a:p>
+                      </a:txBody>
+                      <a:tcPr anchor="ctr"/>
+                    </a:tc>
+                    <a:extLst>
+                      <a:ext uri="{0D108BD9-81ED-4DB2-BD59-A6C34878D82A}">
+                        <a16:rowId xmlns:a16="http://schemas.microsoft.com/office/drawing/2014/main" val="3654672897"/>
+                      </a:ext>
+                    </a:extLst>
+                  </a:tr>
+                  <a:tr h="784860">
+                    <a:tc>
+                      <a:txBody>
+                        <a:bodyPr/>
+                        <a:lstStyle/>
+                        <a:p>
+                          <a:pPr algn="ctr"/>
+                          <a:r>
+                            <a:rPr lang="en-CA" sz="1800" b="1" i="1" dirty="0"/>
+                            <a:t>L</a:t>
+                          </a:r>
+                          <a:r>
+                            <a:rPr lang="en-CA" sz="1800" b="1" i="1" baseline="-25000" dirty="0"/>
+                            <a:t>ST</a:t>
+                          </a:r>
+                          <a:endParaRPr lang="en-CA" sz="1800" b="1" i="1" dirty="0"/>
+                        </a:p>
+                      </a:txBody>
+                      <a:tcPr anchor="ctr"/>
+                    </a:tc>
+                    <a:tc>
+                      <a:txBody>
+                        <a:bodyPr/>
+                        <a:lstStyle/>
+                        <a:p>
+                          <a:pPr algn="ctr"/>
+                          <a14:m>
+                            <m:oMathPara xmlns:m="http://schemas.openxmlformats.org/officeDocument/2006/math">
+                              <m:oMathParaPr>
+                                <m:jc m:val="centerGroup"/>
+                              </m:oMathParaPr>
+                              <m:oMath xmlns:m="http://schemas.openxmlformats.org/officeDocument/2006/math">
+                                <m:sSub>
+                                  <m:sSubPr>
+                                    <m:ctrlPr>
+                                      <a:rPr lang="en-CA" sz="2000" b="1" i="1" smtClean="0">
+                                        <a:latin typeface="Cambria Math" panose="02040503050406030204" pitchFamily="18" charset="0"/>
+                                      </a:rPr>
+                                    </m:ctrlPr>
+                                  </m:sSubPr>
+                                  <m:e>
+                                    <m:r>
+                                      <a:rPr lang="en-CA" sz="2000" b="1" i="1" smtClean="0">
+                                        <a:latin typeface="Cambria Math" panose="02040503050406030204" pitchFamily="18" charset="0"/>
+                                      </a:rPr>
+                                      <m:t>𝑳</m:t>
+                                    </m:r>
+                                  </m:e>
+                                  <m:sub>
+                                    <m:r>
+                                      <a:rPr lang="en-CA" sz="2000" b="1" i="1" smtClean="0">
+                                        <a:latin typeface="Cambria Math" panose="02040503050406030204" pitchFamily="18" charset="0"/>
+                                      </a:rPr>
+                                      <m:t>𝑰𝑭</m:t>
+                                    </m:r>
+                                  </m:sub>
+                                </m:sSub>
+                                <m:r>
+                                  <a:rPr lang="en-CA" sz="2000" b="1" i="1" smtClean="0">
+                                    <a:latin typeface="Cambria Math" panose="02040503050406030204" pitchFamily="18" charset="0"/>
+                                  </a:rPr>
+                                  <m:t>∪{</m:t>
+                                </m:r>
+                                <m:r>
+                                  <a:rPr lang="en-CA" sz="2000" b="1" i="1" smtClean="0">
+                                    <a:latin typeface="Cambria Math" panose="02040503050406030204" pitchFamily="18" charset="0"/>
+                                  </a:rPr>
+                                  <m:t>𝒔𝒖𝒎</m:t>
+                                </m:r>
+                                <m:r>
+                                  <a:rPr lang="en-CA" sz="2000" b="1" i="1" smtClean="0">
+                                    <a:latin typeface="Cambria Math" panose="02040503050406030204" pitchFamily="18" charset="0"/>
+                                  </a:rPr>
+                                  <m:t>, </m:t>
+                                </m:r>
+                                <m:r>
+                                  <a:rPr lang="en-CA" sz="2000" b="1" i="1" smtClean="0">
+                                    <a:latin typeface="Cambria Math" panose="02040503050406030204" pitchFamily="18" charset="0"/>
+                                  </a:rPr>
+                                  <m:t>𝒔𝒕𝒅𝒆𝒗</m:t>
+                                </m:r>
+                                <m:r>
+                                  <a:rPr lang="en-CA" sz="2000" b="1" i="1" smtClean="0">
+                                    <a:latin typeface="Cambria Math" panose="02040503050406030204" pitchFamily="18" charset="0"/>
+                                  </a:rPr>
+                                  <m:t>, </m:t>
+                                </m:r>
+                                <m:r>
+                                  <a:rPr lang="en-CA" sz="2000" b="1" i="1" smtClean="0">
+                                    <a:latin typeface="Cambria Math" panose="02040503050406030204" pitchFamily="18" charset="0"/>
+                                  </a:rPr>
+                                  <m:t>𝒔𝒌𝒆𝒘</m:t>
+                                </m:r>
+                                <m:r>
+                                  <a:rPr lang="en-CA" sz="2000" b="1" i="1" smtClean="0">
+                                    <a:latin typeface="Cambria Math" panose="02040503050406030204" pitchFamily="18" charset="0"/>
+                                  </a:rPr>
+                                  <m:t>}</m:t>
+                                </m:r>
+                              </m:oMath>
+                            </m:oMathPara>
+                          </a14:m>
+                          <a:endParaRPr lang="en-CA" sz="2000" b="1" dirty="0"/>
+                        </a:p>
+                      </a:txBody>
+                      <a:tcPr anchor="ctr"/>
+                    </a:tc>
+                    <a:extLst>
+                      <a:ext uri="{0D108BD9-81ED-4DB2-BD59-A6C34878D82A}">
+                        <a16:rowId xmlns:a16="http://schemas.microsoft.com/office/drawing/2014/main" val="2083470743"/>
+                      </a:ext>
+                    </a:extLst>
+                  </a:tr>
+                  <a:tr h="784860">
+                    <a:tc>
+                      <a:txBody>
+                        <a:bodyPr/>
+                        <a:lstStyle/>
+                        <a:p>
+                          <a:pPr algn="ctr"/>
+                          <a:r>
+                            <a:rPr lang="en-CA" sz="1800" b="1" i="1" dirty="0"/>
+                            <a:t>L</a:t>
+                          </a:r>
+                          <a:r>
+                            <a:rPr lang="en-CA" sz="1800" b="1" i="1" baseline="-25000" dirty="0"/>
+                            <a:t>ST’</a:t>
+                          </a:r>
+                          <a:endParaRPr lang="en-CA" sz="1800" b="1" i="1" dirty="0"/>
+                        </a:p>
+                      </a:txBody>
+                      <a:tcPr anchor="ctr"/>
+                    </a:tc>
+                    <a:tc>
+                      <a:txBody>
+                        <a:bodyPr/>
+                        <a:lstStyle/>
+                        <a:p>
+                          <a:pPr algn="ctr"/>
+                          <a14:m>
+                            <m:oMathPara xmlns:m="http://schemas.openxmlformats.org/officeDocument/2006/math">
+                              <m:oMathParaPr>
+                                <m:jc m:val="centerGroup"/>
+                              </m:oMathParaPr>
+                              <m:oMath xmlns:m="http://schemas.openxmlformats.org/officeDocument/2006/math">
+                                <m:sSub>
+                                  <m:sSubPr>
+                                    <m:ctrlPr>
+                                      <a:rPr lang="en-CA" sz="2000" b="1" i="1" smtClean="0">
+                                        <a:latin typeface="Cambria Math" panose="02040503050406030204" pitchFamily="18" charset="0"/>
+                                      </a:rPr>
+                                    </m:ctrlPr>
+                                  </m:sSubPr>
+                                  <m:e>
+                                    <m:r>
+                                      <a:rPr lang="en-CA" sz="2000" b="1" i="1" smtClean="0">
+                                        <a:latin typeface="Cambria Math" panose="02040503050406030204" pitchFamily="18" charset="0"/>
+                                      </a:rPr>
+                                      <m:t>𝑳</m:t>
+                                    </m:r>
+                                  </m:e>
+                                  <m:sub>
+                                    <m:r>
+                                      <a:rPr lang="en-CA" sz="2000" b="1" i="1" smtClean="0">
+                                        <a:latin typeface="Cambria Math" panose="02040503050406030204" pitchFamily="18" charset="0"/>
+                                      </a:rPr>
+                                      <m:t>𝑺𝑻</m:t>
+                                    </m:r>
+                                  </m:sub>
+                                </m:sSub>
+                                <m:r>
+                                  <a:rPr lang="en-CA" sz="2000" b="1" i="1" smtClean="0">
+                                    <a:latin typeface="Cambria Math" panose="02040503050406030204" pitchFamily="18" charset="0"/>
+                                  </a:rPr>
+                                  <m:t>∪{</m:t>
+                                </m:r>
+                                <m:r>
+                                  <a:rPr lang="en-CA" sz="2000" b="1" i="1" smtClean="0">
+                                    <a:latin typeface="Cambria Math" panose="02040503050406030204" pitchFamily="18" charset="0"/>
+                                  </a:rPr>
+                                  <m:t>𝒂𝒗𝒈</m:t>
+                                </m:r>
+                                <m:r>
+                                  <a:rPr lang="en-CA" sz="2000" b="1" i="1" smtClean="0">
+                                    <a:latin typeface="Cambria Math" panose="02040503050406030204" pitchFamily="18" charset="0"/>
+                                  </a:rPr>
+                                  <m:t>, </m:t>
+                                </m:r>
+                                <m:r>
+                                  <a:rPr lang="en-CA" sz="2000" b="1" i="1" smtClean="0">
+                                    <a:latin typeface="Cambria Math" panose="02040503050406030204" pitchFamily="18" charset="0"/>
+                                  </a:rPr>
+                                  <m:t>𝒎𝒊𝒏</m:t>
+                                </m:r>
+                                <m:r>
+                                  <a:rPr lang="en-CA" sz="2000" b="1" i="1" smtClean="0">
+                                    <a:latin typeface="Cambria Math" panose="02040503050406030204" pitchFamily="18" charset="0"/>
+                                  </a:rPr>
+                                  <m:t>, </m:t>
+                                </m:r>
+                                <m:r>
+                                  <a:rPr lang="en-CA" sz="2000" b="1" i="1" smtClean="0">
+                                    <a:latin typeface="Cambria Math" panose="02040503050406030204" pitchFamily="18" charset="0"/>
+                                  </a:rPr>
+                                  <m:t>𝒎𝒂𝒙</m:t>
+                                </m:r>
+                                <m:r>
+                                  <a:rPr lang="en-CA" sz="2000" b="1" i="1" smtClean="0">
+                                    <a:latin typeface="Cambria Math" panose="02040503050406030204" pitchFamily="18" charset="0"/>
+                                  </a:rPr>
+                                  <m:t>}</m:t>
+                                </m:r>
+                              </m:oMath>
+                            </m:oMathPara>
+                          </a14:m>
+                          <a:endParaRPr lang="en-CA" sz="2000" b="1" dirty="0"/>
+                        </a:p>
+                      </a:txBody>
+                      <a:tcPr anchor="ctr"/>
+                    </a:tc>
+                    <a:extLst>
+                      <a:ext uri="{0D108BD9-81ED-4DB2-BD59-A6C34878D82A}">
+                        <a16:rowId xmlns:a16="http://schemas.microsoft.com/office/drawing/2014/main" val="1427336378"/>
+                      </a:ext>
+                    </a:extLst>
+                  </a:tr>
+                </a:tbl>
+              </a:graphicData>
+            </a:graphic>
+          </p:graphicFrame>
+        </mc:Choice>
+        <mc:Fallback>
+          <p:graphicFrame>
+            <p:nvGraphicFramePr>
+              <p:cNvPr id="4" name="Content Placeholder 3"/>
+              <p:cNvGraphicFramePr>
+                <a:graphicFrameLocks noGrp="1"/>
+              </p:cNvGraphicFramePr>
+              <p:nvPr>
+                <p:ph idx="1"/>
+                <p:extLst>
+                  <p:ext uri="{D42A27DB-BD31-4B8C-83A1-F6EECF244321}">
+                    <p14:modId xmlns:p14="http://schemas.microsoft.com/office/powerpoint/2010/main" val="2179313020"/>
+                  </p:ext>
+                </p:extLst>
+              </p:nvPr>
+            </p:nvGraphicFramePr>
+            <p:xfrm>
+              <a:off x="1104900" y="1600200"/>
+              <a:ext cx="9980614" cy="2354580"/>
+            </p:xfrm>
+            <a:graphic>
+              <a:graphicData uri="http://schemas.openxmlformats.org/drawingml/2006/table">
+                <a:tbl>
+                  <a:tblPr firstRow="1" bandRow="1">
+                    <a:tableStyleId>{5C22544A-7EE6-4342-B048-85BDC9FD1C3A}</a:tableStyleId>
+                  </a:tblPr>
+                  <a:tblGrid>
+                    <a:gridCol w="4990307">
+                      <a:extLst>
+                        <a:ext uri="{9D8B030D-6E8A-4147-A177-3AD203B41FA5}">
+                          <a16:colId xmlns:a16="http://schemas.microsoft.com/office/drawing/2014/main" val="452220581"/>
+                        </a:ext>
+                      </a:extLst>
+                    </a:gridCol>
+                    <a:gridCol w="4990307">
+                      <a:extLst>
+                        <a:ext uri="{9D8B030D-6E8A-4147-A177-3AD203B41FA5}">
+                          <a16:colId xmlns:a16="http://schemas.microsoft.com/office/drawing/2014/main" val="82609379"/>
+                        </a:ext>
+                      </a:extLst>
+                    </a:gridCol>
+                  </a:tblGrid>
+                  <a:tr h="784860">
+                    <a:tc>
+                      <a:txBody>
+                        <a:bodyPr/>
+                        <a:lstStyle/>
+                        <a:p>
+                          <a:pPr algn="ctr"/>
+                          <a:r>
+                            <a:rPr lang="en-CA" sz="1800" dirty="0"/>
+                            <a:t>Language Variation</a:t>
+                          </a:r>
+                        </a:p>
+                      </a:txBody>
+                      <a:tcPr anchor="ctr"/>
+                    </a:tc>
+                    <a:tc>
+                      <a:txBody>
+                        <a:bodyPr/>
+                        <a:lstStyle/>
+                        <a:p>
+                          <a:pPr algn="ctr"/>
+                          <a:r>
+                            <a:rPr lang="en-CA" sz="1800" dirty="0"/>
+                            <a:t>Function &amp; Terminal Set</a:t>
+                          </a:r>
+                        </a:p>
+                      </a:txBody>
+                      <a:tcPr anchor="ctr"/>
+                    </a:tc>
+                    <a:extLst>
+                      <a:ext uri="{0D108BD9-81ED-4DB2-BD59-A6C34878D82A}">
+                        <a16:rowId xmlns:a16="http://schemas.microsoft.com/office/drawing/2014/main" val="3654672897"/>
+                      </a:ext>
+                    </a:extLst>
+                  </a:tr>
+                  <a:tr h="784860">
+                    <a:tc>
+                      <a:txBody>
+                        <a:bodyPr/>
+                        <a:lstStyle/>
+                        <a:p>
+                          <a:pPr algn="ctr"/>
+                          <a:r>
+                            <a:rPr lang="en-CA" sz="1800" b="1" i="1" dirty="0"/>
+                            <a:t>L</a:t>
+                          </a:r>
+                          <a:r>
+                            <a:rPr lang="en-CA" sz="1800" b="1" i="1" baseline="-25000" dirty="0"/>
+                            <a:t>ST</a:t>
+                          </a:r>
+                          <a:endParaRPr lang="en-CA" sz="1800" b="1" i="1" dirty="0"/>
+                        </a:p>
+                      </a:txBody>
+                      <a:tcPr anchor="ctr"/>
+                    </a:tc>
+                    <a:tc>
+                      <a:txBody>
+                        <a:bodyPr/>
+                        <a:lstStyle/>
+                        <a:p>
+                          <a:endParaRPr lang="en-US"/>
+                        </a:p>
+                      </a:txBody>
+                      <a:tcPr anchor="ctr">
+                        <a:blipFill>
+                          <a:blip r:embed="rId3"/>
+                          <a:stretch>
+                            <a:fillRect l="-100122" t="-100775" r="-488" b="-101550"/>
+                          </a:stretch>
+                        </a:blipFill>
+                      </a:tcPr>
+                    </a:tc>
+                    <a:extLst>
+                      <a:ext uri="{0D108BD9-81ED-4DB2-BD59-A6C34878D82A}">
+                        <a16:rowId xmlns:a16="http://schemas.microsoft.com/office/drawing/2014/main" val="2083470743"/>
+                      </a:ext>
+                    </a:extLst>
+                  </a:tr>
+                  <a:tr h="784860">
+                    <a:tc>
+                      <a:txBody>
+                        <a:bodyPr/>
+                        <a:lstStyle/>
+                        <a:p>
+                          <a:pPr algn="ctr"/>
+                          <a:r>
+                            <a:rPr lang="en-CA" sz="1800" b="1" i="1" dirty="0"/>
+                            <a:t>L</a:t>
+                          </a:r>
+                          <a:r>
+                            <a:rPr lang="en-CA" sz="1800" b="1" i="1" baseline="-25000" dirty="0"/>
+                            <a:t>ST’</a:t>
+                          </a:r>
+                          <a:endParaRPr lang="en-CA" sz="1800" b="1" i="1" dirty="0"/>
+                        </a:p>
+                      </a:txBody>
+                      <a:tcPr anchor="ctr"/>
+                    </a:tc>
+                    <a:tc>
+                      <a:txBody>
+                        <a:bodyPr/>
+                        <a:lstStyle/>
+                        <a:p>
+                          <a:endParaRPr lang="en-US"/>
+                        </a:p>
+                      </a:txBody>
+                      <a:tcPr anchor="ctr">
+                        <a:blipFill>
+                          <a:blip r:embed="rId3"/>
+                          <a:stretch>
+                            <a:fillRect l="-100122" t="-200775" r="-488" b="-1550"/>
+                          </a:stretch>
+                        </a:blipFill>
+                      </a:tcPr>
+                    </a:tc>
+                    <a:extLst>
+                      <a:ext uri="{0D108BD9-81ED-4DB2-BD59-A6C34878D82A}">
+                        <a16:rowId xmlns:a16="http://schemas.microsoft.com/office/drawing/2014/main" val="1427336378"/>
+                      </a:ext>
+                    </a:extLst>
+                  </a:tr>
+                </a:tbl>
+              </a:graphicData>
+            </a:graphic>
+          </p:graphicFrame>
+        </mc:Fallback>
+      </mc:AlternateContent>
+    </p:spTree>
+    <p:extLst>
+      <p:ext uri="{BB962C8B-B14F-4D97-AF65-F5344CB8AC3E}">
+        <p14:creationId xmlns:p14="http://schemas.microsoft.com/office/powerpoint/2010/main" val="1056230780"/>
+      </p:ext>
+    </p:extLst>
+  </p:cSld>
+  <p:clrMapOvr>
+    <a:masterClrMapping/>
+  </p:clrMapOvr>
+  <mc:AlternateContent xmlns:mc="http://schemas.openxmlformats.org/markup-compatibility/2006" xmlns:p14="http://schemas.microsoft.com/office/powerpoint/2010/main">
+    <mc:Choice Requires="p14">
+      <p:transition spd="med" p14:dur="700">
+        <p:fade/>
+      </p:transition>
+    </mc:Choice>
+    <mc:Fallback xmlns="">
+      <p:transition spd="med">
+        <p:fade/>
+      </p:transition>
+    </mc:Fallback>
+  </mc:AlternateContent>
+</p:sld>
+</file>
+
+<file path=ppt/slides/slide15.xml><?xml version="1.0" encoding="utf-8"?>
 <p:sld xmlns:a="http://schemas.openxmlformats.org/drawingml/2006/main" xmlns:r="http://schemas.openxmlformats.org/officeDocument/2006/relationships" xmlns:p="http://schemas.openxmlformats.org/presentationml/2006/main">
   <p:cSld>
     <p:spTree>
@@ -9255,82 +10391,1071 @@
           </a:p>
         </p:txBody>
       </p:sp>
-      <p:sp>
-        <p:nvSpPr>
-          <p:cNvPr id="3" name="Content Placeholder 2"/>
-          <p:cNvSpPr>
-            <a:spLocks noGrp="1"/>
-          </p:cNvSpPr>
-          <p:nvPr>
-            <p:ph idx="1"/>
-          </p:nvPr>
-        </p:nvSpPr>
-        <p:spPr>
-          <a:xfrm>
-            <a:off x="1104900" y="1600200"/>
-            <a:ext cx="4889500" cy="4572000"/>
-          </a:xfrm>
-        </p:spPr>
-        <p:txBody>
-          <a:bodyPr/>
-          <a:lstStyle/>
-          <a:p>
-            <a:r>
-              <a:rPr lang="en-CA" dirty="0"/>
-              <a:t>Without </a:t>
-            </a:r>
-            <a:r>
-              <a:rPr lang="en-CA" i="1" dirty="0"/>
-              <a:t>IFLT</a:t>
-            </a:r>
-            <a:r>
-              <a:rPr lang="en-CA" dirty="0"/>
-              <a:t> in a math-based language</a:t>
-            </a:r>
-          </a:p>
-          <a:p>
-            <a:pPr lvl="1"/>
-            <a:r>
-              <a:rPr lang="en-CA" dirty="0"/>
-              <a:t>Language: </a:t>
-            </a:r>
-            <a:r>
-              <a:rPr lang="en-CA" b="1" i="1" dirty="0"/>
-              <a:t>L</a:t>
-            </a:r>
-          </a:p>
-          <a:p>
-            <a:r>
-              <a:rPr lang="en-CA" dirty="0"/>
-              <a:t>With </a:t>
-            </a:r>
-            <a:r>
-              <a:rPr lang="en-CA" i="1" dirty="0"/>
-              <a:t>IFLT</a:t>
-            </a:r>
-            <a:r>
-              <a:rPr lang="en-CA" dirty="0"/>
-              <a:t> in a math-based language</a:t>
-            </a:r>
-          </a:p>
-          <a:p>
-            <a:pPr lvl="1"/>
-            <a:r>
-              <a:rPr lang="en-CA" dirty="0"/>
-              <a:t>Language: </a:t>
-            </a:r>
-            <a:r>
-              <a:rPr lang="en-CA" b="1" i="1" dirty="0"/>
-              <a:t>L</a:t>
-            </a:r>
-            <a:r>
-              <a:rPr lang="en-CA" b="1" i="1" baseline="-25000" dirty="0"/>
-              <a:t>IF</a:t>
-            </a:r>
-            <a:endParaRPr lang="en-CA" b="1" i="1" dirty="0"/>
-          </a:p>
-        </p:txBody>
-      </p:sp>
+      <mc:AlternateContent xmlns:mc="http://schemas.openxmlformats.org/markup-compatibility/2006">
+        <mc:Choice xmlns:a14="http://schemas.microsoft.com/office/drawing/2010/main" Requires="a14">
+          <p:graphicFrame>
+            <p:nvGraphicFramePr>
+              <p:cNvPr id="4" name="Content Placeholder 3"/>
+              <p:cNvGraphicFramePr>
+                <a:graphicFrameLocks noGrp="1"/>
+              </p:cNvGraphicFramePr>
+              <p:nvPr>
+                <p:ph idx="1"/>
+                <p:extLst>
+                  <p:ext uri="{D42A27DB-BD31-4B8C-83A1-F6EECF244321}">
+                    <p14:modId xmlns:p14="http://schemas.microsoft.com/office/powerpoint/2010/main" val="2795055958"/>
+                  </p:ext>
+                </p:extLst>
+              </p:nvPr>
+            </p:nvGraphicFramePr>
+            <p:xfrm>
+              <a:off x="1104900" y="1600200"/>
+              <a:ext cx="9980614" cy="4193119"/>
+            </p:xfrm>
+            <a:graphic>
+              <a:graphicData uri="http://schemas.openxmlformats.org/drawingml/2006/table">
+                <a:tbl>
+                  <a:tblPr firstRow="1" bandRow="1">
+                    <a:tableStyleId>{5C22544A-7EE6-4342-B048-85BDC9FD1C3A}</a:tableStyleId>
+                  </a:tblPr>
+                  <a:tblGrid>
+                    <a:gridCol w="4990307">
+                      <a:extLst>
+                        <a:ext uri="{9D8B030D-6E8A-4147-A177-3AD203B41FA5}">
+                          <a16:colId xmlns:a16="http://schemas.microsoft.com/office/drawing/2014/main" val="452220581"/>
+                        </a:ext>
+                      </a:extLst>
+                    </a:gridCol>
+                    <a:gridCol w="4990307">
+                      <a:extLst>
+                        <a:ext uri="{9D8B030D-6E8A-4147-A177-3AD203B41FA5}">
+                          <a16:colId xmlns:a16="http://schemas.microsoft.com/office/drawing/2014/main" val="82609379"/>
+                        </a:ext>
+                      </a:extLst>
+                    </a:gridCol>
+                  </a:tblGrid>
+                  <a:tr h="599017">
+                    <a:tc>
+                      <a:txBody>
+                        <a:bodyPr/>
+                        <a:lstStyle/>
+                        <a:p>
+                          <a:pPr algn="ctr"/>
+                          <a:r>
+                            <a:rPr lang="en-CA" sz="1800" dirty="0"/>
+                            <a:t>Language Variation</a:t>
+                          </a:r>
+                        </a:p>
+                      </a:txBody>
+                      <a:tcPr anchor="ctr"/>
+                    </a:tc>
+                    <a:tc>
+                      <a:txBody>
+                        <a:bodyPr/>
+                        <a:lstStyle/>
+                        <a:p>
+                          <a:pPr algn="ctr"/>
+                          <a:r>
+                            <a:rPr lang="en-CA" sz="1800" dirty="0"/>
+                            <a:t>Function &amp; Terminal Set</a:t>
+                          </a:r>
+                        </a:p>
+                      </a:txBody>
+                      <a:tcPr anchor="ctr"/>
+                    </a:tc>
+                    <a:extLst>
+                      <a:ext uri="{0D108BD9-81ED-4DB2-BD59-A6C34878D82A}">
+                        <a16:rowId xmlns:a16="http://schemas.microsoft.com/office/drawing/2014/main" val="3654672897"/>
+                      </a:ext>
+                    </a:extLst>
+                  </a:tr>
+                  <a:tr h="599017">
+                    <a:tc>
+                      <a:txBody>
+                        <a:bodyPr/>
+                        <a:lstStyle/>
+                        <a:p>
+                          <a:pPr algn="ctr"/>
+                          <a:r>
+                            <a:rPr lang="en-CA" sz="1800" b="1" i="1" dirty="0"/>
+                            <a:t>L</a:t>
+                          </a:r>
+                        </a:p>
+                      </a:txBody>
+                      <a:tcPr anchor="ctr"/>
+                    </a:tc>
+                    <a:tc>
+                      <a:txBody>
+                        <a:bodyPr/>
+                        <a:lstStyle/>
+                        <a:p>
+                          <a:pPr algn="ctr"/>
+                          <a14:m>
+                            <m:oMathPara xmlns:m="http://schemas.openxmlformats.org/officeDocument/2006/math">
+                              <m:oMathParaPr>
+                                <m:jc m:val="centerGroup"/>
+                              </m:oMathParaPr>
+                              <m:oMath xmlns:m="http://schemas.openxmlformats.org/officeDocument/2006/math">
+                                <m:r>
+                                  <a:rPr lang="en-CA" sz="2000" b="1" i="1" smtClean="0">
+                                    <a:latin typeface="Cambria Math" panose="02040503050406030204" pitchFamily="18" charset="0"/>
+                                  </a:rPr>
+                                  <m:t>{</m:t>
+                                </m:r>
+                                <m:r>
+                                  <a:rPr lang="en-CA" sz="2000" b="1" i="1" smtClean="0">
+                                    <a:latin typeface="Cambria Math" panose="02040503050406030204" pitchFamily="18" charset="0"/>
+                                  </a:rPr>
+                                  <m:t>𝒙</m:t>
+                                </m:r>
+                                <m:r>
+                                  <a:rPr lang="en-CA" sz="2000" b="1" i="1" smtClean="0">
+                                    <a:latin typeface="Cambria Math" panose="02040503050406030204" pitchFamily="18" charset="0"/>
+                                  </a:rPr>
+                                  <m:t>, </m:t>
+                                </m:r>
+                                <m:r>
+                                  <a:rPr lang="en-CA" sz="2000" b="1" i="1" smtClean="0">
+                                    <a:latin typeface="Cambria Math" panose="02040503050406030204" pitchFamily="18" charset="0"/>
+                                  </a:rPr>
+                                  <m:t>𝑬𝑹𝑪</m:t>
+                                </m:r>
+                                <m:r>
+                                  <a:rPr lang="en-CA" sz="2000" b="1" i="1" smtClean="0">
+                                    <a:latin typeface="Cambria Math" panose="02040503050406030204" pitchFamily="18" charset="0"/>
+                                  </a:rPr>
+                                  <m:t>, +, −, ×, ÷, </m:t>
+                                </m:r>
+                                <m:r>
+                                  <a:rPr lang="en-CA" sz="2000" b="1" i="1" smtClean="0">
+                                    <a:latin typeface="Cambria Math" panose="02040503050406030204" pitchFamily="18" charset="0"/>
+                                    <a:ea typeface="Cambria Math" panose="02040503050406030204" pitchFamily="18" charset="0"/>
+                                  </a:rPr>
+                                  <m:t>𝒍𝒐𝒈</m:t>
+                                </m:r>
+                                <m:r>
+                                  <a:rPr lang="en-CA" sz="2000" b="1" i="1" smtClean="0">
+                                    <a:latin typeface="Cambria Math" panose="02040503050406030204" pitchFamily="18" charset="0"/>
+                                    <a:ea typeface="Cambria Math" panose="02040503050406030204" pitchFamily="18" charset="0"/>
+                                  </a:rPr>
+                                  <m:t>, </m:t>
+                                </m:r>
+                                <m:r>
+                                  <a:rPr lang="en-CA" sz="2000" b="1" i="1" smtClean="0">
+                                    <a:latin typeface="Cambria Math" panose="02040503050406030204" pitchFamily="18" charset="0"/>
+                                    <a:ea typeface="Cambria Math" panose="02040503050406030204" pitchFamily="18" charset="0"/>
+                                  </a:rPr>
+                                  <m:t>𝒄𝒐𝒔</m:t>
+                                </m:r>
+                                <m:r>
+                                  <a:rPr lang="en-CA" sz="2000" b="1" i="1" smtClean="0">
+                                    <a:latin typeface="Cambria Math" panose="02040503050406030204" pitchFamily="18" charset="0"/>
+                                    <a:ea typeface="Cambria Math" panose="02040503050406030204" pitchFamily="18" charset="0"/>
+                                  </a:rPr>
+                                  <m:t>, </m:t>
+                                </m:r>
+                                <m:r>
+                                  <a:rPr lang="en-CA" sz="2000" b="1" i="1" smtClean="0">
+                                    <a:latin typeface="Cambria Math" panose="02040503050406030204" pitchFamily="18" charset="0"/>
+                                    <a:ea typeface="Cambria Math" panose="02040503050406030204" pitchFamily="18" charset="0"/>
+                                  </a:rPr>
+                                  <m:t>𝒔𝒊𝒏</m:t>
+                                </m:r>
+                                <m:r>
+                                  <a:rPr lang="en-CA" sz="2000" b="1" i="1" smtClean="0">
+                                    <a:latin typeface="Cambria Math" panose="02040503050406030204" pitchFamily="18" charset="0"/>
+                                  </a:rPr>
+                                  <m:t>}</m:t>
+                                </m:r>
+                              </m:oMath>
+                            </m:oMathPara>
+                          </a14:m>
+                          <a:endParaRPr lang="en-CA" sz="2000" b="1" dirty="0"/>
+                        </a:p>
+                      </a:txBody>
+                      <a:tcPr anchor="ctr"/>
+                    </a:tc>
+                    <a:extLst>
+                      <a:ext uri="{0D108BD9-81ED-4DB2-BD59-A6C34878D82A}">
+                        <a16:rowId xmlns:a16="http://schemas.microsoft.com/office/drawing/2014/main" val="2083470743"/>
+                      </a:ext>
+                    </a:extLst>
+                  </a:tr>
+                  <a:tr h="599017">
+                    <a:tc>
+                      <a:txBody>
+                        <a:bodyPr/>
+                        <a:lstStyle/>
+                        <a:p>
+                          <a:pPr algn="ctr"/>
+                          <a:r>
+                            <a:rPr lang="en-CA" sz="1800" b="1" i="1" dirty="0"/>
+                            <a:t>L</a:t>
+                          </a:r>
+                          <a:r>
+                            <a:rPr lang="en-CA" sz="1800" b="1" i="1" baseline="-25000" dirty="0"/>
+                            <a:t>IF</a:t>
+                          </a:r>
+                          <a:endParaRPr lang="en-CA" sz="1800" b="1" i="1" dirty="0"/>
+                        </a:p>
+                      </a:txBody>
+                      <a:tcPr anchor="ctr"/>
+                    </a:tc>
+                    <a:tc>
+                      <a:txBody>
+                        <a:bodyPr/>
+                        <a:lstStyle/>
+                        <a:p>
+                          <a:pPr algn="ctr"/>
+                          <a14:m>
+                            <m:oMathPara xmlns:m="http://schemas.openxmlformats.org/officeDocument/2006/math">
+                              <m:oMathParaPr>
+                                <m:jc m:val="centerGroup"/>
+                              </m:oMathParaPr>
+                              <m:oMath xmlns:m="http://schemas.openxmlformats.org/officeDocument/2006/math">
+                                <m:r>
+                                  <a:rPr lang="en-CA" sz="2000" b="1" i="1" smtClean="0">
+                                    <a:latin typeface="Cambria Math" panose="02040503050406030204" pitchFamily="18" charset="0"/>
+                                  </a:rPr>
+                                  <m:t>𝑳</m:t>
+                                </m:r>
+                                <m:r>
+                                  <a:rPr lang="en-CA" sz="2000" b="1" i="1" smtClean="0">
+                                    <a:latin typeface="Cambria Math" panose="02040503050406030204" pitchFamily="18" charset="0"/>
+                                  </a:rPr>
+                                  <m:t>∪{</m:t>
+                                </m:r>
+                                <m:r>
+                                  <a:rPr lang="en-CA" sz="2000" b="1" i="1" smtClean="0">
+                                    <a:latin typeface="Cambria Math" panose="02040503050406030204" pitchFamily="18" charset="0"/>
+                                  </a:rPr>
+                                  <m:t>𝑰𝑭𝑳𝑻</m:t>
+                                </m:r>
+                                <m:r>
+                                  <a:rPr lang="en-CA" sz="2000" b="1" i="1" smtClean="0">
+                                    <a:latin typeface="Cambria Math" panose="02040503050406030204" pitchFamily="18" charset="0"/>
+                                  </a:rPr>
+                                  <m:t>}</m:t>
+                                </m:r>
+                              </m:oMath>
+                            </m:oMathPara>
+                          </a14:m>
+                          <a:endParaRPr lang="en-CA" sz="2000" b="1" dirty="0"/>
+                        </a:p>
+                      </a:txBody>
+                      <a:tcPr anchor="ctr"/>
+                    </a:tc>
+                    <a:extLst>
+                      <a:ext uri="{0D108BD9-81ED-4DB2-BD59-A6C34878D82A}">
+                        <a16:rowId xmlns:a16="http://schemas.microsoft.com/office/drawing/2014/main" val="1427336378"/>
+                      </a:ext>
+                    </a:extLst>
+                  </a:tr>
+                  <a:tr h="599017">
+                    <a:tc>
+                      <a:txBody>
+                        <a:bodyPr/>
+                        <a:lstStyle/>
+                        <a:p>
+                          <a:pPr algn="ctr"/>
+                          <a:r>
+                            <a:rPr lang="en-CA" sz="1800" b="1" i="1" dirty="0"/>
+                            <a:t>L</a:t>
+                          </a:r>
+                          <a:r>
+                            <a:rPr lang="en-CA" sz="1800" b="1" i="1" baseline="-25000" dirty="0"/>
+                            <a:t>ST</a:t>
+                          </a:r>
+                          <a:endParaRPr lang="en-CA" sz="1800" b="1" i="1" dirty="0"/>
+                        </a:p>
+                      </a:txBody>
+                      <a:tcPr anchor="ctr"/>
+                    </a:tc>
+                    <a:tc>
+                      <a:txBody>
+                        <a:bodyPr/>
+                        <a:lstStyle/>
+                        <a:p>
+                          <a:pPr algn="ctr"/>
+                          <a14:m>
+                            <m:oMathPara xmlns:m="http://schemas.openxmlformats.org/officeDocument/2006/math">
+                              <m:oMathParaPr>
+                                <m:jc m:val="centerGroup"/>
+                              </m:oMathParaPr>
+                              <m:oMath xmlns:m="http://schemas.openxmlformats.org/officeDocument/2006/math">
+                                <m:sSub>
+                                  <m:sSubPr>
+                                    <m:ctrlPr>
+                                      <a:rPr lang="en-CA" sz="2000" b="1" i="1" smtClean="0">
+                                        <a:latin typeface="Cambria Math" panose="02040503050406030204" pitchFamily="18" charset="0"/>
+                                      </a:rPr>
+                                    </m:ctrlPr>
+                                  </m:sSubPr>
+                                  <m:e>
+                                    <m:r>
+                                      <a:rPr lang="en-CA" sz="2000" b="1" i="1" smtClean="0">
+                                        <a:latin typeface="Cambria Math" panose="02040503050406030204" pitchFamily="18" charset="0"/>
+                                      </a:rPr>
+                                      <m:t>𝑳</m:t>
+                                    </m:r>
+                                  </m:e>
+                                  <m:sub>
+                                    <m:r>
+                                      <a:rPr lang="en-CA" sz="2000" b="1" i="1" smtClean="0">
+                                        <a:latin typeface="Cambria Math" panose="02040503050406030204" pitchFamily="18" charset="0"/>
+                                      </a:rPr>
+                                      <m:t>𝑰𝑭</m:t>
+                                    </m:r>
+                                  </m:sub>
+                                </m:sSub>
+                                <m:r>
+                                  <a:rPr lang="en-CA" sz="2000" b="1" i="1" smtClean="0">
+                                    <a:latin typeface="Cambria Math" panose="02040503050406030204" pitchFamily="18" charset="0"/>
+                                  </a:rPr>
+                                  <m:t>∪{</m:t>
+                                </m:r>
+                                <m:r>
+                                  <a:rPr lang="en-CA" sz="2000" b="1" i="1" smtClean="0">
+                                    <a:latin typeface="Cambria Math" panose="02040503050406030204" pitchFamily="18" charset="0"/>
+                                  </a:rPr>
+                                  <m:t>𝒔𝒖𝒎</m:t>
+                                </m:r>
+                                <m:r>
+                                  <a:rPr lang="en-CA" sz="2000" b="1" i="1" smtClean="0">
+                                    <a:latin typeface="Cambria Math" panose="02040503050406030204" pitchFamily="18" charset="0"/>
+                                  </a:rPr>
+                                  <m:t>, </m:t>
+                                </m:r>
+                                <m:r>
+                                  <a:rPr lang="en-CA" sz="2000" b="1" i="1" smtClean="0">
+                                    <a:latin typeface="Cambria Math" panose="02040503050406030204" pitchFamily="18" charset="0"/>
+                                  </a:rPr>
+                                  <m:t>𝒔𝒕𝒅𝒆𝒗</m:t>
+                                </m:r>
+                                <m:r>
+                                  <a:rPr lang="en-CA" sz="2000" b="1" i="1" smtClean="0">
+                                    <a:latin typeface="Cambria Math" panose="02040503050406030204" pitchFamily="18" charset="0"/>
+                                  </a:rPr>
+                                  <m:t>, </m:t>
+                                </m:r>
+                                <m:r>
+                                  <a:rPr lang="en-CA" sz="2000" b="1" i="1" smtClean="0">
+                                    <a:latin typeface="Cambria Math" panose="02040503050406030204" pitchFamily="18" charset="0"/>
+                                  </a:rPr>
+                                  <m:t>𝒔𝒌𝒆𝒘</m:t>
+                                </m:r>
+                                <m:r>
+                                  <a:rPr lang="en-CA" sz="2000" b="1" i="1" smtClean="0">
+                                    <a:latin typeface="Cambria Math" panose="02040503050406030204" pitchFamily="18" charset="0"/>
+                                  </a:rPr>
+                                  <m:t>}</m:t>
+                                </m:r>
+                              </m:oMath>
+                            </m:oMathPara>
+                          </a14:m>
+                          <a:endParaRPr lang="en-CA" sz="2000" b="1" dirty="0"/>
+                        </a:p>
+                      </a:txBody>
+                      <a:tcPr anchor="ctr"/>
+                    </a:tc>
+                    <a:extLst>
+                      <a:ext uri="{0D108BD9-81ED-4DB2-BD59-A6C34878D82A}">
+                        <a16:rowId xmlns:a16="http://schemas.microsoft.com/office/drawing/2014/main" val="1548791112"/>
+                      </a:ext>
+                    </a:extLst>
+                  </a:tr>
+                  <a:tr h="599017">
+                    <a:tc>
+                      <a:txBody>
+                        <a:bodyPr/>
+                        <a:lstStyle/>
+                        <a:p>
+                          <a:pPr algn="ctr"/>
+                          <a:r>
+                            <a:rPr lang="en-CA" sz="1800" b="1" i="1" dirty="0"/>
+                            <a:t>L</a:t>
+                          </a:r>
+                          <a:r>
+                            <a:rPr lang="en-CA" sz="1800" b="1" i="1" baseline="-25000" dirty="0"/>
+                            <a:t>ST’</a:t>
+                          </a:r>
+                          <a:endParaRPr lang="en-CA" sz="1800" b="1" i="1" dirty="0"/>
+                        </a:p>
+                      </a:txBody>
+                      <a:tcPr anchor="ctr"/>
+                    </a:tc>
+                    <a:tc>
+                      <a:txBody>
+                        <a:bodyPr/>
+                        <a:lstStyle/>
+                        <a:p>
+                          <a:pPr algn="ctr"/>
+                          <a14:m>
+                            <m:oMathPara xmlns:m="http://schemas.openxmlformats.org/officeDocument/2006/math">
+                              <m:oMathParaPr>
+                                <m:jc m:val="centerGroup"/>
+                              </m:oMathParaPr>
+                              <m:oMath xmlns:m="http://schemas.openxmlformats.org/officeDocument/2006/math">
+                                <m:sSub>
+                                  <m:sSubPr>
+                                    <m:ctrlPr>
+                                      <a:rPr lang="en-CA" sz="2000" b="1" i="1" u="sng" smtClean="0">
+                                        <a:latin typeface="Cambria Math" panose="02040503050406030204" pitchFamily="18" charset="0"/>
+                                      </a:rPr>
+                                    </m:ctrlPr>
+                                  </m:sSubPr>
+                                  <m:e>
+                                    <m:r>
+                                      <a:rPr lang="en-CA" sz="2000" b="1" i="1" u="sng" smtClean="0">
+                                        <a:latin typeface="Cambria Math" panose="02040503050406030204" pitchFamily="18" charset="0"/>
+                                      </a:rPr>
+                                      <m:t>𝑳</m:t>
+                                    </m:r>
+                                  </m:e>
+                                  <m:sub>
+                                    <m:r>
+                                      <a:rPr lang="en-CA" sz="2000" b="1" i="1" u="sng" smtClean="0">
+                                        <a:latin typeface="Cambria Math" panose="02040503050406030204" pitchFamily="18" charset="0"/>
+                                      </a:rPr>
+                                      <m:t>𝑺𝑻</m:t>
+                                    </m:r>
+                                  </m:sub>
+                                </m:sSub>
+                                <m:r>
+                                  <a:rPr lang="en-CA" sz="2000" b="1" i="1" u="sng" smtClean="0">
+                                    <a:latin typeface="Cambria Math" panose="02040503050406030204" pitchFamily="18" charset="0"/>
+                                  </a:rPr>
+                                  <m:t>∪{</m:t>
+                                </m:r>
+                                <m:r>
+                                  <a:rPr lang="en-CA" sz="2000" b="1" i="1" u="sng" smtClean="0">
+                                    <a:latin typeface="Cambria Math" panose="02040503050406030204" pitchFamily="18" charset="0"/>
+                                  </a:rPr>
+                                  <m:t>𝒂𝒗𝒈</m:t>
+                                </m:r>
+                                <m:r>
+                                  <a:rPr lang="en-CA" sz="2000" b="1" i="1" u="sng" smtClean="0">
+                                    <a:latin typeface="Cambria Math" panose="02040503050406030204" pitchFamily="18" charset="0"/>
+                                  </a:rPr>
+                                  <m:t>, </m:t>
+                                </m:r>
+                                <m:r>
+                                  <a:rPr lang="en-CA" sz="2000" b="1" i="1" u="sng" smtClean="0">
+                                    <a:latin typeface="Cambria Math" panose="02040503050406030204" pitchFamily="18" charset="0"/>
+                                  </a:rPr>
+                                  <m:t>𝒎𝒊𝒏</m:t>
+                                </m:r>
+                                <m:r>
+                                  <a:rPr lang="en-CA" sz="2000" b="1" i="1" u="sng" smtClean="0">
+                                    <a:latin typeface="Cambria Math" panose="02040503050406030204" pitchFamily="18" charset="0"/>
+                                  </a:rPr>
+                                  <m:t>, </m:t>
+                                </m:r>
+                                <m:r>
+                                  <a:rPr lang="en-CA" sz="2000" b="1" i="1" u="sng" smtClean="0">
+                                    <a:latin typeface="Cambria Math" panose="02040503050406030204" pitchFamily="18" charset="0"/>
+                                  </a:rPr>
+                                  <m:t>𝒎𝒂𝒙</m:t>
+                                </m:r>
+                                <m:r>
+                                  <a:rPr lang="en-CA" sz="2000" b="1" i="1" u="sng" smtClean="0">
+                                    <a:latin typeface="Cambria Math" panose="02040503050406030204" pitchFamily="18" charset="0"/>
+                                  </a:rPr>
+                                  <m:t>}</m:t>
+                                </m:r>
+                              </m:oMath>
+                            </m:oMathPara>
+                          </a14:m>
+                          <a:endParaRPr lang="en-CA" sz="2000" b="1" u="sng" dirty="0"/>
+                        </a:p>
+                      </a:txBody>
+                      <a:tcPr anchor="ctr"/>
+                    </a:tc>
+                    <a:extLst>
+                      <a:ext uri="{0D108BD9-81ED-4DB2-BD59-A6C34878D82A}">
+                        <a16:rowId xmlns:a16="http://schemas.microsoft.com/office/drawing/2014/main" val="3273923411"/>
+                      </a:ext>
+                    </a:extLst>
+                  </a:tr>
+                  <a:tr h="599017">
+                    <a:tc>
+                      <a:txBody>
+                        <a:bodyPr/>
+                        <a:lstStyle/>
+                        <a:p>
+                          <a:pPr algn="ctr"/>
+                          <a:r>
+                            <a:rPr lang="en-CA" sz="1800" b="1" i="1" dirty="0"/>
+                            <a:t>L</a:t>
+                          </a:r>
+                          <a:r>
+                            <a:rPr lang="en-CA" sz="1800" b="1" i="1" baseline="-25000" dirty="0"/>
+                            <a:t>FI</a:t>
+                          </a:r>
+                          <a:endParaRPr lang="en-CA" sz="1800" b="1" i="1" dirty="0"/>
+                        </a:p>
+                      </a:txBody>
+                      <a:tcPr anchor="ctr"/>
+                    </a:tc>
+                    <a:tc>
+                      <a:txBody>
+                        <a:bodyPr/>
+                        <a:lstStyle/>
+                        <a:p>
+                          <a:pPr algn="ctr"/>
+                          <a14:m>
+                            <m:oMathPara xmlns:m="http://schemas.openxmlformats.org/officeDocument/2006/math">
+                              <m:oMathParaPr>
+                                <m:jc m:val="centerGroup"/>
+                              </m:oMathParaPr>
+                              <m:oMath xmlns:m="http://schemas.openxmlformats.org/officeDocument/2006/math">
+                                <m:sSub>
+                                  <m:sSubPr>
+                                    <m:ctrlPr>
+                                      <a:rPr lang="en-CA" sz="2000" b="1" i="1" smtClean="0">
+                                        <a:latin typeface="Cambria Math" panose="02040503050406030204" pitchFamily="18" charset="0"/>
+                                      </a:rPr>
+                                    </m:ctrlPr>
+                                  </m:sSubPr>
+                                  <m:e>
+                                    <m:r>
+                                      <a:rPr lang="en-CA" sz="2000" b="1" i="1" smtClean="0">
+                                        <a:latin typeface="Cambria Math" panose="02040503050406030204" pitchFamily="18" charset="0"/>
+                                      </a:rPr>
+                                      <m:t>𝑳</m:t>
+                                    </m:r>
+                                  </m:e>
+                                  <m:sub>
+                                    <m:r>
+                                      <a:rPr lang="en-CA" sz="2000" b="1" i="1" smtClean="0">
+                                        <a:latin typeface="Cambria Math" panose="02040503050406030204" pitchFamily="18" charset="0"/>
+                                      </a:rPr>
+                                      <m:t>𝑺𝑻</m:t>
+                                    </m:r>
+                                  </m:sub>
+                                </m:sSub>
+                                <m:r>
+                                  <a:rPr lang="en-CA" sz="2000" b="1" i="1" smtClean="0">
+                                    <a:latin typeface="Cambria Math" panose="02040503050406030204" pitchFamily="18" charset="0"/>
+                                  </a:rPr>
+                                  <m:t>∪{</m:t>
+                                </m:r>
+                                <m:r>
+                                  <a:rPr lang="en-CA" sz="2000" b="1" i="1" smtClean="0">
+                                    <a:latin typeface="Cambria Math" panose="02040503050406030204" pitchFamily="18" charset="0"/>
+                                  </a:rPr>
+                                  <m:t>𝒐𝒑𝒆𝒏</m:t>
+                                </m:r>
+                                <m:r>
+                                  <a:rPr lang="en-CA" sz="2000" b="1" i="1" smtClean="0">
+                                    <a:latin typeface="Cambria Math" panose="02040503050406030204" pitchFamily="18" charset="0"/>
+                                  </a:rPr>
+                                  <m:t>, </m:t>
+                                </m:r>
+                                <m:r>
+                                  <a:rPr lang="en-CA" sz="2000" b="1" i="1" smtClean="0">
+                                    <a:latin typeface="Cambria Math" panose="02040503050406030204" pitchFamily="18" charset="0"/>
+                                  </a:rPr>
+                                  <m:t>𝒉𝒊𝒈𝒉</m:t>
+                                </m:r>
+                                <m:r>
+                                  <a:rPr lang="en-CA" sz="2000" b="1" i="1" smtClean="0">
+                                    <a:latin typeface="Cambria Math" panose="02040503050406030204" pitchFamily="18" charset="0"/>
+                                  </a:rPr>
+                                  <m:t>, </m:t>
+                                </m:r>
+                                <m:r>
+                                  <a:rPr lang="en-CA" sz="2000" b="1" i="1" smtClean="0">
+                                    <a:latin typeface="Cambria Math" panose="02040503050406030204" pitchFamily="18" charset="0"/>
+                                  </a:rPr>
+                                  <m:t>𝒍𝒐𝒘</m:t>
+                                </m:r>
+                                <m:r>
+                                  <a:rPr lang="en-CA" sz="2000" b="1" i="1" smtClean="0">
+                                    <a:latin typeface="Cambria Math" panose="02040503050406030204" pitchFamily="18" charset="0"/>
+                                  </a:rPr>
+                                  <m:t>, </m:t>
+                                </m:r>
+                                <m:r>
+                                  <a:rPr lang="en-CA" sz="2000" b="1" i="1" smtClean="0">
+                                    <a:latin typeface="Cambria Math" panose="02040503050406030204" pitchFamily="18" charset="0"/>
+                                  </a:rPr>
+                                  <m:t>𝒗𝒐𝒍</m:t>
+                                </m:r>
+                                <m:r>
+                                  <a:rPr lang="en-CA" sz="2000" b="1" i="1" smtClean="0">
+                                    <a:latin typeface="Cambria Math" panose="02040503050406030204" pitchFamily="18" charset="0"/>
+                                  </a:rPr>
+                                  <m:t>}</m:t>
+                                </m:r>
+                              </m:oMath>
+                            </m:oMathPara>
+                          </a14:m>
+                          <a:endParaRPr lang="en-CA" sz="2000" b="1" dirty="0"/>
+                        </a:p>
+                      </a:txBody>
+                      <a:tcPr anchor="ctr"/>
+                    </a:tc>
+                    <a:extLst>
+                      <a:ext uri="{0D108BD9-81ED-4DB2-BD59-A6C34878D82A}">
+                        <a16:rowId xmlns:a16="http://schemas.microsoft.com/office/drawing/2014/main" val="500252021"/>
+                      </a:ext>
+                    </a:extLst>
+                  </a:tr>
+                  <a:tr h="599017">
+                    <a:tc>
+                      <a:txBody>
+                        <a:bodyPr/>
+                        <a:lstStyle/>
+                        <a:p>
+                          <a:pPr algn="ctr"/>
+                          <a:r>
+                            <a:rPr lang="en-CA" sz="1800" b="1" i="1" dirty="0"/>
+                            <a:t>L</a:t>
+                          </a:r>
+                          <a:r>
+                            <a:rPr lang="en-CA" sz="1800" b="1" i="1" baseline="-25000" dirty="0"/>
+                            <a:t>FI’</a:t>
+                          </a:r>
+                          <a:endParaRPr lang="en-CA" sz="1800" b="1" i="1" dirty="0"/>
+                        </a:p>
+                      </a:txBody>
+                      <a:tcPr anchor="ctr"/>
+                    </a:tc>
+                    <a:tc>
+                      <a:txBody>
+                        <a:bodyPr/>
+                        <a:lstStyle/>
+                        <a:p>
+                          <a:pPr algn="ctr"/>
+                          <a14:m>
+                            <m:oMathPara xmlns:m="http://schemas.openxmlformats.org/officeDocument/2006/math">
+                              <m:oMathParaPr>
+                                <m:jc m:val="centerGroup"/>
+                              </m:oMathParaPr>
+                              <m:oMath xmlns:m="http://schemas.openxmlformats.org/officeDocument/2006/math">
+                                <m:sSub>
+                                  <m:sSubPr>
+                                    <m:ctrlPr>
+                                      <a:rPr lang="en-CA" sz="2000" b="1" i="1" u="sng" smtClean="0">
+                                        <a:latin typeface="Cambria Math" panose="02040503050406030204" pitchFamily="18" charset="0"/>
+                                      </a:rPr>
+                                    </m:ctrlPr>
+                                  </m:sSubPr>
+                                  <m:e>
+                                    <m:r>
+                                      <a:rPr lang="en-CA" sz="2000" b="1" i="1" u="sng" smtClean="0">
+                                        <a:latin typeface="Cambria Math" panose="02040503050406030204" pitchFamily="18" charset="0"/>
+                                      </a:rPr>
+                                      <m:t>𝑳</m:t>
+                                    </m:r>
+                                  </m:e>
+                                  <m:sub>
+                                    <m:r>
+                                      <a:rPr lang="en-CA" sz="2000" b="1" i="1" u="sng" smtClean="0">
+                                        <a:latin typeface="Cambria Math" panose="02040503050406030204" pitchFamily="18" charset="0"/>
+                                      </a:rPr>
+                                      <m:t>𝑭𝑰</m:t>
+                                    </m:r>
+                                  </m:sub>
+                                </m:sSub>
+                                <m:r>
+                                  <a:rPr lang="en-CA" sz="2000" b="1" i="1" u="sng" smtClean="0">
+                                    <a:latin typeface="Cambria Math" panose="02040503050406030204" pitchFamily="18" charset="0"/>
+                                  </a:rPr>
+                                  <m:t>∪{</m:t>
+                                </m:r>
+                                <m:r>
+                                  <a:rPr lang="en-CA" sz="2000" b="1" i="1" u="sng" smtClean="0">
+                                    <a:latin typeface="Cambria Math" panose="02040503050406030204" pitchFamily="18" charset="0"/>
+                                  </a:rPr>
+                                  <m:t>𝒂𝒗𝒈</m:t>
+                                </m:r>
+                                <m:r>
+                                  <a:rPr lang="en-CA" sz="2000" b="1" i="1" u="sng" smtClean="0">
+                                    <a:latin typeface="Cambria Math" panose="02040503050406030204" pitchFamily="18" charset="0"/>
+                                  </a:rPr>
+                                  <m:t>, </m:t>
+                                </m:r>
+                                <m:r>
+                                  <a:rPr lang="en-CA" sz="2000" b="1" i="1" u="sng" smtClean="0">
+                                    <a:latin typeface="Cambria Math" panose="02040503050406030204" pitchFamily="18" charset="0"/>
+                                  </a:rPr>
+                                  <m:t>𝒎𝒊𝒏</m:t>
+                                </m:r>
+                                <m:r>
+                                  <a:rPr lang="en-CA" sz="2000" b="1" i="1" u="sng" smtClean="0">
+                                    <a:latin typeface="Cambria Math" panose="02040503050406030204" pitchFamily="18" charset="0"/>
+                                  </a:rPr>
+                                  <m:t>, </m:t>
+                                </m:r>
+                                <m:r>
+                                  <a:rPr lang="en-CA" sz="2000" b="1" i="1" u="sng" smtClean="0">
+                                    <a:latin typeface="Cambria Math" panose="02040503050406030204" pitchFamily="18" charset="0"/>
+                                  </a:rPr>
+                                  <m:t>𝒎𝒂𝒙</m:t>
+                                </m:r>
+                                <m:r>
+                                  <a:rPr lang="en-CA" sz="2000" b="1" i="1" u="sng" smtClean="0">
+                                    <a:latin typeface="Cambria Math" panose="02040503050406030204" pitchFamily="18" charset="0"/>
+                                  </a:rPr>
+                                  <m:t>}</m:t>
+                                </m:r>
+                              </m:oMath>
+                            </m:oMathPara>
+                          </a14:m>
+                          <a:endParaRPr lang="en-CA" sz="2000" b="1" u="sng" dirty="0"/>
+                        </a:p>
+                      </a:txBody>
+                      <a:tcPr anchor="ctr"/>
+                    </a:tc>
+                    <a:extLst>
+                      <a:ext uri="{0D108BD9-81ED-4DB2-BD59-A6C34878D82A}">
+                        <a16:rowId xmlns:a16="http://schemas.microsoft.com/office/drawing/2014/main" val="1990218277"/>
+                      </a:ext>
+                    </a:extLst>
+                  </a:tr>
+                </a:tbl>
+              </a:graphicData>
+            </a:graphic>
+          </p:graphicFrame>
+        </mc:Choice>
+        <mc:Fallback>
+          <p:graphicFrame>
+            <p:nvGraphicFramePr>
+              <p:cNvPr id="4" name="Content Placeholder 3"/>
+              <p:cNvGraphicFramePr>
+                <a:graphicFrameLocks noGrp="1"/>
+              </p:cNvGraphicFramePr>
+              <p:nvPr>
+                <p:ph idx="1"/>
+                <p:extLst>
+                  <p:ext uri="{D42A27DB-BD31-4B8C-83A1-F6EECF244321}">
+                    <p14:modId xmlns:p14="http://schemas.microsoft.com/office/powerpoint/2010/main" val="2795055958"/>
+                  </p:ext>
+                </p:extLst>
+              </p:nvPr>
+            </p:nvGraphicFramePr>
+            <p:xfrm>
+              <a:off x="1104900" y="1600200"/>
+              <a:ext cx="9980614" cy="4193119"/>
+            </p:xfrm>
+            <a:graphic>
+              <a:graphicData uri="http://schemas.openxmlformats.org/drawingml/2006/table">
+                <a:tbl>
+                  <a:tblPr firstRow="1" bandRow="1">
+                    <a:tableStyleId>{5C22544A-7EE6-4342-B048-85BDC9FD1C3A}</a:tableStyleId>
+                  </a:tblPr>
+                  <a:tblGrid>
+                    <a:gridCol w="4990307">
+                      <a:extLst>
+                        <a:ext uri="{9D8B030D-6E8A-4147-A177-3AD203B41FA5}">
+                          <a16:colId xmlns:a16="http://schemas.microsoft.com/office/drawing/2014/main" val="452220581"/>
+                        </a:ext>
+                      </a:extLst>
+                    </a:gridCol>
+                    <a:gridCol w="4990307">
+                      <a:extLst>
+                        <a:ext uri="{9D8B030D-6E8A-4147-A177-3AD203B41FA5}">
+                          <a16:colId xmlns:a16="http://schemas.microsoft.com/office/drawing/2014/main" val="82609379"/>
+                        </a:ext>
+                      </a:extLst>
+                    </a:gridCol>
+                  </a:tblGrid>
+                  <a:tr h="599017">
+                    <a:tc>
+                      <a:txBody>
+                        <a:bodyPr/>
+                        <a:lstStyle/>
+                        <a:p>
+                          <a:pPr algn="ctr"/>
+                          <a:r>
+                            <a:rPr lang="en-CA" sz="1800" dirty="0"/>
+                            <a:t>Language Variation</a:t>
+                          </a:r>
+                        </a:p>
+                      </a:txBody>
+                      <a:tcPr anchor="ctr"/>
+                    </a:tc>
+                    <a:tc>
+                      <a:txBody>
+                        <a:bodyPr/>
+                        <a:lstStyle/>
+                        <a:p>
+                          <a:pPr algn="ctr"/>
+                          <a:r>
+                            <a:rPr lang="en-CA" sz="1800" dirty="0"/>
+                            <a:t>Function &amp; Terminal Set</a:t>
+                          </a:r>
+                        </a:p>
+                      </a:txBody>
+                      <a:tcPr anchor="ctr"/>
+                    </a:tc>
+                    <a:extLst>
+                      <a:ext uri="{0D108BD9-81ED-4DB2-BD59-A6C34878D82A}">
+                        <a16:rowId xmlns:a16="http://schemas.microsoft.com/office/drawing/2014/main" val="3654672897"/>
+                      </a:ext>
+                    </a:extLst>
+                  </a:tr>
+                  <a:tr h="599017">
+                    <a:tc>
+                      <a:txBody>
+                        <a:bodyPr/>
+                        <a:lstStyle/>
+                        <a:p>
+                          <a:pPr algn="ctr"/>
+                          <a:r>
+                            <a:rPr lang="en-CA" sz="1800" b="1" i="1" dirty="0"/>
+                            <a:t>L</a:t>
+                          </a:r>
+                        </a:p>
+                      </a:txBody>
+                      <a:tcPr anchor="ctr"/>
+                    </a:tc>
+                    <a:tc>
+                      <a:txBody>
+                        <a:bodyPr/>
+                        <a:lstStyle/>
+                        <a:p>
+                          <a:endParaRPr lang="en-US"/>
+                        </a:p>
+                      </a:txBody>
+                      <a:tcPr anchor="ctr">
+                        <a:blipFill>
+                          <a:blip r:embed="rId3"/>
+                          <a:stretch>
+                            <a:fillRect l="-100122" t="-100000" r="-488" b="-498990"/>
+                          </a:stretch>
+                        </a:blipFill>
+                      </a:tcPr>
+                    </a:tc>
+                    <a:extLst>
+                      <a:ext uri="{0D108BD9-81ED-4DB2-BD59-A6C34878D82A}">
+                        <a16:rowId xmlns:a16="http://schemas.microsoft.com/office/drawing/2014/main" val="2083470743"/>
+                      </a:ext>
+                    </a:extLst>
+                  </a:tr>
+                  <a:tr h="599017">
+                    <a:tc>
+                      <a:txBody>
+                        <a:bodyPr/>
+                        <a:lstStyle/>
+                        <a:p>
+                          <a:pPr algn="ctr"/>
+                          <a:r>
+                            <a:rPr lang="en-CA" sz="1800" b="1" i="1" dirty="0"/>
+                            <a:t>L</a:t>
+                          </a:r>
+                          <a:r>
+                            <a:rPr lang="en-CA" sz="1800" b="1" i="1" baseline="-25000" dirty="0"/>
+                            <a:t>IF</a:t>
+                          </a:r>
+                          <a:endParaRPr lang="en-CA" sz="1800" b="1" i="1" dirty="0"/>
+                        </a:p>
+                      </a:txBody>
+                      <a:tcPr anchor="ctr"/>
+                    </a:tc>
+                    <a:tc>
+                      <a:txBody>
+                        <a:bodyPr/>
+                        <a:lstStyle/>
+                        <a:p>
+                          <a:endParaRPr lang="en-US"/>
+                        </a:p>
+                      </a:txBody>
+                      <a:tcPr anchor="ctr">
+                        <a:blipFill>
+                          <a:blip r:embed="rId3"/>
+                          <a:stretch>
+                            <a:fillRect l="-100122" t="-202041" r="-488" b="-404082"/>
+                          </a:stretch>
+                        </a:blipFill>
+                      </a:tcPr>
+                    </a:tc>
+                    <a:extLst>
+                      <a:ext uri="{0D108BD9-81ED-4DB2-BD59-A6C34878D82A}">
+                        <a16:rowId xmlns:a16="http://schemas.microsoft.com/office/drawing/2014/main" val="1427336378"/>
+                      </a:ext>
+                    </a:extLst>
+                  </a:tr>
+                  <a:tr h="599017">
+                    <a:tc>
+                      <a:txBody>
+                        <a:bodyPr/>
+                        <a:lstStyle/>
+                        <a:p>
+                          <a:pPr algn="ctr"/>
+                          <a:r>
+                            <a:rPr lang="en-CA" sz="1800" b="1" i="1" dirty="0"/>
+                            <a:t>L</a:t>
+                          </a:r>
+                          <a:r>
+                            <a:rPr lang="en-CA" sz="1800" b="1" i="1" baseline="-25000" dirty="0"/>
+                            <a:t>ST</a:t>
+                          </a:r>
+                          <a:endParaRPr lang="en-CA" sz="1800" b="1" i="1" dirty="0"/>
+                        </a:p>
+                      </a:txBody>
+                      <a:tcPr anchor="ctr"/>
+                    </a:tc>
+                    <a:tc>
+                      <a:txBody>
+                        <a:bodyPr/>
+                        <a:lstStyle/>
+                        <a:p>
+                          <a:endParaRPr lang="en-US"/>
+                        </a:p>
+                      </a:txBody>
+                      <a:tcPr anchor="ctr">
+                        <a:blipFill>
+                          <a:blip r:embed="rId3"/>
+                          <a:stretch>
+                            <a:fillRect l="-100122" t="-298990" r="-488" b="-300000"/>
+                          </a:stretch>
+                        </a:blipFill>
+                      </a:tcPr>
+                    </a:tc>
+                    <a:extLst>
+                      <a:ext uri="{0D108BD9-81ED-4DB2-BD59-A6C34878D82A}">
+                        <a16:rowId xmlns:a16="http://schemas.microsoft.com/office/drawing/2014/main" val="1548791112"/>
+                      </a:ext>
+                    </a:extLst>
+                  </a:tr>
+                  <a:tr h="599017">
+                    <a:tc>
+                      <a:txBody>
+                        <a:bodyPr/>
+                        <a:lstStyle/>
+                        <a:p>
+                          <a:pPr algn="ctr"/>
+                          <a:r>
+                            <a:rPr lang="en-CA" sz="1800" b="1" i="1" dirty="0"/>
+                            <a:t>L</a:t>
+                          </a:r>
+                          <a:r>
+                            <a:rPr lang="en-CA" sz="1800" b="1" i="1" baseline="-25000" dirty="0"/>
+                            <a:t>ST’</a:t>
+                          </a:r>
+                          <a:endParaRPr lang="en-CA" sz="1800" b="1" i="1" dirty="0"/>
+                        </a:p>
+                      </a:txBody>
+                      <a:tcPr anchor="ctr"/>
+                    </a:tc>
+                    <a:tc>
+                      <a:txBody>
+                        <a:bodyPr/>
+                        <a:lstStyle/>
+                        <a:p>
+                          <a:endParaRPr lang="en-US"/>
+                        </a:p>
+                      </a:txBody>
+                      <a:tcPr anchor="ctr">
+                        <a:blipFill>
+                          <a:blip r:embed="rId3"/>
+                          <a:stretch>
+                            <a:fillRect l="-100122" t="-403061" r="-488" b="-203061"/>
+                          </a:stretch>
+                        </a:blipFill>
+                      </a:tcPr>
+                    </a:tc>
+                    <a:extLst>
+                      <a:ext uri="{0D108BD9-81ED-4DB2-BD59-A6C34878D82A}">
+                        <a16:rowId xmlns:a16="http://schemas.microsoft.com/office/drawing/2014/main" val="3273923411"/>
+                      </a:ext>
+                    </a:extLst>
+                  </a:tr>
+                  <a:tr h="599017">
+                    <a:tc>
+                      <a:txBody>
+                        <a:bodyPr/>
+                        <a:lstStyle/>
+                        <a:p>
+                          <a:pPr algn="ctr"/>
+                          <a:r>
+                            <a:rPr lang="en-CA" sz="1800" b="1" i="1" dirty="0"/>
+                            <a:t>L</a:t>
+                          </a:r>
+                          <a:r>
+                            <a:rPr lang="en-CA" sz="1800" b="1" i="1" baseline="-25000" dirty="0"/>
+                            <a:t>FI</a:t>
+                          </a:r>
+                          <a:endParaRPr lang="en-CA" sz="1800" b="1" i="1" dirty="0"/>
+                        </a:p>
+                      </a:txBody>
+                      <a:tcPr anchor="ctr"/>
+                    </a:tc>
+                    <a:tc>
+                      <a:txBody>
+                        <a:bodyPr/>
+                        <a:lstStyle/>
+                        <a:p>
+                          <a:endParaRPr lang="en-US"/>
+                        </a:p>
+                      </a:txBody>
+                      <a:tcPr anchor="ctr">
+                        <a:blipFill>
+                          <a:blip r:embed="rId3"/>
+                          <a:stretch>
+                            <a:fillRect l="-100122" t="-497980" r="-488" b="-101010"/>
+                          </a:stretch>
+                        </a:blipFill>
+                      </a:tcPr>
+                    </a:tc>
+                    <a:extLst>
+                      <a:ext uri="{0D108BD9-81ED-4DB2-BD59-A6C34878D82A}">
+                        <a16:rowId xmlns:a16="http://schemas.microsoft.com/office/drawing/2014/main" val="500252021"/>
+                      </a:ext>
+                    </a:extLst>
+                  </a:tr>
+                  <a:tr h="599017">
+                    <a:tc>
+                      <a:txBody>
+                        <a:bodyPr/>
+                        <a:lstStyle/>
+                        <a:p>
+                          <a:pPr algn="ctr"/>
+                          <a:r>
+                            <a:rPr lang="en-CA" sz="1800" b="1" i="1" dirty="0"/>
+                            <a:t>L</a:t>
+                          </a:r>
+                          <a:r>
+                            <a:rPr lang="en-CA" sz="1800" b="1" i="1" baseline="-25000" dirty="0"/>
+                            <a:t>FI’</a:t>
+                          </a:r>
+                          <a:endParaRPr lang="en-CA" sz="1800" b="1" i="1" dirty="0"/>
+                        </a:p>
+                      </a:txBody>
+                      <a:tcPr anchor="ctr"/>
+                    </a:tc>
+                    <a:tc>
+                      <a:txBody>
+                        <a:bodyPr/>
+                        <a:lstStyle/>
+                        <a:p>
+                          <a:endParaRPr lang="en-US"/>
+                        </a:p>
+                      </a:txBody>
+                      <a:tcPr anchor="ctr">
+                        <a:blipFill>
+                          <a:blip r:embed="rId3"/>
+                          <a:stretch>
+                            <a:fillRect l="-100122" t="-604082" r="-488" b="-2041"/>
+                          </a:stretch>
+                        </a:blipFill>
+                      </a:tcPr>
+                    </a:tc>
+                    <a:extLst>
+                      <a:ext uri="{0D108BD9-81ED-4DB2-BD59-A6C34878D82A}">
+                        <a16:rowId xmlns:a16="http://schemas.microsoft.com/office/drawing/2014/main" val="1990218277"/>
+                      </a:ext>
+                    </a:extLst>
+                  </a:tr>
+                </a:tbl>
+              </a:graphicData>
+            </a:graphic>
+          </p:graphicFrame>
+        </mc:Fallback>
+      </mc:AlternateContent>
     </p:spTree>
     <p:extLst>
       <p:ext uri="{BB962C8B-B14F-4D97-AF65-F5344CB8AC3E}">

</xml_diff>

<commit_message>
added aggregate tables and improved structure of experiments
</commit_message>
<xml_diff>
--- a/GPP_Defense.pptx
+++ b/GPP_Defense.pptx
@@ -5,10 +5,10 @@
     <p:sldMasterId id="2147483648" r:id="rId2"/>
   </p:sldMasterIdLst>
   <p:notesMasterIdLst>
-    <p:notesMasterId r:id="rId18"/>
+    <p:notesMasterId r:id="rId27"/>
   </p:notesMasterIdLst>
   <p:handoutMasterIdLst>
-    <p:handoutMasterId r:id="rId19"/>
+    <p:handoutMasterId r:id="rId28"/>
   </p:handoutMasterIdLst>
   <p:sldIdLst>
     <p:sldId id="256" r:id="rId3"/>
@@ -25,7 +25,16 @@
     <p:sldId id="278" r:id="rId14"/>
     <p:sldId id="279" r:id="rId15"/>
     <p:sldId id="280" r:id="rId16"/>
-    <p:sldId id="274" r:id="rId17"/>
+    <p:sldId id="281" r:id="rId17"/>
+    <p:sldId id="282" r:id="rId18"/>
+    <p:sldId id="283" r:id="rId19"/>
+    <p:sldId id="284" r:id="rId20"/>
+    <p:sldId id="285" r:id="rId21"/>
+    <p:sldId id="286" r:id="rId22"/>
+    <p:sldId id="287" r:id="rId23"/>
+    <p:sldId id="288" r:id="rId24"/>
+    <p:sldId id="289" r:id="rId25"/>
+    <p:sldId id="274" r:id="rId26"/>
   </p:sldIdLst>
   <p:sldSz cx="12192000" cy="6858000"/>
   <p:notesSz cx="6858000" cy="9144000"/>
@@ -143,6 +152,15 @@
             <p14:sldId id="278"/>
             <p14:sldId id="279"/>
             <p14:sldId id="280"/>
+            <p14:sldId id="281"/>
+            <p14:sldId id="282"/>
+            <p14:sldId id="283"/>
+            <p14:sldId id="284"/>
+            <p14:sldId id="285"/>
+            <p14:sldId id="286"/>
+            <p14:sldId id="287"/>
+            <p14:sldId id="288"/>
+            <p14:sldId id="289"/>
             <p14:sldId id="274"/>
           </p14:sldIdLst>
         </p14:section>
@@ -251,7 +269,7 @@
           <a:p>
             <a:fld id="{23CEAAF3-9831-450B-8D59-2C09DB96C8FC}" type="datetimeFigureOut">
               <a:rPr lang="en-US"/>
-              <a:t>5/1/2016</a:t>
+              <a:t>5/2/2016</a:t>
             </a:fld>
             <a:endParaRPr/>
           </a:p>
@@ -416,7 +434,7 @@
           <a:p>
             <a:fld id="{2D50CD79-FC16-4410-AB61-17F26E6D3BC8}" type="datetimeFigureOut">
               <a:rPr lang="en-US"/>
-              <a:t>5/1/2016</a:t>
+              <a:t>5/2/2016</a:t>
             </a:fld>
             <a:endParaRPr/>
           </a:p>
@@ -791,6 +809,444 @@
 </p:notes>
 </file>
 
+<file path=ppt/notesSlides/notesSlide10.xml><?xml version="1.0" encoding="utf-8"?>
+<p:notes xmlns:a="http://schemas.openxmlformats.org/drawingml/2006/main" xmlns:r="http://schemas.openxmlformats.org/officeDocument/2006/relationships" xmlns:p="http://schemas.openxmlformats.org/presentationml/2006/main">
+  <p:cSld>
+    <p:spTree>
+      <p:nvGrpSpPr>
+        <p:cNvPr id="1" name=""/>
+        <p:cNvGrpSpPr/>
+        <p:nvPr/>
+      </p:nvGrpSpPr>
+      <p:grpSpPr>
+        <a:xfrm>
+          <a:off x="0" y="0"/>
+          <a:ext cx="0" cy="0"/>
+          <a:chOff x="0" y="0"/>
+          <a:chExt cx="0" cy="0"/>
+        </a:xfrm>
+      </p:grpSpPr>
+      <p:sp>
+        <p:nvSpPr>
+          <p:cNvPr id="2" name="Slide Image Placeholder 1"/>
+          <p:cNvSpPr>
+            <a:spLocks noGrp="1" noRot="1" noChangeAspect="1"/>
+          </p:cNvSpPr>
+          <p:nvPr>
+            <p:ph type="sldImg"/>
+          </p:nvPr>
+        </p:nvSpPr>
+        <p:spPr/>
+      </p:sp>
+      <p:sp>
+        <p:nvSpPr>
+          <p:cNvPr id="3" name="Notes Placeholder 2"/>
+          <p:cNvSpPr>
+            <a:spLocks noGrp="1"/>
+          </p:cNvSpPr>
+          <p:nvPr>
+            <p:ph type="body" idx="1"/>
+          </p:nvPr>
+        </p:nvSpPr>
+        <p:spPr/>
+        <p:txBody>
+          <a:bodyPr/>
+          <a:lstStyle/>
+          <a:p>
+            <a:endParaRPr lang="en-CA" dirty="0"/>
+          </a:p>
+        </p:txBody>
+      </p:sp>
+      <p:sp>
+        <p:nvSpPr>
+          <p:cNvPr id="4" name="Slide Number Placeholder 3"/>
+          <p:cNvSpPr>
+            <a:spLocks noGrp="1"/>
+          </p:cNvSpPr>
+          <p:nvPr>
+            <p:ph type="sldNum" sz="quarter" idx="10"/>
+          </p:nvPr>
+        </p:nvSpPr>
+        <p:spPr/>
+        <p:txBody>
+          <a:bodyPr/>
+          <a:lstStyle/>
+          <a:p>
+            <a:fld id="{0A3C37BE-C303-496D-B5CD-85F2937540FC}" type="slidenum">
+              <a:rPr lang="en-CA" smtClean="0"/>
+              <a:t>18</a:t>
+            </a:fld>
+            <a:endParaRPr lang="en-CA"/>
+          </a:p>
+        </p:txBody>
+      </p:sp>
+    </p:spTree>
+    <p:extLst>
+      <p:ext uri="{BB962C8B-B14F-4D97-AF65-F5344CB8AC3E}">
+        <p14:creationId xmlns:p14="http://schemas.microsoft.com/office/powerpoint/2010/main" val="126510921"/>
+      </p:ext>
+    </p:extLst>
+  </p:cSld>
+  <p:clrMapOvr>
+    <a:masterClrMapping/>
+  </p:clrMapOvr>
+</p:notes>
+</file>
+
+<file path=ppt/notesSlides/notesSlide11.xml><?xml version="1.0" encoding="utf-8"?>
+<p:notes xmlns:a="http://schemas.openxmlformats.org/drawingml/2006/main" xmlns:r="http://schemas.openxmlformats.org/officeDocument/2006/relationships" xmlns:p="http://schemas.openxmlformats.org/presentationml/2006/main">
+  <p:cSld>
+    <p:spTree>
+      <p:nvGrpSpPr>
+        <p:cNvPr id="1" name=""/>
+        <p:cNvGrpSpPr/>
+        <p:nvPr/>
+      </p:nvGrpSpPr>
+      <p:grpSpPr>
+        <a:xfrm>
+          <a:off x="0" y="0"/>
+          <a:ext cx="0" cy="0"/>
+          <a:chOff x="0" y="0"/>
+          <a:chExt cx="0" cy="0"/>
+        </a:xfrm>
+      </p:grpSpPr>
+      <p:sp>
+        <p:nvSpPr>
+          <p:cNvPr id="2" name="Slide Image Placeholder 1"/>
+          <p:cNvSpPr>
+            <a:spLocks noGrp="1" noRot="1" noChangeAspect="1"/>
+          </p:cNvSpPr>
+          <p:nvPr>
+            <p:ph type="sldImg"/>
+          </p:nvPr>
+        </p:nvSpPr>
+        <p:spPr/>
+      </p:sp>
+      <p:sp>
+        <p:nvSpPr>
+          <p:cNvPr id="3" name="Notes Placeholder 2"/>
+          <p:cNvSpPr>
+            <a:spLocks noGrp="1"/>
+          </p:cNvSpPr>
+          <p:nvPr>
+            <p:ph type="body" idx="1"/>
+          </p:nvPr>
+        </p:nvSpPr>
+        <p:spPr/>
+        <p:txBody>
+          <a:bodyPr/>
+          <a:lstStyle/>
+          <a:p>
+            <a:endParaRPr lang="en-CA" dirty="0"/>
+          </a:p>
+        </p:txBody>
+      </p:sp>
+      <p:sp>
+        <p:nvSpPr>
+          <p:cNvPr id="4" name="Slide Number Placeholder 3"/>
+          <p:cNvSpPr>
+            <a:spLocks noGrp="1"/>
+          </p:cNvSpPr>
+          <p:nvPr>
+            <p:ph type="sldNum" sz="quarter" idx="10"/>
+          </p:nvPr>
+        </p:nvSpPr>
+        <p:spPr/>
+        <p:txBody>
+          <a:bodyPr/>
+          <a:lstStyle/>
+          <a:p>
+            <a:fld id="{0A3C37BE-C303-496D-B5CD-85F2937540FC}" type="slidenum">
+              <a:rPr lang="en-CA" smtClean="0"/>
+              <a:t>19</a:t>
+            </a:fld>
+            <a:endParaRPr lang="en-CA"/>
+          </a:p>
+        </p:txBody>
+      </p:sp>
+    </p:spTree>
+    <p:extLst>
+      <p:ext uri="{BB962C8B-B14F-4D97-AF65-F5344CB8AC3E}">
+        <p14:creationId xmlns:p14="http://schemas.microsoft.com/office/powerpoint/2010/main" val="3289096373"/>
+      </p:ext>
+    </p:extLst>
+  </p:cSld>
+  <p:clrMapOvr>
+    <a:masterClrMapping/>
+  </p:clrMapOvr>
+</p:notes>
+</file>
+
+<file path=ppt/notesSlides/notesSlide12.xml><?xml version="1.0" encoding="utf-8"?>
+<p:notes xmlns:a="http://schemas.openxmlformats.org/drawingml/2006/main" xmlns:r="http://schemas.openxmlformats.org/officeDocument/2006/relationships" xmlns:p="http://schemas.openxmlformats.org/presentationml/2006/main">
+  <p:cSld>
+    <p:spTree>
+      <p:nvGrpSpPr>
+        <p:cNvPr id="1" name=""/>
+        <p:cNvGrpSpPr/>
+        <p:nvPr/>
+      </p:nvGrpSpPr>
+      <p:grpSpPr>
+        <a:xfrm>
+          <a:off x="0" y="0"/>
+          <a:ext cx="0" cy="0"/>
+          <a:chOff x="0" y="0"/>
+          <a:chExt cx="0" cy="0"/>
+        </a:xfrm>
+      </p:grpSpPr>
+      <p:sp>
+        <p:nvSpPr>
+          <p:cNvPr id="2" name="Slide Image Placeholder 1"/>
+          <p:cNvSpPr>
+            <a:spLocks noGrp="1" noRot="1" noChangeAspect="1"/>
+          </p:cNvSpPr>
+          <p:nvPr>
+            <p:ph type="sldImg"/>
+          </p:nvPr>
+        </p:nvSpPr>
+        <p:spPr/>
+      </p:sp>
+      <p:sp>
+        <p:nvSpPr>
+          <p:cNvPr id="3" name="Notes Placeholder 2"/>
+          <p:cNvSpPr>
+            <a:spLocks noGrp="1"/>
+          </p:cNvSpPr>
+          <p:nvPr>
+            <p:ph type="body" idx="1"/>
+          </p:nvPr>
+        </p:nvSpPr>
+        <p:spPr/>
+        <p:txBody>
+          <a:bodyPr/>
+          <a:lstStyle/>
+          <a:p>
+            <a:r>
+              <a:rPr lang="en-CA" baseline="0" dirty="0"/>
+              <a:t>L</a:t>
+            </a:r>
+            <a:r>
+              <a:rPr lang="en-CA" baseline="-25000" dirty="0"/>
+              <a:t>IF</a:t>
+            </a:r>
+            <a:r>
+              <a:rPr lang="en-CA" baseline="0" dirty="0"/>
+              <a:t> performs better in all cases, but also yields more outliers</a:t>
+            </a:r>
+            <a:endParaRPr lang="en-CA" dirty="0"/>
+          </a:p>
+        </p:txBody>
+      </p:sp>
+      <p:sp>
+        <p:nvSpPr>
+          <p:cNvPr id="4" name="Slide Number Placeholder 3"/>
+          <p:cNvSpPr>
+            <a:spLocks noGrp="1"/>
+          </p:cNvSpPr>
+          <p:nvPr>
+            <p:ph type="sldNum" sz="quarter" idx="10"/>
+          </p:nvPr>
+        </p:nvSpPr>
+        <p:spPr/>
+        <p:txBody>
+          <a:bodyPr/>
+          <a:lstStyle/>
+          <a:p>
+            <a:fld id="{0A3C37BE-C303-496D-B5CD-85F2937540FC}" type="slidenum">
+              <a:rPr lang="en-CA" smtClean="0"/>
+              <a:t>20</a:t>
+            </a:fld>
+            <a:endParaRPr lang="en-CA"/>
+          </a:p>
+        </p:txBody>
+      </p:sp>
+    </p:spTree>
+    <p:extLst>
+      <p:ext uri="{BB962C8B-B14F-4D97-AF65-F5344CB8AC3E}">
+        <p14:creationId xmlns:p14="http://schemas.microsoft.com/office/powerpoint/2010/main" val="1700676884"/>
+      </p:ext>
+    </p:extLst>
+  </p:cSld>
+  <p:clrMapOvr>
+    <a:masterClrMapping/>
+  </p:clrMapOvr>
+</p:notes>
+</file>
+
+<file path=ppt/notesSlides/notesSlide13.xml><?xml version="1.0" encoding="utf-8"?>
+<p:notes xmlns:a="http://schemas.openxmlformats.org/drawingml/2006/main" xmlns:r="http://schemas.openxmlformats.org/officeDocument/2006/relationships" xmlns:p="http://schemas.openxmlformats.org/presentationml/2006/main">
+  <p:cSld>
+    <p:spTree>
+      <p:nvGrpSpPr>
+        <p:cNvPr id="1" name=""/>
+        <p:cNvGrpSpPr/>
+        <p:nvPr/>
+      </p:nvGrpSpPr>
+      <p:grpSpPr>
+        <a:xfrm>
+          <a:off x="0" y="0"/>
+          <a:ext cx="0" cy="0"/>
+          <a:chOff x="0" y="0"/>
+          <a:chExt cx="0" cy="0"/>
+        </a:xfrm>
+      </p:grpSpPr>
+      <p:sp>
+        <p:nvSpPr>
+          <p:cNvPr id="2" name="Slide Image Placeholder 1"/>
+          <p:cNvSpPr>
+            <a:spLocks noGrp="1" noRot="1" noChangeAspect="1"/>
+          </p:cNvSpPr>
+          <p:nvPr>
+            <p:ph type="sldImg"/>
+          </p:nvPr>
+        </p:nvSpPr>
+        <p:spPr/>
+      </p:sp>
+      <p:sp>
+        <p:nvSpPr>
+          <p:cNvPr id="3" name="Notes Placeholder 2"/>
+          <p:cNvSpPr>
+            <a:spLocks noGrp="1"/>
+          </p:cNvSpPr>
+          <p:nvPr>
+            <p:ph type="body" idx="1"/>
+          </p:nvPr>
+        </p:nvSpPr>
+        <p:spPr/>
+        <p:txBody>
+          <a:bodyPr/>
+          <a:lstStyle/>
+          <a:p>
+            <a:r>
+              <a:rPr lang="en-CA" dirty="0"/>
+              <a:t>NOTE: All on 90-10 splits.</a:t>
+            </a:r>
+          </a:p>
+        </p:txBody>
+      </p:sp>
+      <p:sp>
+        <p:nvSpPr>
+          <p:cNvPr id="4" name="Slide Number Placeholder 3"/>
+          <p:cNvSpPr>
+            <a:spLocks noGrp="1"/>
+          </p:cNvSpPr>
+          <p:nvPr>
+            <p:ph type="sldNum" sz="quarter" idx="10"/>
+          </p:nvPr>
+        </p:nvSpPr>
+        <p:spPr/>
+        <p:txBody>
+          <a:bodyPr/>
+          <a:lstStyle/>
+          <a:p>
+            <a:fld id="{0A3C37BE-C303-496D-B5CD-85F2937540FC}" type="slidenum">
+              <a:rPr lang="en-CA" smtClean="0"/>
+              <a:t>22</a:t>
+            </a:fld>
+            <a:endParaRPr lang="en-CA"/>
+          </a:p>
+        </p:txBody>
+      </p:sp>
+    </p:spTree>
+    <p:extLst>
+      <p:ext uri="{BB962C8B-B14F-4D97-AF65-F5344CB8AC3E}">
+        <p14:creationId xmlns:p14="http://schemas.microsoft.com/office/powerpoint/2010/main" val="3983224020"/>
+      </p:ext>
+    </p:extLst>
+  </p:cSld>
+  <p:clrMapOvr>
+    <a:masterClrMapping/>
+  </p:clrMapOvr>
+</p:notes>
+</file>
+
+<file path=ppt/notesSlides/notesSlide14.xml><?xml version="1.0" encoding="utf-8"?>
+<p:notes xmlns:a="http://schemas.openxmlformats.org/drawingml/2006/main" xmlns:r="http://schemas.openxmlformats.org/officeDocument/2006/relationships" xmlns:p="http://schemas.openxmlformats.org/presentationml/2006/main">
+  <p:cSld>
+    <p:spTree>
+      <p:nvGrpSpPr>
+        <p:cNvPr id="1" name=""/>
+        <p:cNvGrpSpPr/>
+        <p:nvPr/>
+      </p:nvGrpSpPr>
+      <p:grpSpPr>
+        <a:xfrm>
+          <a:off x="0" y="0"/>
+          <a:ext cx="0" cy="0"/>
+          <a:chOff x="0" y="0"/>
+          <a:chExt cx="0" cy="0"/>
+        </a:xfrm>
+      </p:grpSpPr>
+      <p:sp>
+        <p:nvSpPr>
+          <p:cNvPr id="2" name="Slide Image Placeholder 1"/>
+          <p:cNvSpPr>
+            <a:spLocks noGrp="1" noRot="1" noChangeAspect="1"/>
+          </p:cNvSpPr>
+          <p:nvPr>
+            <p:ph type="sldImg"/>
+          </p:nvPr>
+        </p:nvSpPr>
+        <p:spPr/>
+      </p:sp>
+      <p:sp>
+        <p:nvSpPr>
+          <p:cNvPr id="3" name="Notes Placeholder 2"/>
+          <p:cNvSpPr>
+            <a:spLocks noGrp="1"/>
+          </p:cNvSpPr>
+          <p:nvPr>
+            <p:ph type="body" idx="1"/>
+          </p:nvPr>
+        </p:nvSpPr>
+        <p:spPr/>
+        <p:txBody>
+          <a:bodyPr/>
+          <a:lstStyle/>
+          <a:p>
+            <a:r>
+              <a:rPr lang="en-CA" dirty="0"/>
+              <a:t>NOTE: All on 90-10 splits.</a:t>
+            </a:r>
+          </a:p>
+        </p:txBody>
+      </p:sp>
+      <p:sp>
+        <p:nvSpPr>
+          <p:cNvPr id="4" name="Slide Number Placeholder 3"/>
+          <p:cNvSpPr>
+            <a:spLocks noGrp="1"/>
+          </p:cNvSpPr>
+          <p:nvPr>
+            <p:ph type="sldNum" sz="quarter" idx="10"/>
+          </p:nvPr>
+        </p:nvSpPr>
+        <p:spPr/>
+        <p:txBody>
+          <a:bodyPr/>
+          <a:lstStyle/>
+          <a:p>
+            <a:fld id="{0A3C37BE-C303-496D-B5CD-85F2937540FC}" type="slidenum">
+              <a:rPr lang="en-CA" smtClean="0"/>
+              <a:t>23</a:t>
+            </a:fld>
+            <a:endParaRPr lang="en-CA"/>
+          </a:p>
+        </p:txBody>
+      </p:sp>
+    </p:spTree>
+    <p:extLst>
+      <p:ext uri="{BB962C8B-B14F-4D97-AF65-F5344CB8AC3E}">
+        <p14:creationId xmlns:p14="http://schemas.microsoft.com/office/powerpoint/2010/main" val="679213028"/>
+      </p:ext>
+    </p:extLst>
+  </p:cSld>
+  <p:clrMapOvr>
+    <a:masterClrMapping/>
+  </p:clrMapOvr>
+</p:notes>
+</file>
+
 <file path=ppt/notesSlides/notesSlide2.xml><?xml version="1.0" encoding="utf-8"?>
 <p:notes xmlns:a="http://schemas.openxmlformats.org/drawingml/2006/main" xmlns:r="http://schemas.openxmlformats.org/officeDocument/2006/relationships" xmlns:p="http://schemas.openxmlformats.org/presentationml/2006/main">
   <p:cSld>
@@ -1003,7 +1459,35 @@
           <a:bodyPr/>
           <a:lstStyle/>
           <a:p>
+            <a:r>
+              <a:rPr lang="en-CA" dirty="0"/>
+              <a:t>A 70-30, 80-20, and 90-10 split will also be considered for</a:t>
+            </a:r>
+            <a:r>
+              <a:rPr lang="en-CA" baseline="0" dirty="0"/>
+              <a:t> L</a:t>
+            </a:r>
+            <a:r>
+              <a:rPr lang="en-CA" baseline="-25000" dirty="0"/>
+              <a:t>ST</a:t>
+            </a:r>
+            <a:r>
+              <a:rPr lang="en-CA" baseline="0" dirty="0"/>
+              <a:t> and L</a:t>
+            </a:r>
+            <a:r>
+              <a:rPr lang="en-CA" baseline="-25000" dirty="0"/>
+              <a:t>ST’</a:t>
+            </a:r>
+          </a:p>
+          <a:p>
             <a:endParaRPr lang="en-CA" dirty="0"/>
+          </a:p>
+          <a:p>
+            <a:r>
+              <a:rPr lang="en-CA" dirty="0"/>
+              <a:t>Also mention the 5 day lag period on the advanced functions</a:t>
+            </a:r>
           </a:p>
         </p:txBody>
       </p:sp>
@@ -1297,7 +1781,175 @@
     </p:spTree>
     <p:extLst>
       <p:ext uri="{BB962C8B-B14F-4D97-AF65-F5344CB8AC3E}">
-        <p14:creationId xmlns:p14="http://schemas.microsoft.com/office/powerpoint/2010/main" val="1423042962"/>
+        <p14:creationId xmlns:p14="http://schemas.microsoft.com/office/powerpoint/2010/main" val="2199384654"/>
+      </p:ext>
+    </p:extLst>
+  </p:cSld>
+  <p:clrMapOvr>
+    <a:masterClrMapping/>
+  </p:clrMapOvr>
+</p:notes>
+</file>
+
+<file path=ppt/notesSlides/notesSlide8.xml><?xml version="1.0" encoding="utf-8"?>
+<p:notes xmlns:a="http://schemas.openxmlformats.org/drawingml/2006/main" xmlns:r="http://schemas.openxmlformats.org/officeDocument/2006/relationships" xmlns:p="http://schemas.openxmlformats.org/presentationml/2006/main">
+  <p:cSld>
+    <p:spTree>
+      <p:nvGrpSpPr>
+        <p:cNvPr id="1" name=""/>
+        <p:cNvGrpSpPr/>
+        <p:nvPr/>
+      </p:nvGrpSpPr>
+      <p:grpSpPr>
+        <a:xfrm>
+          <a:off x="0" y="0"/>
+          <a:ext cx="0" cy="0"/>
+          <a:chOff x="0" y="0"/>
+          <a:chExt cx="0" cy="0"/>
+        </a:xfrm>
+      </p:grpSpPr>
+      <p:sp>
+        <p:nvSpPr>
+          <p:cNvPr id="2" name="Slide Image Placeholder 1"/>
+          <p:cNvSpPr>
+            <a:spLocks noGrp="1" noRot="1" noChangeAspect="1"/>
+          </p:cNvSpPr>
+          <p:nvPr>
+            <p:ph type="sldImg"/>
+          </p:nvPr>
+        </p:nvSpPr>
+        <p:spPr/>
+      </p:sp>
+      <p:sp>
+        <p:nvSpPr>
+          <p:cNvPr id="3" name="Notes Placeholder 2"/>
+          <p:cNvSpPr>
+            <a:spLocks noGrp="1"/>
+          </p:cNvSpPr>
+          <p:nvPr>
+            <p:ph type="body" idx="1"/>
+          </p:nvPr>
+        </p:nvSpPr>
+        <p:spPr/>
+        <p:txBody>
+          <a:bodyPr/>
+          <a:lstStyle/>
+          <a:p>
+            <a:endParaRPr lang="en-CA" dirty="0"/>
+          </a:p>
+        </p:txBody>
+      </p:sp>
+      <p:sp>
+        <p:nvSpPr>
+          <p:cNvPr id="4" name="Slide Number Placeholder 3"/>
+          <p:cNvSpPr>
+            <a:spLocks noGrp="1"/>
+          </p:cNvSpPr>
+          <p:nvPr>
+            <p:ph type="sldNum" sz="quarter" idx="10"/>
+          </p:nvPr>
+        </p:nvSpPr>
+        <p:spPr/>
+        <p:txBody>
+          <a:bodyPr/>
+          <a:lstStyle/>
+          <a:p>
+            <a:fld id="{0A3C37BE-C303-496D-B5CD-85F2937540FC}" type="slidenum">
+              <a:rPr lang="en-CA" smtClean="0"/>
+              <a:t>15</a:t>
+            </a:fld>
+            <a:endParaRPr lang="en-CA"/>
+          </a:p>
+        </p:txBody>
+      </p:sp>
+    </p:spTree>
+    <p:extLst>
+      <p:ext uri="{BB962C8B-B14F-4D97-AF65-F5344CB8AC3E}">
+        <p14:creationId xmlns:p14="http://schemas.microsoft.com/office/powerpoint/2010/main" val="1762691433"/>
+      </p:ext>
+    </p:extLst>
+  </p:cSld>
+  <p:clrMapOvr>
+    <a:masterClrMapping/>
+  </p:clrMapOvr>
+</p:notes>
+</file>
+
+<file path=ppt/notesSlides/notesSlide9.xml><?xml version="1.0" encoding="utf-8"?>
+<p:notes xmlns:a="http://schemas.openxmlformats.org/drawingml/2006/main" xmlns:r="http://schemas.openxmlformats.org/officeDocument/2006/relationships" xmlns:p="http://schemas.openxmlformats.org/presentationml/2006/main">
+  <p:cSld>
+    <p:spTree>
+      <p:nvGrpSpPr>
+        <p:cNvPr id="1" name=""/>
+        <p:cNvGrpSpPr/>
+        <p:nvPr/>
+      </p:nvGrpSpPr>
+      <p:grpSpPr>
+        <a:xfrm>
+          <a:off x="0" y="0"/>
+          <a:ext cx="0" cy="0"/>
+          <a:chOff x="0" y="0"/>
+          <a:chExt cx="0" cy="0"/>
+        </a:xfrm>
+      </p:grpSpPr>
+      <p:sp>
+        <p:nvSpPr>
+          <p:cNvPr id="2" name="Slide Image Placeholder 1"/>
+          <p:cNvSpPr>
+            <a:spLocks noGrp="1" noRot="1" noChangeAspect="1"/>
+          </p:cNvSpPr>
+          <p:nvPr>
+            <p:ph type="sldImg"/>
+          </p:nvPr>
+        </p:nvSpPr>
+        <p:spPr/>
+      </p:sp>
+      <p:sp>
+        <p:nvSpPr>
+          <p:cNvPr id="3" name="Notes Placeholder 2"/>
+          <p:cNvSpPr>
+            <a:spLocks noGrp="1"/>
+          </p:cNvSpPr>
+          <p:nvPr>
+            <p:ph type="body" idx="1"/>
+          </p:nvPr>
+        </p:nvSpPr>
+        <p:spPr/>
+        <p:txBody>
+          <a:bodyPr/>
+          <a:lstStyle/>
+          <a:p>
+            <a:endParaRPr lang="en-CA" dirty="0"/>
+          </a:p>
+        </p:txBody>
+      </p:sp>
+      <p:sp>
+        <p:nvSpPr>
+          <p:cNvPr id="4" name="Slide Number Placeholder 3"/>
+          <p:cNvSpPr>
+            <a:spLocks noGrp="1"/>
+          </p:cNvSpPr>
+          <p:nvPr>
+            <p:ph type="sldNum" sz="quarter" idx="10"/>
+          </p:nvPr>
+        </p:nvSpPr>
+        <p:spPr/>
+        <p:txBody>
+          <a:bodyPr/>
+          <a:lstStyle/>
+          <a:p>
+            <a:fld id="{0A3C37BE-C303-496D-B5CD-85F2937540FC}" type="slidenum">
+              <a:rPr lang="en-CA" smtClean="0"/>
+              <a:t>16</a:t>
+            </a:fld>
+            <a:endParaRPr lang="en-CA"/>
+          </a:p>
+        </p:txBody>
+      </p:sp>
+    </p:spTree>
+    <p:extLst>
+      <p:ext uri="{BB962C8B-B14F-4D97-AF65-F5344CB8AC3E}">
+        <p14:creationId xmlns:p14="http://schemas.microsoft.com/office/powerpoint/2010/main" val="2782126990"/>
       </p:ext>
     </p:extLst>
   </p:cSld>
@@ -1531,7 +2183,7 @@
           <a:p>
             <a:fld id="{402B9795-92DC-40DC-A1CA-9A4B349D7824}" type="datetimeFigureOut">
               <a:rPr lang="en-US"/>
-              <a:t>5/1/2016</a:t>
+              <a:t>5/2/2016</a:t>
             </a:fld>
             <a:endParaRPr/>
           </a:p>
@@ -1847,7 +2499,7 @@
           <a:p>
             <a:fld id="{402B9795-92DC-40DC-A1CA-9A4B349D7824}" type="datetimeFigureOut">
               <a:rPr lang="en-US"/>
-              <a:t>5/1/2016</a:t>
+              <a:t>5/2/2016</a:t>
             </a:fld>
             <a:endParaRPr/>
           </a:p>
@@ -2029,7 +2681,7 @@
           <a:p>
             <a:fld id="{402B9795-92DC-40DC-A1CA-9A4B349D7824}" type="datetimeFigureOut">
               <a:rPr lang="en-US"/>
-              <a:t>5/1/2016</a:t>
+              <a:t>5/2/2016</a:t>
             </a:fld>
             <a:endParaRPr/>
           </a:p>
@@ -2221,7 +2873,7 @@
           <a:p>
             <a:fld id="{402B9795-92DC-40DC-A1CA-9A4B349D7824}" type="datetimeFigureOut">
               <a:rPr lang="en-US"/>
-              <a:t>5/1/2016</a:t>
+              <a:t>5/2/2016</a:t>
             </a:fld>
             <a:endParaRPr/>
           </a:p>
@@ -2490,7 +3142,7 @@
           <a:p>
             <a:fld id="{402B9795-92DC-40DC-A1CA-9A4B349D7824}" type="datetimeFigureOut">
               <a:rPr lang="en-US"/>
-              <a:t>5/1/2016</a:t>
+              <a:t>5/2/2016</a:t>
             </a:fld>
             <a:endParaRPr/>
           </a:p>
@@ -3549,7 +4201,7 @@
           <a:p>
             <a:fld id="{402B9795-92DC-40DC-A1CA-9A4B349D7824}" type="datetimeFigureOut">
               <a:rPr lang="en-US"/>
-              <a:t>5/1/2016</a:t>
+              <a:t>5/2/2016</a:t>
             </a:fld>
             <a:endParaRPr/>
           </a:p>
@@ -3859,7 +4511,7 @@
           <a:p>
             <a:fld id="{402B9795-92DC-40DC-A1CA-9A4B349D7824}" type="datetimeFigureOut">
               <a:rPr lang="en-US"/>
-              <a:t>5/1/2016</a:t>
+              <a:t>5/2/2016</a:t>
             </a:fld>
             <a:endParaRPr/>
           </a:p>
@@ -4239,7 +4891,7 @@
           <a:p>
             <a:fld id="{402B9795-92DC-40DC-A1CA-9A4B349D7824}" type="datetimeFigureOut">
               <a:rPr lang="en-US"/>
-              <a:t>5/1/2016</a:t>
+              <a:t>5/2/2016</a:t>
             </a:fld>
             <a:endParaRPr/>
           </a:p>
@@ -4369,7 +5021,7 @@
           <a:p>
             <a:fld id="{402B9795-92DC-40DC-A1CA-9A4B349D7824}" type="datetimeFigureOut">
               <a:rPr lang="en-US"/>
-              <a:t>5/1/2016</a:t>
+              <a:t>5/2/2016</a:t>
             </a:fld>
             <a:endParaRPr/>
           </a:p>
@@ -4476,7 +5128,7 @@
           <a:p>
             <a:fld id="{402B9795-92DC-40DC-A1CA-9A4B349D7824}" type="datetimeFigureOut">
               <a:rPr lang="en-US"/>
-              <a:t>5/1/2016</a:t>
+              <a:t>5/2/2016</a:t>
             </a:fld>
             <a:endParaRPr/>
           </a:p>
@@ -4767,7 +5419,7 @@
           <a:p>
             <a:fld id="{402B9795-92DC-40DC-A1CA-9A4B349D7824}" type="datetimeFigureOut">
               <a:rPr lang="en-US"/>
-              <a:t>5/1/2016</a:t>
+              <a:t>5/2/2016</a:t>
             </a:fld>
             <a:endParaRPr/>
           </a:p>
@@ -4994,7 +5646,7 @@
             <a:fld id="{402B9795-92DC-40DC-A1CA-9A4B349D7824}" type="datetimeFigureOut">
               <a:rPr lang="en-US"/>
               <a:pPr/>
-              <a:t>5/1/2016</a:t>
+              <a:t>5/2/2016</a:t>
             </a:fld>
             <a:endParaRPr/>
           </a:p>
@@ -6241,7 +6893,7 @@
             <p:ph idx="1"/>
             <p:extLst>
               <p:ext uri="{D42A27DB-BD31-4B8C-83A1-F6EECF244321}">
-                <p14:modId xmlns:p14="http://schemas.microsoft.com/office/powerpoint/2010/main" val="2776639724"/>
+                <p14:modId xmlns:p14="http://schemas.microsoft.com/office/powerpoint/2010/main" val="2263377930"/>
               </p:ext>
             </p:extLst>
           </p:nvPr>
@@ -6384,7 +7036,7 @@
                     <a:p>
                       <a:pPr algn="ctr"/>
                       <a:r>
-                        <a:rPr lang="en-CA" b="1" dirty="0"/>
+                        <a:rPr lang="en-CA" b="0" dirty="0"/>
                         <a:t>0.194444</a:t>
                       </a:r>
                     </a:p>
@@ -6398,7 +7050,7 @@
                     <a:p>
                       <a:pPr algn="ctr"/>
                       <a:r>
-                        <a:rPr lang="en-CA" b="1" dirty="0"/>
+                        <a:rPr lang="en-CA" b="0" dirty="0"/>
                         <a:t>0.200982</a:t>
                       </a:r>
                     </a:p>
@@ -6412,7 +7064,7 @@
                     <a:p>
                       <a:pPr algn="ctr"/>
                       <a:r>
-                        <a:rPr lang="en-CA" b="1" dirty="0"/>
+                        <a:rPr lang="en-CA" b="0" dirty="0"/>
                         <a:t>35</a:t>
                       </a:r>
                     </a:p>
@@ -6452,7 +7104,7 @@
                     <a:p>
                       <a:pPr algn="ctr"/>
                       <a:r>
-                        <a:rPr lang="en-CA" b="1" dirty="0"/>
+                        <a:rPr lang="en-CA" b="0" dirty="0"/>
                         <a:t>0.185474</a:t>
                       </a:r>
                     </a:p>
@@ -6466,7 +7118,7 @@
                     <a:p>
                       <a:pPr algn="ctr"/>
                       <a:r>
-                        <a:rPr lang="en-CA" b="1" dirty="0"/>
+                        <a:rPr lang="en-CA" b="0" dirty="0"/>
                         <a:t>0.179552</a:t>
                       </a:r>
                     </a:p>
@@ -6480,7 +7132,7 @@
                     <a:p>
                       <a:pPr algn="ctr"/>
                       <a:r>
-                        <a:rPr lang="en-CA" b="1" dirty="0"/>
+                        <a:rPr lang="en-CA" b="0" dirty="0"/>
                         <a:t>43</a:t>
                       </a:r>
                     </a:p>
@@ -6555,494 +7207,144 @@
           <a:lstStyle/>
           <a:p>
             <a:r>
-              <a:rPr lang="en-US" dirty="0"/>
-              <a:t>Results &amp; Discussion</a:t>
-            </a:r>
-          </a:p>
-        </p:txBody>
-      </p:sp>
-      <mc:AlternateContent xmlns:mc="http://schemas.openxmlformats.org/markup-compatibility/2006">
-        <mc:Choice xmlns:a14="http://schemas.microsoft.com/office/drawing/2010/main" Requires="a14">
-          <p:graphicFrame>
-            <p:nvGraphicFramePr>
-              <p:cNvPr id="4" name="Content Placeholder 3"/>
-              <p:cNvGraphicFramePr>
-                <a:graphicFrameLocks noGrp="1"/>
-              </p:cNvGraphicFramePr>
-              <p:nvPr>
-                <p:ph idx="1"/>
-                <p:extLst>
-                  <p:ext uri="{D42A27DB-BD31-4B8C-83A1-F6EECF244321}">
-                    <p14:modId xmlns:p14="http://schemas.microsoft.com/office/powerpoint/2010/main" val="2179313020"/>
-                  </p:ext>
-                </p:extLst>
-              </p:nvPr>
-            </p:nvGraphicFramePr>
-            <p:xfrm>
-              <a:off x="1104900" y="1600200"/>
-              <a:ext cx="9980614" cy="2354580"/>
-            </p:xfrm>
-            <a:graphic>
-              <a:graphicData uri="http://schemas.openxmlformats.org/drawingml/2006/table">
-                <a:tbl>
-                  <a:tblPr firstRow="1" bandRow="1">
-                    <a:tableStyleId>{5C22544A-7EE6-4342-B048-85BDC9FD1C3A}</a:tableStyleId>
-                  </a:tblPr>
-                  <a:tblGrid>
-                    <a:gridCol w="4990307">
-                      <a:extLst>
-                        <a:ext uri="{9D8B030D-6E8A-4147-A177-3AD203B41FA5}">
-                          <a16:colId xmlns:a16="http://schemas.microsoft.com/office/drawing/2014/main" val="452220581"/>
-                        </a:ext>
-                      </a:extLst>
-                    </a:gridCol>
-                    <a:gridCol w="4990307">
-                      <a:extLst>
-                        <a:ext uri="{9D8B030D-6E8A-4147-A177-3AD203B41FA5}">
-                          <a16:colId xmlns:a16="http://schemas.microsoft.com/office/drawing/2014/main" val="82609379"/>
-                        </a:ext>
-                      </a:extLst>
-                    </a:gridCol>
-                  </a:tblGrid>
-                  <a:tr h="784860">
-                    <a:tc>
-                      <a:txBody>
-                        <a:bodyPr/>
-                        <a:lstStyle/>
-                        <a:p>
-                          <a:pPr algn="ctr"/>
-                          <a:r>
-                            <a:rPr lang="en-CA" sz="1800" dirty="0"/>
-                            <a:t>Language Variation</a:t>
-                          </a:r>
-                        </a:p>
-                      </a:txBody>
-                      <a:tcPr anchor="ctr"/>
-                    </a:tc>
-                    <a:tc>
-                      <a:txBody>
-                        <a:bodyPr/>
-                        <a:lstStyle/>
-                        <a:p>
-                          <a:pPr algn="ctr"/>
-                          <a:r>
-                            <a:rPr lang="en-CA" sz="1800" dirty="0"/>
-                            <a:t>Function &amp; Terminal Set</a:t>
-                          </a:r>
-                        </a:p>
-                      </a:txBody>
-                      <a:tcPr anchor="ctr"/>
-                    </a:tc>
-                    <a:extLst>
-                      <a:ext uri="{0D108BD9-81ED-4DB2-BD59-A6C34878D82A}">
-                        <a16:rowId xmlns:a16="http://schemas.microsoft.com/office/drawing/2014/main" val="3654672897"/>
-                      </a:ext>
-                    </a:extLst>
-                  </a:tr>
-                  <a:tr h="784860">
-                    <a:tc>
-                      <a:txBody>
-                        <a:bodyPr/>
-                        <a:lstStyle/>
-                        <a:p>
-                          <a:pPr algn="ctr"/>
-                          <a:r>
-                            <a:rPr lang="en-CA" sz="1800" b="1" i="1" dirty="0"/>
-                            <a:t>L</a:t>
-                          </a:r>
-                          <a:r>
-                            <a:rPr lang="en-CA" sz="1800" b="1" i="1" baseline="-25000" dirty="0"/>
-                            <a:t>ST</a:t>
-                          </a:r>
-                          <a:endParaRPr lang="en-CA" sz="1800" b="1" i="1" dirty="0"/>
-                        </a:p>
-                      </a:txBody>
-                      <a:tcPr anchor="ctr"/>
-                    </a:tc>
-                    <a:tc>
-                      <a:txBody>
-                        <a:bodyPr/>
-                        <a:lstStyle/>
-                        <a:p>
-                          <a:pPr algn="ctr"/>
-                          <a14:m>
-                            <m:oMathPara xmlns:m="http://schemas.openxmlformats.org/officeDocument/2006/math">
-                              <m:oMathParaPr>
-                                <m:jc m:val="centerGroup"/>
-                              </m:oMathParaPr>
-                              <m:oMath xmlns:m="http://schemas.openxmlformats.org/officeDocument/2006/math">
-                                <m:sSub>
-                                  <m:sSubPr>
-                                    <m:ctrlPr>
-                                      <a:rPr lang="en-CA" sz="2000" b="1" i="1" smtClean="0">
-                                        <a:latin typeface="Cambria Math" panose="02040503050406030204" pitchFamily="18" charset="0"/>
-                                      </a:rPr>
-                                    </m:ctrlPr>
-                                  </m:sSubPr>
-                                  <m:e>
-                                    <m:r>
-                                      <a:rPr lang="en-CA" sz="2000" b="1" i="1" smtClean="0">
-                                        <a:latin typeface="Cambria Math" panose="02040503050406030204" pitchFamily="18" charset="0"/>
-                                      </a:rPr>
-                                      <m:t>𝑳</m:t>
-                                    </m:r>
-                                  </m:e>
-                                  <m:sub>
-                                    <m:r>
-                                      <a:rPr lang="en-CA" sz="2000" b="1" i="1" smtClean="0">
-                                        <a:latin typeface="Cambria Math" panose="02040503050406030204" pitchFamily="18" charset="0"/>
-                                      </a:rPr>
-                                      <m:t>𝑰𝑭</m:t>
-                                    </m:r>
-                                  </m:sub>
-                                </m:sSub>
-                                <m:r>
-                                  <a:rPr lang="en-CA" sz="2000" b="1" i="1" smtClean="0">
-                                    <a:latin typeface="Cambria Math" panose="02040503050406030204" pitchFamily="18" charset="0"/>
-                                  </a:rPr>
-                                  <m:t>∪{</m:t>
-                                </m:r>
-                                <m:r>
-                                  <a:rPr lang="en-CA" sz="2000" b="1" i="1" smtClean="0">
-                                    <a:latin typeface="Cambria Math" panose="02040503050406030204" pitchFamily="18" charset="0"/>
-                                  </a:rPr>
-                                  <m:t>𝒔𝒖𝒎</m:t>
-                                </m:r>
-                                <m:r>
-                                  <a:rPr lang="en-CA" sz="2000" b="1" i="1" smtClean="0">
-                                    <a:latin typeface="Cambria Math" panose="02040503050406030204" pitchFamily="18" charset="0"/>
-                                  </a:rPr>
-                                  <m:t>, </m:t>
-                                </m:r>
-                                <m:r>
-                                  <a:rPr lang="en-CA" sz="2000" b="1" i="1" smtClean="0">
-                                    <a:latin typeface="Cambria Math" panose="02040503050406030204" pitchFamily="18" charset="0"/>
-                                  </a:rPr>
-                                  <m:t>𝒔𝒕𝒅𝒆𝒗</m:t>
-                                </m:r>
-                                <m:r>
-                                  <a:rPr lang="en-CA" sz="2000" b="1" i="1" smtClean="0">
-                                    <a:latin typeface="Cambria Math" panose="02040503050406030204" pitchFamily="18" charset="0"/>
-                                  </a:rPr>
-                                  <m:t>, </m:t>
-                                </m:r>
-                                <m:r>
-                                  <a:rPr lang="en-CA" sz="2000" b="1" i="1" smtClean="0">
-                                    <a:latin typeface="Cambria Math" panose="02040503050406030204" pitchFamily="18" charset="0"/>
-                                  </a:rPr>
-                                  <m:t>𝒔𝒌𝒆𝒘</m:t>
-                                </m:r>
-                                <m:r>
-                                  <a:rPr lang="en-CA" sz="2000" b="1" i="1" smtClean="0">
-                                    <a:latin typeface="Cambria Math" panose="02040503050406030204" pitchFamily="18" charset="0"/>
-                                  </a:rPr>
-                                  <m:t>}</m:t>
-                                </m:r>
-                              </m:oMath>
-                            </m:oMathPara>
-                          </a14:m>
-                          <a:endParaRPr lang="en-CA" sz="2000" b="1" dirty="0"/>
-                        </a:p>
-                      </a:txBody>
-                      <a:tcPr anchor="ctr"/>
-                    </a:tc>
-                    <a:extLst>
-                      <a:ext uri="{0D108BD9-81ED-4DB2-BD59-A6C34878D82A}">
-                        <a16:rowId xmlns:a16="http://schemas.microsoft.com/office/drawing/2014/main" val="2083470743"/>
-                      </a:ext>
-                    </a:extLst>
-                  </a:tr>
-                  <a:tr h="784860">
-                    <a:tc>
-                      <a:txBody>
-                        <a:bodyPr/>
-                        <a:lstStyle/>
-                        <a:p>
-                          <a:pPr algn="ctr"/>
-                          <a:r>
-                            <a:rPr lang="en-CA" sz="1800" b="1" i="1" dirty="0"/>
-                            <a:t>L</a:t>
-                          </a:r>
-                          <a:r>
-                            <a:rPr lang="en-CA" sz="1800" b="1" i="1" baseline="-25000" dirty="0"/>
-                            <a:t>ST’</a:t>
-                          </a:r>
-                          <a:endParaRPr lang="en-CA" sz="1800" b="1" i="1" dirty="0"/>
-                        </a:p>
-                      </a:txBody>
-                      <a:tcPr anchor="ctr"/>
-                    </a:tc>
-                    <a:tc>
-                      <a:txBody>
-                        <a:bodyPr/>
-                        <a:lstStyle/>
-                        <a:p>
-                          <a:pPr algn="ctr"/>
-                          <a14:m>
-                            <m:oMathPara xmlns:m="http://schemas.openxmlformats.org/officeDocument/2006/math">
-                              <m:oMathParaPr>
-                                <m:jc m:val="centerGroup"/>
-                              </m:oMathParaPr>
-                              <m:oMath xmlns:m="http://schemas.openxmlformats.org/officeDocument/2006/math">
-                                <m:sSub>
-                                  <m:sSubPr>
-                                    <m:ctrlPr>
-                                      <a:rPr lang="en-CA" sz="2000" b="1" i="1" smtClean="0">
-                                        <a:latin typeface="Cambria Math" panose="02040503050406030204" pitchFamily="18" charset="0"/>
-                                      </a:rPr>
-                                    </m:ctrlPr>
-                                  </m:sSubPr>
-                                  <m:e>
-                                    <m:r>
-                                      <a:rPr lang="en-CA" sz="2000" b="1" i="1" smtClean="0">
-                                        <a:latin typeface="Cambria Math" panose="02040503050406030204" pitchFamily="18" charset="0"/>
-                                      </a:rPr>
-                                      <m:t>𝑳</m:t>
-                                    </m:r>
-                                  </m:e>
-                                  <m:sub>
-                                    <m:r>
-                                      <a:rPr lang="en-CA" sz="2000" b="1" i="1" smtClean="0">
-                                        <a:latin typeface="Cambria Math" panose="02040503050406030204" pitchFamily="18" charset="0"/>
-                                      </a:rPr>
-                                      <m:t>𝑺𝑻</m:t>
-                                    </m:r>
-                                  </m:sub>
-                                </m:sSub>
-                                <m:r>
-                                  <a:rPr lang="en-CA" sz="2000" b="1" i="1" smtClean="0">
-                                    <a:latin typeface="Cambria Math" panose="02040503050406030204" pitchFamily="18" charset="0"/>
-                                  </a:rPr>
-                                  <m:t>∪{</m:t>
-                                </m:r>
-                                <m:r>
-                                  <a:rPr lang="en-CA" sz="2000" b="1" i="1" smtClean="0">
-                                    <a:latin typeface="Cambria Math" panose="02040503050406030204" pitchFamily="18" charset="0"/>
-                                  </a:rPr>
-                                  <m:t>𝒂𝒗𝒈</m:t>
-                                </m:r>
-                                <m:r>
-                                  <a:rPr lang="en-CA" sz="2000" b="1" i="1" smtClean="0">
-                                    <a:latin typeface="Cambria Math" panose="02040503050406030204" pitchFamily="18" charset="0"/>
-                                  </a:rPr>
-                                  <m:t>, </m:t>
-                                </m:r>
-                                <m:r>
-                                  <a:rPr lang="en-CA" sz="2000" b="1" i="1" smtClean="0">
-                                    <a:latin typeface="Cambria Math" panose="02040503050406030204" pitchFamily="18" charset="0"/>
-                                  </a:rPr>
-                                  <m:t>𝒎𝒊𝒏</m:t>
-                                </m:r>
-                                <m:r>
-                                  <a:rPr lang="en-CA" sz="2000" b="1" i="1" smtClean="0">
-                                    <a:latin typeface="Cambria Math" panose="02040503050406030204" pitchFamily="18" charset="0"/>
-                                  </a:rPr>
-                                  <m:t>, </m:t>
-                                </m:r>
-                                <m:r>
-                                  <a:rPr lang="en-CA" sz="2000" b="1" i="1" smtClean="0">
-                                    <a:latin typeface="Cambria Math" panose="02040503050406030204" pitchFamily="18" charset="0"/>
-                                  </a:rPr>
-                                  <m:t>𝒎𝒂𝒙</m:t>
-                                </m:r>
-                                <m:r>
-                                  <a:rPr lang="en-CA" sz="2000" b="1" i="1" smtClean="0">
-                                    <a:latin typeface="Cambria Math" panose="02040503050406030204" pitchFamily="18" charset="0"/>
-                                  </a:rPr>
-                                  <m:t>}</m:t>
-                                </m:r>
-                              </m:oMath>
-                            </m:oMathPara>
-                          </a14:m>
-                          <a:endParaRPr lang="en-CA" sz="2000" b="1" dirty="0"/>
-                        </a:p>
-                      </a:txBody>
-                      <a:tcPr anchor="ctr"/>
-                    </a:tc>
-                    <a:extLst>
-                      <a:ext uri="{0D108BD9-81ED-4DB2-BD59-A6C34878D82A}">
-                        <a16:rowId xmlns:a16="http://schemas.microsoft.com/office/drawing/2014/main" val="1427336378"/>
-                      </a:ext>
-                    </a:extLst>
-                  </a:tr>
-                </a:tbl>
-              </a:graphicData>
-            </a:graphic>
-          </p:graphicFrame>
-        </mc:Choice>
-        <mc:Fallback>
-          <p:graphicFrame>
-            <p:nvGraphicFramePr>
-              <p:cNvPr id="4" name="Content Placeholder 3"/>
-              <p:cNvGraphicFramePr>
-                <a:graphicFrameLocks noGrp="1"/>
-              </p:cNvGraphicFramePr>
-              <p:nvPr>
-                <p:ph idx="1"/>
-                <p:extLst>
-                  <p:ext uri="{D42A27DB-BD31-4B8C-83A1-F6EECF244321}">
-                    <p14:modId xmlns:p14="http://schemas.microsoft.com/office/powerpoint/2010/main" val="2179313020"/>
-                  </p:ext>
-                </p:extLst>
-              </p:nvPr>
-            </p:nvGraphicFramePr>
-            <p:xfrm>
-              <a:off x="1104900" y="1600200"/>
-              <a:ext cx="9980614" cy="2354580"/>
-            </p:xfrm>
-            <a:graphic>
-              <a:graphicData uri="http://schemas.openxmlformats.org/drawingml/2006/table">
-                <a:tbl>
-                  <a:tblPr firstRow="1" bandRow="1">
-                    <a:tableStyleId>{5C22544A-7EE6-4342-B048-85BDC9FD1C3A}</a:tableStyleId>
-                  </a:tblPr>
-                  <a:tblGrid>
-                    <a:gridCol w="4990307">
-                      <a:extLst>
-                        <a:ext uri="{9D8B030D-6E8A-4147-A177-3AD203B41FA5}">
-                          <a16:colId xmlns:a16="http://schemas.microsoft.com/office/drawing/2014/main" val="452220581"/>
-                        </a:ext>
-                      </a:extLst>
-                    </a:gridCol>
-                    <a:gridCol w="4990307">
-                      <a:extLst>
-                        <a:ext uri="{9D8B030D-6E8A-4147-A177-3AD203B41FA5}">
-                          <a16:colId xmlns:a16="http://schemas.microsoft.com/office/drawing/2014/main" val="82609379"/>
-                        </a:ext>
-                      </a:extLst>
-                    </a:gridCol>
-                  </a:tblGrid>
-                  <a:tr h="784860">
-                    <a:tc>
-                      <a:txBody>
-                        <a:bodyPr/>
-                        <a:lstStyle/>
-                        <a:p>
-                          <a:pPr algn="ctr"/>
-                          <a:r>
-                            <a:rPr lang="en-CA" sz="1800" dirty="0"/>
-                            <a:t>Language Variation</a:t>
-                          </a:r>
-                        </a:p>
-                      </a:txBody>
-                      <a:tcPr anchor="ctr"/>
-                    </a:tc>
-                    <a:tc>
-                      <a:txBody>
-                        <a:bodyPr/>
-                        <a:lstStyle/>
-                        <a:p>
-                          <a:pPr algn="ctr"/>
-                          <a:r>
-                            <a:rPr lang="en-CA" sz="1800" dirty="0"/>
-                            <a:t>Function &amp; Terminal Set</a:t>
-                          </a:r>
-                        </a:p>
-                      </a:txBody>
-                      <a:tcPr anchor="ctr"/>
-                    </a:tc>
-                    <a:extLst>
-                      <a:ext uri="{0D108BD9-81ED-4DB2-BD59-A6C34878D82A}">
-                        <a16:rowId xmlns:a16="http://schemas.microsoft.com/office/drawing/2014/main" val="3654672897"/>
-                      </a:ext>
-                    </a:extLst>
-                  </a:tr>
-                  <a:tr h="784860">
-                    <a:tc>
-                      <a:txBody>
-                        <a:bodyPr/>
-                        <a:lstStyle/>
-                        <a:p>
-                          <a:pPr algn="ctr"/>
-                          <a:r>
-                            <a:rPr lang="en-CA" sz="1800" b="1" i="1" dirty="0"/>
-                            <a:t>L</a:t>
-                          </a:r>
-                          <a:r>
-                            <a:rPr lang="en-CA" sz="1800" b="1" i="1" baseline="-25000" dirty="0"/>
-                            <a:t>ST</a:t>
-                          </a:r>
-                          <a:endParaRPr lang="en-CA" sz="1800" b="1" i="1" dirty="0"/>
-                        </a:p>
-                      </a:txBody>
-                      <a:tcPr anchor="ctr"/>
-                    </a:tc>
-                    <a:tc>
-                      <a:txBody>
-                        <a:bodyPr/>
-                        <a:lstStyle/>
-                        <a:p>
-                          <a:endParaRPr lang="en-US"/>
-                        </a:p>
-                      </a:txBody>
-                      <a:tcPr anchor="ctr">
-                        <a:blipFill>
-                          <a:blip r:embed="rId3"/>
-                          <a:stretch>
-                            <a:fillRect l="-100122" t="-100775" r="-488" b="-101550"/>
-                          </a:stretch>
-                        </a:blipFill>
-                      </a:tcPr>
-                    </a:tc>
-                    <a:extLst>
-                      <a:ext uri="{0D108BD9-81ED-4DB2-BD59-A6C34878D82A}">
-                        <a16:rowId xmlns:a16="http://schemas.microsoft.com/office/drawing/2014/main" val="2083470743"/>
-                      </a:ext>
-                    </a:extLst>
-                  </a:tr>
-                  <a:tr h="784860">
-                    <a:tc>
-                      <a:txBody>
-                        <a:bodyPr/>
-                        <a:lstStyle/>
-                        <a:p>
-                          <a:pPr algn="ctr"/>
-                          <a:r>
-                            <a:rPr lang="en-CA" sz="1800" b="1" i="1" dirty="0"/>
-                            <a:t>L</a:t>
-                          </a:r>
-                          <a:r>
-                            <a:rPr lang="en-CA" sz="1800" b="1" i="1" baseline="-25000" dirty="0"/>
-                            <a:t>ST’</a:t>
-                          </a:r>
-                          <a:endParaRPr lang="en-CA" sz="1800" b="1" i="1" dirty="0"/>
-                        </a:p>
-                      </a:txBody>
-                      <a:tcPr anchor="ctr"/>
-                    </a:tc>
-                    <a:tc>
-                      <a:txBody>
-                        <a:bodyPr/>
-                        <a:lstStyle/>
-                        <a:p>
-                          <a:endParaRPr lang="en-US"/>
-                        </a:p>
-                      </a:txBody>
-                      <a:tcPr anchor="ctr">
-                        <a:blipFill>
-                          <a:blip r:embed="rId3"/>
-                          <a:stretch>
-                            <a:fillRect l="-100122" t="-200775" r="-488" b="-1550"/>
-                          </a:stretch>
-                        </a:blipFill>
-                      </a:tcPr>
-                    </a:tc>
-                    <a:extLst>
-                      <a:ext uri="{0D108BD9-81ED-4DB2-BD59-A6C34878D82A}">
-                        <a16:rowId xmlns:a16="http://schemas.microsoft.com/office/drawing/2014/main" val="1427336378"/>
-                      </a:ext>
-                    </a:extLst>
-                  </a:tr>
-                </a:tbl>
-              </a:graphicData>
-            </a:graphic>
-          </p:graphicFrame>
-        </mc:Fallback>
-      </mc:AlternateContent>
+              <a:rPr lang="en-CA" b="1" i="1" dirty="0"/>
+              <a:t>L</a:t>
+            </a:r>
+            <a:r>
+              <a:rPr lang="en-CA" b="1" i="1" baseline="-25000" dirty="0"/>
+              <a:t>ST</a:t>
+            </a:r>
+            <a:r>
+              <a:rPr lang="en-CA" dirty="0"/>
+              <a:t>:</a:t>
+            </a:r>
+            <a:r>
+              <a:rPr lang="en-CA" b="1" i="1" dirty="0"/>
+              <a:t> </a:t>
+            </a:r>
+            <a:r>
+              <a:rPr lang="en-CA" dirty="0"/>
+              <a:t>Comparison of Individual Models (70-30)</a:t>
+            </a:r>
+          </a:p>
+        </p:txBody>
+      </p:sp>
+      <p:sp>
+        <p:nvSpPr>
+          <p:cNvPr id="3" name="Text Placeholder 2"/>
+          <p:cNvSpPr>
+            <a:spLocks noGrp="1"/>
+          </p:cNvSpPr>
+          <p:nvPr>
+            <p:ph type="body" idx="1"/>
+          </p:nvPr>
+        </p:nvSpPr>
+        <p:spPr>
+          <a:xfrm>
+            <a:off x="750806" y="1223962"/>
+            <a:ext cx="4919472" cy="823912"/>
+          </a:xfrm>
+        </p:spPr>
+        <p:txBody>
+          <a:bodyPr/>
+          <a:lstStyle/>
+          <a:p>
+            <a:r>
+              <a:rPr lang="en-CA" dirty="0"/>
+              <a:t>Best &amp; Average Models (Training)</a:t>
+            </a:r>
+          </a:p>
+        </p:txBody>
+      </p:sp>
+      <p:pic>
+        <p:nvPicPr>
+          <p:cNvPr id="7" name="Content Placeholder 6"/>
+          <p:cNvPicPr>
+            <a:picLocks noGrp="1" noChangeAspect="1"/>
+          </p:cNvPicPr>
+          <p:nvPr>
+            <p:ph sz="half" idx="2"/>
+          </p:nvPr>
+        </p:nvPicPr>
+        <p:blipFill>
+          <a:blip r:embed="rId3">
+            <a:extLst>
+              <a:ext uri="{28A0092B-C50C-407E-A947-70E740481C1C}">
+                <a14:useLocalDpi xmlns:a14="http://schemas.microsoft.com/office/drawing/2010/main" val="0"/>
+              </a:ext>
+            </a:extLst>
+          </a:blip>
+          <a:stretch>
+            <a:fillRect/>
+          </a:stretch>
+        </p:blipFill>
+        <p:spPr>
+          <a:xfrm>
+            <a:off x="269500" y="2103438"/>
+            <a:ext cx="5882084" cy="4297362"/>
+          </a:xfrm>
+        </p:spPr>
+      </p:pic>
+      <p:sp>
+        <p:nvSpPr>
+          <p:cNvPr id="5" name="Text Placeholder 4"/>
+          <p:cNvSpPr>
+            <a:spLocks noGrp="1"/>
+          </p:cNvSpPr>
+          <p:nvPr>
+            <p:ph type="body" sz="quarter" idx="3"/>
+          </p:nvPr>
+        </p:nvSpPr>
+        <p:spPr>
+          <a:xfrm>
+            <a:off x="6656578" y="1223962"/>
+            <a:ext cx="4919472" cy="823912"/>
+          </a:xfrm>
+        </p:spPr>
+        <p:txBody>
+          <a:bodyPr/>
+          <a:lstStyle/>
+          <a:p>
+            <a:r>
+              <a:rPr lang="en-CA" dirty="0"/>
+              <a:t>Ensemble Testing</a:t>
+            </a:r>
+          </a:p>
+        </p:txBody>
+      </p:sp>
+      <p:pic>
+        <p:nvPicPr>
+          <p:cNvPr id="8" name="Content Placeholder 7"/>
+          <p:cNvPicPr>
+            <a:picLocks noGrp="1" noChangeAspect="1"/>
+          </p:cNvPicPr>
+          <p:nvPr>
+            <p:ph sz="quarter" idx="4"/>
+          </p:nvPr>
+        </p:nvPicPr>
+        <p:blipFill>
+          <a:blip r:embed="rId4">
+            <a:extLst>
+              <a:ext uri="{28A0092B-C50C-407E-A947-70E740481C1C}">
+                <a14:useLocalDpi xmlns:a14="http://schemas.microsoft.com/office/drawing/2010/main" val="0"/>
+              </a:ext>
+            </a:extLst>
+          </a:blip>
+          <a:stretch>
+            <a:fillRect/>
+          </a:stretch>
+        </p:blipFill>
+        <p:spPr>
+          <a:xfrm>
+            <a:off x="6166041" y="2099970"/>
+            <a:ext cx="5900546" cy="4299534"/>
+          </a:xfrm>
+        </p:spPr>
+      </p:pic>
     </p:spTree>
     <p:extLst>
       <p:ext uri="{BB962C8B-B14F-4D97-AF65-F5344CB8AC3E}">
-        <p14:creationId xmlns:p14="http://schemas.microsoft.com/office/powerpoint/2010/main" val="1056230780"/>
+        <p14:creationId xmlns:p14="http://schemas.microsoft.com/office/powerpoint/2010/main" val="1630310746"/>
       </p:ext>
     </p:extLst>
   </p:cSld>
@@ -7097,61 +7399,1180 @@
           <a:lstStyle/>
           <a:p>
             <a:r>
+              <a:rPr lang="en-CA" b="1" i="1" dirty="0"/>
+              <a:t>L</a:t>
+            </a:r>
+            <a:r>
+              <a:rPr lang="en-CA" b="1" i="1" baseline="-25000" dirty="0"/>
+              <a:t>ST’</a:t>
+            </a:r>
+            <a:r>
               <a:rPr lang="en-CA" dirty="0"/>
-              <a:t>References</a:t>
-            </a:r>
-          </a:p>
-        </p:txBody>
-      </p:sp>
-      <p:sp>
-        <p:nvSpPr>
-          <p:cNvPr id="3" name="Content Placeholder 2"/>
+              <a:t>:</a:t>
+            </a:r>
+            <a:r>
+              <a:rPr lang="en-CA" b="1" i="1" dirty="0"/>
+              <a:t> </a:t>
+            </a:r>
+            <a:r>
+              <a:rPr lang="en-CA" dirty="0"/>
+              <a:t>Comparison of Individual Models (70-30)</a:t>
+            </a:r>
+          </a:p>
+        </p:txBody>
+      </p:sp>
+      <p:sp>
+        <p:nvSpPr>
+          <p:cNvPr id="3" name="Text Placeholder 2"/>
           <p:cNvSpPr>
             <a:spLocks noGrp="1"/>
           </p:cNvSpPr>
           <p:nvPr>
-            <p:ph idx="1"/>
-          </p:nvPr>
-        </p:nvSpPr>
-        <p:spPr/>
+            <p:ph type="body" idx="1"/>
+          </p:nvPr>
+        </p:nvSpPr>
+        <p:spPr>
+          <a:xfrm>
+            <a:off x="750806" y="1223962"/>
+            <a:ext cx="4919472" cy="823912"/>
+          </a:xfrm>
+        </p:spPr>
         <p:txBody>
           <a:bodyPr/>
           <a:lstStyle/>
           <a:p>
             <a:r>
-              <a:rPr lang="en-CA" dirty="0" err="1"/>
-              <a:t>Minkyu</a:t>
-            </a:r>
-            <a:r>
               <a:rPr lang="en-CA" dirty="0"/>
-              <a:t> Kim, Ying L. Becker, Peng </a:t>
-            </a:r>
-            <a:r>
-              <a:rPr lang="en-CA" dirty="0" err="1"/>
-              <a:t>Fei</a:t>
-            </a:r>
+              <a:t>Best &amp; Average Models (Training)</a:t>
+            </a:r>
+          </a:p>
+        </p:txBody>
+      </p:sp>
+      <p:pic>
+        <p:nvPicPr>
+          <p:cNvPr id="7" name="Content Placeholder 6"/>
+          <p:cNvPicPr>
+            <a:picLocks noGrp="1" noChangeAspect="1"/>
+          </p:cNvPicPr>
+          <p:nvPr>
+            <p:ph sz="half" idx="2"/>
+          </p:nvPr>
+        </p:nvPicPr>
+        <p:blipFill>
+          <a:blip r:embed="rId3">
+            <a:extLst>
+              <a:ext uri="{28A0092B-C50C-407E-A947-70E740481C1C}">
+                <a14:useLocalDpi xmlns:a14="http://schemas.microsoft.com/office/drawing/2010/main" val="0"/>
+              </a:ext>
+            </a:extLst>
+          </a:blip>
+          <a:stretch>
+            <a:fillRect/>
+          </a:stretch>
+        </p:blipFill>
+        <p:spPr>
+          <a:xfrm>
+            <a:off x="257165" y="2109159"/>
+            <a:ext cx="5906755" cy="4285920"/>
+          </a:xfrm>
+        </p:spPr>
+      </p:pic>
+      <p:sp>
+        <p:nvSpPr>
+          <p:cNvPr id="5" name="Text Placeholder 4"/>
+          <p:cNvSpPr>
+            <a:spLocks noGrp="1"/>
+          </p:cNvSpPr>
+          <p:nvPr>
+            <p:ph type="body" sz="quarter" idx="3"/>
+          </p:nvPr>
+        </p:nvSpPr>
+        <p:spPr>
+          <a:xfrm>
+            <a:off x="6656578" y="1223962"/>
+            <a:ext cx="4919472" cy="823912"/>
+          </a:xfrm>
+        </p:spPr>
+        <p:txBody>
+          <a:bodyPr/>
+          <a:lstStyle/>
+          <a:p>
             <a:r>
               <a:rPr lang="en-CA" dirty="0"/>
-              <a:t>, and Una-May O’Reilly. Constrained genetic programming to minimize overfitting in stock selection. </a:t>
-            </a:r>
-            <a:r>
-              <a:rPr lang="en-CA" i="1" dirty="0"/>
-              <a:t>Genetic Programming Theory and Practice,</a:t>
-            </a:r>
-            <a:r>
-              <a:rPr lang="en-CA" dirty="0"/>
-              <a:t> 6:178-194, 2009</a:t>
-            </a:r>
-          </a:p>
-          <a:p>
-            <a:endParaRPr lang="en-CA" dirty="0"/>
-          </a:p>
-        </p:txBody>
-      </p:sp>
+              <a:t>Ensemble Testing</a:t>
+            </a:r>
+          </a:p>
+        </p:txBody>
+      </p:sp>
+      <p:pic>
+        <p:nvPicPr>
+          <p:cNvPr id="8" name="Content Placeholder 7"/>
+          <p:cNvPicPr>
+            <a:picLocks noGrp="1" noChangeAspect="1"/>
+          </p:cNvPicPr>
+          <p:nvPr>
+            <p:ph sz="quarter" idx="4"/>
+          </p:nvPr>
+        </p:nvPicPr>
+        <p:blipFill>
+          <a:blip r:embed="rId4">
+            <a:extLst>
+              <a:ext uri="{28A0092B-C50C-407E-A947-70E740481C1C}">
+                <a14:useLocalDpi xmlns:a14="http://schemas.microsoft.com/office/drawing/2010/main" val="0"/>
+              </a:ext>
+            </a:extLst>
+          </a:blip>
+          <a:stretch>
+            <a:fillRect/>
+          </a:stretch>
+        </p:blipFill>
+        <p:spPr>
+          <a:xfrm>
+            <a:off x="6166041" y="2111776"/>
+            <a:ext cx="5900546" cy="4275921"/>
+          </a:xfrm>
+        </p:spPr>
+      </p:pic>
     </p:spTree>
     <p:extLst>
       <p:ext uri="{BB962C8B-B14F-4D97-AF65-F5344CB8AC3E}">
-        <p14:creationId xmlns:p14="http://schemas.microsoft.com/office/powerpoint/2010/main" val="4294613089"/>
+        <p14:creationId xmlns:p14="http://schemas.microsoft.com/office/powerpoint/2010/main" val="4211181262"/>
+      </p:ext>
+    </p:extLst>
+  </p:cSld>
+  <p:clrMapOvr>
+    <a:masterClrMapping/>
+  </p:clrMapOvr>
+  <mc:AlternateContent xmlns:mc="http://schemas.openxmlformats.org/markup-compatibility/2006" xmlns:p14="http://schemas.microsoft.com/office/powerpoint/2010/main">
+    <mc:Choice Requires="p14">
+      <p:transition spd="med" p14:dur="700">
+        <p:fade/>
+      </p:transition>
+    </mc:Choice>
+    <mc:Fallback xmlns="">
+      <p:transition spd="med">
+        <p:fade/>
+      </p:transition>
+    </mc:Fallback>
+  </mc:AlternateContent>
+</p:sld>
+</file>
+
+<file path=ppt/slides/slide16.xml><?xml version="1.0" encoding="utf-8"?>
+<p:sld xmlns:a="http://schemas.openxmlformats.org/drawingml/2006/main" xmlns:r="http://schemas.openxmlformats.org/officeDocument/2006/relationships" xmlns:p="http://schemas.openxmlformats.org/presentationml/2006/main">
+  <p:cSld>
+    <p:spTree>
+      <p:nvGrpSpPr>
+        <p:cNvPr id="1" name=""/>
+        <p:cNvGrpSpPr/>
+        <p:nvPr/>
+      </p:nvGrpSpPr>
+      <p:grpSpPr>
+        <a:xfrm>
+          <a:off x="0" y="0"/>
+          <a:ext cx="0" cy="0"/>
+          <a:chOff x="0" y="0"/>
+          <a:chExt cx="0" cy="0"/>
+        </a:xfrm>
+      </p:grpSpPr>
+      <p:sp>
+        <p:nvSpPr>
+          <p:cNvPr id="2" name="Title 1"/>
+          <p:cNvSpPr>
+            <a:spLocks noGrp="1"/>
+          </p:cNvSpPr>
+          <p:nvPr>
+            <p:ph type="title"/>
+          </p:nvPr>
+        </p:nvSpPr>
+        <p:spPr/>
+        <p:txBody>
+          <a:bodyPr/>
+          <a:lstStyle/>
+          <a:p>
+            <a:r>
+              <a:rPr lang="en-CA" b="1" i="1" dirty="0"/>
+              <a:t>L</a:t>
+            </a:r>
+            <a:r>
+              <a:rPr lang="en-CA" b="1" i="1" baseline="-25000" dirty="0"/>
+              <a:t>ST</a:t>
+            </a:r>
+            <a:r>
+              <a:rPr lang="en-CA" dirty="0"/>
+              <a:t>:</a:t>
+            </a:r>
+            <a:r>
+              <a:rPr lang="en-CA" b="1" i="1" dirty="0"/>
+              <a:t> </a:t>
+            </a:r>
+            <a:r>
+              <a:rPr lang="en-CA" dirty="0"/>
+              <a:t>Comparison of Individual Models (90-10)</a:t>
+            </a:r>
+          </a:p>
+        </p:txBody>
+      </p:sp>
+      <p:sp>
+        <p:nvSpPr>
+          <p:cNvPr id="3" name="Text Placeholder 2"/>
+          <p:cNvSpPr>
+            <a:spLocks noGrp="1"/>
+          </p:cNvSpPr>
+          <p:nvPr>
+            <p:ph type="body" idx="1"/>
+          </p:nvPr>
+        </p:nvSpPr>
+        <p:spPr>
+          <a:xfrm>
+            <a:off x="750806" y="1223962"/>
+            <a:ext cx="4919472" cy="823912"/>
+          </a:xfrm>
+        </p:spPr>
+        <p:txBody>
+          <a:bodyPr/>
+          <a:lstStyle/>
+          <a:p>
+            <a:r>
+              <a:rPr lang="en-CA" dirty="0"/>
+              <a:t>Best &amp; Average Models (Training)</a:t>
+            </a:r>
+          </a:p>
+        </p:txBody>
+      </p:sp>
+      <p:pic>
+        <p:nvPicPr>
+          <p:cNvPr id="7" name="Content Placeholder 6"/>
+          <p:cNvPicPr>
+            <a:picLocks noGrp="1" noChangeAspect="1"/>
+          </p:cNvPicPr>
+          <p:nvPr>
+            <p:ph sz="half" idx="2"/>
+          </p:nvPr>
+        </p:nvPicPr>
+        <p:blipFill>
+          <a:blip r:embed="rId3">
+            <a:extLst>
+              <a:ext uri="{28A0092B-C50C-407E-A947-70E740481C1C}">
+                <a14:useLocalDpi xmlns:a14="http://schemas.microsoft.com/office/drawing/2010/main" val="0"/>
+              </a:ext>
+            </a:extLst>
+          </a:blip>
+          <a:stretch>
+            <a:fillRect/>
+          </a:stretch>
+        </p:blipFill>
+        <p:spPr>
+          <a:xfrm>
+            <a:off x="265028" y="2109159"/>
+            <a:ext cx="5891028" cy="4285920"/>
+          </a:xfrm>
+        </p:spPr>
+      </p:pic>
+      <p:sp>
+        <p:nvSpPr>
+          <p:cNvPr id="5" name="Text Placeholder 4"/>
+          <p:cNvSpPr>
+            <a:spLocks noGrp="1"/>
+          </p:cNvSpPr>
+          <p:nvPr>
+            <p:ph type="body" sz="quarter" idx="3"/>
+          </p:nvPr>
+        </p:nvSpPr>
+        <p:spPr>
+          <a:xfrm>
+            <a:off x="6656578" y="1223962"/>
+            <a:ext cx="4919472" cy="823912"/>
+          </a:xfrm>
+        </p:spPr>
+        <p:txBody>
+          <a:bodyPr/>
+          <a:lstStyle/>
+          <a:p>
+            <a:r>
+              <a:rPr lang="en-CA" dirty="0"/>
+              <a:t>Ensemble Testing</a:t>
+            </a:r>
+          </a:p>
+        </p:txBody>
+      </p:sp>
+      <p:pic>
+        <p:nvPicPr>
+          <p:cNvPr id="8" name="Content Placeholder 7"/>
+          <p:cNvPicPr>
+            <a:picLocks noGrp="1" noChangeAspect="1"/>
+          </p:cNvPicPr>
+          <p:nvPr>
+            <p:ph sz="quarter" idx="4"/>
+          </p:nvPr>
+        </p:nvPicPr>
+        <p:blipFill>
+          <a:blip r:embed="rId4">
+            <a:extLst>
+              <a:ext uri="{28A0092B-C50C-407E-A947-70E740481C1C}">
+                <a14:useLocalDpi xmlns:a14="http://schemas.microsoft.com/office/drawing/2010/main" val="0"/>
+              </a:ext>
+            </a:extLst>
+          </a:blip>
+          <a:stretch>
+            <a:fillRect/>
+          </a:stretch>
+        </p:blipFill>
+        <p:spPr>
+          <a:xfrm>
+            <a:off x="6174503" y="2111776"/>
+            <a:ext cx="5883622" cy="4275921"/>
+          </a:xfrm>
+        </p:spPr>
+      </p:pic>
+    </p:spTree>
+    <p:extLst>
+      <p:ext uri="{BB962C8B-B14F-4D97-AF65-F5344CB8AC3E}">
+        <p14:creationId xmlns:p14="http://schemas.microsoft.com/office/powerpoint/2010/main" val="103009781"/>
+      </p:ext>
+    </p:extLst>
+  </p:cSld>
+  <p:clrMapOvr>
+    <a:masterClrMapping/>
+  </p:clrMapOvr>
+  <mc:AlternateContent xmlns:mc="http://schemas.openxmlformats.org/markup-compatibility/2006" xmlns:p14="http://schemas.microsoft.com/office/powerpoint/2010/main">
+    <mc:Choice Requires="p14">
+      <p:transition spd="med" p14:dur="700">
+        <p:fade/>
+      </p:transition>
+    </mc:Choice>
+    <mc:Fallback xmlns="">
+      <p:transition spd="med">
+        <p:fade/>
+      </p:transition>
+    </mc:Fallback>
+  </mc:AlternateContent>
+</p:sld>
+</file>
+
+<file path=ppt/slides/slide17.xml><?xml version="1.0" encoding="utf-8"?>
+<p:sld xmlns:a="http://schemas.openxmlformats.org/drawingml/2006/main" xmlns:r="http://schemas.openxmlformats.org/officeDocument/2006/relationships" xmlns:p="http://schemas.openxmlformats.org/presentationml/2006/main">
+  <p:cSld>
+    <p:spTree>
+      <p:nvGrpSpPr>
+        <p:cNvPr id="1" name=""/>
+        <p:cNvGrpSpPr/>
+        <p:nvPr/>
+      </p:nvGrpSpPr>
+      <p:grpSpPr>
+        <a:xfrm>
+          <a:off x="0" y="0"/>
+          <a:ext cx="0" cy="0"/>
+          <a:chOff x="0" y="0"/>
+          <a:chExt cx="0" cy="0"/>
+        </a:xfrm>
+      </p:grpSpPr>
+      <p:sp>
+        <p:nvSpPr>
+          <p:cNvPr id="2" name="Title 1"/>
+          <p:cNvSpPr>
+            <a:spLocks noGrp="1"/>
+          </p:cNvSpPr>
+          <p:nvPr>
+            <p:ph type="title"/>
+          </p:nvPr>
+        </p:nvSpPr>
+        <p:spPr/>
+        <p:txBody>
+          <a:bodyPr/>
+          <a:lstStyle/>
+          <a:p>
+            <a:r>
+              <a:rPr lang="en-CA" dirty="0"/>
+              <a:t>Ensemble Fitness</a:t>
+            </a:r>
+          </a:p>
+        </p:txBody>
+      </p:sp>
+      <p:graphicFrame>
+        <p:nvGraphicFramePr>
+          <p:cNvPr id="4" name="Content Placeholder 3"/>
+          <p:cNvGraphicFramePr>
+            <a:graphicFrameLocks noGrp="1"/>
+          </p:cNvGraphicFramePr>
+          <p:nvPr>
+            <p:ph idx="1"/>
+            <p:extLst>
+              <p:ext uri="{D42A27DB-BD31-4B8C-83A1-F6EECF244321}">
+                <p14:modId xmlns:p14="http://schemas.microsoft.com/office/powerpoint/2010/main" val="2654204459"/>
+              </p:ext>
+            </p:extLst>
+          </p:nvPr>
+        </p:nvGraphicFramePr>
+        <p:xfrm>
+          <a:off x="1104900" y="1600200"/>
+          <a:ext cx="9982200" cy="3251200"/>
+        </p:xfrm>
+        <a:graphic>
+          <a:graphicData uri="http://schemas.openxmlformats.org/drawingml/2006/table">
+            <a:tbl>
+              <a:tblPr firstRow="1" bandRow="1">
+                <a:tableStyleId>{5C22544A-7EE6-4342-B048-85BDC9FD1C3A}</a:tableStyleId>
+              </a:tblPr>
+              <a:tblGrid>
+                <a:gridCol w="2495550">
+                  <a:extLst>
+                    <a:ext uri="{9D8B030D-6E8A-4147-A177-3AD203B41FA5}">
+                      <a16:colId xmlns:a16="http://schemas.microsoft.com/office/drawing/2014/main" val="4260470491"/>
+                    </a:ext>
+                  </a:extLst>
+                </a:gridCol>
+                <a:gridCol w="2495550">
+                  <a:extLst>
+                    <a:ext uri="{9D8B030D-6E8A-4147-A177-3AD203B41FA5}">
+                      <a16:colId xmlns:a16="http://schemas.microsoft.com/office/drawing/2014/main" val="984885218"/>
+                    </a:ext>
+                  </a:extLst>
+                </a:gridCol>
+                <a:gridCol w="2495550">
+                  <a:extLst>
+                    <a:ext uri="{9D8B030D-6E8A-4147-A177-3AD203B41FA5}">
+                      <a16:colId xmlns:a16="http://schemas.microsoft.com/office/drawing/2014/main" val="1208586841"/>
+                    </a:ext>
+                  </a:extLst>
+                </a:gridCol>
+                <a:gridCol w="2495550">
+                  <a:extLst>
+                    <a:ext uri="{9D8B030D-6E8A-4147-A177-3AD203B41FA5}">
+                      <a16:colId xmlns:a16="http://schemas.microsoft.com/office/drawing/2014/main" val="2817348180"/>
+                    </a:ext>
+                  </a:extLst>
+                </a:gridCol>
+              </a:tblGrid>
+              <a:tr h="650240">
+                <a:tc>
+                  <a:txBody>
+                    <a:bodyPr/>
+                    <a:lstStyle/>
+                    <a:p>
+                      <a:pPr algn="ctr"/>
+                      <a:endParaRPr lang="en-CA" dirty="0"/>
+                    </a:p>
+                  </a:txBody>
+                  <a:tcPr anchor="ctr"/>
+                </a:tc>
+                <a:tc>
+                  <a:txBody>
+                    <a:bodyPr/>
+                    <a:lstStyle/>
+                    <a:p>
+                      <a:pPr algn="ctr"/>
+                      <a:r>
+                        <a:rPr lang="en-CA" dirty="0"/>
+                        <a:t>70-30</a:t>
+                      </a:r>
+                    </a:p>
+                  </a:txBody>
+                  <a:tcPr anchor="ctr"/>
+                </a:tc>
+                <a:tc>
+                  <a:txBody>
+                    <a:bodyPr/>
+                    <a:lstStyle/>
+                    <a:p>
+                      <a:pPr algn="ctr"/>
+                      <a:r>
+                        <a:rPr lang="en-CA" dirty="0"/>
+                        <a:t>80-20</a:t>
+                      </a:r>
+                    </a:p>
+                  </a:txBody>
+                  <a:tcPr anchor="ctr"/>
+                </a:tc>
+                <a:tc>
+                  <a:txBody>
+                    <a:bodyPr/>
+                    <a:lstStyle/>
+                    <a:p>
+                      <a:pPr algn="ctr"/>
+                      <a:r>
+                        <a:rPr lang="en-CA" dirty="0"/>
+                        <a:t>90-10</a:t>
+                      </a:r>
+                    </a:p>
+                  </a:txBody>
+                  <a:tcPr anchor="ctr"/>
+                </a:tc>
+                <a:extLst>
+                  <a:ext uri="{0D108BD9-81ED-4DB2-BD59-A6C34878D82A}">
+                    <a16:rowId xmlns:a16="http://schemas.microsoft.com/office/drawing/2014/main" val="3418847742"/>
+                  </a:ext>
+                </a:extLst>
+              </a:tr>
+              <a:tr h="650240">
+                <a:tc>
+                  <a:txBody>
+                    <a:bodyPr/>
+                    <a:lstStyle/>
+                    <a:p>
+                      <a:pPr algn="ctr"/>
+                      <a:r>
+                        <a:rPr lang="en-CA" b="1" i="1" dirty="0"/>
+                        <a:t>L</a:t>
+                      </a:r>
+                      <a:r>
+                        <a:rPr lang="en-CA" b="1" i="1" baseline="-25000" dirty="0"/>
+                        <a:t>ST</a:t>
+                      </a:r>
+                      <a:endParaRPr lang="en-CA" b="1" i="1" dirty="0"/>
+                    </a:p>
+                  </a:txBody>
+                  <a:tcPr anchor="ctr"/>
+                </a:tc>
+                <a:tc>
+                  <a:txBody>
+                    <a:bodyPr/>
+                    <a:lstStyle/>
+                    <a:p>
+                      <a:pPr algn="ctr"/>
+                      <a:r>
+                        <a:rPr lang="en-CA" dirty="0"/>
+                        <a:t>0.088749</a:t>
+                      </a:r>
+                    </a:p>
+                  </a:txBody>
+                  <a:tcPr anchor="ctr"/>
+                </a:tc>
+                <a:tc>
+                  <a:txBody>
+                    <a:bodyPr/>
+                    <a:lstStyle/>
+                    <a:p>
+                      <a:pPr algn="ctr"/>
+                      <a:r>
+                        <a:rPr lang="en-CA" dirty="0"/>
+                        <a:t>0.074097</a:t>
+                      </a:r>
+                    </a:p>
+                  </a:txBody>
+                  <a:tcPr anchor="ctr"/>
+                </a:tc>
+                <a:tc>
+                  <a:txBody>
+                    <a:bodyPr/>
+                    <a:lstStyle/>
+                    <a:p>
+                      <a:pPr algn="ctr"/>
+                      <a:r>
+                        <a:rPr lang="en-CA" dirty="0"/>
+                        <a:t>0.026279</a:t>
+                      </a:r>
+                    </a:p>
+                  </a:txBody>
+                  <a:tcPr anchor="ctr"/>
+                </a:tc>
+                <a:extLst>
+                  <a:ext uri="{0D108BD9-81ED-4DB2-BD59-A6C34878D82A}">
+                    <a16:rowId xmlns:a16="http://schemas.microsoft.com/office/drawing/2014/main" val="3001223746"/>
+                  </a:ext>
+                </a:extLst>
+              </a:tr>
+              <a:tr h="650240">
+                <a:tc>
+                  <a:txBody>
+                    <a:bodyPr/>
+                    <a:lstStyle/>
+                    <a:p>
+                      <a:pPr algn="ctr"/>
+                      <a:r>
+                        <a:rPr lang="en-CA" b="1" i="1" dirty="0"/>
+                        <a:t>L</a:t>
+                      </a:r>
+                      <a:r>
+                        <a:rPr lang="en-CA" b="1" i="1" baseline="-25000" dirty="0"/>
+                        <a:t>ST’</a:t>
+                      </a:r>
+                      <a:endParaRPr lang="en-CA" b="1" i="1" dirty="0"/>
+                    </a:p>
+                  </a:txBody>
+                  <a:tcPr anchor="ctr"/>
+                </a:tc>
+                <a:tc>
+                  <a:txBody>
+                    <a:bodyPr/>
+                    <a:lstStyle/>
+                    <a:p>
+                      <a:pPr algn="ctr"/>
+                      <a:r>
+                        <a:rPr lang="en-CA" dirty="0"/>
+                        <a:t>1.395065</a:t>
+                      </a:r>
+                    </a:p>
+                  </a:txBody>
+                  <a:tcPr anchor="ctr"/>
+                </a:tc>
+                <a:tc>
+                  <a:txBody>
+                    <a:bodyPr/>
+                    <a:lstStyle/>
+                    <a:p>
+                      <a:pPr algn="ctr"/>
+                      <a:r>
+                        <a:rPr lang="en-CA" dirty="0"/>
+                        <a:t>0.246555</a:t>
+                      </a:r>
+                    </a:p>
+                  </a:txBody>
+                  <a:tcPr anchor="ctr"/>
+                </a:tc>
+                <a:tc>
+                  <a:txBody>
+                    <a:bodyPr/>
+                    <a:lstStyle/>
+                    <a:p>
+                      <a:pPr algn="ctr"/>
+                      <a:r>
+                        <a:rPr lang="en-CA" dirty="0"/>
+                        <a:t>0.073232</a:t>
+                      </a:r>
+                    </a:p>
+                  </a:txBody>
+                  <a:tcPr anchor="ctr"/>
+                </a:tc>
+                <a:extLst>
+                  <a:ext uri="{0D108BD9-81ED-4DB2-BD59-A6C34878D82A}">
+                    <a16:rowId xmlns:a16="http://schemas.microsoft.com/office/drawing/2014/main" val="1409226119"/>
+                  </a:ext>
+                </a:extLst>
+              </a:tr>
+              <a:tr h="650240">
+                <a:tc>
+                  <a:txBody>
+                    <a:bodyPr/>
+                    <a:lstStyle/>
+                    <a:p>
+                      <a:pPr algn="ctr"/>
+                      <a:r>
+                        <a:rPr lang="en-CA" b="1" i="1" dirty="0"/>
+                        <a:t>L</a:t>
+                      </a:r>
+                      <a:r>
+                        <a:rPr lang="en-CA" b="1" i="1" baseline="-25000" dirty="0"/>
+                        <a:t>ST</a:t>
+                      </a:r>
+                      <a:r>
+                        <a:rPr lang="en-CA" b="1" i="1" baseline="0" dirty="0"/>
+                        <a:t> Outliers</a:t>
+                      </a:r>
+                      <a:endParaRPr lang="en-CA" b="1" i="1" dirty="0"/>
+                    </a:p>
+                  </a:txBody>
+                  <a:tcPr anchor="ctr"/>
+                </a:tc>
+                <a:tc>
+                  <a:txBody>
+                    <a:bodyPr/>
+                    <a:lstStyle/>
+                    <a:p>
+                      <a:pPr algn="ctr"/>
+                      <a:r>
+                        <a:rPr lang="en-CA" dirty="0"/>
+                        <a:t>466</a:t>
+                      </a:r>
+                    </a:p>
+                  </a:txBody>
+                  <a:tcPr anchor="ctr"/>
+                </a:tc>
+                <a:tc>
+                  <a:txBody>
+                    <a:bodyPr/>
+                    <a:lstStyle/>
+                    <a:p>
+                      <a:pPr algn="ctr"/>
+                      <a:r>
+                        <a:rPr lang="en-CA" dirty="0"/>
+                        <a:t>310</a:t>
+                      </a:r>
+                    </a:p>
+                  </a:txBody>
+                  <a:tcPr anchor="ctr"/>
+                </a:tc>
+                <a:tc>
+                  <a:txBody>
+                    <a:bodyPr/>
+                    <a:lstStyle/>
+                    <a:p>
+                      <a:pPr algn="ctr"/>
+                      <a:r>
+                        <a:rPr lang="en-CA" dirty="0"/>
+                        <a:t>111</a:t>
+                      </a:r>
+                    </a:p>
+                  </a:txBody>
+                  <a:tcPr anchor="ctr"/>
+                </a:tc>
+                <a:extLst>
+                  <a:ext uri="{0D108BD9-81ED-4DB2-BD59-A6C34878D82A}">
+                    <a16:rowId xmlns:a16="http://schemas.microsoft.com/office/drawing/2014/main" val="2156384988"/>
+                  </a:ext>
+                </a:extLst>
+              </a:tr>
+              <a:tr h="650240">
+                <a:tc>
+                  <a:txBody>
+                    <a:bodyPr/>
+                    <a:lstStyle/>
+                    <a:p>
+                      <a:pPr algn="ctr"/>
+                      <a:r>
+                        <a:rPr lang="en-CA" b="1" i="1" dirty="0"/>
+                        <a:t>L</a:t>
+                      </a:r>
+                      <a:r>
+                        <a:rPr lang="en-CA" b="1" i="1" baseline="-25000" dirty="0"/>
+                        <a:t>ST’</a:t>
+                      </a:r>
+                      <a:r>
+                        <a:rPr lang="en-CA" b="1" i="1" baseline="0" dirty="0"/>
+                        <a:t> Outliers</a:t>
+                      </a:r>
+                      <a:endParaRPr lang="en-CA" b="1" i="1" dirty="0"/>
+                    </a:p>
+                  </a:txBody>
+                  <a:tcPr anchor="ctr"/>
+                </a:tc>
+                <a:tc>
+                  <a:txBody>
+                    <a:bodyPr/>
+                    <a:lstStyle/>
+                    <a:p>
+                      <a:pPr algn="ctr"/>
+                      <a:r>
+                        <a:rPr lang="en-CA" dirty="0"/>
+                        <a:t>384</a:t>
+                      </a:r>
+                    </a:p>
+                  </a:txBody>
+                  <a:tcPr anchor="ctr"/>
+                </a:tc>
+                <a:tc>
+                  <a:txBody>
+                    <a:bodyPr/>
+                    <a:lstStyle/>
+                    <a:p>
+                      <a:pPr algn="ctr"/>
+                      <a:r>
+                        <a:rPr lang="en-CA" dirty="0"/>
+                        <a:t>253</a:t>
+                      </a:r>
+                    </a:p>
+                  </a:txBody>
+                  <a:tcPr anchor="ctr"/>
+                </a:tc>
+                <a:tc>
+                  <a:txBody>
+                    <a:bodyPr/>
+                    <a:lstStyle/>
+                    <a:p>
+                      <a:pPr algn="ctr"/>
+                      <a:r>
+                        <a:rPr lang="en-CA" dirty="0"/>
+                        <a:t>18</a:t>
+                      </a:r>
+                    </a:p>
+                  </a:txBody>
+                  <a:tcPr anchor="ctr"/>
+                </a:tc>
+                <a:extLst>
+                  <a:ext uri="{0D108BD9-81ED-4DB2-BD59-A6C34878D82A}">
+                    <a16:rowId xmlns:a16="http://schemas.microsoft.com/office/drawing/2014/main" val="3681039543"/>
+                  </a:ext>
+                </a:extLst>
+              </a:tr>
+            </a:tbl>
+          </a:graphicData>
+        </a:graphic>
+      </p:graphicFrame>
+    </p:spTree>
+    <p:extLst>
+      <p:ext uri="{BB962C8B-B14F-4D97-AF65-F5344CB8AC3E}">
+        <p14:creationId xmlns:p14="http://schemas.microsoft.com/office/powerpoint/2010/main" val="4248199266"/>
+      </p:ext>
+    </p:extLst>
+  </p:cSld>
+  <p:clrMapOvr>
+    <a:masterClrMapping/>
+  </p:clrMapOvr>
+  <mc:AlternateContent xmlns:mc="http://schemas.openxmlformats.org/markup-compatibility/2006" xmlns:p14="http://schemas.microsoft.com/office/powerpoint/2010/main">
+    <mc:Choice Requires="p14">
+      <p:transition spd="med" p14:dur="700">
+        <p:fade/>
+      </p:transition>
+    </mc:Choice>
+    <mc:Fallback xmlns="">
+      <p:transition spd="med">
+        <p:fade/>
+      </p:transition>
+    </mc:Fallback>
+  </mc:AlternateContent>
+</p:sld>
+</file>
+
+<file path=ppt/slides/slide18.xml><?xml version="1.0" encoding="utf-8"?>
+<p:sld xmlns:a="http://schemas.openxmlformats.org/drawingml/2006/main" xmlns:r="http://schemas.openxmlformats.org/officeDocument/2006/relationships" xmlns:p="http://schemas.openxmlformats.org/presentationml/2006/main">
+  <p:cSld>
+    <p:spTree>
+      <p:nvGrpSpPr>
+        <p:cNvPr id="1" name=""/>
+        <p:cNvGrpSpPr/>
+        <p:nvPr/>
+      </p:nvGrpSpPr>
+      <p:grpSpPr>
+        <a:xfrm>
+          <a:off x="0" y="0"/>
+          <a:ext cx="0" cy="0"/>
+          <a:chOff x="0" y="0"/>
+          <a:chExt cx="0" cy="0"/>
+        </a:xfrm>
+      </p:grpSpPr>
+      <p:sp>
+        <p:nvSpPr>
+          <p:cNvPr id="2" name="Title 1"/>
+          <p:cNvSpPr>
+            <a:spLocks noGrp="1"/>
+          </p:cNvSpPr>
+          <p:nvPr>
+            <p:ph type="title"/>
+          </p:nvPr>
+        </p:nvSpPr>
+        <p:spPr/>
+        <p:txBody>
+          <a:bodyPr/>
+          <a:lstStyle/>
+          <a:p>
+            <a:r>
+              <a:rPr lang="en-CA" b="1" i="1" dirty="0"/>
+              <a:t>L</a:t>
+            </a:r>
+            <a:r>
+              <a:rPr lang="en-CA" b="1" i="1" baseline="-25000" dirty="0"/>
+              <a:t>FI</a:t>
+            </a:r>
+            <a:r>
+              <a:rPr lang="en-CA" dirty="0"/>
+              <a:t>:</a:t>
+            </a:r>
+            <a:r>
+              <a:rPr lang="en-CA" b="1" i="1" dirty="0"/>
+              <a:t> </a:t>
+            </a:r>
+            <a:r>
+              <a:rPr lang="en-CA" dirty="0"/>
+              <a:t>Comparison of Individual Models (70-30)</a:t>
+            </a:r>
+          </a:p>
+        </p:txBody>
+      </p:sp>
+      <p:sp>
+        <p:nvSpPr>
+          <p:cNvPr id="3" name="Text Placeholder 2"/>
+          <p:cNvSpPr>
+            <a:spLocks noGrp="1"/>
+          </p:cNvSpPr>
+          <p:nvPr>
+            <p:ph type="body" idx="1"/>
+          </p:nvPr>
+        </p:nvSpPr>
+        <p:spPr>
+          <a:xfrm>
+            <a:off x="750806" y="1223962"/>
+            <a:ext cx="4919472" cy="823912"/>
+          </a:xfrm>
+        </p:spPr>
+        <p:txBody>
+          <a:bodyPr/>
+          <a:lstStyle/>
+          <a:p>
+            <a:r>
+              <a:rPr lang="en-CA" dirty="0"/>
+              <a:t>Best &amp; Average Models (Training)</a:t>
+            </a:r>
+          </a:p>
+        </p:txBody>
+      </p:sp>
+      <p:pic>
+        <p:nvPicPr>
+          <p:cNvPr id="7" name="Content Placeholder 6"/>
+          <p:cNvPicPr>
+            <a:picLocks noGrp="1" noChangeAspect="1"/>
+          </p:cNvPicPr>
+          <p:nvPr>
+            <p:ph sz="half" idx="2"/>
+          </p:nvPr>
+        </p:nvPicPr>
+        <p:blipFill>
+          <a:blip r:embed="rId3">
+            <a:extLst>
+              <a:ext uri="{28A0092B-C50C-407E-A947-70E740481C1C}">
+                <a14:useLocalDpi xmlns:a14="http://schemas.microsoft.com/office/drawing/2010/main" val="0"/>
+              </a:ext>
+            </a:extLst>
+          </a:blip>
+          <a:stretch>
+            <a:fillRect/>
+          </a:stretch>
+        </p:blipFill>
+        <p:spPr>
+          <a:xfrm>
+            <a:off x="269500" y="2104736"/>
+            <a:ext cx="5882084" cy="4294765"/>
+          </a:xfrm>
+        </p:spPr>
+      </p:pic>
+      <p:sp>
+        <p:nvSpPr>
+          <p:cNvPr id="5" name="Text Placeholder 4"/>
+          <p:cNvSpPr>
+            <a:spLocks noGrp="1"/>
+          </p:cNvSpPr>
+          <p:nvPr>
+            <p:ph type="body" sz="quarter" idx="3"/>
+          </p:nvPr>
+        </p:nvSpPr>
+        <p:spPr>
+          <a:xfrm>
+            <a:off x="6656578" y="1223962"/>
+            <a:ext cx="4919472" cy="823912"/>
+          </a:xfrm>
+        </p:spPr>
+        <p:txBody>
+          <a:bodyPr/>
+          <a:lstStyle/>
+          <a:p>
+            <a:r>
+              <a:rPr lang="en-CA" dirty="0"/>
+              <a:t>Ensemble Testing</a:t>
+            </a:r>
+          </a:p>
+        </p:txBody>
+      </p:sp>
+      <p:pic>
+        <p:nvPicPr>
+          <p:cNvPr id="8" name="Content Placeholder 7"/>
+          <p:cNvPicPr>
+            <a:picLocks noGrp="1" noChangeAspect="1"/>
+          </p:cNvPicPr>
+          <p:nvPr>
+            <p:ph sz="quarter" idx="4"/>
+          </p:nvPr>
+        </p:nvPicPr>
+        <p:blipFill>
+          <a:blip r:embed="rId4">
+            <a:extLst>
+              <a:ext uri="{28A0092B-C50C-407E-A947-70E740481C1C}">
+                <a14:useLocalDpi xmlns:a14="http://schemas.microsoft.com/office/drawing/2010/main" val="0"/>
+              </a:ext>
+            </a:extLst>
+          </a:blip>
+          <a:stretch>
+            <a:fillRect/>
+          </a:stretch>
+        </p:blipFill>
+        <p:spPr>
+          <a:xfrm>
+            <a:off x="6166041" y="2111776"/>
+            <a:ext cx="5900546" cy="4275921"/>
+          </a:xfrm>
+        </p:spPr>
+      </p:pic>
+    </p:spTree>
+    <p:extLst>
+      <p:ext uri="{BB962C8B-B14F-4D97-AF65-F5344CB8AC3E}">
+        <p14:creationId xmlns:p14="http://schemas.microsoft.com/office/powerpoint/2010/main" val="2952001209"/>
+      </p:ext>
+    </p:extLst>
+  </p:cSld>
+  <p:clrMapOvr>
+    <a:masterClrMapping/>
+  </p:clrMapOvr>
+  <mc:AlternateContent xmlns:mc="http://schemas.openxmlformats.org/markup-compatibility/2006" xmlns:p14="http://schemas.microsoft.com/office/powerpoint/2010/main">
+    <mc:Choice Requires="p14">
+      <p:transition spd="med" p14:dur="700">
+        <p:fade/>
+      </p:transition>
+    </mc:Choice>
+    <mc:Fallback xmlns="">
+      <p:transition spd="med">
+        <p:fade/>
+      </p:transition>
+    </mc:Fallback>
+  </mc:AlternateContent>
+</p:sld>
+</file>
+
+<file path=ppt/slides/slide19.xml><?xml version="1.0" encoding="utf-8"?>
+<p:sld xmlns:a="http://schemas.openxmlformats.org/drawingml/2006/main" xmlns:r="http://schemas.openxmlformats.org/officeDocument/2006/relationships" xmlns:p="http://schemas.openxmlformats.org/presentationml/2006/main">
+  <p:cSld>
+    <p:spTree>
+      <p:nvGrpSpPr>
+        <p:cNvPr id="1" name=""/>
+        <p:cNvGrpSpPr/>
+        <p:nvPr/>
+      </p:nvGrpSpPr>
+      <p:grpSpPr>
+        <a:xfrm>
+          <a:off x="0" y="0"/>
+          <a:ext cx="0" cy="0"/>
+          <a:chOff x="0" y="0"/>
+          <a:chExt cx="0" cy="0"/>
+        </a:xfrm>
+      </p:grpSpPr>
+      <p:sp>
+        <p:nvSpPr>
+          <p:cNvPr id="2" name="Title 1"/>
+          <p:cNvSpPr>
+            <a:spLocks noGrp="1"/>
+          </p:cNvSpPr>
+          <p:nvPr>
+            <p:ph type="title"/>
+          </p:nvPr>
+        </p:nvSpPr>
+        <p:spPr/>
+        <p:txBody>
+          <a:bodyPr/>
+          <a:lstStyle/>
+          <a:p>
+            <a:r>
+              <a:rPr lang="en-CA" dirty="0"/>
+              <a:t>Comparison of </a:t>
+            </a:r>
+            <a:r>
+              <a:rPr lang="en-CA" b="1" i="1" dirty="0"/>
+              <a:t>HIGH</a:t>
+            </a:r>
+            <a:r>
+              <a:rPr lang="en-CA" i="1" dirty="0"/>
+              <a:t> and </a:t>
+            </a:r>
+            <a:r>
+              <a:rPr lang="en-CA" b="1" dirty="0"/>
+              <a:t>AVG</a:t>
+            </a:r>
+            <a:endParaRPr lang="en-CA" dirty="0"/>
+          </a:p>
+        </p:txBody>
+      </p:sp>
+      <p:sp>
+        <p:nvSpPr>
+          <p:cNvPr id="3" name="Text Placeholder 2"/>
+          <p:cNvSpPr>
+            <a:spLocks noGrp="1"/>
+          </p:cNvSpPr>
+          <p:nvPr>
+            <p:ph type="body" idx="1"/>
+          </p:nvPr>
+        </p:nvSpPr>
+        <p:spPr>
+          <a:xfrm>
+            <a:off x="2868395" y="1292626"/>
+            <a:ext cx="684294" cy="823912"/>
+          </a:xfrm>
+        </p:spPr>
+        <p:txBody>
+          <a:bodyPr/>
+          <a:lstStyle/>
+          <a:p>
+            <a:r>
+              <a:rPr lang="en-CA" dirty="0"/>
+              <a:t>AVG</a:t>
+            </a:r>
+          </a:p>
+        </p:txBody>
+      </p:sp>
+      <p:pic>
+        <p:nvPicPr>
+          <p:cNvPr id="7" name="Content Placeholder 6"/>
+          <p:cNvPicPr>
+            <a:picLocks noGrp="1" noChangeAspect="1"/>
+          </p:cNvPicPr>
+          <p:nvPr>
+            <p:ph sz="half" idx="2"/>
+          </p:nvPr>
+        </p:nvPicPr>
+        <p:blipFill>
+          <a:blip r:embed="rId3">
+            <a:extLst>
+              <a:ext uri="{28A0092B-C50C-407E-A947-70E740481C1C}">
+                <a14:useLocalDpi xmlns:a14="http://schemas.microsoft.com/office/drawing/2010/main" val="0"/>
+              </a:ext>
+            </a:extLst>
+          </a:blip>
+          <a:stretch>
+            <a:fillRect/>
+          </a:stretch>
+        </p:blipFill>
+        <p:spPr>
+          <a:xfrm>
+            <a:off x="269500" y="2116495"/>
+            <a:ext cx="5882084" cy="4271246"/>
+          </a:xfrm>
+        </p:spPr>
+      </p:pic>
+      <p:sp>
+        <p:nvSpPr>
+          <p:cNvPr id="5" name="Text Placeholder 4"/>
+          <p:cNvSpPr>
+            <a:spLocks noGrp="1"/>
+          </p:cNvSpPr>
+          <p:nvPr>
+            <p:ph type="body" sz="quarter" idx="3"/>
+          </p:nvPr>
+        </p:nvSpPr>
+        <p:spPr>
+          <a:xfrm>
+            <a:off x="8723503" y="1280824"/>
+            <a:ext cx="785622" cy="823912"/>
+          </a:xfrm>
+        </p:spPr>
+        <p:txBody>
+          <a:bodyPr/>
+          <a:lstStyle/>
+          <a:p>
+            <a:r>
+              <a:rPr lang="en-CA" dirty="0"/>
+              <a:t>HIGH</a:t>
+            </a:r>
+          </a:p>
+        </p:txBody>
+      </p:sp>
+      <p:pic>
+        <p:nvPicPr>
+          <p:cNvPr id="8" name="Content Placeholder 7"/>
+          <p:cNvPicPr>
+            <a:picLocks noGrp="1" noChangeAspect="1"/>
+          </p:cNvPicPr>
+          <p:nvPr>
+            <p:ph sz="quarter" idx="4"/>
+          </p:nvPr>
+        </p:nvPicPr>
+        <p:blipFill>
+          <a:blip r:embed="rId4">
+            <a:extLst>
+              <a:ext uri="{28A0092B-C50C-407E-A947-70E740481C1C}">
+                <a14:useLocalDpi xmlns:a14="http://schemas.microsoft.com/office/drawing/2010/main" val="0"/>
+              </a:ext>
+            </a:extLst>
+          </a:blip>
+          <a:stretch>
+            <a:fillRect/>
+          </a:stretch>
+        </p:blipFill>
+        <p:spPr>
+          <a:xfrm>
+            <a:off x="6166041" y="2111776"/>
+            <a:ext cx="5900546" cy="4275921"/>
+          </a:xfrm>
+        </p:spPr>
+      </p:pic>
+    </p:spTree>
+    <p:extLst>
+      <p:ext uri="{BB962C8B-B14F-4D97-AF65-F5344CB8AC3E}">
+        <p14:creationId xmlns:p14="http://schemas.microsoft.com/office/powerpoint/2010/main" val="3074684678"/>
       </p:ext>
     </p:extLst>
   </p:cSld>
@@ -7755,6 +9176,1487 @@
 </p:sld>
 </file>
 
+<file path=ppt/slides/slide20.xml><?xml version="1.0" encoding="utf-8"?>
+<p:sld xmlns:a="http://schemas.openxmlformats.org/drawingml/2006/main" xmlns:r="http://schemas.openxmlformats.org/officeDocument/2006/relationships" xmlns:p="http://schemas.openxmlformats.org/presentationml/2006/main">
+  <p:cSld>
+    <p:spTree>
+      <p:nvGrpSpPr>
+        <p:cNvPr id="1" name=""/>
+        <p:cNvGrpSpPr/>
+        <p:nvPr/>
+      </p:nvGrpSpPr>
+      <p:grpSpPr>
+        <a:xfrm>
+          <a:off x="0" y="0"/>
+          <a:ext cx="0" cy="0"/>
+          <a:chOff x="0" y="0"/>
+          <a:chExt cx="0" cy="0"/>
+        </a:xfrm>
+      </p:grpSpPr>
+      <p:sp>
+        <p:nvSpPr>
+          <p:cNvPr id="2" name="Title 1"/>
+          <p:cNvSpPr>
+            <a:spLocks noGrp="1"/>
+          </p:cNvSpPr>
+          <p:nvPr>
+            <p:ph type="title"/>
+          </p:nvPr>
+        </p:nvSpPr>
+        <p:spPr/>
+        <p:txBody>
+          <a:bodyPr/>
+          <a:lstStyle/>
+          <a:p>
+            <a:r>
+              <a:rPr lang="en-CA" dirty="0"/>
+              <a:t>Ensemble Fitness</a:t>
+            </a:r>
+          </a:p>
+        </p:txBody>
+      </p:sp>
+      <p:graphicFrame>
+        <p:nvGraphicFramePr>
+          <p:cNvPr id="4" name="Content Placeholder 3"/>
+          <p:cNvGraphicFramePr>
+            <a:graphicFrameLocks noGrp="1"/>
+          </p:cNvGraphicFramePr>
+          <p:nvPr>
+            <p:ph idx="1"/>
+            <p:extLst>
+              <p:ext uri="{D42A27DB-BD31-4B8C-83A1-F6EECF244321}">
+                <p14:modId xmlns:p14="http://schemas.microsoft.com/office/powerpoint/2010/main" val="4036487584"/>
+              </p:ext>
+            </p:extLst>
+          </p:nvPr>
+        </p:nvGraphicFramePr>
+        <p:xfrm>
+          <a:off x="1104900" y="1600200"/>
+          <a:ext cx="9980682" cy="2091690"/>
+        </p:xfrm>
+        <a:graphic>
+          <a:graphicData uri="http://schemas.openxmlformats.org/drawingml/2006/table">
+            <a:tbl>
+              <a:tblPr firstRow="1" bandRow="1">
+                <a:tableStyleId>{5C22544A-7EE6-4342-B048-85BDC9FD1C3A}</a:tableStyleId>
+              </a:tblPr>
+              <a:tblGrid>
+                <a:gridCol w="3326894">
+                  <a:extLst>
+                    <a:ext uri="{9D8B030D-6E8A-4147-A177-3AD203B41FA5}">
+                      <a16:colId xmlns:a16="http://schemas.microsoft.com/office/drawing/2014/main" val="1063830725"/>
+                    </a:ext>
+                  </a:extLst>
+                </a:gridCol>
+                <a:gridCol w="3326894">
+                  <a:extLst>
+                    <a:ext uri="{9D8B030D-6E8A-4147-A177-3AD203B41FA5}">
+                      <a16:colId xmlns:a16="http://schemas.microsoft.com/office/drawing/2014/main" val="2742314196"/>
+                    </a:ext>
+                  </a:extLst>
+                </a:gridCol>
+                <a:gridCol w="3326894">
+                  <a:extLst>
+                    <a:ext uri="{9D8B030D-6E8A-4147-A177-3AD203B41FA5}">
+                      <a16:colId xmlns:a16="http://schemas.microsoft.com/office/drawing/2014/main" val="4178842973"/>
+                    </a:ext>
+                  </a:extLst>
+                </a:gridCol>
+              </a:tblGrid>
+              <a:tr h="697230">
+                <a:tc>
+                  <a:txBody>
+                    <a:bodyPr/>
+                    <a:lstStyle/>
+                    <a:p>
+                      <a:pPr algn="ctr"/>
+                      <a:r>
+                        <a:rPr lang="en-CA" dirty="0"/>
+                        <a:t>Language</a:t>
+                      </a:r>
+                    </a:p>
+                  </a:txBody>
+                  <a:tcPr anchor="ctr"/>
+                </a:tc>
+                <a:tc>
+                  <a:txBody>
+                    <a:bodyPr/>
+                    <a:lstStyle/>
+                    <a:p>
+                      <a:pPr algn="ctr"/>
+                      <a:r>
+                        <a:rPr lang="en-CA" dirty="0"/>
+                        <a:t>Ensemble</a:t>
+                      </a:r>
+                      <a:r>
+                        <a:rPr lang="en-CA" baseline="0" dirty="0"/>
+                        <a:t> </a:t>
+                      </a:r>
+                      <a:r>
+                        <a:rPr lang="en-CA" dirty="0"/>
+                        <a:t>Fit</a:t>
+                      </a:r>
+                    </a:p>
+                  </a:txBody>
+                  <a:tcPr anchor="ctr"/>
+                </a:tc>
+                <a:tc>
+                  <a:txBody>
+                    <a:bodyPr/>
+                    <a:lstStyle/>
+                    <a:p>
+                      <a:pPr algn="ctr"/>
+                      <a:r>
+                        <a:rPr lang="en-CA" dirty="0"/>
+                        <a:t>Outliers Removed</a:t>
+                      </a:r>
+                    </a:p>
+                  </a:txBody>
+                  <a:tcPr anchor="ctr"/>
+                </a:tc>
+                <a:extLst>
+                  <a:ext uri="{0D108BD9-81ED-4DB2-BD59-A6C34878D82A}">
+                    <a16:rowId xmlns:a16="http://schemas.microsoft.com/office/drawing/2014/main" val="4032793956"/>
+                  </a:ext>
+                </a:extLst>
+              </a:tr>
+              <a:tr h="697230">
+                <a:tc>
+                  <a:txBody>
+                    <a:bodyPr/>
+                    <a:lstStyle/>
+                    <a:p>
+                      <a:pPr algn="ctr"/>
+                      <a:r>
+                        <a:rPr lang="en-CA" b="1" i="1" dirty="0"/>
+                        <a:t>L</a:t>
+                      </a:r>
+                      <a:r>
+                        <a:rPr lang="en-CA" b="1" i="1" baseline="-25000" dirty="0"/>
+                        <a:t>FI</a:t>
+                      </a:r>
+                      <a:endParaRPr lang="en-CA" b="1" i="1" dirty="0"/>
+                    </a:p>
+                  </a:txBody>
+                  <a:tcPr anchor="ctr"/>
+                </a:tc>
+                <a:tc>
+                  <a:txBody>
+                    <a:bodyPr/>
+                    <a:lstStyle/>
+                    <a:p>
+                      <a:pPr algn="ctr"/>
+                      <a:r>
+                        <a:rPr lang="en-CA" b="0" dirty="0"/>
+                        <a:t>0.057844</a:t>
+                      </a:r>
+                    </a:p>
+                  </a:txBody>
+                  <a:tcPr anchor="ctr"/>
+                </a:tc>
+                <a:tc>
+                  <a:txBody>
+                    <a:bodyPr/>
+                    <a:lstStyle/>
+                    <a:p>
+                      <a:pPr algn="ctr"/>
+                      <a:r>
+                        <a:rPr lang="en-CA" b="0" dirty="0"/>
+                        <a:t>128</a:t>
+                      </a:r>
+                    </a:p>
+                  </a:txBody>
+                  <a:tcPr anchor="ctr"/>
+                </a:tc>
+                <a:extLst>
+                  <a:ext uri="{0D108BD9-81ED-4DB2-BD59-A6C34878D82A}">
+                    <a16:rowId xmlns:a16="http://schemas.microsoft.com/office/drawing/2014/main" val="3865386210"/>
+                  </a:ext>
+                </a:extLst>
+              </a:tr>
+              <a:tr h="697230">
+                <a:tc>
+                  <a:txBody>
+                    <a:bodyPr/>
+                    <a:lstStyle/>
+                    <a:p>
+                      <a:pPr algn="ctr"/>
+                      <a:r>
+                        <a:rPr lang="en-CA" b="1" i="1" dirty="0"/>
+                        <a:t>L</a:t>
+                      </a:r>
+                      <a:r>
+                        <a:rPr lang="en-CA" b="1" i="1" baseline="-25000" dirty="0"/>
+                        <a:t>FI’</a:t>
+                      </a:r>
+                      <a:endParaRPr lang="en-CA" b="1" i="1" dirty="0"/>
+                    </a:p>
+                  </a:txBody>
+                  <a:tcPr anchor="ctr"/>
+                </a:tc>
+                <a:tc>
+                  <a:txBody>
+                    <a:bodyPr/>
+                    <a:lstStyle/>
+                    <a:p>
+                      <a:pPr algn="ctr"/>
+                      <a:r>
+                        <a:rPr lang="en-CA" b="0" dirty="0"/>
+                        <a:t>0.026279</a:t>
+                      </a:r>
+                    </a:p>
+                  </a:txBody>
+                  <a:tcPr anchor="ctr"/>
+                </a:tc>
+                <a:tc>
+                  <a:txBody>
+                    <a:bodyPr/>
+                    <a:lstStyle/>
+                    <a:p>
+                      <a:pPr algn="ctr"/>
+                      <a:r>
+                        <a:rPr lang="en-CA" b="0" dirty="0"/>
+                        <a:t>0</a:t>
+                      </a:r>
+                    </a:p>
+                  </a:txBody>
+                  <a:tcPr anchor="ctr"/>
+                </a:tc>
+                <a:extLst>
+                  <a:ext uri="{0D108BD9-81ED-4DB2-BD59-A6C34878D82A}">
+                    <a16:rowId xmlns:a16="http://schemas.microsoft.com/office/drawing/2014/main" val="331165827"/>
+                  </a:ext>
+                </a:extLst>
+              </a:tr>
+            </a:tbl>
+          </a:graphicData>
+        </a:graphic>
+      </p:graphicFrame>
+    </p:spTree>
+    <p:extLst>
+      <p:ext uri="{BB962C8B-B14F-4D97-AF65-F5344CB8AC3E}">
+        <p14:creationId xmlns:p14="http://schemas.microsoft.com/office/powerpoint/2010/main" val="3535075265"/>
+      </p:ext>
+    </p:extLst>
+  </p:cSld>
+  <p:clrMapOvr>
+    <a:masterClrMapping/>
+  </p:clrMapOvr>
+  <mc:AlternateContent xmlns:mc="http://schemas.openxmlformats.org/markup-compatibility/2006" xmlns:p14="http://schemas.microsoft.com/office/powerpoint/2010/main">
+    <mc:Choice Requires="p14">
+      <p:transition spd="med" p14:dur="700">
+        <p:fade/>
+      </p:transition>
+    </mc:Choice>
+    <mc:Fallback xmlns="">
+      <p:transition spd="med">
+        <p:fade/>
+      </p:transition>
+    </mc:Fallback>
+  </mc:AlternateContent>
+</p:sld>
+</file>
+
+<file path=ppt/slides/slide21.xml><?xml version="1.0" encoding="utf-8"?>
+<p:sld xmlns:a="http://schemas.openxmlformats.org/drawingml/2006/main" xmlns:r="http://schemas.openxmlformats.org/officeDocument/2006/relationships" xmlns:p="http://schemas.openxmlformats.org/presentationml/2006/main">
+  <p:cSld>
+    <p:spTree>
+      <p:nvGrpSpPr>
+        <p:cNvPr id="1" name=""/>
+        <p:cNvGrpSpPr/>
+        <p:nvPr/>
+      </p:nvGrpSpPr>
+      <p:grpSpPr>
+        <a:xfrm>
+          <a:off x="0" y="0"/>
+          <a:ext cx="0" cy="0"/>
+          <a:chOff x="0" y="0"/>
+          <a:chExt cx="0" cy="0"/>
+        </a:xfrm>
+      </p:grpSpPr>
+      <p:sp>
+        <p:nvSpPr>
+          <p:cNvPr id="2" name="Title 1"/>
+          <p:cNvSpPr>
+            <a:spLocks noGrp="1"/>
+          </p:cNvSpPr>
+          <p:nvPr>
+            <p:ph type="title"/>
+          </p:nvPr>
+        </p:nvSpPr>
+        <p:spPr/>
+        <p:txBody>
+          <a:bodyPr/>
+          <a:lstStyle/>
+          <a:p>
+            <a:r>
+              <a:rPr lang="en-CA" dirty="0"/>
+              <a:t>Shifted </a:t>
+            </a:r>
+            <a:r>
+              <a:rPr lang="en-CA" b="1" i="1" dirty="0"/>
+              <a:t>HIGH </a:t>
+            </a:r>
+            <a:r>
+              <a:rPr lang="en-CA" dirty="0"/>
+              <a:t>Ensemble Example</a:t>
+            </a:r>
+          </a:p>
+        </p:txBody>
+      </p:sp>
+      <p:pic>
+        <p:nvPicPr>
+          <p:cNvPr id="4" name="Content Placeholder 3"/>
+          <p:cNvPicPr>
+            <a:picLocks noGrp="1" noChangeAspect="1"/>
+          </p:cNvPicPr>
+          <p:nvPr>
+            <p:ph idx="1"/>
+          </p:nvPr>
+        </p:nvPicPr>
+        <p:blipFill>
+          <a:blip r:embed="rId2">
+            <a:extLst>
+              <a:ext uri="{28A0092B-C50C-407E-A947-70E740481C1C}">
+                <a14:useLocalDpi xmlns:a14="http://schemas.microsoft.com/office/drawing/2010/main" val="0"/>
+              </a:ext>
+            </a:extLst>
+          </a:blip>
+          <a:stretch>
+            <a:fillRect/>
+          </a:stretch>
+        </p:blipFill>
+        <p:spPr>
+          <a:xfrm>
+            <a:off x="2497229" y="1473200"/>
+            <a:ext cx="7196023" cy="5219700"/>
+          </a:xfrm>
+        </p:spPr>
+      </p:pic>
+    </p:spTree>
+    <p:extLst>
+      <p:ext uri="{BB962C8B-B14F-4D97-AF65-F5344CB8AC3E}">
+        <p14:creationId xmlns:p14="http://schemas.microsoft.com/office/powerpoint/2010/main" val="2176589000"/>
+      </p:ext>
+    </p:extLst>
+  </p:cSld>
+  <p:clrMapOvr>
+    <a:masterClrMapping/>
+  </p:clrMapOvr>
+  <mc:AlternateContent xmlns:mc="http://schemas.openxmlformats.org/markup-compatibility/2006" xmlns:p14="http://schemas.microsoft.com/office/powerpoint/2010/main">
+    <mc:Choice Requires="p14">
+      <p:transition spd="med" p14:dur="700">
+        <p:fade/>
+      </p:transition>
+    </mc:Choice>
+    <mc:Fallback xmlns="">
+      <p:transition spd="med">
+        <p:fade/>
+      </p:transition>
+    </mc:Fallback>
+  </mc:AlternateContent>
+</p:sld>
+</file>
+
+<file path=ppt/slides/slide22.xml><?xml version="1.0" encoding="utf-8"?>
+<p:sld xmlns:a="http://schemas.openxmlformats.org/drawingml/2006/main" xmlns:r="http://schemas.openxmlformats.org/officeDocument/2006/relationships" xmlns:p="http://schemas.openxmlformats.org/presentationml/2006/main">
+  <p:cSld>
+    <p:spTree>
+      <p:nvGrpSpPr>
+        <p:cNvPr id="1" name=""/>
+        <p:cNvGrpSpPr/>
+        <p:nvPr/>
+      </p:nvGrpSpPr>
+      <p:grpSpPr>
+        <a:xfrm>
+          <a:off x="0" y="0"/>
+          <a:ext cx="0" cy="0"/>
+          <a:chOff x="0" y="0"/>
+          <a:chExt cx="0" cy="0"/>
+        </a:xfrm>
+      </p:grpSpPr>
+      <p:sp>
+        <p:nvSpPr>
+          <p:cNvPr id="2" name="Title 1"/>
+          <p:cNvSpPr>
+            <a:spLocks noGrp="1"/>
+          </p:cNvSpPr>
+          <p:nvPr>
+            <p:ph type="title"/>
+          </p:nvPr>
+        </p:nvSpPr>
+        <p:spPr/>
+        <p:txBody>
+          <a:bodyPr/>
+          <a:lstStyle/>
+          <a:p>
+            <a:r>
+              <a:rPr lang="en-CA" dirty="0"/>
+              <a:t>Ensemble Fitness Across Experiments</a:t>
+            </a:r>
+          </a:p>
+        </p:txBody>
+      </p:sp>
+      <p:graphicFrame>
+        <p:nvGraphicFramePr>
+          <p:cNvPr id="6" name="Content Placeholder 3"/>
+          <p:cNvGraphicFramePr>
+            <a:graphicFrameLocks/>
+          </p:cNvGraphicFramePr>
+          <p:nvPr>
+            <p:extLst>
+              <p:ext uri="{D42A27DB-BD31-4B8C-83A1-F6EECF244321}">
+                <p14:modId xmlns:p14="http://schemas.microsoft.com/office/powerpoint/2010/main" val="2625265516"/>
+              </p:ext>
+            </p:extLst>
+          </p:nvPr>
+        </p:nvGraphicFramePr>
+        <p:xfrm>
+          <a:off x="1104900" y="1600200"/>
+          <a:ext cx="9980682" cy="4880610"/>
+        </p:xfrm>
+        <a:graphic>
+          <a:graphicData uri="http://schemas.openxmlformats.org/drawingml/2006/table">
+            <a:tbl>
+              <a:tblPr firstRow="1" bandRow="1">
+                <a:tableStyleId>{5C22544A-7EE6-4342-B048-85BDC9FD1C3A}</a:tableStyleId>
+              </a:tblPr>
+              <a:tblGrid>
+                <a:gridCol w="3326894">
+                  <a:extLst>
+                    <a:ext uri="{9D8B030D-6E8A-4147-A177-3AD203B41FA5}">
+                      <a16:colId xmlns:a16="http://schemas.microsoft.com/office/drawing/2014/main" val="1063830725"/>
+                    </a:ext>
+                  </a:extLst>
+                </a:gridCol>
+                <a:gridCol w="3326894">
+                  <a:extLst>
+                    <a:ext uri="{9D8B030D-6E8A-4147-A177-3AD203B41FA5}">
+                      <a16:colId xmlns:a16="http://schemas.microsoft.com/office/drawing/2014/main" val="2742314196"/>
+                    </a:ext>
+                  </a:extLst>
+                </a:gridCol>
+                <a:gridCol w="3326894">
+                  <a:extLst>
+                    <a:ext uri="{9D8B030D-6E8A-4147-A177-3AD203B41FA5}">
+                      <a16:colId xmlns:a16="http://schemas.microsoft.com/office/drawing/2014/main" val="4178842973"/>
+                    </a:ext>
+                  </a:extLst>
+                </a:gridCol>
+              </a:tblGrid>
+              <a:tr h="697230">
+                <a:tc>
+                  <a:txBody>
+                    <a:bodyPr/>
+                    <a:lstStyle/>
+                    <a:p>
+                      <a:pPr algn="ctr"/>
+                      <a:r>
+                        <a:rPr lang="en-CA" dirty="0"/>
+                        <a:t>Language</a:t>
+                      </a:r>
+                    </a:p>
+                  </a:txBody>
+                  <a:tcPr anchor="ctr"/>
+                </a:tc>
+                <a:tc>
+                  <a:txBody>
+                    <a:bodyPr/>
+                    <a:lstStyle/>
+                    <a:p>
+                      <a:pPr algn="ctr"/>
+                      <a:r>
+                        <a:rPr lang="en-CA" dirty="0"/>
+                        <a:t>Ensemble</a:t>
+                      </a:r>
+                      <a:r>
+                        <a:rPr lang="en-CA" baseline="0" dirty="0"/>
+                        <a:t> </a:t>
+                      </a:r>
+                      <a:r>
+                        <a:rPr lang="en-CA" dirty="0"/>
+                        <a:t>Fit</a:t>
+                      </a:r>
+                    </a:p>
+                  </a:txBody>
+                  <a:tcPr anchor="ctr"/>
+                </a:tc>
+                <a:tc>
+                  <a:txBody>
+                    <a:bodyPr/>
+                    <a:lstStyle/>
+                    <a:p>
+                      <a:pPr algn="ctr"/>
+                      <a:r>
+                        <a:rPr lang="en-CA" dirty="0"/>
+                        <a:t>Outliers Removed</a:t>
+                      </a:r>
+                    </a:p>
+                  </a:txBody>
+                  <a:tcPr anchor="ctr"/>
+                </a:tc>
+                <a:extLst>
+                  <a:ext uri="{0D108BD9-81ED-4DB2-BD59-A6C34878D82A}">
+                    <a16:rowId xmlns:a16="http://schemas.microsoft.com/office/drawing/2014/main" val="4032793956"/>
+                  </a:ext>
+                </a:extLst>
+              </a:tr>
+              <a:tr h="697230">
+                <a:tc>
+                  <a:txBody>
+                    <a:bodyPr/>
+                    <a:lstStyle/>
+                    <a:p>
+                      <a:pPr algn="ctr"/>
+                      <a:r>
+                        <a:rPr lang="en-CA" b="1" i="1" dirty="0"/>
+                        <a:t>L</a:t>
+                      </a:r>
+                    </a:p>
+                  </a:txBody>
+                  <a:tcPr anchor="ctr"/>
+                </a:tc>
+                <a:tc>
+                  <a:txBody>
+                    <a:bodyPr/>
+                    <a:lstStyle/>
+                    <a:p>
+                      <a:pPr algn="ctr"/>
+                      <a:r>
+                        <a:rPr lang="en-CA" b="0" dirty="0"/>
+                        <a:t>0.194444</a:t>
+                      </a:r>
+                    </a:p>
+                  </a:txBody>
+                  <a:tcPr anchor="ctr"/>
+                </a:tc>
+                <a:tc>
+                  <a:txBody>
+                    <a:bodyPr/>
+                    <a:lstStyle/>
+                    <a:p>
+                      <a:pPr algn="ctr"/>
+                      <a:r>
+                        <a:rPr lang="en-CA" b="0" dirty="0"/>
+                        <a:t>38</a:t>
+                      </a:r>
+                    </a:p>
+                  </a:txBody>
+                  <a:tcPr anchor="ctr"/>
+                </a:tc>
+                <a:extLst>
+                  <a:ext uri="{0D108BD9-81ED-4DB2-BD59-A6C34878D82A}">
+                    <a16:rowId xmlns:a16="http://schemas.microsoft.com/office/drawing/2014/main" val="446838915"/>
+                  </a:ext>
+                </a:extLst>
+              </a:tr>
+              <a:tr h="697230">
+                <a:tc>
+                  <a:txBody>
+                    <a:bodyPr/>
+                    <a:lstStyle/>
+                    <a:p>
+                      <a:pPr algn="ctr"/>
+                      <a:r>
+                        <a:rPr lang="en-CA" b="1" i="1" dirty="0"/>
+                        <a:t>L</a:t>
+                      </a:r>
+                      <a:r>
+                        <a:rPr lang="en-CA" b="1" i="1" baseline="-25000" dirty="0"/>
+                        <a:t>IF</a:t>
+                      </a:r>
+                      <a:endParaRPr lang="en-CA" b="1" i="1" dirty="0"/>
+                    </a:p>
+                  </a:txBody>
+                  <a:tcPr anchor="ctr"/>
+                </a:tc>
+                <a:tc>
+                  <a:txBody>
+                    <a:bodyPr/>
+                    <a:lstStyle/>
+                    <a:p>
+                      <a:pPr algn="ctr"/>
+                      <a:r>
+                        <a:rPr lang="en-CA" b="0" dirty="0"/>
+                        <a:t>0.185474</a:t>
+                      </a:r>
+                    </a:p>
+                  </a:txBody>
+                  <a:tcPr anchor="ctr"/>
+                </a:tc>
+                <a:tc>
+                  <a:txBody>
+                    <a:bodyPr/>
+                    <a:lstStyle/>
+                    <a:p>
+                      <a:pPr algn="ctr"/>
+                      <a:r>
+                        <a:rPr lang="en-CA" b="0" dirty="0"/>
+                        <a:t>43</a:t>
+                      </a:r>
+                    </a:p>
+                  </a:txBody>
+                  <a:tcPr anchor="ctr"/>
+                </a:tc>
+                <a:extLst>
+                  <a:ext uri="{0D108BD9-81ED-4DB2-BD59-A6C34878D82A}">
+                    <a16:rowId xmlns:a16="http://schemas.microsoft.com/office/drawing/2014/main" val="2229032511"/>
+                  </a:ext>
+                </a:extLst>
+              </a:tr>
+              <a:tr h="697230">
+                <a:tc>
+                  <a:txBody>
+                    <a:bodyPr/>
+                    <a:lstStyle/>
+                    <a:p>
+                      <a:pPr algn="ctr"/>
+                      <a:r>
+                        <a:rPr lang="en-CA" b="1" i="1" dirty="0"/>
+                        <a:t>L</a:t>
+                      </a:r>
+                      <a:r>
+                        <a:rPr lang="en-CA" b="1" i="1" baseline="-25000" dirty="0"/>
+                        <a:t>ST</a:t>
+                      </a:r>
+                      <a:endParaRPr lang="en-CA" b="1" i="1" dirty="0"/>
+                    </a:p>
+                  </a:txBody>
+                  <a:tcPr anchor="ctr"/>
+                </a:tc>
+                <a:tc>
+                  <a:txBody>
+                    <a:bodyPr/>
+                    <a:lstStyle/>
+                    <a:p>
+                      <a:pPr algn="ctr"/>
+                      <a:r>
+                        <a:rPr lang="en-CA" b="0" dirty="0"/>
+                        <a:t>0.073232</a:t>
+                      </a:r>
+                    </a:p>
+                  </a:txBody>
+                  <a:tcPr anchor="ctr"/>
+                </a:tc>
+                <a:tc>
+                  <a:txBody>
+                    <a:bodyPr/>
+                    <a:lstStyle/>
+                    <a:p>
+                      <a:pPr algn="ctr"/>
+                      <a:r>
+                        <a:rPr lang="en-CA" b="0" dirty="0"/>
+                        <a:t>18</a:t>
+                      </a:r>
+                    </a:p>
+                  </a:txBody>
+                  <a:tcPr anchor="ctr"/>
+                </a:tc>
+                <a:extLst>
+                  <a:ext uri="{0D108BD9-81ED-4DB2-BD59-A6C34878D82A}">
+                    <a16:rowId xmlns:a16="http://schemas.microsoft.com/office/drawing/2014/main" val="3178529980"/>
+                  </a:ext>
+                </a:extLst>
+              </a:tr>
+              <a:tr h="697230">
+                <a:tc>
+                  <a:txBody>
+                    <a:bodyPr/>
+                    <a:lstStyle/>
+                    <a:p>
+                      <a:pPr algn="ctr"/>
+                      <a:r>
+                        <a:rPr lang="en-CA" b="1" i="1" dirty="0"/>
+                        <a:t>L</a:t>
+                      </a:r>
+                      <a:r>
+                        <a:rPr lang="en-CA" b="1" i="1" baseline="-25000" dirty="0"/>
+                        <a:t>ST’</a:t>
+                      </a:r>
+                      <a:endParaRPr lang="en-CA" b="1" i="1" dirty="0"/>
+                    </a:p>
+                  </a:txBody>
+                  <a:tcPr anchor="ctr"/>
+                </a:tc>
+                <a:tc>
+                  <a:txBody>
+                    <a:bodyPr/>
+                    <a:lstStyle/>
+                    <a:p>
+                      <a:pPr algn="ctr"/>
+                      <a:r>
+                        <a:rPr lang="en-CA" b="0" dirty="0"/>
+                        <a:t>0.026279</a:t>
+                      </a:r>
+                    </a:p>
+                  </a:txBody>
+                  <a:tcPr anchor="ctr"/>
+                </a:tc>
+                <a:tc>
+                  <a:txBody>
+                    <a:bodyPr/>
+                    <a:lstStyle/>
+                    <a:p>
+                      <a:pPr algn="ctr"/>
+                      <a:r>
+                        <a:rPr lang="en-CA" b="0" dirty="0"/>
+                        <a:t>111</a:t>
+                      </a:r>
+                    </a:p>
+                  </a:txBody>
+                  <a:tcPr anchor="ctr"/>
+                </a:tc>
+                <a:extLst>
+                  <a:ext uri="{0D108BD9-81ED-4DB2-BD59-A6C34878D82A}">
+                    <a16:rowId xmlns:a16="http://schemas.microsoft.com/office/drawing/2014/main" val="4239658633"/>
+                  </a:ext>
+                </a:extLst>
+              </a:tr>
+              <a:tr h="697230">
+                <a:tc>
+                  <a:txBody>
+                    <a:bodyPr/>
+                    <a:lstStyle/>
+                    <a:p>
+                      <a:pPr algn="ctr"/>
+                      <a:r>
+                        <a:rPr lang="en-CA" b="1" i="1" dirty="0"/>
+                        <a:t>L</a:t>
+                      </a:r>
+                      <a:r>
+                        <a:rPr lang="en-CA" b="1" i="1" baseline="-25000" dirty="0"/>
+                        <a:t>FI</a:t>
+                      </a:r>
+                      <a:endParaRPr lang="en-CA" b="1" i="1" dirty="0"/>
+                    </a:p>
+                  </a:txBody>
+                  <a:tcPr anchor="ctr"/>
+                </a:tc>
+                <a:tc>
+                  <a:txBody>
+                    <a:bodyPr/>
+                    <a:lstStyle/>
+                    <a:p>
+                      <a:pPr algn="ctr"/>
+                      <a:r>
+                        <a:rPr lang="en-CA" b="0" dirty="0"/>
+                        <a:t>0.057844</a:t>
+                      </a:r>
+                    </a:p>
+                  </a:txBody>
+                  <a:tcPr anchor="ctr"/>
+                </a:tc>
+                <a:tc>
+                  <a:txBody>
+                    <a:bodyPr/>
+                    <a:lstStyle/>
+                    <a:p>
+                      <a:pPr algn="ctr"/>
+                      <a:r>
+                        <a:rPr lang="en-CA" b="0" dirty="0"/>
+                        <a:t>128</a:t>
+                      </a:r>
+                    </a:p>
+                  </a:txBody>
+                  <a:tcPr anchor="ctr"/>
+                </a:tc>
+                <a:extLst>
+                  <a:ext uri="{0D108BD9-81ED-4DB2-BD59-A6C34878D82A}">
+                    <a16:rowId xmlns:a16="http://schemas.microsoft.com/office/drawing/2014/main" val="3865386210"/>
+                  </a:ext>
+                </a:extLst>
+              </a:tr>
+              <a:tr h="697230">
+                <a:tc>
+                  <a:txBody>
+                    <a:bodyPr/>
+                    <a:lstStyle/>
+                    <a:p>
+                      <a:pPr algn="ctr"/>
+                      <a:r>
+                        <a:rPr lang="en-CA" b="1" i="1" dirty="0"/>
+                        <a:t>L</a:t>
+                      </a:r>
+                      <a:r>
+                        <a:rPr lang="en-CA" b="1" i="1" baseline="-25000" dirty="0"/>
+                        <a:t>FI’</a:t>
+                      </a:r>
+                      <a:endParaRPr lang="en-CA" b="1" i="1" dirty="0"/>
+                    </a:p>
+                  </a:txBody>
+                  <a:tcPr anchor="ctr"/>
+                </a:tc>
+                <a:tc>
+                  <a:txBody>
+                    <a:bodyPr/>
+                    <a:lstStyle/>
+                    <a:p>
+                      <a:pPr algn="ctr"/>
+                      <a:r>
+                        <a:rPr lang="en-CA" b="0" dirty="0"/>
+                        <a:t>0.026279</a:t>
+                      </a:r>
+                    </a:p>
+                  </a:txBody>
+                  <a:tcPr anchor="ctr"/>
+                </a:tc>
+                <a:tc>
+                  <a:txBody>
+                    <a:bodyPr/>
+                    <a:lstStyle/>
+                    <a:p>
+                      <a:pPr algn="ctr"/>
+                      <a:r>
+                        <a:rPr lang="en-CA" b="0" dirty="0"/>
+                        <a:t>0</a:t>
+                      </a:r>
+                    </a:p>
+                  </a:txBody>
+                  <a:tcPr anchor="ctr"/>
+                </a:tc>
+                <a:extLst>
+                  <a:ext uri="{0D108BD9-81ED-4DB2-BD59-A6C34878D82A}">
+                    <a16:rowId xmlns:a16="http://schemas.microsoft.com/office/drawing/2014/main" val="331165827"/>
+                  </a:ext>
+                </a:extLst>
+              </a:tr>
+            </a:tbl>
+          </a:graphicData>
+        </a:graphic>
+      </p:graphicFrame>
+    </p:spTree>
+    <p:extLst>
+      <p:ext uri="{BB962C8B-B14F-4D97-AF65-F5344CB8AC3E}">
+        <p14:creationId xmlns:p14="http://schemas.microsoft.com/office/powerpoint/2010/main" val="2304331823"/>
+      </p:ext>
+    </p:extLst>
+  </p:cSld>
+  <p:clrMapOvr>
+    <a:masterClrMapping/>
+  </p:clrMapOvr>
+  <mc:AlternateContent xmlns:mc="http://schemas.openxmlformats.org/markup-compatibility/2006" xmlns:p14="http://schemas.microsoft.com/office/powerpoint/2010/main">
+    <mc:Choice Requires="p14">
+      <p:transition spd="med" p14:dur="700">
+        <p:fade/>
+      </p:transition>
+    </mc:Choice>
+    <mc:Fallback xmlns="">
+      <p:transition spd="med">
+        <p:fade/>
+      </p:transition>
+    </mc:Fallback>
+  </mc:AlternateContent>
+</p:sld>
+</file>
+
+<file path=ppt/slides/slide23.xml><?xml version="1.0" encoding="utf-8"?>
+<p:sld xmlns:a="http://schemas.openxmlformats.org/drawingml/2006/main" xmlns:r="http://schemas.openxmlformats.org/officeDocument/2006/relationships" xmlns:p="http://schemas.openxmlformats.org/presentationml/2006/main">
+  <p:cSld>
+    <p:spTree>
+      <p:nvGrpSpPr>
+        <p:cNvPr id="1" name=""/>
+        <p:cNvGrpSpPr/>
+        <p:nvPr/>
+      </p:nvGrpSpPr>
+      <p:grpSpPr>
+        <a:xfrm>
+          <a:off x="0" y="0"/>
+          <a:ext cx="0" cy="0"/>
+          <a:chOff x="0" y="0"/>
+          <a:chExt cx="0" cy="0"/>
+        </a:xfrm>
+      </p:grpSpPr>
+      <p:sp>
+        <p:nvSpPr>
+          <p:cNvPr id="2" name="Title 1"/>
+          <p:cNvSpPr>
+            <a:spLocks noGrp="1"/>
+          </p:cNvSpPr>
+          <p:nvPr>
+            <p:ph type="title"/>
+          </p:nvPr>
+        </p:nvSpPr>
+        <p:spPr/>
+        <p:txBody>
+          <a:bodyPr/>
+          <a:lstStyle/>
+          <a:p>
+            <a:r>
+              <a:rPr lang="en-CA" dirty="0"/>
+              <a:t>Ensemble Fitness Across Experiments</a:t>
+            </a:r>
+          </a:p>
+        </p:txBody>
+      </p:sp>
+      <p:graphicFrame>
+        <p:nvGraphicFramePr>
+          <p:cNvPr id="6" name="Content Placeholder 3"/>
+          <p:cNvGraphicFramePr>
+            <a:graphicFrameLocks/>
+          </p:cNvGraphicFramePr>
+          <p:nvPr>
+            <p:extLst>
+              <p:ext uri="{D42A27DB-BD31-4B8C-83A1-F6EECF244321}">
+                <p14:modId xmlns:p14="http://schemas.microsoft.com/office/powerpoint/2010/main" val="2226128895"/>
+              </p:ext>
+            </p:extLst>
+          </p:nvPr>
+        </p:nvGraphicFramePr>
+        <p:xfrm>
+          <a:off x="1104900" y="1600200"/>
+          <a:ext cx="9980682" cy="4880610"/>
+        </p:xfrm>
+        <a:graphic>
+          <a:graphicData uri="http://schemas.openxmlformats.org/drawingml/2006/table">
+            <a:tbl>
+              <a:tblPr firstRow="1" bandRow="1">
+                <a:tableStyleId>{5C22544A-7EE6-4342-B048-85BDC9FD1C3A}</a:tableStyleId>
+              </a:tblPr>
+              <a:tblGrid>
+                <a:gridCol w="3326894">
+                  <a:extLst>
+                    <a:ext uri="{9D8B030D-6E8A-4147-A177-3AD203B41FA5}">
+                      <a16:colId xmlns:a16="http://schemas.microsoft.com/office/drawing/2014/main" val="1063830725"/>
+                    </a:ext>
+                  </a:extLst>
+                </a:gridCol>
+                <a:gridCol w="3326894">
+                  <a:extLst>
+                    <a:ext uri="{9D8B030D-6E8A-4147-A177-3AD203B41FA5}">
+                      <a16:colId xmlns:a16="http://schemas.microsoft.com/office/drawing/2014/main" val="2742314196"/>
+                    </a:ext>
+                  </a:extLst>
+                </a:gridCol>
+                <a:gridCol w="3326894">
+                  <a:extLst>
+                    <a:ext uri="{9D8B030D-6E8A-4147-A177-3AD203B41FA5}">
+                      <a16:colId xmlns:a16="http://schemas.microsoft.com/office/drawing/2014/main" val="4178842973"/>
+                    </a:ext>
+                  </a:extLst>
+                </a:gridCol>
+              </a:tblGrid>
+              <a:tr h="697230">
+                <a:tc>
+                  <a:txBody>
+                    <a:bodyPr/>
+                    <a:lstStyle/>
+                    <a:p>
+                      <a:pPr algn="ctr"/>
+                      <a:r>
+                        <a:rPr lang="en-CA" dirty="0"/>
+                        <a:t>Language</a:t>
+                      </a:r>
+                    </a:p>
+                  </a:txBody>
+                  <a:tcPr anchor="ctr"/>
+                </a:tc>
+                <a:tc>
+                  <a:txBody>
+                    <a:bodyPr/>
+                    <a:lstStyle/>
+                    <a:p>
+                      <a:pPr algn="ctr"/>
+                      <a:r>
+                        <a:rPr lang="en-CA" dirty="0"/>
+                        <a:t>Ensemble</a:t>
+                      </a:r>
+                      <a:r>
+                        <a:rPr lang="en-CA" baseline="0" dirty="0"/>
+                        <a:t> </a:t>
+                      </a:r>
+                      <a:r>
+                        <a:rPr lang="en-CA" dirty="0"/>
+                        <a:t>Fit</a:t>
+                      </a:r>
+                    </a:p>
+                  </a:txBody>
+                  <a:tcPr anchor="ctr"/>
+                </a:tc>
+                <a:tc>
+                  <a:txBody>
+                    <a:bodyPr/>
+                    <a:lstStyle/>
+                    <a:p>
+                      <a:pPr algn="ctr"/>
+                      <a:r>
+                        <a:rPr lang="en-CA" dirty="0"/>
+                        <a:t>Outliers Removed</a:t>
+                      </a:r>
+                    </a:p>
+                  </a:txBody>
+                  <a:tcPr anchor="ctr"/>
+                </a:tc>
+                <a:extLst>
+                  <a:ext uri="{0D108BD9-81ED-4DB2-BD59-A6C34878D82A}">
+                    <a16:rowId xmlns:a16="http://schemas.microsoft.com/office/drawing/2014/main" val="4032793956"/>
+                  </a:ext>
+                </a:extLst>
+              </a:tr>
+              <a:tr h="697230">
+                <a:tc>
+                  <a:txBody>
+                    <a:bodyPr/>
+                    <a:lstStyle/>
+                    <a:p>
+                      <a:pPr algn="ctr"/>
+                      <a:r>
+                        <a:rPr lang="en-CA" b="1" i="1" dirty="0"/>
+                        <a:t>L</a:t>
+                      </a:r>
+                    </a:p>
+                  </a:txBody>
+                  <a:tcPr anchor="ctr"/>
+                </a:tc>
+                <a:tc>
+                  <a:txBody>
+                    <a:bodyPr/>
+                    <a:lstStyle/>
+                    <a:p>
+                      <a:pPr algn="ctr"/>
+                      <a:r>
+                        <a:rPr lang="en-CA" b="0" dirty="0"/>
+                        <a:t>0.194444</a:t>
+                      </a:r>
+                    </a:p>
+                  </a:txBody>
+                  <a:tcPr anchor="ctr"/>
+                </a:tc>
+                <a:tc>
+                  <a:txBody>
+                    <a:bodyPr/>
+                    <a:lstStyle/>
+                    <a:p>
+                      <a:pPr algn="ctr"/>
+                      <a:r>
+                        <a:rPr lang="en-CA" b="0" dirty="0"/>
+                        <a:t>38</a:t>
+                      </a:r>
+                    </a:p>
+                  </a:txBody>
+                  <a:tcPr anchor="ctr"/>
+                </a:tc>
+                <a:extLst>
+                  <a:ext uri="{0D108BD9-81ED-4DB2-BD59-A6C34878D82A}">
+                    <a16:rowId xmlns:a16="http://schemas.microsoft.com/office/drawing/2014/main" val="446838915"/>
+                  </a:ext>
+                </a:extLst>
+              </a:tr>
+              <a:tr h="697230">
+                <a:tc>
+                  <a:txBody>
+                    <a:bodyPr/>
+                    <a:lstStyle/>
+                    <a:p>
+                      <a:pPr algn="ctr"/>
+                      <a:r>
+                        <a:rPr lang="en-CA" b="1" i="1" dirty="0"/>
+                        <a:t>L</a:t>
+                      </a:r>
+                      <a:r>
+                        <a:rPr lang="en-CA" b="1" i="1" baseline="-25000" dirty="0"/>
+                        <a:t>IF</a:t>
+                      </a:r>
+                      <a:endParaRPr lang="en-CA" b="1" i="1" dirty="0"/>
+                    </a:p>
+                  </a:txBody>
+                  <a:tcPr anchor="ctr"/>
+                </a:tc>
+                <a:tc>
+                  <a:txBody>
+                    <a:bodyPr/>
+                    <a:lstStyle/>
+                    <a:p>
+                      <a:pPr algn="ctr"/>
+                      <a:r>
+                        <a:rPr lang="en-CA" b="0" dirty="0"/>
+                        <a:t>0.185474</a:t>
+                      </a:r>
+                    </a:p>
+                  </a:txBody>
+                  <a:tcPr anchor="ctr"/>
+                </a:tc>
+                <a:tc>
+                  <a:txBody>
+                    <a:bodyPr/>
+                    <a:lstStyle/>
+                    <a:p>
+                      <a:pPr algn="ctr"/>
+                      <a:r>
+                        <a:rPr lang="en-CA" b="0" dirty="0"/>
+                        <a:t>43</a:t>
+                      </a:r>
+                    </a:p>
+                  </a:txBody>
+                  <a:tcPr anchor="ctr"/>
+                </a:tc>
+                <a:extLst>
+                  <a:ext uri="{0D108BD9-81ED-4DB2-BD59-A6C34878D82A}">
+                    <a16:rowId xmlns:a16="http://schemas.microsoft.com/office/drawing/2014/main" val="2229032511"/>
+                  </a:ext>
+                </a:extLst>
+              </a:tr>
+              <a:tr h="697230">
+                <a:tc>
+                  <a:txBody>
+                    <a:bodyPr/>
+                    <a:lstStyle/>
+                    <a:p>
+                      <a:pPr algn="ctr"/>
+                      <a:r>
+                        <a:rPr lang="en-CA" b="1" i="1" dirty="0"/>
+                        <a:t>L</a:t>
+                      </a:r>
+                      <a:r>
+                        <a:rPr lang="en-CA" b="1" i="1" baseline="-25000" dirty="0"/>
+                        <a:t>ST</a:t>
+                      </a:r>
+                      <a:endParaRPr lang="en-CA" b="1" i="1" dirty="0"/>
+                    </a:p>
+                  </a:txBody>
+                  <a:tcPr anchor="ctr"/>
+                </a:tc>
+                <a:tc>
+                  <a:txBody>
+                    <a:bodyPr/>
+                    <a:lstStyle/>
+                    <a:p>
+                      <a:pPr algn="ctr"/>
+                      <a:r>
+                        <a:rPr lang="en-CA" b="0" dirty="0"/>
+                        <a:t>0.073232</a:t>
+                      </a:r>
+                    </a:p>
+                  </a:txBody>
+                  <a:tcPr anchor="ctr"/>
+                </a:tc>
+                <a:tc>
+                  <a:txBody>
+                    <a:bodyPr/>
+                    <a:lstStyle/>
+                    <a:p>
+                      <a:pPr algn="ctr"/>
+                      <a:r>
+                        <a:rPr lang="en-CA" b="0" dirty="0"/>
+                        <a:t>18</a:t>
+                      </a:r>
+                    </a:p>
+                  </a:txBody>
+                  <a:tcPr anchor="ctr"/>
+                </a:tc>
+                <a:extLst>
+                  <a:ext uri="{0D108BD9-81ED-4DB2-BD59-A6C34878D82A}">
+                    <a16:rowId xmlns:a16="http://schemas.microsoft.com/office/drawing/2014/main" val="3178529980"/>
+                  </a:ext>
+                </a:extLst>
+              </a:tr>
+              <a:tr h="697230">
+                <a:tc>
+                  <a:txBody>
+                    <a:bodyPr/>
+                    <a:lstStyle/>
+                    <a:p>
+                      <a:pPr algn="ctr"/>
+                      <a:r>
+                        <a:rPr lang="en-CA" b="1" i="1" dirty="0"/>
+                        <a:t>L</a:t>
+                      </a:r>
+                      <a:r>
+                        <a:rPr lang="en-CA" b="1" i="1" baseline="-25000" dirty="0"/>
+                        <a:t>ST’</a:t>
+                      </a:r>
+                      <a:endParaRPr lang="en-CA" b="1" i="1" dirty="0"/>
+                    </a:p>
+                  </a:txBody>
+                  <a:tcPr anchor="ctr"/>
+                </a:tc>
+                <a:tc>
+                  <a:txBody>
+                    <a:bodyPr/>
+                    <a:lstStyle/>
+                    <a:p>
+                      <a:pPr algn="ctr"/>
+                      <a:r>
+                        <a:rPr lang="en-CA" b="0" dirty="0">
+                          <a:solidFill>
+                            <a:srgbClr val="FF0000"/>
+                          </a:solidFill>
+                        </a:rPr>
+                        <a:t>0.026279</a:t>
+                      </a:r>
+                    </a:p>
+                  </a:txBody>
+                  <a:tcPr anchor="ctr"/>
+                </a:tc>
+                <a:tc>
+                  <a:txBody>
+                    <a:bodyPr/>
+                    <a:lstStyle/>
+                    <a:p>
+                      <a:pPr algn="ctr"/>
+                      <a:r>
+                        <a:rPr lang="en-CA" b="0" dirty="0"/>
+                        <a:t>111</a:t>
+                      </a:r>
+                    </a:p>
+                  </a:txBody>
+                  <a:tcPr anchor="ctr"/>
+                </a:tc>
+                <a:extLst>
+                  <a:ext uri="{0D108BD9-81ED-4DB2-BD59-A6C34878D82A}">
+                    <a16:rowId xmlns:a16="http://schemas.microsoft.com/office/drawing/2014/main" val="4239658633"/>
+                  </a:ext>
+                </a:extLst>
+              </a:tr>
+              <a:tr h="697230">
+                <a:tc>
+                  <a:txBody>
+                    <a:bodyPr/>
+                    <a:lstStyle/>
+                    <a:p>
+                      <a:pPr algn="ctr"/>
+                      <a:r>
+                        <a:rPr lang="en-CA" b="1" i="1" dirty="0"/>
+                        <a:t>L</a:t>
+                      </a:r>
+                      <a:r>
+                        <a:rPr lang="en-CA" b="1" i="1" baseline="-25000" dirty="0"/>
+                        <a:t>FI</a:t>
+                      </a:r>
+                      <a:endParaRPr lang="en-CA" b="1" i="1" dirty="0"/>
+                    </a:p>
+                  </a:txBody>
+                  <a:tcPr anchor="ctr"/>
+                </a:tc>
+                <a:tc>
+                  <a:txBody>
+                    <a:bodyPr/>
+                    <a:lstStyle/>
+                    <a:p>
+                      <a:pPr algn="ctr"/>
+                      <a:r>
+                        <a:rPr lang="en-CA" b="0" dirty="0"/>
+                        <a:t>0.057844</a:t>
+                      </a:r>
+                    </a:p>
+                  </a:txBody>
+                  <a:tcPr anchor="ctr"/>
+                </a:tc>
+                <a:tc>
+                  <a:txBody>
+                    <a:bodyPr/>
+                    <a:lstStyle/>
+                    <a:p>
+                      <a:pPr algn="ctr"/>
+                      <a:r>
+                        <a:rPr lang="en-CA" b="0" dirty="0"/>
+                        <a:t>128</a:t>
+                      </a:r>
+                    </a:p>
+                  </a:txBody>
+                  <a:tcPr anchor="ctr"/>
+                </a:tc>
+                <a:extLst>
+                  <a:ext uri="{0D108BD9-81ED-4DB2-BD59-A6C34878D82A}">
+                    <a16:rowId xmlns:a16="http://schemas.microsoft.com/office/drawing/2014/main" val="3865386210"/>
+                  </a:ext>
+                </a:extLst>
+              </a:tr>
+              <a:tr h="697230">
+                <a:tc>
+                  <a:txBody>
+                    <a:bodyPr/>
+                    <a:lstStyle/>
+                    <a:p>
+                      <a:pPr algn="ctr"/>
+                      <a:r>
+                        <a:rPr lang="en-CA" b="1" i="1" dirty="0"/>
+                        <a:t>L</a:t>
+                      </a:r>
+                      <a:r>
+                        <a:rPr lang="en-CA" b="1" i="1" baseline="-25000" dirty="0"/>
+                        <a:t>FI’</a:t>
+                      </a:r>
+                      <a:endParaRPr lang="en-CA" b="1" i="1" dirty="0"/>
+                    </a:p>
+                  </a:txBody>
+                  <a:tcPr anchor="ctr"/>
+                </a:tc>
+                <a:tc>
+                  <a:txBody>
+                    <a:bodyPr/>
+                    <a:lstStyle/>
+                    <a:p>
+                      <a:pPr algn="ctr"/>
+                      <a:r>
+                        <a:rPr lang="en-CA" b="0" dirty="0">
+                          <a:solidFill>
+                            <a:srgbClr val="FF0000"/>
+                          </a:solidFill>
+                        </a:rPr>
+                        <a:t>0.026279</a:t>
+                      </a:r>
+                    </a:p>
+                  </a:txBody>
+                  <a:tcPr anchor="ctr"/>
+                </a:tc>
+                <a:tc>
+                  <a:txBody>
+                    <a:bodyPr/>
+                    <a:lstStyle/>
+                    <a:p>
+                      <a:pPr algn="ctr"/>
+                      <a:r>
+                        <a:rPr lang="en-CA" b="0" dirty="0"/>
+                        <a:t>0</a:t>
+                      </a:r>
+                    </a:p>
+                  </a:txBody>
+                  <a:tcPr anchor="ctr"/>
+                </a:tc>
+                <a:extLst>
+                  <a:ext uri="{0D108BD9-81ED-4DB2-BD59-A6C34878D82A}">
+                    <a16:rowId xmlns:a16="http://schemas.microsoft.com/office/drawing/2014/main" val="331165827"/>
+                  </a:ext>
+                </a:extLst>
+              </a:tr>
+            </a:tbl>
+          </a:graphicData>
+        </a:graphic>
+      </p:graphicFrame>
+    </p:spTree>
+    <p:extLst>
+      <p:ext uri="{BB962C8B-B14F-4D97-AF65-F5344CB8AC3E}">
+        <p14:creationId xmlns:p14="http://schemas.microsoft.com/office/powerpoint/2010/main" val="2503249464"/>
+      </p:ext>
+    </p:extLst>
+  </p:cSld>
+  <p:clrMapOvr>
+    <a:masterClrMapping/>
+  </p:clrMapOvr>
+  <mc:AlternateContent xmlns:mc="http://schemas.openxmlformats.org/markup-compatibility/2006" xmlns:p14="http://schemas.microsoft.com/office/powerpoint/2010/main">
+    <mc:Choice Requires="p14">
+      <p:transition spd="med" p14:dur="700">
+        <p:fade/>
+      </p:transition>
+    </mc:Choice>
+    <mc:Fallback xmlns="">
+      <p:transition spd="med">
+        <p:fade/>
+      </p:transition>
+    </mc:Fallback>
+  </mc:AlternateContent>
+</p:sld>
+</file>
+
+<file path=ppt/slides/slide24.xml><?xml version="1.0" encoding="utf-8"?>
+<p:sld xmlns:a="http://schemas.openxmlformats.org/drawingml/2006/main" xmlns:r="http://schemas.openxmlformats.org/officeDocument/2006/relationships" xmlns:p="http://schemas.openxmlformats.org/presentationml/2006/main">
+  <p:cSld>
+    <p:spTree>
+      <p:nvGrpSpPr>
+        <p:cNvPr id="1" name=""/>
+        <p:cNvGrpSpPr/>
+        <p:nvPr/>
+      </p:nvGrpSpPr>
+      <p:grpSpPr>
+        <a:xfrm>
+          <a:off x="0" y="0"/>
+          <a:ext cx="0" cy="0"/>
+          <a:chOff x="0" y="0"/>
+          <a:chExt cx="0" cy="0"/>
+        </a:xfrm>
+      </p:grpSpPr>
+      <p:sp>
+        <p:nvSpPr>
+          <p:cNvPr id="2" name="Title 1"/>
+          <p:cNvSpPr>
+            <a:spLocks noGrp="1"/>
+          </p:cNvSpPr>
+          <p:nvPr>
+            <p:ph type="title"/>
+          </p:nvPr>
+        </p:nvSpPr>
+        <p:spPr/>
+        <p:txBody>
+          <a:bodyPr/>
+          <a:lstStyle/>
+          <a:p>
+            <a:r>
+              <a:rPr lang="en-CA" dirty="0"/>
+              <a:t>References</a:t>
+            </a:r>
+          </a:p>
+        </p:txBody>
+      </p:sp>
+      <p:sp>
+        <p:nvSpPr>
+          <p:cNvPr id="3" name="Content Placeholder 2"/>
+          <p:cNvSpPr>
+            <a:spLocks noGrp="1"/>
+          </p:cNvSpPr>
+          <p:nvPr>
+            <p:ph idx="1"/>
+          </p:nvPr>
+        </p:nvSpPr>
+        <p:spPr/>
+        <p:txBody>
+          <a:bodyPr/>
+          <a:lstStyle/>
+          <a:p>
+            <a:r>
+              <a:rPr lang="en-CA" dirty="0" err="1"/>
+              <a:t>Minkyu</a:t>
+            </a:r>
+            <a:r>
+              <a:rPr lang="en-CA" dirty="0"/>
+              <a:t> Kim, Ying L. Becker, Peng </a:t>
+            </a:r>
+            <a:r>
+              <a:rPr lang="en-CA" dirty="0" err="1"/>
+              <a:t>Fei</a:t>
+            </a:r>
+            <a:r>
+              <a:rPr lang="en-CA" dirty="0"/>
+              <a:t>, and Una-May O’Reilly. Constrained genetic programming to minimize overfitting in stock selection. </a:t>
+            </a:r>
+            <a:r>
+              <a:rPr lang="en-CA" i="1" dirty="0"/>
+              <a:t>Genetic Programming Theory and Practice,</a:t>
+            </a:r>
+            <a:r>
+              <a:rPr lang="en-CA" dirty="0"/>
+              <a:t> 6:178-194, 2009</a:t>
+            </a:r>
+          </a:p>
+          <a:p>
+            <a:endParaRPr lang="en-CA" dirty="0"/>
+          </a:p>
+        </p:txBody>
+      </p:sp>
+    </p:spTree>
+    <p:extLst>
+      <p:ext uri="{BB962C8B-B14F-4D97-AF65-F5344CB8AC3E}">
+        <p14:creationId xmlns:p14="http://schemas.microsoft.com/office/powerpoint/2010/main" val="4294613089"/>
+      </p:ext>
+    </p:extLst>
+  </p:cSld>
+  <p:clrMapOvr>
+    <a:masterClrMapping/>
+  </p:clrMapOvr>
+  <mc:AlternateContent xmlns:mc="http://schemas.openxmlformats.org/markup-compatibility/2006" xmlns:p14="http://schemas.microsoft.com/office/powerpoint/2010/main">
+    <mc:Choice Requires="p14">
+      <p:transition spd="med" p14:dur="700">
+        <p:fade/>
+      </p:transition>
+    </mc:Choice>
+    <mc:Fallback xmlns="">
+      <p:transition spd="med">
+        <p:fade/>
+      </p:transition>
+    </mc:Fallback>
+  </mc:AlternateContent>
+</p:sld>
+</file>
+
 <file path=ppt/slides/slide3.xml><?xml version="1.0" encoding="utf-8"?>
 <p:sld xmlns:a="http://schemas.openxmlformats.org/drawingml/2006/main" xmlns:r="http://schemas.openxmlformats.org/officeDocument/2006/relationships" xmlns:p="http://schemas.openxmlformats.org/presentationml/2006/main">
   <p:cSld>
@@ -10349,6 +13251,196 @@
       </p:transition>
     </mc:Fallback>
   </mc:AlternateContent>
+  <p:timing>
+    <p:tnLst>
+      <p:par>
+        <p:cTn id="1" dur="indefinite" restart="never" nodeType="tmRoot">
+          <p:childTnLst>
+            <p:seq concurrent="1" nextAc="seek">
+              <p:cTn id="2" dur="indefinite" nodeType="mainSeq">
+                <p:childTnLst>
+                  <p:par>
+                    <p:cTn id="3" fill="hold">
+                      <p:stCondLst>
+                        <p:cond delay="indefinite"/>
+                      </p:stCondLst>
+                      <p:childTnLst>
+                        <p:par>
+                          <p:cTn id="4" fill="hold">
+                            <p:stCondLst>
+                              <p:cond delay="0"/>
+                            </p:stCondLst>
+                            <p:childTnLst>
+                              <p:par>
+                                <p:cTn id="5" presetID="10" presetClass="entr" presetSubtype="0" fill="hold" grpId="0" nodeType="clickEffect">
+                                  <p:stCondLst>
+                                    <p:cond delay="0"/>
+                                  </p:stCondLst>
+                                  <p:childTnLst>
+                                    <p:set>
+                                      <p:cBhvr>
+                                        <p:cTn id="6" dur="1" fill="hold">
+                                          <p:stCondLst>
+                                            <p:cond delay="0"/>
+                                          </p:stCondLst>
+                                        </p:cTn>
+                                        <p:tgtEl>
+                                          <p:spTgt spid="3">
+                                            <p:txEl>
+                                              <p:pRg st="0" end="0"/>
+                                            </p:txEl>
+                                          </p:spTgt>
+                                        </p:tgtEl>
+                                        <p:attrNameLst>
+                                          <p:attrName>style.visibility</p:attrName>
+                                        </p:attrNameLst>
+                                      </p:cBhvr>
+                                      <p:to>
+                                        <p:strVal val="visible"/>
+                                      </p:to>
+                                    </p:set>
+                                    <p:animEffect transition="in" filter="fade">
+                                      <p:cBhvr>
+                                        <p:cTn id="7" dur="500"/>
+                                        <p:tgtEl>
+                                          <p:spTgt spid="3">
+                                            <p:txEl>
+                                              <p:pRg st="0" end="0"/>
+                                            </p:txEl>
+                                          </p:spTgt>
+                                        </p:tgtEl>
+                                      </p:cBhvr>
+                                    </p:animEffect>
+                                  </p:childTnLst>
+                                </p:cTn>
+                              </p:par>
+                            </p:childTnLst>
+                          </p:cTn>
+                        </p:par>
+                      </p:childTnLst>
+                    </p:cTn>
+                  </p:par>
+                  <p:par>
+                    <p:cTn id="8" fill="hold">
+                      <p:stCondLst>
+                        <p:cond delay="indefinite"/>
+                      </p:stCondLst>
+                      <p:childTnLst>
+                        <p:par>
+                          <p:cTn id="9" fill="hold">
+                            <p:stCondLst>
+                              <p:cond delay="0"/>
+                            </p:stCondLst>
+                            <p:childTnLst>
+                              <p:par>
+                                <p:cTn id="10" presetID="10" presetClass="entr" presetSubtype="0" fill="hold" grpId="0" nodeType="clickEffect">
+                                  <p:stCondLst>
+                                    <p:cond delay="0"/>
+                                  </p:stCondLst>
+                                  <p:childTnLst>
+                                    <p:set>
+                                      <p:cBhvr>
+                                        <p:cTn id="11" dur="1" fill="hold">
+                                          <p:stCondLst>
+                                            <p:cond delay="0"/>
+                                          </p:stCondLst>
+                                        </p:cTn>
+                                        <p:tgtEl>
+                                          <p:spTgt spid="3">
+                                            <p:txEl>
+                                              <p:pRg st="1" end="1"/>
+                                            </p:txEl>
+                                          </p:spTgt>
+                                        </p:tgtEl>
+                                        <p:attrNameLst>
+                                          <p:attrName>style.visibility</p:attrName>
+                                        </p:attrNameLst>
+                                      </p:cBhvr>
+                                      <p:to>
+                                        <p:strVal val="visible"/>
+                                      </p:to>
+                                    </p:set>
+                                    <p:animEffect transition="in" filter="fade">
+                                      <p:cBhvr>
+                                        <p:cTn id="12" dur="500"/>
+                                        <p:tgtEl>
+                                          <p:spTgt spid="3">
+                                            <p:txEl>
+                                              <p:pRg st="1" end="1"/>
+                                            </p:txEl>
+                                          </p:spTgt>
+                                        </p:tgtEl>
+                                      </p:cBhvr>
+                                    </p:animEffect>
+                                  </p:childTnLst>
+                                </p:cTn>
+                              </p:par>
+                              <p:par>
+                                <p:cTn id="13" presetID="10" presetClass="entr" presetSubtype="0" fill="hold" nodeType="withEffect">
+                                  <p:stCondLst>
+                                    <p:cond delay="0"/>
+                                  </p:stCondLst>
+                                  <p:childTnLst>
+                                    <p:set>
+                                      <p:cBhvr>
+                                        <p:cTn id="14" dur="1" fill="hold">
+                                          <p:stCondLst>
+                                            <p:cond delay="0"/>
+                                          </p:stCondLst>
+                                        </p:cTn>
+                                        <p:tgtEl>
+                                          <p:spTgt spid="5"/>
+                                        </p:tgtEl>
+                                        <p:attrNameLst>
+                                          <p:attrName>style.visibility</p:attrName>
+                                        </p:attrNameLst>
+                                      </p:cBhvr>
+                                      <p:to>
+                                        <p:strVal val="visible"/>
+                                      </p:to>
+                                    </p:set>
+                                    <p:animEffect transition="in" filter="fade">
+                                      <p:cBhvr>
+                                        <p:cTn id="15" dur="500"/>
+                                        <p:tgtEl>
+                                          <p:spTgt spid="5"/>
+                                        </p:tgtEl>
+                                      </p:cBhvr>
+                                    </p:animEffect>
+                                  </p:childTnLst>
+                                </p:cTn>
+                              </p:par>
+                            </p:childTnLst>
+                          </p:cTn>
+                        </p:par>
+                      </p:childTnLst>
+                    </p:cTn>
+                  </p:par>
+                </p:childTnLst>
+              </p:cTn>
+              <p:prevCondLst>
+                <p:cond evt="onPrev" delay="0">
+                  <p:tgtEl>
+                    <p:sldTgt/>
+                  </p:tgtEl>
+                </p:cond>
+              </p:prevCondLst>
+              <p:nextCondLst>
+                <p:cond evt="onNext" delay="0">
+                  <p:tgtEl>
+                    <p:sldTgt/>
+                  </p:tgtEl>
+                </p:cond>
+              </p:nextCondLst>
+            </p:seq>
+          </p:childTnLst>
+        </p:cTn>
+      </p:par>
+    </p:tnLst>
+    <p:bldLst>
+      <p:bldP spid="3" grpId="0" build="p"/>
+    </p:bldLst>
+  </p:timing>
 </p:sld>
 </file>
 
@@ -10386,7 +13478,7 @@
           <a:p>
             <a:r>
               <a:rPr lang="en-US" dirty="0"/>
-              <a:t>Results &amp; Discussion</a:t>
+              <a:t>Language Variations</a:t>
             </a:r>
           </a:p>
         </p:txBody>
@@ -10403,7 +13495,7 @@
                 <p:ph idx="1"/>
                 <p:extLst>
                   <p:ext uri="{D42A27DB-BD31-4B8C-83A1-F6EECF244321}">
-                    <p14:modId xmlns:p14="http://schemas.microsoft.com/office/powerpoint/2010/main" val="2795055958"/>
+                    <p14:modId xmlns:p14="http://schemas.microsoft.com/office/powerpoint/2010/main" val="4291528544"/>
                   </p:ext>
                 </p:extLst>
               </p:nvPr>
@@ -10799,14 +13891,14 @@
                                 <m:sSub>
                                   <m:sSubPr>
                                     <m:ctrlPr>
-                                      <a:rPr lang="en-CA" sz="2000" b="1" i="1" u="sng" smtClean="0">
+                                      <a:rPr lang="en-CA" sz="2000" b="1" i="1" u="none" smtClean="0">
                                         <a:latin typeface="Cambria Math" panose="02040503050406030204" pitchFamily="18" charset="0"/>
                                       </a:rPr>
                                     </m:ctrlPr>
                                   </m:sSubPr>
                                   <m:e>
                                     <m:r>
-                                      <a:rPr lang="en-CA" sz="2000" b="1" i="1" u="sng" smtClean="0">
+                                      <a:rPr lang="en-CA" sz="2000" b="1" i="1" u="none" smtClean="0">
                                         <a:latin typeface="Cambria Math" panose="02040503050406030204" pitchFamily="18" charset="0"/>
                                       </a:rPr>
                                       <m:t>𝑳</m:t>
@@ -10814,7 +13906,7 @@
                                   </m:e>
                                   <m:sub>
                                     <m:r>
-                                      <a:rPr lang="en-CA" sz="2000" b="1" i="1" u="sng" smtClean="0">
+                                      <a:rPr lang="en-CA" sz="2000" b="1" i="1" u="none" smtClean="0">
                                         <a:latin typeface="Cambria Math" panose="02040503050406030204" pitchFamily="18" charset="0"/>
                                       </a:rPr>
                                       <m:t>𝑺𝑻</m:t>
@@ -10822,43 +13914,43 @@
                                   </m:sub>
                                 </m:sSub>
                                 <m:r>
-                                  <a:rPr lang="en-CA" sz="2000" b="1" i="1" u="sng" smtClean="0">
+                                  <a:rPr lang="en-CA" sz="2000" b="1" i="1" u="none" smtClean="0">
                                     <a:latin typeface="Cambria Math" panose="02040503050406030204" pitchFamily="18" charset="0"/>
                                   </a:rPr>
                                   <m:t>∪{</m:t>
                                 </m:r>
                                 <m:r>
-                                  <a:rPr lang="en-CA" sz="2000" b="1" i="1" u="sng" smtClean="0">
+                                  <a:rPr lang="en-CA" sz="2000" b="1" i="1" u="none" smtClean="0">
                                     <a:latin typeface="Cambria Math" panose="02040503050406030204" pitchFamily="18" charset="0"/>
                                   </a:rPr>
                                   <m:t>𝒂𝒗𝒈</m:t>
                                 </m:r>
                                 <m:r>
-                                  <a:rPr lang="en-CA" sz="2000" b="1" i="1" u="sng" smtClean="0">
+                                  <a:rPr lang="en-CA" sz="2000" b="1" i="1" u="none" smtClean="0">
                                     <a:latin typeface="Cambria Math" panose="02040503050406030204" pitchFamily="18" charset="0"/>
                                   </a:rPr>
                                   <m:t>, </m:t>
                                 </m:r>
                                 <m:r>
-                                  <a:rPr lang="en-CA" sz="2000" b="1" i="1" u="sng" smtClean="0">
+                                  <a:rPr lang="en-CA" sz="2000" b="1" i="1" u="none" smtClean="0">
                                     <a:latin typeface="Cambria Math" panose="02040503050406030204" pitchFamily="18" charset="0"/>
                                   </a:rPr>
                                   <m:t>𝒎𝒊𝒏</m:t>
                                 </m:r>
                                 <m:r>
-                                  <a:rPr lang="en-CA" sz="2000" b="1" i="1" u="sng" smtClean="0">
+                                  <a:rPr lang="en-CA" sz="2000" b="1" i="1" u="none" smtClean="0">
                                     <a:latin typeface="Cambria Math" panose="02040503050406030204" pitchFamily="18" charset="0"/>
                                   </a:rPr>
                                   <m:t>, </m:t>
                                 </m:r>
                                 <m:r>
-                                  <a:rPr lang="en-CA" sz="2000" b="1" i="1" u="sng" smtClean="0">
+                                  <a:rPr lang="en-CA" sz="2000" b="1" i="1" u="none" smtClean="0">
                                     <a:latin typeface="Cambria Math" panose="02040503050406030204" pitchFamily="18" charset="0"/>
                                   </a:rPr>
                                   <m:t>𝒎𝒂𝒙</m:t>
                                 </m:r>
                                 <m:r>
-                                  <a:rPr lang="en-CA" sz="2000" b="1" i="1" u="sng" smtClean="0">
+                                  <a:rPr lang="en-CA" sz="2000" b="1" i="1" u="none" smtClean="0">
                                     <a:latin typeface="Cambria Math" panose="02040503050406030204" pitchFamily="18" charset="0"/>
                                   </a:rPr>
                                   <m:t>}</m:t>
@@ -10866,7 +13958,7 @@
                               </m:oMath>
                             </m:oMathPara>
                           </a14:m>
-                          <a:endParaRPr lang="en-CA" sz="2000" b="1" u="sng" dirty="0"/>
+                          <a:endParaRPr lang="en-CA" sz="2000" b="1" u="none" dirty="0"/>
                         </a:p>
                       </a:txBody>
                       <a:tcPr anchor="ctr"/>
@@ -11037,14 +14129,14 @@
                                 <m:sSub>
                                   <m:sSubPr>
                                     <m:ctrlPr>
-                                      <a:rPr lang="en-CA" sz="2000" b="1" i="1" u="sng" smtClean="0">
+                                      <a:rPr lang="en-CA" sz="2000" b="1" i="1" u="none" smtClean="0">
                                         <a:latin typeface="Cambria Math" panose="02040503050406030204" pitchFamily="18" charset="0"/>
                                       </a:rPr>
                                     </m:ctrlPr>
                                   </m:sSubPr>
                                   <m:e>
                                     <m:r>
-                                      <a:rPr lang="en-CA" sz="2000" b="1" i="1" u="sng" smtClean="0">
+                                      <a:rPr lang="en-CA" sz="2000" b="1" i="1" u="none" smtClean="0">
                                         <a:latin typeface="Cambria Math" panose="02040503050406030204" pitchFamily="18" charset="0"/>
                                       </a:rPr>
                                       <m:t>𝑳</m:t>
@@ -11052,7 +14144,7 @@
                                   </m:e>
                                   <m:sub>
                                     <m:r>
-                                      <a:rPr lang="en-CA" sz="2000" b="1" i="1" u="sng" smtClean="0">
+                                      <a:rPr lang="en-CA" sz="2000" b="1" i="1" u="none" smtClean="0">
                                         <a:latin typeface="Cambria Math" panose="02040503050406030204" pitchFamily="18" charset="0"/>
                                       </a:rPr>
                                       <m:t>𝑭𝑰</m:t>
@@ -11060,43 +14152,43 @@
                                   </m:sub>
                                 </m:sSub>
                                 <m:r>
-                                  <a:rPr lang="en-CA" sz="2000" b="1" i="1" u="sng" smtClean="0">
+                                  <a:rPr lang="en-CA" sz="2000" b="1" i="1" u="none" smtClean="0">
                                     <a:latin typeface="Cambria Math" panose="02040503050406030204" pitchFamily="18" charset="0"/>
                                   </a:rPr>
                                   <m:t>∪{</m:t>
                                 </m:r>
                                 <m:r>
-                                  <a:rPr lang="en-CA" sz="2000" b="1" i="1" u="sng" smtClean="0">
+                                  <a:rPr lang="en-CA" sz="2000" b="1" i="1" u="none" smtClean="0">
                                     <a:latin typeface="Cambria Math" panose="02040503050406030204" pitchFamily="18" charset="0"/>
                                   </a:rPr>
                                   <m:t>𝒂𝒗𝒈</m:t>
                                 </m:r>
                                 <m:r>
-                                  <a:rPr lang="en-CA" sz="2000" b="1" i="1" u="sng" smtClean="0">
+                                  <a:rPr lang="en-CA" sz="2000" b="1" i="1" u="none" smtClean="0">
                                     <a:latin typeface="Cambria Math" panose="02040503050406030204" pitchFamily="18" charset="0"/>
                                   </a:rPr>
                                   <m:t>, </m:t>
                                 </m:r>
                                 <m:r>
-                                  <a:rPr lang="en-CA" sz="2000" b="1" i="1" u="sng" smtClean="0">
+                                  <a:rPr lang="en-CA" sz="2000" b="1" i="1" u="none" smtClean="0">
                                     <a:latin typeface="Cambria Math" panose="02040503050406030204" pitchFamily="18" charset="0"/>
                                   </a:rPr>
                                   <m:t>𝒎𝒊𝒏</m:t>
                                 </m:r>
                                 <m:r>
-                                  <a:rPr lang="en-CA" sz="2000" b="1" i="1" u="sng" smtClean="0">
+                                  <a:rPr lang="en-CA" sz="2000" b="1" i="1" u="none" smtClean="0">
                                     <a:latin typeface="Cambria Math" panose="02040503050406030204" pitchFamily="18" charset="0"/>
                                   </a:rPr>
                                   <m:t>, </m:t>
                                 </m:r>
                                 <m:r>
-                                  <a:rPr lang="en-CA" sz="2000" b="1" i="1" u="sng" smtClean="0">
+                                  <a:rPr lang="en-CA" sz="2000" b="1" i="1" u="none" smtClean="0">
                                     <a:latin typeface="Cambria Math" panose="02040503050406030204" pitchFamily="18" charset="0"/>
                                   </a:rPr>
                                   <m:t>𝒎𝒂𝒙</m:t>
                                 </m:r>
                                 <m:r>
-                                  <a:rPr lang="en-CA" sz="2000" b="1" i="1" u="sng" smtClean="0">
+                                  <a:rPr lang="en-CA" sz="2000" b="1" i="1" u="none" smtClean="0">
                                     <a:latin typeface="Cambria Math" panose="02040503050406030204" pitchFamily="18" charset="0"/>
                                   </a:rPr>
                                   <m:t>}</m:t>
@@ -11104,7 +14196,7 @@
                               </m:oMath>
                             </m:oMathPara>
                           </a14:m>
-                          <a:endParaRPr lang="en-CA" sz="2000" b="1" u="sng" dirty="0"/>
+                          <a:endParaRPr lang="en-CA" sz="2000" b="1" u="none" dirty="0"/>
                         </a:p>
                       </a:txBody>
                       <a:tcPr anchor="ctr"/>
@@ -11131,7 +14223,7 @@
                 <p:ph idx="1"/>
                 <p:extLst>
                   <p:ext uri="{D42A27DB-BD31-4B8C-83A1-F6EECF244321}">
-                    <p14:modId xmlns:p14="http://schemas.microsoft.com/office/powerpoint/2010/main" val="2795055958"/>
+                    <p14:modId xmlns:p14="http://schemas.microsoft.com/office/powerpoint/2010/main" val="4291528544"/>
                   </p:ext>
                 </p:extLst>
               </p:nvPr>

</xml_diff>

<commit_message>
draft sent to ross
</commit_message>
<xml_diff>
--- a/GPP_Defense.pptx
+++ b/GPP_Defense.pptx
@@ -5,10 +5,10 @@
     <p:sldMasterId id="2147483648" r:id="rId2"/>
   </p:sldMasterIdLst>
   <p:notesMasterIdLst>
-    <p:notesMasterId r:id="rId27"/>
+    <p:notesMasterId r:id="rId28"/>
   </p:notesMasterIdLst>
   <p:handoutMasterIdLst>
-    <p:handoutMasterId r:id="rId28"/>
+    <p:handoutMasterId r:id="rId29"/>
   </p:handoutMasterIdLst>
   <p:sldIdLst>
     <p:sldId id="256" r:id="rId3"/>
@@ -34,7 +34,8 @@
     <p:sldId id="287" r:id="rId23"/>
     <p:sldId id="288" r:id="rId24"/>
     <p:sldId id="289" r:id="rId25"/>
-    <p:sldId id="274" r:id="rId26"/>
+    <p:sldId id="290" r:id="rId26"/>
+    <p:sldId id="274" r:id="rId27"/>
   </p:sldIdLst>
   <p:sldSz cx="12192000" cy="6858000"/>
   <p:notesSz cx="6858000" cy="9144000"/>
@@ -161,6 +162,7 @@
             <p14:sldId id="287"/>
             <p14:sldId id="288"/>
             <p14:sldId id="289"/>
+            <p14:sldId id="290"/>
             <p14:sldId id="274"/>
           </p14:sldIdLst>
         </p14:section>
@@ -853,6 +855,14 @@
           <a:bodyPr/>
           <a:lstStyle/>
           <a:p>
+            <a:r>
+              <a:rPr lang="en-CA" dirty="0"/>
+              <a:t>The marginal difference from 70-30 to 80-20 is small, but it</a:t>
+            </a:r>
+            <a:r>
+              <a:rPr lang="en-CA" baseline="0" dirty="0"/>
+              <a:t> is much larger in the 80-20 to 90-10. This implies that the shorter range of testing data is NOT the only reason for stronger fitness</a:t>
+            </a:r>
             <a:endParaRPr lang="en-CA" dirty="0"/>
           </a:p>
         </p:txBody>
@@ -874,7 +884,7 @@
           <a:p>
             <a:fld id="{0A3C37BE-C303-496D-B5CD-85F2937540FC}" type="slidenum">
               <a:rPr lang="en-CA" smtClean="0"/>
-              <a:t>18</a:t>
+              <a:t>17</a:t>
             </a:fld>
             <a:endParaRPr lang="en-CA"/>
           </a:p>
@@ -883,7 +893,7 @@
     </p:spTree>
     <p:extLst>
       <p:ext uri="{BB962C8B-B14F-4D97-AF65-F5344CB8AC3E}">
-        <p14:creationId xmlns:p14="http://schemas.microsoft.com/office/powerpoint/2010/main" val="126510921"/>
+        <p14:creationId xmlns:p14="http://schemas.microsoft.com/office/powerpoint/2010/main" val="4061684247"/>
       </p:ext>
     </p:extLst>
   </p:cSld>
@@ -958,7 +968,7 @@
           <a:p>
             <a:fld id="{0A3C37BE-C303-496D-B5CD-85F2937540FC}" type="slidenum">
               <a:rPr lang="en-CA" smtClean="0"/>
-              <a:t>19</a:t>
+              <a:t>18</a:t>
             </a:fld>
             <a:endParaRPr lang="en-CA"/>
           </a:p>
@@ -967,7 +977,7 @@
     </p:spTree>
     <p:extLst>
       <p:ext uri="{BB962C8B-B14F-4D97-AF65-F5344CB8AC3E}">
-        <p14:creationId xmlns:p14="http://schemas.microsoft.com/office/powerpoint/2010/main" val="3289096373"/>
+        <p14:creationId xmlns:p14="http://schemas.microsoft.com/office/powerpoint/2010/main" val="126510921"/>
       </p:ext>
     </p:extLst>
   </p:cSld>
@@ -1021,18 +1031,6 @@
           <a:bodyPr/>
           <a:lstStyle/>
           <a:p>
-            <a:r>
-              <a:rPr lang="en-CA" baseline="0" dirty="0"/>
-              <a:t>L</a:t>
-            </a:r>
-            <a:r>
-              <a:rPr lang="en-CA" baseline="-25000" dirty="0"/>
-              <a:t>IF</a:t>
-            </a:r>
-            <a:r>
-              <a:rPr lang="en-CA" baseline="0" dirty="0"/>
-              <a:t> performs better in all cases, but also yields more outliers</a:t>
-            </a:r>
             <a:endParaRPr lang="en-CA" dirty="0"/>
           </a:p>
         </p:txBody>
@@ -1054,7 +1052,7 @@
           <a:p>
             <a:fld id="{0A3C37BE-C303-496D-B5CD-85F2937540FC}" type="slidenum">
               <a:rPr lang="en-CA" smtClean="0"/>
-              <a:t>20</a:t>
+              <a:t>19</a:t>
             </a:fld>
             <a:endParaRPr lang="en-CA"/>
           </a:p>
@@ -1063,7 +1061,7 @@
     </p:spTree>
     <p:extLst>
       <p:ext uri="{BB962C8B-B14F-4D97-AF65-F5344CB8AC3E}">
-        <p14:creationId xmlns:p14="http://schemas.microsoft.com/office/powerpoint/2010/main" val="1700676884"/>
+        <p14:creationId xmlns:p14="http://schemas.microsoft.com/office/powerpoint/2010/main" val="3289096373"/>
       </p:ext>
     </p:extLst>
   </p:cSld>
@@ -1118,9 +1116,18 @@
           <a:lstStyle/>
           <a:p>
             <a:r>
-              <a:rPr lang="en-CA" dirty="0"/>
-              <a:t>NOTE: All on 90-10 splits.</a:t>
-            </a:r>
+              <a:rPr lang="en-CA" baseline="0" dirty="0"/>
+              <a:t>L</a:t>
+            </a:r>
+            <a:r>
+              <a:rPr lang="en-CA" baseline="-25000" dirty="0"/>
+              <a:t>IF</a:t>
+            </a:r>
+            <a:r>
+              <a:rPr lang="en-CA" baseline="0" dirty="0"/>
+              <a:t> performs better in all cases, but also yields more outliers</a:t>
+            </a:r>
+            <a:endParaRPr lang="en-CA" dirty="0"/>
           </a:p>
         </p:txBody>
       </p:sp>
@@ -1141,7 +1148,7 @@
           <a:p>
             <a:fld id="{0A3C37BE-C303-496D-B5CD-85F2937540FC}" type="slidenum">
               <a:rPr lang="en-CA" smtClean="0"/>
-              <a:t>22</a:t>
+              <a:t>20</a:t>
             </a:fld>
             <a:endParaRPr lang="en-CA"/>
           </a:p>
@@ -1150,7 +1157,7 @@
     </p:spTree>
     <p:extLst>
       <p:ext uri="{BB962C8B-B14F-4D97-AF65-F5344CB8AC3E}">
-        <p14:creationId xmlns:p14="http://schemas.microsoft.com/office/powerpoint/2010/main" val="3983224020"/>
+        <p14:creationId xmlns:p14="http://schemas.microsoft.com/office/powerpoint/2010/main" val="1700676884"/>
       </p:ext>
     </p:extLst>
   </p:cSld>
@@ -1228,6 +1235,93 @@
           <a:p>
             <a:fld id="{0A3C37BE-C303-496D-B5CD-85F2937540FC}" type="slidenum">
               <a:rPr lang="en-CA" smtClean="0"/>
+              <a:t>22</a:t>
+            </a:fld>
+            <a:endParaRPr lang="en-CA"/>
+          </a:p>
+        </p:txBody>
+      </p:sp>
+    </p:spTree>
+    <p:extLst>
+      <p:ext uri="{BB962C8B-B14F-4D97-AF65-F5344CB8AC3E}">
+        <p14:creationId xmlns:p14="http://schemas.microsoft.com/office/powerpoint/2010/main" val="3983224020"/>
+      </p:ext>
+    </p:extLst>
+  </p:cSld>
+  <p:clrMapOvr>
+    <a:masterClrMapping/>
+  </p:clrMapOvr>
+</p:notes>
+</file>
+
+<file path=ppt/notesSlides/notesSlide15.xml><?xml version="1.0" encoding="utf-8"?>
+<p:notes xmlns:a="http://schemas.openxmlformats.org/drawingml/2006/main" xmlns:r="http://schemas.openxmlformats.org/officeDocument/2006/relationships" xmlns:p="http://schemas.openxmlformats.org/presentationml/2006/main">
+  <p:cSld>
+    <p:spTree>
+      <p:nvGrpSpPr>
+        <p:cNvPr id="1" name=""/>
+        <p:cNvGrpSpPr/>
+        <p:nvPr/>
+      </p:nvGrpSpPr>
+      <p:grpSpPr>
+        <a:xfrm>
+          <a:off x="0" y="0"/>
+          <a:ext cx="0" cy="0"/>
+          <a:chOff x="0" y="0"/>
+          <a:chExt cx="0" cy="0"/>
+        </a:xfrm>
+      </p:grpSpPr>
+      <p:sp>
+        <p:nvSpPr>
+          <p:cNvPr id="2" name="Slide Image Placeholder 1"/>
+          <p:cNvSpPr>
+            <a:spLocks noGrp="1" noRot="1" noChangeAspect="1"/>
+          </p:cNvSpPr>
+          <p:nvPr>
+            <p:ph type="sldImg"/>
+          </p:nvPr>
+        </p:nvSpPr>
+        <p:spPr/>
+      </p:sp>
+      <p:sp>
+        <p:nvSpPr>
+          <p:cNvPr id="3" name="Notes Placeholder 2"/>
+          <p:cNvSpPr>
+            <a:spLocks noGrp="1"/>
+          </p:cNvSpPr>
+          <p:nvPr>
+            <p:ph type="body" idx="1"/>
+          </p:nvPr>
+        </p:nvSpPr>
+        <p:spPr/>
+        <p:txBody>
+          <a:bodyPr/>
+          <a:lstStyle/>
+          <a:p>
+            <a:r>
+              <a:rPr lang="en-CA" dirty="0"/>
+              <a:t>NOTE: All on 90-10 splits.</a:t>
+            </a:r>
+          </a:p>
+        </p:txBody>
+      </p:sp>
+      <p:sp>
+        <p:nvSpPr>
+          <p:cNvPr id="4" name="Slide Number Placeholder 3"/>
+          <p:cNvSpPr>
+            <a:spLocks noGrp="1"/>
+          </p:cNvSpPr>
+          <p:nvPr>
+            <p:ph type="sldNum" sz="quarter" idx="10"/>
+          </p:nvPr>
+        </p:nvSpPr>
+        <p:spPr/>
+        <p:txBody>
+          <a:bodyPr/>
+          <a:lstStyle/>
+          <a:p>
+            <a:fld id="{0A3C37BE-C303-496D-B5CD-85F2937540FC}" type="slidenum">
+              <a:rPr lang="en-CA" smtClean="0"/>
               <a:t>23</a:t>
             </a:fld>
             <a:endParaRPr lang="en-CA"/>
@@ -1238,6 +1332,174 @@
     <p:extLst>
       <p:ext uri="{BB962C8B-B14F-4D97-AF65-F5344CB8AC3E}">
         <p14:creationId xmlns:p14="http://schemas.microsoft.com/office/powerpoint/2010/main" val="679213028"/>
+      </p:ext>
+    </p:extLst>
+  </p:cSld>
+  <p:clrMapOvr>
+    <a:masterClrMapping/>
+  </p:clrMapOvr>
+</p:notes>
+</file>
+
+<file path=ppt/notesSlides/notesSlide16.xml><?xml version="1.0" encoding="utf-8"?>
+<p:notes xmlns:a="http://schemas.openxmlformats.org/drawingml/2006/main" xmlns:r="http://schemas.openxmlformats.org/officeDocument/2006/relationships" xmlns:p="http://schemas.openxmlformats.org/presentationml/2006/main">
+  <p:cSld>
+    <p:spTree>
+      <p:nvGrpSpPr>
+        <p:cNvPr id="1" name=""/>
+        <p:cNvGrpSpPr/>
+        <p:nvPr/>
+      </p:nvGrpSpPr>
+      <p:grpSpPr>
+        <a:xfrm>
+          <a:off x="0" y="0"/>
+          <a:ext cx="0" cy="0"/>
+          <a:chOff x="0" y="0"/>
+          <a:chExt cx="0" cy="0"/>
+        </a:xfrm>
+      </p:grpSpPr>
+      <p:sp>
+        <p:nvSpPr>
+          <p:cNvPr id="2" name="Slide Image Placeholder 1"/>
+          <p:cNvSpPr>
+            <a:spLocks noGrp="1" noRot="1" noChangeAspect="1"/>
+          </p:cNvSpPr>
+          <p:nvPr>
+            <p:ph type="sldImg"/>
+          </p:nvPr>
+        </p:nvSpPr>
+        <p:spPr/>
+      </p:sp>
+      <p:sp>
+        <p:nvSpPr>
+          <p:cNvPr id="3" name="Notes Placeholder 2"/>
+          <p:cNvSpPr>
+            <a:spLocks noGrp="1"/>
+          </p:cNvSpPr>
+          <p:nvPr>
+            <p:ph type="body" idx="1"/>
+          </p:nvPr>
+        </p:nvSpPr>
+        <p:spPr/>
+        <p:txBody>
+          <a:bodyPr/>
+          <a:lstStyle/>
+          <a:p>
+            <a:endParaRPr lang="en-CA" dirty="0"/>
+          </a:p>
+        </p:txBody>
+      </p:sp>
+      <p:sp>
+        <p:nvSpPr>
+          <p:cNvPr id="4" name="Slide Number Placeholder 3"/>
+          <p:cNvSpPr>
+            <a:spLocks noGrp="1"/>
+          </p:cNvSpPr>
+          <p:nvPr>
+            <p:ph type="sldNum" sz="quarter" idx="10"/>
+          </p:nvPr>
+        </p:nvSpPr>
+        <p:spPr/>
+        <p:txBody>
+          <a:bodyPr/>
+          <a:lstStyle/>
+          <a:p>
+            <a:fld id="{0A3C37BE-C303-496D-B5CD-85F2937540FC}" type="slidenum">
+              <a:rPr lang="en-CA" smtClean="0"/>
+              <a:t>24</a:t>
+            </a:fld>
+            <a:endParaRPr lang="en-CA"/>
+          </a:p>
+        </p:txBody>
+      </p:sp>
+    </p:spTree>
+    <p:extLst>
+      <p:ext uri="{BB962C8B-B14F-4D97-AF65-F5344CB8AC3E}">
+        <p14:creationId xmlns:p14="http://schemas.microsoft.com/office/powerpoint/2010/main" val="710688171"/>
+      </p:ext>
+    </p:extLst>
+  </p:cSld>
+  <p:clrMapOvr>
+    <a:masterClrMapping/>
+  </p:clrMapOvr>
+</p:notes>
+</file>
+
+<file path=ppt/notesSlides/notesSlide17.xml><?xml version="1.0" encoding="utf-8"?>
+<p:notes xmlns:a="http://schemas.openxmlformats.org/drawingml/2006/main" xmlns:r="http://schemas.openxmlformats.org/officeDocument/2006/relationships" xmlns:p="http://schemas.openxmlformats.org/presentationml/2006/main">
+  <p:cSld>
+    <p:spTree>
+      <p:nvGrpSpPr>
+        <p:cNvPr id="1" name=""/>
+        <p:cNvGrpSpPr/>
+        <p:nvPr/>
+      </p:nvGrpSpPr>
+      <p:grpSpPr>
+        <a:xfrm>
+          <a:off x="0" y="0"/>
+          <a:ext cx="0" cy="0"/>
+          <a:chOff x="0" y="0"/>
+          <a:chExt cx="0" cy="0"/>
+        </a:xfrm>
+      </p:grpSpPr>
+      <p:sp>
+        <p:nvSpPr>
+          <p:cNvPr id="2" name="Slide Image Placeholder 1"/>
+          <p:cNvSpPr>
+            <a:spLocks noGrp="1" noRot="1" noChangeAspect="1"/>
+          </p:cNvSpPr>
+          <p:nvPr>
+            <p:ph type="sldImg"/>
+          </p:nvPr>
+        </p:nvSpPr>
+        <p:spPr/>
+      </p:sp>
+      <p:sp>
+        <p:nvSpPr>
+          <p:cNvPr id="3" name="Notes Placeholder 2"/>
+          <p:cNvSpPr>
+            <a:spLocks noGrp="1"/>
+          </p:cNvSpPr>
+          <p:nvPr>
+            <p:ph type="body" idx="1"/>
+          </p:nvPr>
+        </p:nvSpPr>
+        <p:spPr/>
+        <p:txBody>
+          <a:bodyPr/>
+          <a:lstStyle/>
+          <a:p>
+            <a:endParaRPr lang="en-CA" dirty="0"/>
+          </a:p>
+        </p:txBody>
+      </p:sp>
+      <p:sp>
+        <p:nvSpPr>
+          <p:cNvPr id="4" name="Slide Number Placeholder 3"/>
+          <p:cNvSpPr>
+            <a:spLocks noGrp="1"/>
+          </p:cNvSpPr>
+          <p:nvPr>
+            <p:ph type="sldNum" sz="quarter" idx="10"/>
+          </p:nvPr>
+        </p:nvSpPr>
+        <p:spPr/>
+        <p:txBody>
+          <a:bodyPr/>
+          <a:lstStyle/>
+          <a:p>
+            <a:fld id="{0A3C37BE-C303-496D-B5CD-85F2937540FC}" type="slidenum">
+              <a:rPr lang="en-CA" smtClean="0"/>
+              <a:t>25</a:t>
+            </a:fld>
+            <a:endParaRPr lang="en-CA"/>
+          </a:p>
+        </p:txBody>
+      </p:sp>
+    </p:spTree>
+    <p:extLst>
+      <p:ext uri="{BB962C8B-B14F-4D97-AF65-F5344CB8AC3E}">
+        <p14:creationId xmlns:p14="http://schemas.microsoft.com/office/powerpoint/2010/main" val="2303083875"/>
       </p:ext>
     </p:extLst>
   </p:cSld>
@@ -10582,7 +10844,7 @@
           <a:p>
             <a:r>
               <a:rPr lang="en-CA" dirty="0"/>
-              <a:t>References</a:t>
+              <a:t>Conclusions</a:t>
             </a:r>
           </a:p>
         </p:txBody>
@@ -10603,6 +10865,145 @@
           <a:lstStyle/>
           <a:p>
             <a:r>
+              <a:rPr lang="en-CA" dirty="0"/>
+              <a:t>Highly dependent on use-case</a:t>
+            </a:r>
+          </a:p>
+          <a:p>
+            <a:r>
+              <a:rPr lang="en-CA" dirty="0"/>
+              <a:t>Highly improved performance in advanced languages</a:t>
+            </a:r>
+          </a:p>
+          <a:p>
+            <a:pPr lvl="1"/>
+            <a:r>
+              <a:rPr lang="en-CA" dirty="0"/>
+              <a:t>Short-term – </a:t>
+            </a:r>
+            <a:r>
+              <a:rPr lang="en-CA" b="1" i="1" dirty="0"/>
+              <a:t>L</a:t>
+            </a:r>
+            <a:r>
+              <a:rPr lang="en-CA" b="1" i="1" baseline="-25000" dirty="0"/>
+              <a:t>FI</a:t>
+            </a:r>
+            <a:r>
+              <a:rPr lang="en-CA" b="1" i="1" dirty="0"/>
+              <a:t> </a:t>
+            </a:r>
+            <a:endParaRPr lang="en-CA" b="1" i="1" baseline="-25000" dirty="0"/>
+          </a:p>
+          <a:p>
+            <a:pPr lvl="1"/>
+            <a:r>
+              <a:rPr lang="en-CA" dirty="0"/>
+              <a:t>Long-term – </a:t>
+            </a:r>
+            <a:r>
+              <a:rPr lang="en-CA" b="1" i="1" dirty="0"/>
+              <a:t>L</a:t>
+            </a:r>
+            <a:r>
+              <a:rPr lang="en-CA" b="1" i="1" baseline="-25000" dirty="0"/>
+              <a:t>FI’</a:t>
+            </a:r>
+          </a:p>
+          <a:p>
+            <a:r>
+              <a:rPr lang="en-CA" dirty="0"/>
+              <a:t>Volatility in financial functions</a:t>
+            </a:r>
+          </a:p>
+          <a:p>
+            <a:r>
+              <a:rPr lang="en-CA" dirty="0"/>
+              <a:t>Smooth average</a:t>
+            </a:r>
+          </a:p>
+        </p:txBody>
+      </p:sp>
+    </p:spTree>
+    <p:extLst>
+      <p:ext uri="{BB962C8B-B14F-4D97-AF65-F5344CB8AC3E}">
+        <p14:creationId xmlns:p14="http://schemas.microsoft.com/office/powerpoint/2010/main" val="64266169"/>
+      </p:ext>
+    </p:extLst>
+  </p:cSld>
+  <p:clrMapOvr>
+    <a:masterClrMapping/>
+  </p:clrMapOvr>
+  <mc:AlternateContent xmlns:mc="http://schemas.openxmlformats.org/markup-compatibility/2006" xmlns:p14="http://schemas.microsoft.com/office/powerpoint/2010/main">
+    <mc:Choice Requires="p14">
+      <p:transition spd="med" p14:dur="700">
+        <p:fade/>
+      </p:transition>
+    </mc:Choice>
+    <mc:Fallback xmlns="">
+      <p:transition spd="med">
+        <p:fade/>
+      </p:transition>
+    </mc:Fallback>
+  </mc:AlternateContent>
+</p:sld>
+</file>
+
+<file path=ppt/slides/slide25.xml><?xml version="1.0" encoding="utf-8"?>
+<p:sld xmlns:a="http://schemas.openxmlformats.org/drawingml/2006/main" xmlns:r="http://schemas.openxmlformats.org/officeDocument/2006/relationships" xmlns:p="http://schemas.openxmlformats.org/presentationml/2006/main">
+  <p:cSld>
+    <p:spTree>
+      <p:nvGrpSpPr>
+        <p:cNvPr id="1" name=""/>
+        <p:cNvGrpSpPr/>
+        <p:nvPr/>
+      </p:nvGrpSpPr>
+      <p:grpSpPr>
+        <a:xfrm>
+          <a:off x="0" y="0"/>
+          <a:ext cx="0" cy="0"/>
+          <a:chOff x="0" y="0"/>
+          <a:chExt cx="0" cy="0"/>
+        </a:xfrm>
+      </p:grpSpPr>
+      <p:sp>
+        <p:nvSpPr>
+          <p:cNvPr id="2" name="Title 1"/>
+          <p:cNvSpPr>
+            <a:spLocks noGrp="1"/>
+          </p:cNvSpPr>
+          <p:nvPr>
+            <p:ph type="title"/>
+          </p:nvPr>
+        </p:nvSpPr>
+        <p:spPr/>
+        <p:txBody>
+          <a:bodyPr/>
+          <a:lstStyle/>
+          <a:p>
+            <a:r>
+              <a:rPr lang="en-CA" dirty="0"/>
+              <a:t>References</a:t>
+            </a:r>
+          </a:p>
+        </p:txBody>
+      </p:sp>
+      <p:sp>
+        <p:nvSpPr>
+          <p:cNvPr id="3" name="Content Placeholder 2"/>
+          <p:cNvSpPr>
+            <a:spLocks noGrp="1"/>
+          </p:cNvSpPr>
+          <p:nvPr>
+            <p:ph idx="1"/>
+          </p:nvPr>
+        </p:nvSpPr>
+        <p:spPr/>
+        <p:txBody>
+          <a:bodyPr/>
+          <a:lstStyle/>
+          <a:p>
+            <a:r>
               <a:rPr lang="en-CA" dirty="0" err="1"/>
               <a:t>Minkyu</a:t>
             </a:r>
@@ -10624,7 +11025,7 @@
             </a:r>
             <a:r>
               <a:rPr lang="en-CA" dirty="0"/>
-              <a:t> 6:178-194, 2009</a:t>
+              <a:t> 6:178-194, 2009 [1]</a:t>
             </a:r>
           </a:p>
           <a:p>
@@ -12898,9 +13299,12 @@
             </a:r>
             <a:r>
               <a:rPr lang="en-CA" i="1" dirty="0"/>
-              <a:t>et al. [1]</a:t>
-            </a:r>
-            <a:endParaRPr lang="en-CA" dirty="0"/>
+              <a:t>et al. </a:t>
+            </a:r>
+            <a:r>
+              <a:rPr lang="en-CA" dirty="0"/>
+              <a:t>[1]</a:t>
+            </a:r>
           </a:p>
         </p:txBody>
       </p:sp>
@@ -13483,8 +13887,8 @@
           </a:p>
         </p:txBody>
       </p:sp>
-      <mc:AlternateContent xmlns:mc="http://schemas.openxmlformats.org/markup-compatibility/2006">
-        <mc:Choice xmlns:a14="http://schemas.microsoft.com/office/drawing/2010/main" Requires="a14">
+      <mc:AlternateContent xmlns:mc="http://schemas.openxmlformats.org/markup-compatibility/2006" xmlns:a14="http://schemas.microsoft.com/office/drawing/2010/main">
+        <mc:Choice Requires="a14">
           <p:graphicFrame>
             <p:nvGraphicFramePr>
               <p:cNvPr id="4" name="Content Placeholder 3"/>
@@ -14212,7 +14616,7 @@
             </a:graphic>
           </p:graphicFrame>
         </mc:Choice>
-        <mc:Fallback>
+        <mc:Fallback xmlns="">
           <p:graphicFrame>
             <p:nvGraphicFramePr>
               <p:cNvPr id="4" name="Content Placeholder 3"/>

</xml_diff>

<commit_message>
final version, ready for presentation
</commit_message>
<xml_diff>
--- a/GPP_Defense.pptx
+++ b/GPP_Defense.pptx
@@ -762,6 +762,10 @@
             <a:br>
               <a:rPr lang="en-CA" dirty="0"/>
             </a:br>
+            <a:r>
+              <a:rPr lang="en-CA" dirty="0"/>
+              <a:t/>
+            </a:r>
             <a:br>
               <a:rPr lang="en-CA" dirty="0"/>
             </a:br>
@@ -773,9 +777,17 @@
               <a:rPr lang="en-CA" baseline="0" dirty="0"/>
               <a:t> we use ensemble learning to not rely on a single run.</a:t>
             </a:r>
+            <a:r>
+              <a:rPr lang="en-CA" dirty="0"/>
+              <a:t/>
+            </a:r>
             <a:br>
               <a:rPr lang="en-CA" dirty="0"/>
             </a:br>
+            <a:r>
+              <a:rPr lang="en-CA" dirty="0"/>
+              <a:t/>
+            </a:r>
             <a:br>
               <a:rPr lang="en-CA" dirty="0"/>
             </a:br>
@@ -7010,6 +7022,13 @@
       </p:transition>
     </mc:Fallback>
   </mc:AlternateContent>
+  <p:timing>
+    <p:tnLst>
+      <p:par>
+        <p:cTn id="1" dur="indefinite" restart="never" nodeType="tmRoot"/>
+      </p:par>
+    </p:tnLst>
+  </p:timing>
 </p:sld>
 </file>
 
@@ -7093,6 +7112,13 @@
       </p:transition>
     </mc:Fallback>
   </mc:AlternateContent>
+  <p:timing>
+    <p:tnLst>
+      <p:par>
+        <p:cTn id="1" dur="indefinite" restart="never" nodeType="tmRoot"/>
+      </p:par>
+    </p:tnLst>
+  </p:timing>
 </p:sld>
 </file>
 
@@ -7166,14 +7192,14 @@
                     <a:gridCol w="4990307">
                       <a:extLst>
                         <a:ext uri="{9D8B030D-6E8A-4147-A177-3AD203B41FA5}">
-                          <a16:colId xmlns:a16="http://schemas.microsoft.com/office/drawing/2014/main" val="452220581"/>
+                          <a16:colId xmlns:a16="http://schemas.microsoft.com/office/drawing/2014/main" xmlns="" val="452220581"/>
                         </a:ext>
                       </a:extLst>
                     </a:gridCol>
                     <a:gridCol w="4990307">
                       <a:extLst>
                         <a:ext uri="{9D8B030D-6E8A-4147-A177-3AD203B41FA5}">
-                          <a16:colId xmlns:a16="http://schemas.microsoft.com/office/drawing/2014/main" val="82609379"/>
+                          <a16:colId xmlns:a16="http://schemas.microsoft.com/office/drawing/2014/main" xmlns="" val="82609379"/>
                         </a:ext>
                       </a:extLst>
                     </a:gridCol>
@@ -7209,7 +7235,7 @@
                     </a:tc>
                     <a:extLst>
                       <a:ext uri="{0D108BD9-81ED-4DB2-BD59-A6C34878D82A}">
-                        <a16:rowId xmlns:a16="http://schemas.microsoft.com/office/drawing/2014/main" val="3654672897"/>
+                        <a16:rowId xmlns:a16="http://schemas.microsoft.com/office/drawing/2014/main" xmlns="" val="3654672897"/>
                       </a:ext>
                     </a:extLst>
                   </a:tr>
@@ -7321,7 +7347,7 @@
                     </a:tc>
                     <a:extLst>
                       <a:ext uri="{0D108BD9-81ED-4DB2-BD59-A6C34878D82A}">
-                        <a16:rowId xmlns:a16="http://schemas.microsoft.com/office/drawing/2014/main" val="2083470743"/>
+                        <a16:rowId xmlns:a16="http://schemas.microsoft.com/office/drawing/2014/main" xmlns="" val="2083470743"/>
                       </a:ext>
                     </a:extLst>
                   </a:tr>
@@ -7391,7 +7417,7 @@
                     </a:tc>
                     <a:extLst>
                       <a:ext uri="{0D108BD9-81ED-4DB2-BD59-A6C34878D82A}">
-                        <a16:rowId xmlns:a16="http://schemas.microsoft.com/office/drawing/2014/main" val="1427336378"/>
+                        <a16:rowId xmlns:a16="http://schemas.microsoft.com/office/drawing/2014/main" xmlns="" val="1427336378"/>
                       </a:ext>
                     </a:extLst>
                   </a:tr>
@@ -7504,7 +7530,7 @@
                     </a:tc>
                     <a:extLst>
                       <a:ext uri="{0D108BD9-81ED-4DB2-BD59-A6C34878D82A}">
-                        <a16:rowId xmlns:a16="http://schemas.microsoft.com/office/drawing/2014/main" val="1548791112"/>
+                        <a16:rowId xmlns:a16="http://schemas.microsoft.com/office/drawing/2014/main" xmlns="" val="1548791112"/>
                       </a:ext>
                     </a:extLst>
                   </a:tr>
@@ -7617,7 +7643,7 @@
                     </a:tc>
                     <a:extLst>
                       <a:ext uri="{0D108BD9-81ED-4DB2-BD59-A6C34878D82A}">
-                        <a16:rowId xmlns:a16="http://schemas.microsoft.com/office/drawing/2014/main" val="3273923411"/>
+                        <a16:rowId xmlns:a16="http://schemas.microsoft.com/office/drawing/2014/main" xmlns="" val="3273923411"/>
                       </a:ext>
                     </a:extLst>
                   </a:tr>
@@ -7742,7 +7768,7 @@
                     </a:tc>
                     <a:extLst>
                       <a:ext uri="{0D108BD9-81ED-4DB2-BD59-A6C34878D82A}">
-                        <a16:rowId xmlns:a16="http://schemas.microsoft.com/office/drawing/2014/main" val="500252021"/>
+                        <a16:rowId xmlns:a16="http://schemas.microsoft.com/office/drawing/2014/main" xmlns="" val="500252021"/>
                       </a:ext>
                     </a:extLst>
                   </a:tr>
@@ -7855,7 +7881,7 @@
                     </a:tc>
                     <a:extLst>
                       <a:ext uri="{0D108BD9-81ED-4DB2-BD59-A6C34878D82A}">
-                        <a16:rowId xmlns:a16="http://schemas.microsoft.com/office/drawing/2014/main" val="1990218277"/>
+                        <a16:rowId xmlns:a16="http://schemas.microsoft.com/office/drawing/2014/main" xmlns="" val="1990218277"/>
                       </a:ext>
                     </a:extLst>
                   </a:tr>
@@ -8222,6 +8248,13 @@
       </p:transition>
     </mc:Fallback>
   </mc:AlternateContent>
+  <p:timing>
+    <p:tnLst>
+      <p:par>
+        <p:cTn id="1" dur="indefinite" restart="never" nodeType="tmRoot"/>
+      </p:par>
+    </p:tnLst>
+  </p:timing>
 </p:sld>
 </file>
 
@@ -8410,6 +8443,13 @@
       </p:transition>
     </mc:Fallback>
   </mc:AlternateContent>
+  <p:timing>
+    <p:tnLst>
+      <p:par>
+        <p:cTn id="1" dur="indefinite" restart="never" nodeType="tmRoot"/>
+      </p:par>
+    </p:tnLst>
+  </p:timing>
 </p:sld>
 </file>
 
@@ -8602,6 +8642,13 @@
       </p:transition>
     </mc:Fallback>
   </mc:AlternateContent>
+  <p:timing>
+    <p:tnLst>
+      <p:par>
+        <p:cTn id="1" dur="indefinite" restart="never" nodeType="tmRoot"/>
+      </p:par>
+    </p:tnLst>
+  </p:timing>
 </p:sld>
 </file>
 
@@ -8783,6 +8830,13 @@
       </p:transition>
     </mc:Fallback>
   </mc:AlternateContent>
+  <p:timing>
+    <p:tnLst>
+      <p:par>
+        <p:cTn id="1" dur="indefinite" restart="never" nodeType="tmRoot"/>
+      </p:par>
+    </p:tnLst>
+  </p:timing>
 </p:sld>
 </file>
 
@@ -8854,28 +8908,28 @@
                 <a:gridCol w="2495550">
                   <a:extLst>
                     <a:ext uri="{9D8B030D-6E8A-4147-A177-3AD203B41FA5}">
-                      <a16:colId xmlns:a16="http://schemas.microsoft.com/office/drawing/2014/main" val="1063830725"/>
+                      <a16:colId xmlns:a16="http://schemas.microsoft.com/office/drawing/2014/main" xmlns="" val="1063830725"/>
                     </a:ext>
                   </a:extLst>
                 </a:gridCol>
                 <a:gridCol w="2495550">
                   <a:extLst>
                     <a:ext uri="{9D8B030D-6E8A-4147-A177-3AD203B41FA5}">
-                      <a16:colId xmlns:a16="http://schemas.microsoft.com/office/drawing/2014/main" val="2742314196"/>
+                      <a16:colId xmlns:a16="http://schemas.microsoft.com/office/drawing/2014/main" xmlns="" val="2742314196"/>
                     </a:ext>
                   </a:extLst>
                 </a:gridCol>
                 <a:gridCol w="2495550">
                   <a:extLst>
                     <a:ext uri="{9D8B030D-6E8A-4147-A177-3AD203B41FA5}">
-                      <a16:colId xmlns:a16="http://schemas.microsoft.com/office/drawing/2014/main" val="1344616909"/>
+                      <a16:colId xmlns:a16="http://schemas.microsoft.com/office/drawing/2014/main" xmlns="" val="1344616909"/>
                     </a:ext>
                   </a:extLst>
                 </a:gridCol>
                 <a:gridCol w="2495550">
                   <a:extLst>
                     <a:ext uri="{9D8B030D-6E8A-4147-A177-3AD203B41FA5}">
-                      <a16:colId xmlns:a16="http://schemas.microsoft.com/office/drawing/2014/main" val="4178842973"/>
+                      <a16:colId xmlns:a16="http://schemas.microsoft.com/office/drawing/2014/main" xmlns="" val="4178842973"/>
                     </a:ext>
                   </a:extLst>
                 </a:gridCol>
@@ -8952,7 +9006,7 @@
                 </a:tc>
                 <a:extLst>
                   <a:ext uri="{0D108BD9-81ED-4DB2-BD59-A6C34878D82A}">
-                    <a16:rowId xmlns:a16="http://schemas.microsoft.com/office/drawing/2014/main" val="4032793956"/>
+                    <a16:rowId xmlns:a16="http://schemas.microsoft.com/office/drawing/2014/main" xmlns="" val="4032793956"/>
                   </a:ext>
                 </a:extLst>
               </a:tr>
@@ -9015,7 +9069,7 @@
                 </a:tc>
                 <a:extLst>
                   <a:ext uri="{0D108BD9-81ED-4DB2-BD59-A6C34878D82A}">
-                    <a16:rowId xmlns:a16="http://schemas.microsoft.com/office/drawing/2014/main" val="3865386210"/>
+                    <a16:rowId xmlns:a16="http://schemas.microsoft.com/office/drawing/2014/main" xmlns="" val="3865386210"/>
                   </a:ext>
                 </a:extLst>
               </a:tr>
@@ -9083,7 +9137,7 @@
                 </a:tc>
                 <a:extLst>
                   <a:ext uri="{0D108BD9-81ED-4DB2-BD59-A6C34878D82A}">
-                    <a16:rowId xmlns:a16="http://schemas.microsoft.com/office/drawing/2014/main" val="331165827"/>
+                    <a16:rowId xmlns:a16="http://schemas.microsoft.com/office/drawing/2014/main" xmlns="" val="331165827"/>
                   </a:ext>
                 </a:extLst>
               </a:tr>
@@ -9113,6 +9167,13 @@
       </p:transition>
     </mc:Fallback>
   </mc:AlternateContent>
+  <p:timing>
+    <p:tnLst>
+      <p:par>
+        <p:cTn id="1" dur="indefinite" restart="never" nodeType="tmRoot"/>
+      </p:par>
+    </p:tnLst>
+  </p:timing>
 </p:sld>
 </file>
 
@@ -9305,6 +9366,13 @@
       </p:transition>
     </mc:Fallback>
   </mc:AlternateContent>
+  <p:timing>
+    <p:tnLst>
+      <p:par>
+        <p:cTn id="1" dur="indefinite" restart="never" nodeType="tmRoot"/>
+      </p:par>
+    </p:tnLst>
+  </p:timing>
 </p:sld>
 </file>
 
@@ -9497,6 +9565,13 @@
       </p:transition>
     </mc:Fallback>
   </mc:AlternateContent>
+  <p:timing>
+    <p:tnLst>
+      <p:par>
+        <p:cTn id="1" dur="indefinite" restart="never" nodeType="tmRoot"/>
+      </p:par>
+    </p:tnLst>
+  </p:timing>
 </p:sld>
 </file>
 
@@ -9689,6 +9764,13 @@
       </p:transition>
     </mc:Fallback>
   </mc:AlternateContent>
+  <p:timing>
+    <p:tnLst>
+      <p:par>
+        <p:cTn id="1" dur="indefinite" restart="never" nodeType="tmRoot"/>
+      </p:par>
+    </p:tnLst>
+  </p:timing>
 </p:sld>
 </file>
 
@@ -9741,7 +9823,7 @@
             <p:ph idx="1"/>
             <p:extLst>
               <p:ext uri="{D42A27DB-BD31-4B8C-83A1-F6EECF244321}">
-                <p14:modId xmlns:p14="http://schemas.microsoft.com/office/powerpoint/2010/main" val="2654204459"/>
+                <p14:modId xmlns:p14="http://schemas.microsoft.com/office/powerpoint/2010/main" val="193687182"/>
               </p:ext>
             </p:extLst>
           </p:nvPr>
@@ -9760,28 +9842,28 @@
                 <a:gridCol w="2495550">
                   <a:extLst>
                     <a:ext uri="{9D8B030D-6E8A-4147-A177-3AD203B41FA5}">
-                      <a16:colId xmlns:a16="http://schemas.microsoft.com/office/drawing/2014/main" val="4260470491"/>
+                      <a16:colId xmlns:a16="http://schemas.microsoft.com/office/drawing/2014/main" xmlns="" val="4260470491"/>
                     </a:ext>
                   </a:extLst>
                 </a:gridCol>
                 <a:gridCol w="2495550">
                   <a:extLst>
                     <a:ext uri="{9D8B030D-6E8A-4147-A177-3AD203B41FA5}">
-                      <a16:colId xmlns:a16="http://schemas.microsoft.com/office/drawing/2014/main" val="984885218"/>
+                      <a16:colId xmlns:a16="http://schemas.microsoft.com/office/drawing/2014/main" xmlns="" val="984885218"/>
                     </a:ext>
                   </a:extLst>
                 </a:gridCol>
                 <a:gridCol w="2495550">
                   <a:extLst>
                     <a:ext uri="{9D8B030D-6E8A-4147-A177-3AD203B41FA5}">
-                      <a16:colId xmlns:a16="http://schemas.microsoft.com/office/drawing/2014/main" val="1208586841"/>
+                      <a16:colId xmlns:a16="http://schemas.microsoft.com/office/drawing/2014/main" xmlns="" val="1208586841"/>
                     </a:ext>
                   </a:extLst>
                 </a:gridCol>
                 <a:gridCol w="2495550">
                   <a:extLst>
                     <a:ext uri="{9D8B030D-6E8A-4147-A177-3AD203B41FA5}">
-                      <a16:colId xmlns:a16="http://schemas.microsoft.com/office/drawing/2014/main" val="2817348180"/>
+                      <a16:colId xmlns:a16="http://schemas.microsoft.com/office/drawing/2014/main" xmlns="" val="2817348180"/>
                     </a:ext>
                   </a:extLst>
                 </a:gridCol>
@@ -9842,7 +9924,7 @@
                 </a:tc>
                 <a:extLst>
                   <a:ext uri="{0D108BD9-81ED-4DB2-BD59-A6C34878D82A}">
-                    <a16:rowId xmlns:a16="http://schemas.microsoft.com/office/drawing/2014/main" val="3418847742"/>
+                    <a16:rowId xmlns:a16="http://schemas.microsoft.com/office/drawing/2014/main" xmlns="" val="3418847742"/>
                   </a:ext>
                 </a:extLst>
               </a:tr>
@@ -9860,6 +9942,74 @@
                       <a:r>
                         <a:rPr lang="en-CA" b="1" i="1" baseline="-25000" dirty="0"/>
                         <a:t>ST</a:t>
+                      </a:r>
+                      <a:endParaRPr lang="en-CA" b="1" i="1" dirty="0"/>
+                    </a:p>
+                  </a:txBody>
+                  <a:tcPr anchor="ctr"/>
+                </a:tc>
+                <a:tc>
+                  <a:txBody>
+                    <a:bodyPr/>
+                    <a:lstStyle/>
+                    <a:p>
+                      <a:pPr algn="ctr"/>
+                      <a:r>
+                        <a:rPr lang="en-CA" dirty="0"/>
+                        <a:t>1.395065</a:t>
+                      </a:r>
+                    </a:p>
+                  </a:txBody>
+                  <a:tcPr anchor="ctr"/>
+                </a:tc>
+                <a:tc>
+                  <a:txBody>
+                    <a:bodyPr/>
+                    <a:lstStyle/>
+                    <a:p>
+                      <a:pPr algn="ctr"/>
+                      <a:r>
+                        <a:rPr lang="en-CA" dirty="0"/>
+                        <a:t>0.246555</a:t>
+                      </a:r>
+                    </a:p>
+                  </a:txBody>
+                  <a:tcPr anchor="ctr"/>
+                </a:tc>
+                <a:tc>
+                  <a:txBody>
+                    <a:bodyPr/>
+                    <a:lstStyle/>
+                    <a:p>
+                      <a:pPr algn="ctr"/>
+                      <a:r>
+                        <a:rPr lang="en-CA" dirty="0"/>
+                        <a:t>0.073232</a:t>
+                      </a:r>
+                    </a:p>
+                  </a:txBody>
+                  <a:tcPr anchor="ctr"/>
+                </a:tc>
+                <a:extLst>
+                  <a:ext uri="{0D108BD9-81ED-4DB2-BD59-A6C34878D82A}">
+                    <a16:rowId xmlns:a16="http://schemas.microsoft.com/office/drawing/2014/main" xmlns="" val="3001223746"/>
+                  </a:ext>
+                </a:extLst>
+              </a:tr>
+              <a:tr h="650240">
+                <a:tc>
+                  <a:txBody>
+                    <a:bodyPr/>
+                    <a:lstStyle/>
+                    <a:p>
+                      <a:pPr algn="ctr"/>
+                      <a:r>
+                        <a:rPr lang="en-CA" b="1" i="1" dirty="0"/>
+                        <a:t>L</a:t>
+                      </a:r>
+                      <a:r>
+                        <a:rPr lang="en-CA" b="1" i="1" baseline="-25000" dirty="0"/>
+                        <a:t>ST’</a:t>
                       </a:r>
                       <a:endParaRPr lang="en-CA" b="1" i="1" dirty="0"/>
                     </a:p>
@@ -9910,75 +10060,7 @@
                 </a:tc>
                 <a:extLst>
                   <a:ext uri="{0D108BD9-81ED-4DB2-BD59-A6C34878D82A}">
-                    <a16:rowId xmlns:a16="http://schemas.microsoft.com/office/drawing/2014/main" val="3001223746"/>
-                  </a:ext>
-                </a:extLst>
-              </a:tr>
-              <a:tr h="650240">
-                <a:tc>
-                  <a:txBody>
-                    <a:bodyPr/>
-                    <a:lstStyle/>
-                    <a:p>
-                      <a:pPr algn="ctr"/>
-                      <a:r>
-                        <a:rPr lang="en-CA" b="1" i="1" dirty="0"/>
-                        <a:t>L</a:t>
-                      </a:r>
-                      <a:r>
-                        <a:rPr lang="en-CA" b="1" i="1" baseline="-25000" dirty="0"/>
-                        <a:t>ST’</a:t>
-                      </a:r>
-                      <a:endParaRPr lang="en-CA" b="1" i="1" dirty="0"/>
-                    </a:p>
-                  </a:txBody>
-                  <a:tcPr anchor="ctr"/>
-                </a:tc>
-                <a:tc>
-                  <a:txBody>
-                    <a:bodyPr/>
-                    <a:lstStyle/>
-                    <a:p>
-                      <a:pPr algn="ctr"/>
-                      <a:r>
-                        <a:rPr lang="en-CA" dirty="0"/>
-                        <a:t>1.395065</a:t>
-                      </a:r>
-                    </a:p>
-                  </a:txBody>
-                  <a:tcPr anchor="ctr"/>
-                </a:tc>
-                <a:tc>
-                  <a:txBody>
-                    <a:bodyPr/>
-                    <a:lstStyle/>
-                    <a:p>
-                      <a:pPr algn="ctr"/>
-                      <a:r>
-                        <a:rPr lang="en-CA" dirty="0"/>
-                        <a:t>0.246555</a:t>
-                      </a:r>
-                    </a:p>
-                  </a:txBody>
-                  <a:tcPr anchor="ctr"/>
-                </a:tc>
-                <a:tc>
-                  <a:txBody>
-                    <a:bodyPr/>
-                    <a:lstStyle/>
-                    <a:p>
-                      <a:pPr algn="ctr"/>
-                      <a:r>
-                        <a:rPr lang="en-CA" dirty="0"/>
-                        <a:t>0.073232</a:t>
-                      </a:r>
-                    </a:p>
-                  </a:txBody>
-                  <a:tcPr anchor="ctr"/>
-                </a:tc>
-                <a:extLst>
-                  <a:ext uri="{0D108BD9-81ED-4DB2-BD59-A6C34878D82A}">
-                    <a16:rowId xmlns:a16="http://schemas.microsoft.com/office/drawing/2014/main" val="1409226119"/>
+                    <a16:rowId xmlns:a16="http://schemas.microsoft.com/office/drawing/2014/main" xmlns="" val="1409226119"/>
                   </a:ext>
                 </a:extLst>
               </a:tr>
@@ -10050,7 +10132,7 @@
                 </a:tc>
                 <a:extLst>
                   <a:ext uri="{0D108BD9-81ED-4DB2-BD59-A6C34878D82A}">
-                    <a16:rowId xmlns:a16="http://schemas.microsoft.com/office/drawing/2014/main" val="2156384988"/>
+                    <a16:rowId xmlns:a16="http://schemas.microsoft.com/office/drawing/2014/main" xmlns="" val="2156384988"/>
                   </a:ext>
                 </a:extLst>
               </a:tr>
@@ -10122,7 +10204,7 @@
                 </a:tc>
                 <a:extLst>
                   <a:ext uri="{0D108BD9-81ED-4DB2-BD59-A6C34878D82A}">
-                    <a16:rowId xmlns:a16="http://schemas.microsoft.com/office/drawing/2014/main" val="3681039543"/>
+                    <a16:rowId xmlns:a16="http://schemas.microsoft.com/office/drawing/2014/main" xmlns="" val="3681039543"/>
                   </a:ext>
                 </a:extLst>
               </a:tr>
@@ -10152,6 +10234,13 @@
       </p:transition>
     </mc:Fallback>
   </mc:AlternateContent>
+  <p:timing>
+    <p:tnLst>
+      <p:par>
+        <p:cTn id="1" dur="indefinite" restart="never" nodeType="tmRoot"/>
+      </p:par>
+    </p:tnLst>
+  </p:timing>
 </p:sld>
 </file>
 
@@ -10286,6 +10375,13 @@
       </p:transition>
     </mc:Fallback>
   </mc:AlternateContent>
+  <p:timing>
+    <p:tnLst>
+      <p:par>
+        <p:cTn id="1" dur="indefinite" restart="never" nodeType="tmRoot"/>
+      </p:par>
+    </p:tnLst>
+  </p:timing>
 </p:sld>
 </file>
 
@@ -10478,6 +10574,13 @@
       </p:transition>
     </mc:Fallback>
   </mc:AlternateContent>
+  <p:timing>
+    <p:tnLst>
+      <p:par>
+        <p:cTn id="1" dur="indefinite" restart="never" nodeType="tmRoot"/>
+      </p:par>
+    </p:tnLst>
+  </p:timing>
 </p:sld>
 </file>
 
@@ -10667,6 +10770,13 @@
       </p:transition>
     </mc:Fallback>
   </mc:AlternateContent>
+  <p:timing>
+    <p:tnLst>
+      <p:par>
+        <p:cTn id="1" dur="indefinite" restart="never" nodeType="tmRoot"/>
+      </p:par>
+    </p:tnLst>
+  </p:timing>
 </p:sld>
 </file>
 
@@ -10738,21 +10848,21 @@
                 <a:gridCol w="3326894">
                   <a:extLst>
                     <a:ext uri="{9D8B030D-6E8A-4147-A177-3AD203B41FA5}">
-                      <a16:colId xmlns:a16="http://schemas.microsoft.com/office/drawing/2014/main" val="1063830725"/>
+                      <a16:colId xmlns:a16="http://schemas.microsoft.com/office/drawing/2014/main" xmlns="" val="1063830725"/>
                     </a:ext>
                   </a:extLst>
                 </a:gridCol>
                 <a:gridCol w="3326894">
                   <a:extLst>
                     <a:ext uri="{9D8B030D-6E8A-4147-A177-3AD203B41FA5}">
-                      <a16:colId xmlns:a16="http://schemas.microsoft.com/office/drawing/2014/main" val="2742314196"/>
+                      <a16:colId xmlns:a16="http://schemas.microsoft.com/office/drawing/2014/main" xmlns="" val="2742314196"/>
                     </a:ext>
                   </a:extLst>
                 </a:gridCol>
                 <a:gridCol w="3326894">
                   <a:extLst>
                     <a:ext uri="{9D8B030D-6E8A-4147-A177-3AD203B41FA5}">
-                      <a16:colId xmlns:a16="http://schemas.microsoft.com/office/drawing/2014/main" val="4178842973"/>
+                      <a16:colId xmlns:a16="http://schemas.microsoft.com/office/drawing/2014/main" xmlns="" val="4178842973"/>
                     </a:ext>
                   </a:extLst>
                 </a:gridCol>
@@ -10810,7 +10920,7 @@
                 </a:tc>
                 <a:extLst>
                   <a:ext uri="{0D108BD9-81ED-4DB2-BD59-A6C34878D82A}">
-                    <a16:rowId xmlns:a16="http://schemas.microsoft.com/office/drawing/2014/main" val="4032793956"/>
+                    <a16:rowId xmlns:a16="http://schemas.microsoft.com/office/drawing/2014/main" xmlns="" val="4032793956"/>
                   </a:ext>
                 </a:extLst>
               </a:tr>
@@ -10864,7 +10974,7 @@
                 </a:tc>
                 <a:extLst>
                   <a:ext uri="{0D108BD9-81ED-4DB2-BD59-A6C34878D82A}">
-                    <a16:rowId xmlns:a16="http://schemas.microsoft.com/office/drawing/2014/main" val="3865386210"/>
+                    <a16:rowId xmlns:a16="http://schemas.microsoft.com/office/drawing/2014/main" xmlns="" val="3865386210"/>
                   </a:ext>
                 </a:extLst>
               </a:tr>
@@ -10918,7 +11028,7 @@
                 </a:tc>
                 <a:extLst>
                   <a:ext uri="{0D108BD9-81ED-4DB2-BD59-A6C34878D82A}">
-                    <a16:rowId xmlns:a16="http://schemas.microsoft.com/office/drawing/2014/main" val="331165827"/>
+                    <a16:rowId xmlns:a16="http://schemas.microsoft.com/office/drawing/2014/main" xmlns="" val="331165827"/>
                   </a:ext>
                 </a:extLst>
               </a:tr>
@@ -10948,6 +11058,13 @@
       </p:transition>
     </mc:Fallback>
   </mc:AlternateContent>
+  <p:timing>
+    <p:tnLst>
+      <p:par>
+        <p:cTn id="1" dur="indefinite" restart="never" nodeType="tmRoot"/>
+      </p:par>
+    </p:tnLst>
+  </p:timing>
 </p:sld>
 </file>
 
@@ -11049,6 +11166,13 @@
       </p:transition>
     </mc:Fallback>
   </mc:AlternateContent>
+  <p:timing>
+    <p:tnLst>
+      <p:par>
+        <p:cTn id="1" dur="indefinite" restart="never" nodeType="tmRoot"/>
+      </p:par>
+    </p:tnLst>
+  </p:timing>
 </p:sld>
 </file>
 
@@ -11119,21 +11243,21 @@
                 <a:gridCol w="3326894">
                   <a:extLst>
                     <a:ext uri="{9D8B030D-6E8A-4147-A177-3AD203B41FA5}">
-                      <a16:colId xmlns:a16="http://schemas.microsoft.com/office/drawing/2014/main" val="1063830725"/>
+                      <a16:colId xmlns:a16="http://schemas.microsoft.com/office/drawing/2014/main" xmlns="" val="1063830725"/>
                     </a:ext>
                   </a:extLst>
                 </a:gridCol>
                 <a:gridCol w="3326894">
                   <a:extLst>
                     <a:ext uri="{9D8B030D-6E8A-4147-A177-3AD203B41FA5}">
-                      <a16:colId xmlns:a16="http://schemas.microsoft.com/office/drawing/2014/main" val="2742314196"/>
+                      <a16:colId xmlns:a16="http://schemas.microsoft.com/office/drawing/2014/main" xmlns="" val="2742314196"/>
                     </a:ext>
                   </a:extLst>
                 </a:gridCol>
                 <a:gridCol w="3326894">
                   <a:extLst>
                     <a:ext uri="{9D8B030D-6E8A-4147-A177-3AD203B41FA5}">
-                      <a16:colId xmlns:a16="http://schemas.microsoft.com/office/drawing/2014/main" val="4178842973"/>
+                      <a16:colId xmlns:a16="http://schemas.microsoft.com/office/drawing/2014/main" xmlns="" val="4178842973"/>
                     </a:ext>
                   </a:extLst>
                 </a:gridCol>
@@ -11191,7 +11315,7 @@
                 </a:tc>
                 <a:extLst>
                   <a:ext uri="{0D108BD9-81ED-4DB2-BD59-A6C34878D82A}">
-                    <a16:rowId xmlns:a16="http://schemas.microsoft.com/office/drawing/2014/main" val="4032793956"/>
+                    <a16:rowId xmlns:a16="http://schemas.microsoft.com/office/drawing/2014/main" xmlns="" val="4032793956"/>
                   </a:ext>
                 </a:extLst>
               </a:tr>
@@ -11240,7 +11364,7 @@
                 </a:tc>
                 <a:extLst>
                   <a:ext uri="{0D108BD9-81ED-4DB2-BD59-A6C34878D82A}">
-                    <a16:rowId xmlns:a16="http://schemas.microsoft.com/office/drawing/2014/main" val="446838915"/>
+                    <a16:rowId xmlns:a16="http://schemas.microsoft.com/office/drawing/2014/main" xmlns="" val="446838915"/>
                   </a:ext>
                 </a:extLst>
               </a:tr>
@@ -11294,7 +11418,7 @@
                 </a:tc>
                 <a:extLst>
                   <a:ext uri="{0D108BD9-81ED-4DB2-BD59-A6C34878D82A}">
-                    <a16:rowId xmlns:a16="http://schemas.microsoft.com/office/drawing/2014/main" val="2229032511"/>
+                    <a16:rowId xmlns:a16="http://schemas.microsoft.com/office/drawing/2014/main" xmlns="" val="2229032511"/>
                   </a:ext>
                 </a:extLst>
               </a:tr>
@@ -11348,7 +11472,7 @@
                 </a:tc>
                 <a:extLst>
                   <a:ext uri="{0D108BD9-81ED-4DB2-BD59-A6C34878D82A}">
-                    <a16:rowId xmlns:a16="http://schemas.microsoft.com/office/drawing/2014/main" val="3178529980"/>
+                    <a16:rowId xmlns:a16="http://schemas.microsoft.com/office/drawing/2014/main" xmlns="" val="3178529980"/>
                   </a:ext>
                 </a:extLst>
               </a:tr>
@@ -11402,7 +11526,7 @@
                 </a:tc>
                 <a:extLst>
                   <a:ext uri="{0D108BD9-81ED-4DB2-BD59-A6C34878D82A}">
-                    <a16:rowId xmlns:a16="http://schemas.microsoft.com/office/drawing/2014/main" val="4239658633"/>
+                    <a16:rowId xmlns:a16="http://schemas.microsoft.com/office/drawing/2014/main" xmlns="" val="4239658633"/>
                   </a:ext>
                 </a:extLst>
               </a:tr>
@@ -11456,7 +11580,7 @@
                 </a:tc>
                 <a:extLst>
                   <a:ext uri="{0D108BD9-81ED-4DB2-BD59-A6C34878D82A}">
-                    <a16:rowId xmlns:a16="http://schemas.microsoft.com/office/drawing/2014/main" val="3865386210"/>
+                    <a16:rowId xmlns:a16="http://schemas.microsoft.com/office/drawing/2014/main" xmlns="" val="3865386210"/>
                   </a:ext>
                 </a:extLst>
               </a:tr>
@@ -11510,7 +11634,7 @@
                 </a:tc>
                 <a:extLst>
                   <a:ext uri="{0D108BD9-81ED-4DB2-BD59-A6C34878D82A}">
-                    <a16:rowId xmlns:a16="http://schemas.microsoft.com/office/drawing/2014/main" val="331165827"/>
+                    <a16:rowId xmlns:a16="http://schemas.microsoft.com/office/drawing/2014/main" xmlns="" val="331165827"/>
                   </a:ext>
                 </a:extLst>
               </a:tr>
@@ -11540,6 +11664,13 @@
       </p:transition>
     </mc:Fallback>
   </mc:AlternateContent>
+  <p:timing>
+    <p:tnLst>
+      <p:par>
+        <p:cTn id="1" dur="indefinite" restart="never" nodeType="tmRoot"/>
+      </p:par>
+    </p:tnLst>
+  </p:timing>
 </p:sld>
 </file>
 
@@ -11610,21 +11741,21 @@
                 <a:gridCol w="3326894">
                   <a:extLst>
                     <a:ext uri="{9D8B030D-6E8A-4147-A177-3AD203B41FA5}">
-                      <a16:colId xmlns:a16="http://schemas.microsoft.com/office/drawing/2014/main" val="1063830725"/>
+                      <a16:colId xmlns:a16="http://schemas.microsoft.com/office/drawing/2014/main" xmlns="" val="1063830725"/>
                     </a:ext>
                   </a:extLst>
                 </a:gridCol>
                 <a:gridCol w="3326894">
                   <a:extLst>
                     <a:ext uri="{9D8B030D-6E8A-4147-A177-3AD203B41FA5}">
-                      <a16:colId xmlns:a16="http://schemas.microsoft.com/office/drawing/2014/main" val="2742314196"/>
+                      <a16:colId xmlns:a16="http://schemas.microsoft.com/office/drawing/2014/main" xmlns="" val="2742314196"/>
                     </a:ext>
                   </a:extLst>
                 </a:gridCol>
                 <a:gridCol w="3326894">
                   <a:extLst>
                     <a:ext uri="{9D8B030D-6E8A-4147-A177-3AD203B41FA5}">
-                      <a16:colId xmlns:a16="http://schemas.microsoft.com/office/drawing/2014/main" val="4178842973"/>
+                      <a16:colId xmlns:a16="http://schemas.microsoft.com/office/drawing/2014/main" xmlns="" val="4178842973"/>
                     </a:ext>
                   </a:extLst>
                 </a:gridCol>
@@ -11682,7 +11813,7 @@
                 </a:tc>
                 <a:extLst>
                   <a:ext uri="{0D108BD9-81ED-4DB2-BD59-A6C34878D82A}">
-                    <a16:rowId xmlns:a16="http://schemas.microsoft.com/office/drawing/2014/main" val="4032793956"/>
+                    <a16:rowId xmlns:a16="http://schemas.microsoft.com/office/drawing/2014/main" xmlns="" val="4032793956"/>
                   </a:ext>
                 </a:extLst>
               </a:tr>
@@ -11731,7 +11862,7 @@
                 </a:tc>
                 <a:extLst>
                   <a:ext uri="{0D108BD9-81ED-4DB2-BD59-A6C34878D82A}">
-                    <a16:rowId xmlns:a16="http://schemas.microsoft.com/office/drawing/2014/main" val="446838915"/>
+                    <a16:rowId xmlns:a16="http://schemas.microsoft.com/office/drawing/2014/main" xmlns="" val="446838915"/>
                   </a:ext>
                 </a:extLst>
               </a:tr>
@@ -11785,7 +11916,7 @@
                 </a:tc>
                 <a:extLst>
                   <a:ext uri="{0D108BD9-81ED-4DB2-BD59-A6C34878D82A}">
-                    <a16:rowId xmlns:a16="http://schemas.microsoft.com/office/drawing/2014/main" val="2229032511"/>
+                    <a16:rowId xmlns:a16="http://schemas.microsoft.com/office/drawing/2014/main" xmlns="" val="2229032511"/>
                   </a:ext>
                 </a:extLst>
               </a:tr>
@@ -11839,7 +11970,7 @@
                 </a:tc>
                 <a:extLst>
                   <a:ext uri="{0D108BD9-81ED-4DB2-BD59-A6C34878D82A}">
-                    <a16:rowId xmlns:a16="http://schemas.microsoft.com/office/drawing/2014/main" val="3178529980"/>
+                    <a16:rowId xmlns:a16="http://schemas.microsoft.com/office/drawing/2014/main" xmlns="" val="3178529980"/>
                   </a:ext>
                 </a:extLst>
               </a:tr>
@@ -11897,7 +12028,7 @@
                 </a:tc>
                 <a:extLst>
                   <a:ext uri="{0D108BD9-81ED-4DB2-BD59-A6C34878D82A}">
-                    <a16:rowId xmlns:a16="http://schemas.microsoft.com/office/drawing/2014/main" val="4239658633"/>
+                    <a16:rowId xmlns:a16="http://schemas.microsoft.com/office/drawing/2014/main" xmlns="" val="4239658633"/>
                   </a:ext>
                 </a:extLst>
               </a:tr>
@@ -11951,7 +12082,7 @@
                 </a:tc>
                 <a:extLst>
                   <a:ext uri="{0D108BD9-81ED-4DB2-BD59-A6C34878D82A}">
-                    <a16:rowId xmlns:a16="http://schemas.microsoft.com/office/drawing/2014/main" val="3865386210"/>
+                    <a16:rowId xmlns:a16="http://schemas.microsoft.com/office/drawing/2014/main" xmlns="" val="3865386210"/>
                   </a:ext>
                 </a:extLst>
               </a:tr>
@@ -12009,7 +12140,7 @@
                 </a:tc>
                 <a:extLst>
                   <a:ext uri="{0D108BD9-81ED-4DB2-BD59-A6C34878D82A}">
-                    <a16:rowId xmlns:a16="http://schemas.microsoft.com/office/drawing/2014/main" val="331165827"/>
+                    <a16:rowId xmlns:a16="http://schemas.microsoft.com/office/drawing/2014/main" xmlns="" val="331165827"/>
                   </a:ext>
                 </a:extLst>
               </a:tr>
@@ -12039,6 +12170,13 @@
       </p:transition>
     </mc:Fallback>
   </mc:AlternateContent>
+  <p:timing>
+    <p:tnLst>
+      <p:par>
+        <p:cTn id="1" dur="indefinite" restart="never" nodeType="tmRoot"/>
+      </p:par>
+    </p:tnLst>
+  </p:timing>
 </p:sld>
 </file>
 
@@ -12678,9 +12816,10 @@
           </a:p>
           <a:p>
             <a:r>
-              <a:rPr lang="en-CA" dirty="0"/>
-              <a:t>Industry application to explore practical use</a:t>
-            </a:r>
+              <a:rPr lang="en-CA" dirty="0" smtClean="0"/>
+              <a:t>Explore practical use of industry application</a:t>
+            </a:r>
+            <a:endParaRPr lang="en-CA" dirty="0"/>
           </a:p>
         </p:txBody>
       </p:sp>
@@ -13144,6 +13283,13 @@
       </p:transition>
     </mc:Fallback>
   </mc:AlternateContent>
+  <p:timing>
+    <p:tnLst>
+      <p:par>
+        <p:cTn id="1" dur="indefinite" restart="never" nodeType="tmRoot"/>
+      </p:par>
+    </p:tnLst>
+  </p:timing>
 </p:sld>
 </file>
 
@@ -13227,6 +13373,13 @@
       </p:transition>
     </mc:Fallback>
   </mc:AlternateContent>
+  <p:timing>
+    <p:tnLst>
+      <p:par>
+        <p:cTn id="1" dur="indefinite" restart="never" nodeType="tmRoot"/>
+      </p:par>
+    </p:tnLst>
+  </p:timing>
 </p:sld>
 </file>
 
@@ -13373,7 +13526,7 @@
                                         <p:tgtEl>
                                           <p:spTgt spid="3">
                                             <p:txEl>
-                                              <p:pRg st="0" end="0"/>
+                                              <p:pRg st="1" end="1"/>
                                             </p:txEl>
                                           </p:spTgt>
                                         </p:tgtEl>
@@ -13391,7 +13544,7 @@
                                         <p:tgtEl>
                                           <p:spTgt spid="3">
                                             <p:txEl>
-                                              <p:pRg st="0" end="0"/>
+                                              <p:pRg st="1" end="1"/>
                                             </p:txEl>
                                           </p:spTgt>
                                         </p:tgtEl>
@@ -13434,7 +13587,7 @@
                                         <p:tgtEl>
                                           <p:spTgt spid="3">
                                             <p:txEl>
-                                              <p:pRg st="1" end="1"/>
+                                              <p:pRg st="2" end="2"/>
                                             </p:txEl>
                                           </p:spTgt>
                                         </p:tgtEl>
@@ -13452,7 +13605,7 @@
                                         <p:tgtEl>
                                           <p:spTgt spid="3">
                                             <p:txEl>
-                                              <p:pRg st="1" end="1"/>
+                                              <p:pRg st="2" end="2"/>
                                             </p:txEl>
                                           </p:spTgt>
                                         </p:tgtEl>
@@ -13495,7 +13648,7 @@
                                         <p:tgtEl>
                                           <p:spTgt spid="3">
                                             <p:txEl>
-                                              <p:pRg st="2" end="2"/>
+                                              <p:pRg st="3" end="3"/>
                                             </p:txEl>
                                           </p:spTgt>
                                         </p:tgtEl>
@@ -13513,7 +13666,7 @@
                                         <p:tgtEl>
                                           <p:spTgt spid="3">
                                             <p:txEl>
-                                              <p:pRg st="2" end="2"/>
+                                              <p:pRg st="3" end="3"/>
                                             </p:txEl>
                                           </p:spTgt>
                                         </p:tgtEl>
@@ -13556,7 +13709,7 @@
                                         <p:tgtEl>
                                           <p:spTgt spid="3">
                                             <p:txEl>
-                                              <p:pRg st="3" end="3"/>
+                                              <p:pRg st="4" end="4"/>
                                             </p:txEl>
                                           </p:spTgt>
                                         </p:tgtEl>
@@ -13574,9 +13727,421 @@
                                         <p:tgtEl>
                                           <p:spTgt spid="3">
                                             <p:txEl>
+                                              <p:pRg st="4" end="4"/>
+                                            </p:txEl>
+                                          </p:spTgt>
+                                        </p:tgtEl>
+                                      </p:cBhvr>
+                                    </p:animEffect>
+                                  </p:childTnLst>
+                                </p:cTn>
+                              </p:par>
+                            </p:childTnLst>
+                          </p:cTn>
+                        </p:par>
+                      </p:childTnLst>
+                    </p:cTn>
+                  </p:par>
+                </p:childTnLst>
+              </p:cTn>
+              <p:prevCondLst>
+                <p:cond evt="onPrev" delay="0">
+                  <p:tgtEl>
+                    <p:sldTgt/>
+                  </p:tgtEl>
+                </p:cond>
+              </p:prevCondLst>
+              <p:nextCondLst>
+                <p:cond evt="onNext" delay="0">
+                  <p:tgtEl>
+                    <p:sldTgt/>
+                  </p:tgtEl>
+                </p:cond>
+              </p:nextCondLst>
+            </p:seq>
+          </p:childTnLst>
+        </p:cTn>
+      </p:par>
+    </p:tnLst>
+    <p:bldLst>
+      <p:bldP spid="3" grpId="0" uiExpand="1" build="p"/>
+    </p:bldLst>
+  </p:timing>
+</p:sld>
+</file>
+
+<file path=ppt/slides/slide4.xml><?xml version="1.0" encoding="utf-8"?>
+<p:sld xmlns:a="http://schemas.openxmlformats.org/drawingml/2006/main" xmlns:r="http://schemas.openxmlformats.org/officeDocument/2006/relationships" xmlns:p="http://schemas.openxmlformats.org/presentationml/2006/main">
+  <p:cSld>
+    <p:spTree>
+      <p:nvGrpSpPr>
+        <p:cNvPr id="1" name=""/>
+        <p:cNvGrpSpPr/>
+        <p:nvPr/>
+      </p:nvGrpSpPr>
+      <p:grpSpPr>
+        <a:xfrm>
+          <a:off x="0" y="0"/>
+          <a:ext cx="0" cy="0"/>
+          <a:chOff x="0" y="0"/>
+          <a:chExt cx="0" cy="0"/>
+        </a:xfrm>
+      </p:grpSpPr>
+      <p:sp>
+        <p:nvSpPr>
+          <p:cNvPr id="2" name="Title 1"/>
+          <p:cNvSpPr>
+            <a:spLocks noGrp="1"/>
+          </p:cNvSpPr>
+          <p:nvPr>
+            <p:ph type="title"/>
+          </p:nvPr>
+        </p:nvSpPr>
+        <p:spPr/>
+        <p:txBody>
+          <a:bodyPr/>
+          <a:lstStyle/>
+          <a:p>
+            <a:r>
+              <a:rPr lang="en-US" dirty="0"/>
+              <a:t>Genetic Programming &amp; Financial Forecasting</a:t>
+            </a:r>
+          </a:p>
+        </p:txBody>
+      </p:sp>
+      <p:sp>
+        <p:nvSpPr>
+          <p:cNvPr id="3" name="Content Placeholder 2"/>
+          <p:cNvSpPr>
+            <a:spLocks noGrp="1"/>
+          </p:cNvSpPr>
+          <p:nvPr>
+            <p:ph sz="half" idx="1"/>
+          </p:nvPr>
+        </p:nvSpPr>
+        <p:spPr/>
+        <p:txBody>
+          <a:bodyPr/>
+          <a:lstStyle/>
+          <a:p>
+            <a:r>
+              <a:rPr lang="en-US" dirty="0"/>
+              <a:t>Symbolic Regression</a:t>
+            </a:r>
+          </a:p>
+          <a:p>
+            <a:pPr lvl="1"/>
+            <a:r>
+              <a:rPr lang="en-US" dirty="0"/>
+              <a:t>Finding a mathematical expression that best fits a curve</a:t>
+            </a:r>
+          </a:p>
+          <a:p>
+            <a:r>
+              <a:rPr lang="en-US" dirty="0"/>
+              <a:t>Rule-based GP</a:t>
+            </a:r>
+          </a:p>
+          <a:p>
+            <a:r>
+              <a:rPr lang="en-US" dirty="0"/>
+              <a:t>Fitness Function – Sum of Square Residuals (right)</a:t>
+            </a:r>
+          </a:p>
+          <a:p>
+            <a:r>
+              <a:rPr lang="en-US" dirty="0"/>
+              <a:t>Similar to Ordinary Least Squares (OLS) econometric regression testing</a:t>
+            </a:r>
+          </a:p>
+        </p:txBody>
+      </p:sp>
+      <p:pic>
+        <p:nvPicPr>
+          <p:cNvPr id="5" name="Content Placeholder 4"/>
+          <p:cNvPicPr>
+            <a:picLocks noGrp="1" noChangeAspect="1"/>
+          </p:cNvPicPr>
+          <p:nvPr>
+            <p:ph sz="half" idx="2"/>
+          </p:nvPr>
+        </p:nvPicPr>
+        <p:blipFill>
+          <a:blip r:embed="rId3">
+            <a:extLst>
+              <a:ext uri="{28A0092B-C50C-407E-A947-70E740481C1C}">
+                <a14:useLocalDpi xmlns:a14="http://schemas.microsoft.com/office/drawing/2010/main" val="0"/>
+              </a:ext>
+            </a:extLst>
+          </a:blip>
+          <a:stretch>
+            <a:fillRect/>
+          </a:stretch>
+        </p:blipFill>
+        <p:spPr>
+          <a:xfrm>
+            <a:off x="6742112" y="1949456"/>
+            <a:ext cx="4013270" cy="3559169"/>
+          </a:xfrm>
+        </p:spPr>
+      </p:pic>
+    </p:spTree>
+    <p:extLst>
+      <p:ext uri="{BB962C8B-B14F-4D97-AF65-F5344CB8AC3E}">
+        <p14:creationId xmlns:p14="http://schemas.microsoft.com/office/powerpoint/2010/main" val="2853788422"/>
+      </p:ext>
+    </p:extLst>
+  </p:cSld>
+  <p:clrMapOvr>
+    <a:masterClrMapping/>
+  </p:clrMapOvr>
+  <mc:AlternateContent xmlns:mc="http://schemas.openxmlformats.org/markup-compatibility/2006" xmlns:p14="http://schemas.microsoft.com/office/powerpoint/2010/main">
+    <mc:Choice Requires="p14">
+      <p:transition spd="med" p14:dur="700">
+        <p:fade/>
+      </p:transition>
+    </mc:Choice>
+    <mc:Fallback xmlns="">
+      <p:transition spd="med">
+        <p:fade/>
+      </p:transition>
+    </mc:Fallback>
+  </mc:AlternateContent>
+  <p:timing>
+    <p:tnLst>
+      <p:par>
+        <p:cTn id="1" dur="indefinite" restart="never" nodeType="tmRoot">
+          <p:childTnLst>
+            <p:seq concurrent="1" nextAc="seek">
+              <p:cTn id="2" dur="indefinite" nodeType="mainSeq">
+                <p:childTnLst>
+                  <p:par>
+                    <p:cTn id="3" fill="hold">
+                      <p:stCondLst>
+                        <p:cond delay="indefinite"/>
+                        <p:cond evt="onBegin" delay="0">
+                          <p:tn val="2"/>
+                        </p:cond>
+                      </p:stCondLst>
+                      <p:childTnLst>
+                        <p:par>
+                          <p:cTn id="4" fill="hold">
+                            <p:stCondLst>
+                              <p:cond delay="0"/>
+                            </p:stCondLst>
+                            <p:childTnLst>
+                              <p:par>
+                                <p:cTn id="5" presetID="10" presetClass="entr" presetSubtype="0" fill="hold" grpId="0" nodeType="withEffect">
+                                  <p:stCondLst>
+                                    <p:cond delay="0"/>
+                                  </p:stCondLst>
+                                  <p:childTnLst>
+                                    <p:set>
+                                      <p:cBhvr>
+                                        <p:cTn id="6" dur="1" fill="hold">
+                                          <p:stCondLst>
+                                            <p:cond delay="0"/>
+                                          </p:stCondLst>
+                                        </p:cTn>
+                                        <p:tgtEl>
+                                          <p:spTgt spid="3">
+                                            <p:txEl>
+                                              <p:pRg st="1" end="1"/>
+                                            </p:txEl>
+                                          </p:spTgt>
+                                        </p:tgtEl>
+                                        <p:attrNameLst>
+                                          <p:attrName>style.visibility</p:attrName>
+                                        </p:attrNameLst>
+                                      </p:cBhvr>
+                                      <p:to>
+                                        <p:strVal val="visible"/>
+                                      </p:to>
+                                    </p:set>
+                                    <p:animEffect transition="in" filter="fade">
+                                      <p:cBhvr>
+                                        <p:cTn id="7" dur="500"/>
+                                        <p:tgtEl>
+                                          <p:spTgt spid="3">
+                                            <p:txEl>
+                                              <p:pRg st="1" end="1"/>
+                                            </p:txEl>
+                                          </p:spTgt>
+                                        </p:tgtEl>
+                                      </p:cBhvr>
+                                    </p:animEffect>
+                                  </p:childTnLst>
+                                </p:cTn>
+                              </p:par>
+                            </p:childTnLst>
+                          </p:cTn>
+                        </p:par>
+                      </p:childTnLst>
+                    </p:cTn>
+                  </p:par>
+                  <p:par>
+                    <p:cTn id="8" fill="hold">
+                      <p:stCondLst>
+                        <p:cond delay="indefinite"/>
+                      </p:stCondLst>
+                      <p:childTnLst>
+                        <p:par>
+                          <p:cTn id="9" fill="hold">
+                            <p:stCondLst>
+                              <p:cond delay="0"/>
+                            </p:stCondLst>
+                            <p:childTnLst>
+                              <p:par>
+                                <p:cTn id="10" presetID="10" presetClass="entr" presetSubtype="0" fill="hold" grpId="0" nodeType="clickEffect">
+                                  <p:stCondLst>
+                                    <p:cond delay="0"/>
+                                  </p:stCondLst>
+                                  <p:childTnLst>
+                                    <p:set>
+                                      <p:cBhvr>
+                                        <p:cTn id="11" dur="1" fill="hold">
+                                          <p:stCondLst>
+                                            <p:cond delay="0"/>
+                                          </p:stCondLst>
+                                        </p:cTn>
+                                        <p:tgtEl>
+                                          <p:spTgt spid="3">
+                                            <p:txEl>
+                                              <p:pRg st="2" end="2"/>
+                                            </p:txEl>
+                                          </p:spTgt>
+                                        </p:tgtEl>
+                                        <p:attrNameLst>
+                                          <p:attrName>style.visibility</p:attrName>
+                                        </p:attrNameLst>
+                                      </p:cBhvr>
+                                      <p:to>
+                                        <p:strVal val="visible"/>
+                                      </p:to>
+                                    </p:set>
+                                    <p:animEffect transition="in" filter="fade">
+                                      <p:cBhvr>
+                                        <p:cTn id="12" dur="500"/>
+                                        <p:tgtEl>
+                                          <p:spTgt spid="3">
+                                            <p:txEl>
+                                              <p:pRg st="2" end="2"/>
+                                            </p:txEl>
+                                          </p:spTgt>
+                                        </p:tgtEl>
+                                      </p:cBhvr>
+                                    </p:animEffect>
+                                  </p:childTnLst>
+                                </p:cTn>
+                              </p:par>
+                            </p:childTnLst>
+                          </p:cTn>
+                        </p:par>
+                      </p:childTnLst>
+                    </p:cTn>
+                  </p:par>
+                  <p:par>
+                    <p:cTn id="13" fill="hold">
+                      <p:stCondLst>
+                        <p:cond delay="indefinite"/>
+                      </p:stCondLst>
+                      <p:childTnLst>
+                        <p:par>
+                          <p:cTn id="14" fill="hold">
+                            <p:stCondLst>
+                              <p:cond delay="0"/>
+                            </p:stCondLst>
+                            <p:childTnLst>
+                              <p:par>
+                                <p:cTn id="15" presetID="10" presetClass="entr" presetSubtype="0" fill="hold" grpId="0" nodeType="clickEffect">
+                                  <p:stCondLst>
+                                    <p:cond delay="0"/>
+                                  </p:stCondLst>
+                                  <p:childTnLst>
+                                    <p:set>
+                                      <p:cBhvr>
+                                        <p:cTn id="16" dur="1" fill="hold">
+                                          <p:stCondLst>
+                                            <p:cond delay="0"/>
+                                          </p:stCondLst>
+                                        </p:cTn>
+                                        <p:tgtEl>
+                                          <p:spTgt spid="3">
+                                            <p:txEl>
                                               <p:pRg st="3" end="3"/>
                                             </p:txEl>
                                           </p:spTgt>
+                                        </p:tgtEl>
+                                        <p:attrNameLst>
+                                          <p:attrName>style.visibility</p:attrName>
+                                        </p:attrNameLst>
+                                      </p:cBhvr>
+                                      <p:to>
+                                        <p:strVal val="visible"/>
+                                      </p:to>
+                                    </p:set>
+                                    <p:animEffect transition="in" filter="fade">
+                                      <p:cBhvr>
+                                        <p:cTn id="17" dur="500"/>
+                                        <p:tgtEl>
+                                          <p:spTgt spid="3">
+                                            <p:txEl>
+                                              <p:pRg st="3" end="3"/>
+                                            </p:txEl>
+                                          </p:spTgt>
+                                        </p:tgtEl>
+                                      </p:cBhvr>
+                                    </p:animEffect>
+                                  </p:childTnLst>
+                                </p:cTn>
+                              </p:par>
+                            </p:childTnLst>
+                          </p:cTn>
+                        </p:par>
+                      </p:childTnLst>
+                    </p:cTn>
+                  </p:par>
+                  <p:par>
+                    <p:cTn id="18" fill="hold">
+                      <p:stCondLst>
+                        <p:cond delay="indefinite"/>
+                      </p:stCondLst>
+                      <p:childTnLst>
+                        <p:par>
+                          <p:cTn id="19" fill="hold">
+                            <p:stCondLst>
+                              <p:cond delay="0"/>
+                            </p:stCondLst>
+                            <p:childTnLst>
+                              <p:par>
+                                <p:cTn id="20" presetID="10" presetClass="entr" presetSubtype="0" fill="hold" nodeType="clickEffect">
+                                  <p:stCondLst>
+                                    <p:cond delay="0"/>
+                                  </p:stCondLst>
+                                  <p:childTnLst>
+                                    <p:set>
+                                      <p:cBhvr>
+                                        <p:cTn id="21" dur="1" fill="hold">
+                                          <p:stCondLst>
+                                            <p:cond delay="0"/>
+                                          </p:stCondLst>
+                                        </p:cTn>
+                                        <p:tgtEl>
+                                          <p:spTgt spid="5"/>
+                                        </p:tgtEl>
+                                        <p:attrNameLst>
+                                          <p:attrName>style.visibility</p:attrName>
+                                        </p:attrNameLst>
+                                      </p:cBhvr>
+                                      <p:to>
+                                        <p:strVal val="visible"/>
+                                      </p:to>
+                                    </p:set>
+                                    <p:animEffect transition="in" filter="fade">
+                                      <p:cBhvr>
+                                        <p:cTn id="22" dur="500"/>
+                                        <p:tgtEl>
+                                          <p:spTgt spid="5"/>
                                         </p:tgtEl>
                                       </p:cBhvr>
                                     </p:animEffect>
@@ -13602,7 +14167,7 @@
                             </p:stCondLst>
                             <p:childTnLst>
                               <p:par>
-                                <p:cTn id="25" presetID="10" presetClass="entr" presetSubtype="0" fill="hold" grpId="0" nodeType="clickEffect">
+                                <p:cTn id="25" presetID="10" presetClass="entr" presetSubtype="0" fill="hold" nodeType="clickEffect">
                                   <p:stCondLst>
                                     <p:cond delay="0"/>
                                   </p:stCondLst>
@@ -13672,519 +14237,6 @@
       </p:par>
     </p:tnLst>
     <p:bldLst>
-      <p:bldP spid="3" grpId="0" build="p"/>
-    </p:bldLst>
-  </p:timing>
-</p:sld>
-</file>
-
-<file path=ppt/slides/slide4.xml><?xml version="1.0" encoding="utf-8"?>
-<p:sld xmlns:a="http://schemas.openxmlformats.org/drawingml/2006/main" xmlns:r="http://schemas.openxmlformats.org/officeDocument/2006/relationships" xmlns:p="http://schemas.openxmlformats.org/presentationml/2006/main">
-  <p:cSld>
-    <p:spTree>
-      <p:nvGrpSpPr>
-        <p:cNvPr id="1" name=""/>
-        <p:cNvGrpSpPr/>
-        <p:nvPr/>
-      </p:nvGrpSpPr>
-      <p:grpSpPr>
-        <a:xfrm>
-          <a:off x="0" y="0"/>
-          <a:ext cx="0" cy="0"/>
-          <a:chOff x="0" y="0"/>
-          <a:chExt cx="0" cy="0"/>
-        </a:xfrm>
-      </p:grpSpPr>
-      <p:sp>
-        <p:nvSpPr>
-          <p:cNvPr id="2" name="Title 1"/>
-          <p:cNvSpPr>
-            <a:spLocks noGrp="1"/>
-          </p:cNvSpPr>
-          <p:nvPr>
-            <p:ph type="title"/>
-          </p:nvPr>
-        </p:nvSpPr>
-        <p:spPr/>
-        <p:txBody>
-          <a:bodyPr/>
-          <a:lstStyle/>
-          <a:p>
-            <a:r>
-              <a:rPr lang="en-US" dirty="0"/>
-              <a:t>Genetic Programming &amp; Financial Forecasting</a:t>
-            </a:r>
-          </a:p>
-        </p:txBody>
-      </p:sp>
-      <p:sp>
-        <p:nvSpPr>
-          <p:cNvPr id="3" name="Content Placeholder 2"/>
-          <p:cNvSpPr>
-            <a:spLocks noGrp="1"/>
-          </p:cNvSpPr>
-          <p:nvPr>
-            <p:ph sz="half" idx="1"/>
-          </p:nvPr>
-        </p:nvSpPr>
-        <p:spPr/>
-        <p:txBody>
-          <a:bodyPr/>
-          <a:lstStyle/>
-          <a:p>
-            <a:r>
-              <a:rPr lang="en-US" dirty="0"/>
-              <a:t>Symbolic Regression</a:t>
-            </a:r>
-          </a:p>
-          <a:p>
-            <a:pPr lvl="1"/>
-            <a:r>
-              <a:rPr lang="en-US" dirty="0"/>
-              <a:t>Finding a mathematical expression that best fits a curve</a:t>
-            </a:r>
-          </a:p>
-          <a:p>
-            <a:r>
-              <a:rPr lang="en-US" dirty="0"/>
-              <a:t>Rule-based GP</a:t>
-            </a:r>
-          </a:p>
-          <a:p>
-            <a:r>
-              <a:rPr lang="en-US" dirty="0"/>
-              <a:t>Fitness Function – Sum of Square Residuals (right)</a:t>
-            </a:r>
-          </a:p>
-          <a:p>
-            <a:r>
-              <a:rPr lang="en-US" dirty="0"/>
-              <a:t>Similar to Ordinary Least Squares (OLS) econometric regression testing</a:t>
-            </a:r>
-          </a:p>
-        </p:txBody>
-      </p:sp>
-      <p:pic>
-        <p:nvPicPr>
-          <p:cNvPr id="5" name="Content Placeholder 4"/>
-          <p:cNvPicPr>
-            <a:picLocks noGrp="1" noChangeAspect="1"/>
-          </p:cNvPicPr>
-          <p:nvPr>
-            <p:ph sz="half" idx="2"/>
-          </p:nvPr>
-        </p:nvPicPr>
-        <p:blipFill>
-          <a:blip r:embed="rId3">
-            <a:extLst>
-              <a:ext uri="{28A0092B-C50C-407E-A947-70E740481C1C}">
-                <a14:useLocalDpi xmlns:a14="http://schemas.microsoft.com/office/drawing/2010/main" val="0"/>
-              </a:ext>
-            </a:extLst>
-          </a:blip>
-          <a:stretch>
-            <a:fillRect/>
-          </a:stretch>
-        </p:blipFill>
-        <p:spPr>
-          <a:xfrm>
-            <a:off x="6742112" y="1949456"/>
-            <a:ext cx="4013270" cy="3559169"/>
-          </a:xfrm>
-        </p:spPr>
-      </p:pic>
-    </p:spTree>
-    <p:extLst>
-      <p:ext uri="{BB962C8B-B14F-4D97-AF65-F5344CB8AC3E}">
-        <p14:creationId xmlns:p14="http://schemas.microsoft.com/office/powerpoint/2010/main" val="2853788422"/>
-      </p:ext>
-    </p:extLst>
-  </p:cSld>
-  <p:clrMapOvr>
-    <a:masterClrMapping/>
-  </p:clrMapOvr>
-  <mc:AlternateContent xmlns:mc="http://schemas.openxmlformats.org/markup-compatibility/2006" xmlns:p14="http://schemas.microsoft.com/office/powerpoint/2010/main">
-    <mc:Choice Requires="p14">
-      <p:transition spd="med" p14:dur="700">
-        <p:fade/>
-      </p:transition>
-    </mc:Choice>
-    <mc:Fallback xmlns="">
-      <p:transition spd="med">
-        <p:fade/>
-      </p:transition>
-    </mc:Fallback>
-  </mc:AlternateContent>
-  <p:timing>
-    <p:tnLst>
-      <p:par>
-        <p:cTn id="1" dur="indefinite" restart="never" nodeType="tmRoot">
-          <p:childTnLst>
-            <p:seq concurrent="1" nextAc="seek">
-              <p:cTn id="2" dur="indefinite" nodeType="mainSeq">
-                <p:childTnLst>
-                  <p:par>
-                    <p:cTn id="3" fill="hold">
-                      <p:stCondLst>
-                        <p:cond delay="indefinite"/>
-                      </p:stCondLst>
-                      <p:childTnLst>
-                        <p:par>
-                          <p:cTn id="4" fill="hold">
-                            <p:stCondLst>
-                              <p:cond delay="0"/>
-                            </p:stCondLst>
-                            <p:childTnLst>
-                              <p:par>
-                                <p:cTn id="5" presetID="10" presetClass="entr" presetSubtype="0" fill="hold" grpId="0" nodeType="clickEffect">
-                                  <p:stCondLst>
-                                    <p:cond delay="0"/>
-                                  </p:stCondLst>
-                                  <p:childTnLst>
-                                    <p:set>
-                                      <p:cBhvr>
-                                        <p:cTn id="6" dur="1" fill="hold">
-                                          <p:stCondLst>
-                                            <p:cond delay="0"/>
-                                          </p:stCondLst>
-                                        </p:cTn>
-                                        <p:tgtEl>
-                                          <p:spTgt spid="3">
-                                            <p:txEl>
-                                              <p:pRg st="0" end="0"/>
-                                            </p:txEl>
-                                          </p:spTgt>
-                                        </p:tgtEl>
-                                        <p:attrNameLst>
-                                          <p:attrName>style.visibility</p:attrName>
-                                        </p:attrNameLst>
-                                      </p:cBhvr>
-                                      <p:to>
-                                        <p:strVal val="visible"/>
-                                      </p:to>
-                                    </p:set>
-                                    <p:animEffect transition="in" filter="fade">
-                                      <p:cBhvr>
-                                        <p:cTn id="7" dur="500"/>
-                                        <p:tgtEl>
-                                          <p:spTgt spid="3">
-                                            <p:txEl>
-                                              <p:pRg st="0" end="0"/>
-                                            </p:txEl>
-                                          </p:spTgt>
-                                        </p:tgtEl>
-                                      </p:cBhvr>
-                                    </p:animEffect>
-                                  </p:childTnLst>
-                                </p:cTn>
-                              </p:par>
-                              <p:par>
-                                <p:cTn id="8" presetID="10" presetClass="entr" presetSubtype="0" fill="hold" grpId="0" nodeType="withEffect">
-                                  <p:stCondLst>
-                                    <p:cond delay="0"/>
-                                  </p:stCondLst>
-                                  <p:childTnLst>
-                                    <p:set>
-                                      <p:cBhvr>
-                                        <p:cTn id="9" dur="1" fill="hold">
-                                          <p:stCondLst>
-                                            <p:cond delay="0"/>
-                                          </p:stCondLst>
-                                        </p:cTn>
-                                        <p:tgtEl>
-                                          <p:spTgt spid="3">
-                                            <p:txEl>
-                                              <p:pRg st="1" end="1"/>
-                                            </p:txEl>
-                                          </p:spTgt>
-                                        </p:tgtEl>
-                                        <p:attrNameLst>
-                                          <p:attrName>style.visibility</p:attrName>
-                                        </p:attrNameLst>
-                                      </p:cBhvr>
-                                      <p:to>
-                                        <p:strVal val="visible"/>
-                                      </p:to>
-                                    </p:set>
-                                    <p:animEffect transition="in" filter="fade">
-                                      <p:cBhvr>
-                                        <p:cTn id="10" dur="500"/>
-                                        <p:tgtEl>
-                                          <p:spTgt spid="3">
-                                            <p:txEl>
-                                              <p:pRg st="1" end="1"/>
-                                            </p:txEl>
-                                          </p:spTgt>
-                                        </p:tgtEl>
-                                      </p:cBhvr>
-                                    </p:animEffect>
-                                  </p:childTnLst>
-                                </p:cTn>
-                              </p:par>
-                            </p:childTnLst>
-                          </p:cTn>
-                        </p:par>
-                      </p:childTnLst>
-                    </p:cTn>
-                  </p:par>
-                  <p:par>
-                    <p:cTn id="11" fill="hold">
-                      <p:stCondLst>
-                        <p:cond delay="indefinite"/>
-                      </p:stCondLst>
-                      <p:childTnLst>
-                        <p:par>
-                          <p:cTn id="12" fill="hold">
-                            <p:stCondLst>
-                              <p:cond delay="0"/>
-                            </p:stCondLst>
-                            <p:childTnLst>
-                              <p:par>
-                                <p:cTn id="13" presetID="10" presetClass="entr" presetSubtype="0" fill="hold" grpId="0" nodeType="clickEffect">
-                                  <p:stCondLst>
-                                    <p:cond delay="0"/>
-                                  </p:stCondLst>
-                                  <p:childTnLst>
-                                    <p:set>
-                                      <p:cBhvr>
-                                        <p:cTn id="14" dur="1" fill="hold">
-                                          <p:stCondLst>
-                                            <p:cond delay="0"/>
-                                          </p:stCondLst>
-                                        </p:cTn>
-                                        <p:tgtEl>
-                                          <p:spTgt spid="3">
-                                            <p:txEl>
-                                              <p:pRg st="2" end="2"/>
-                                            </p:txEl>
-                                          </p:spTgt>
-                                        </p:tgtEl>
-                                        <p:attrNameLst>
-                                          <p:attrName>style.visibility</p:attrName>
-                                        </p:attrNameLst>
-                                      </p:cBhvr>
-                                      <p:to>
-                                        <p:strVal val="visible"/>
-                                      </p:to>
-                                    </p:set>
-                                    <p:animEffect transition="in" filter="fade">
-                                      <p:cBhvr>
-                                        <p:cTn id="15" dur="500"/>
-                                        <p:tgtEl>
-                                          <p:spTgt spid="3">
-                                            <p:txEl>
-                                              <p:pRg st="2" end="2"/>
-                                            </p:txEl>
-                                          </p:spTgt>
-                                        </p:tgtEl>
-                                      </p:cBhvr>
-                                    </p:animEffect>
-                                  </p:childTnLst>
-                                </p:cTn>
-                              </p:par>
-                            </p:childTnLst>
-                          </p:cTn>
-                        </p:par>
-                      </p:childTnLst>
-                    </p:cTn>
-                  </p:par>
-                  <p:par>
-                    <p:cTn id="16" fill="hold">
-                      <p:stCondLst>
-                        <p:cond delay="indefinite"/>
-                      </p:stCondLst>
-                      <p:childTnLst>
-                        <p:par>
-                          <p:cTn id="17" fill="hold">
-                            <p:stCondLst>
-                              <p:cond delay="0"/>
-                            </p:stCondLst>
-                            <p:childTnLst>
-                              <p:par>
-                                <p:cTn id="18" presetID="10" presetClass="entr" presetSubtype="0" fill="hold" grpId="0" nodeType="clickEffect">
-                                  <p:stCondLst>
-                                    <p:cond delay="0"/>
-                                  </p:stCondLst>
-                                  <p:childTnLst>
-                                    <p:set>
-                                      <p:cBhvr>
-                                        <p:cTn id="19" dur="1" fill="hold">
-                                          <p:stCondLst>
-                                            <p:cond delay="0"/>
-                                          </p:stCondLst>
-                                        </p:cTn>
-                                        <p:tgtEl>
-                                          <p:spTgt spid="3">
-                                            <p:txEl>
-                                              <p:pRg st="3" end="3"/>
-                                            </p:txEl>
-                                          </p:spTgt>
-                                        </p:tgtEl>
-                                        <p:attrNameLst>
-                                          <p:attrName>style.visibility</p:attrName>
-                                        </p:attrNameLst>
-                                      </p:cBhvr>
-                                      <p:to>
-                                        <p:strVal val="visible"/>
-                                      </p:to>
-                                    </p:set>
-                                    <p:animEffect transition="in" filter="fade">
-                                      <p:cBhvr>
-                                        <p:cTn id="20" dur="500"/>
-                                        <p:tgtEl>
-                                          <p:spTgt spid="3">
-                                            <p:txEl>
-                                              <p:pRg st="3" end="3"/>
-                                            </p:txEl>
-                                          </p:spTgt>
-                                        </p:tgtEl>
-                                      </p:cBhvr>
-                                    </p:animEffect>
-                                  </p:childTnLst>
-                                </p:cTn>
-                              </p:par>
-                            </p:childTnLst>
-                          </p:cTn>
-                        </p:par>
-                      </p:childTnLst>
-                    </p:cTn>
-                  </p:par>
-                  <p:par>
-                    <p:cTn id="21" fill="hold">
-                      <p:stCondLst>
-                        <p:cond delay="indefinite"/>
-                      </p:stCondLst>
-                      <p:childTnLst>
-                        <p:par>
-                          <p:cTn id="22" fill="hold">
-                            <p:stCondLst>
-                              <p:cond delay="0"/>
-                            </p:stCondLst>
-                            <p:childTnLst>
-                              <p:par>
-                                <p:cTn id="23" presetID="10" presetClass="entr" presetSubtype="0" fill="hold" nodeType="clickEffect">
-                                  <p:stCondLst>
-                                    <p:cond delay="0"/>
-                                  </p:stCondLst>
-                                  <p:childTnLst>
-                                    <p:set>
-                                      <p:cBhvr>
-                                        <p:cTn id="24" dur="1" fill="hold">
-                                          <p:stCondLst>
-                                            <p:cond delay="0"/>
-                                          </p:stCondLst>
-                                        </p:cTn>
-                                        <p:tgtEl>
-                                          <p:spTgt spid="5"/>
-                                        </p:tgtEl>
-                                        <p:attrNameLst>
-                                          <p:attrName>style.visibility</p:attrName>
-                                        </p:attrNameLst>
-                                      </p:cBhvr>
-                                      <p:to>
-                                        <p:strVal val="visible"/>
-                                      </p:to>
-                                    </p:set>
-                                    <p:animEffect transition="in" filter="fade">
-                                      <p:cBhvr>
-                                        <p:cTn id="25" dur="500"/>
-                                        <p:tgtEl>
-                                          <p:spTgt spid="5"/>
-                                        </p:tgtEl>
-                                      </p:cBhvr>
-                                    </p:animEffect>
-                                  </p:childTnLst>
-                                </p:cTn>
-                              </p:par>
-                            </p:childTnLst>
-                          </p:cTn>
-                        </p:par>
-                      </p:childTnLst>
-                    </p:cTn>
-                  </p:par>
-                  <p:par>
-                    <p:cTn id="26" fill="hold">
-                      <p:stCondLst>
-                        <p:cond delay="indefinite"/>
-                      </p:stCondLst>
-                      <p:childTnLst>
-                        <p:par>
-                          <p:cTn id="27" fill="hold">
-                            <p:stCondLst>
-                              <p:cond delay="0"/>
-                            </p:stCondLst>
-                            <p:childTnLst>
-                              <p:par>
-                                <p:cTn id="28" presetID="10" presetClass="entr" presetSubtype="0" fill="hold" nodeType="clickEffect">
-                                  <p:stCondLst>
-                                    <p:cond delay="0"/>
-                                  </p:stCondLst>
-                                  <p:childTnLst>
-                                    <p:set>
-                                      <p:cBhvr>
-                                        <p:cTn id="29" dur="1" fill="hold">
-                                          <p:stCondLst>
-                                            <p:cond delay="0"/>
-                                          </p:stCondLst>
-                                        </p:cTn>
-                                        <p:tgtEl>
-                                          <p:spTgt spid="3">
-                                            <p:txEl>
-                                              <p:pRg st="4" end="4"/>
-                                            </p:txEl>
-                                          </p:spTgt>
-                                        </p:tgtEl>
-                                        <p:attrNameLst>
-                                          <p:attrName>style.visibility</p:attrName>
-                                        </p:attrNameLst>
-                                      </p:cBhvr>
-                                      <p:to>
-                                        <p:strVal val="visible"/>
-                                      </p:to>
-                                    </p:set>
-                                    <p:animEffect transition="in" filter="fade">
-                                      <p:cBhvr>
-                                        <p:cTn id="30" dur="500"/>
-                                        <p:tgtEl>
-                                          <p:spTgt spid="3">
-                                            <p:txEl>
-                                              <p:pRg st="4" end="4"/>
-                                            </p:txEl>
-                                          </p:spTgt>
-                                        </p:tgtEl>
-                                      </p:cBhvr>
-                                    </p:animEffect>
-                                  </p:childTnLst>
-                                </p:cTn>
-                              </p:par>
-                            </p:childTnLst>
-                          </p:cTn>
-                        </p:par>
-                      </p:childTnLst>
-                    </p:cTn>
-                  </p:par>
-                </p:childTnLst>
-              </p:cTn>
-              <p:prevCondLst>
-                <p:cond evt="onPrev" delay="0">
-                  <p:tgtEl>
-                    <p:sldTgt/>
-                  </p:tgtEl>
-                </p:cond>
-              </p:prevCondLst>
-              <p:nextCondLst>
-                <p:cond evt="onNext" delay="0">
-                  <p:tgtEl>
-                    <p:sldTgt/>
-                  </p:tgtEl>
-                </p:cond>
-              </p:nextCondLst>
-            </p:seq>
-          </p:childTnLst>
-        </p:cTn>
-      </p:par>
-    </p:tnLst>
-    <p:bldLst>
       <p:bldP spid="3" grpId="0" uiExpand="1" build="p"/>
     </p:bldLst>
   </p:timing>
@@ -14334,7 +14386,7 @@
                                         <p:tgtEl>
                                           <p:spTgt spid="3">
                                             <p:txEl>
-                                              <p:pRg st="0" end="0"/>
+                                              <p:pRg st="1" end="1"/>
                                             </p:txEl>
                                           </p:spTgt>
                                         </p:tgtEl>
@@ -14352,67 +14404,6 @@
                                         <p:tgtEl>
                                           <p:spTgt spid="3">
                                             <p:txEl>
-                                              <p:pRg st="0" end="0"/>
-                                            </p:txEl>
-                                          </p:spTgt>
-                                        </p:tgtEl>
-                                      </p:cBhvr>
-                                    </p:animEffect>
-                                  </p:childTnLst>
-                                </p:cTn>
-                              </p:par>
-                            </p:childTnLst>
-                          </p:cTn>
-                        </p:par>
-                      </p:childTnLst>
-                    </p:cTn>
-                  </p:par>
-                  <p:par>
-                    <p:cTn id="8" fill="hold">
-                      <p:stCondLst>
-                        <p:cond delay="indefinite"/>
-                      </p:stCondLst>
-                      <p:childTnLst>
-                        <p:par>
-                          <p:cTn id="9" fill="hold">
-                            <p:stCondLst>
-                              <p:cond delay="0"/>
-                            </p:stCondLst>
-                            <p:childTnLst>
-                              <p:par>
-                                <p:cTn id="10" presetID="10" presetClass="entr" presetSubtype="0" fill="hold" grpId="0" nodeType="clickEffect">
-                                  <p:stCondLst>
-                                    <p:cond delay="0"/>
-                                  </p:stCondLst>
-                                  <p:childTnLst>
-                                    <p:set>
-                                      <p:cBhvr>
-                                        <p:cTn id="11" dur="1" fill="hold">
-                                          <p:stCondLst>
-                                            <p:cond delay="0"/>
-                                          </p:stCondLst>
-                                        </p:cTn>
-                                        <p:tgtEl>
-                                          <p:spTgt spid="3">
-                                            <p:txEl>
-                                              <p:pRg st="1" end="1"/>
-                                            </p:txEl>
-                                          </p:spTgt>
-                                        </p:tgtEl>
-                                        <p:attrNameLst>
-                                          <p:attrName>style.visibility</p:attrName>
-                                        </p:attrNameLst>
-                                      </p:cBhvr>
-                                      <p:to>
-                                        <p:strVal val="visible"/>
-                                      </p:to>
-                                    </p:set>
-                                    <p:animEffect transition="in" filter="fade">
-                                      <p:cBhvr>
-                                        <p:cTn id="12" dur="500"/>
-                                        <p:tgtEl>
-                                          <p:spTgt spid="3">
-                                            <p:txEl>
                                               <p:pRg st="1" end="1"/>
                                             </p:txEl>
                                           </p:spTgt>
@@ -14423,14 +14414,14 @@
                                 </p:cTn>
                               </p:par>
                               <p:par>
-                                <p:cTn id="13" presetID="10" presetClass="entr" presetSubtype="0" fill="hold" grpId="0" nodeType="withEffect">
+                                <p:cTn id="8" presetID="10" presetClass="entr" presetSubtype="0" fill="hold" grpId="0" nodeType="withEffect">
                                   <p:stCondLst>
                                     <p:cond delay="0"/>
                                   </p:stCondLst>
                                   <p:childTnLst>
                                     <p:set>
                                       <p:cBhvr>
-                                        <p:cTn id="14" dur="1" fill="hold">
+                                        <p:cTn id="9" dur="1" fill="hold">
                                           <p:stCondLst>
                                             <p:cond delay="0"/>
                                           </p:stCondLst>
@@ -14452,7 +14443,7 @@
                                     </p:set>
                                     <p:animEffect transition="in" filter="fade">
                                       <p:cBhvr>
-                                        <p:cTn id="15" dur="500"/>
+                                        <p:cTn id="10" dur="500"/>
                                         <p:tgtEl>
                                           <p:spTgt spid="3">
                                             <p:txEl>
@@ -14472,26 +14463,26 @@
                     </p:cTn>
                   </p:par>
                   <p:par>
-                    <p:cTn id="16" fill="hold">
+                    <p:cTn id="11" fill="hold">
                       <p:stCondLst>
                         <p:cond delay="indefinite"/>
                       </p:stCondLst>
                       <p:childTnLst>
                         <p:par>
-                          <p:cTn id="17" fill="hold">
+                          <p:cTn id="12" fill="hold">
                             <p:stCondLst>
                               <p:cond delay="0"/>
                             </p:stCondLst>
                             <p:childTnLst>
                               <p:par>
-                                <p:cTn id="18" presetID="10" presetClass="entr" presetSubtype="0" fill="hold" grpId="0" nodeType="clickEffect">
+                                <p:cTn id="13" presetID="10" presetClass="entr" presetSubtype="0" fill="hold" grpId="0" nodeType="clickEffect">
                                   <p:stCondLst>
                                     <p:cond delay="0"/>
                                   </p:stCondLst>
                                   <p:childTnLst>
                                     <p:set>
                                       <p:cBhvr>
-                                        <p:cTn id="19" dur="1" fill="hold">
+                                        <p:cTn id="14" dur="1" fill="hold">
                                           <p:stCondLst>
                                             <p:cond delay="0"/>
                                           </p:stCondLst>
@@ -14513,7 +14504,7 @@
                                     </p:set>
                                     <p:animEffect transition="in" filter="fade">
                                       <p:cBhvr>
-                                        <p:cTn id="20" dur="500"/>
+                                        <p:cTn id="15" dur="500"/>
                                         <p:tgtEl>
                                           <p:spTgt spid="3">
                                             <p:txEl>
@@ -14554,7 +14545,7 @@
       </p:par>
     </p:tnLst>
     <p:bldLst>
-      <p:bldP spid="3" grpId="0" build="p"/>
+      <p:bldP spid="3" grpId="0" uiExpand="1" build="p"/>
     </p:bldLst>
   </p:timing>
 </p:sld>
@@ -15172,383 +15163,9 @@
   <p:timing>
     <p:tnLst>
       <p:par>
-        <p:cTn id="1" dur="indefinite" restart="never" nodeType="tmRoot">
-          <p:childTnLst>
-            <p:seq concurrent="1" nextAc="seek">
-              <p:cTn id="2" dur="indefinite" nodeType="mainSeq">
-                <p:childTnLst>
-                  <p:par>
-                    <p:cTn id="3" fill="hold">
-                      <p:stCondLst>
-                        <p:cond delay="indefinite"/>
-                      </p:stCondLst>
-                      <p:childTnLst>
-                        <p:par>
-                          <p:cTn id="4" fill="hold">
-                            <p:stCondLst>
-                              <p:cond delay="0"/>
-                            </p:stCondLst>
-                            <p:childTnLst>
-                              <p:par>
-                                <p:cTn id="5" presetID="10" presetClass="entr" presetSubtype="0" fill="hold" grpId="0" nodeType="clickEffect">
-                                  <p:stCondLst>
-                                    <p:cond delay="0"/>
-                                  </p:stCondLst>
-                                  <p:childTnLst>
-                                    <p:set>
-                                      <p:cBhvr>
-                                        <p:cTn id="6" dur="1" fill="hold">
-                                          <p:stCondLst>
-                                            <p:cond delay="0"/>
-                                          </p:stCondLst>
-                                        </p:cTn>
-                                        <p:tgtEl>
-                                          <p:spTgt spid="3">
-                                            <p:txEl>
-                                              <p:pRg st="0" end="0"/>
-                                            </p:txEl>
-                                          </p:spTgt>
-                                        </p:tgtEl>
-                                        <p:attrNameLst>
-                                          <p:attrName>style.visibility</p:attrName>
-                                        </p:attrNameLst>
-                                      </p:cBhvr>
-                                      <p:to>
-                                        <p:strVal val="visible"/>
-                                      </p:to>
-                                    </p:set>
-                                    <p:animEffect transition="in" filter="fade">
-                                      <p:cBhvr>
-                                        <p:cTn id="7" dur="500"/>
-                                        <p:tgtEl>
-                                          <p:spTgt spid="3">
-                                            <p:txEl>
-                                              <p:pRg st="0" end="0"/>
-                                            </p:txEl>
-                                          </p:spTgt>
-                                        </p:tgtEl>
-                                      </p:cBhvr>
-                                    </p:animEffect>
-                                  </p:childTnLst>
-                                </p:cTn>
-                              </p:par>
-                            </p:childTnLst>
-                          </p:cTn>
-                        </p:par>
-                      </p:childTnLst>
-                    </p:cTn>
-                  </p:par>
-                  <p:par>
-                    <p:cTn id="8" fill="hold">
-                      <p:stCondLst>
-                        <p:cond delay="indefinite"/>
-                      </p:stCondLst>
-                      <p:childTnLst>
-                        <p:par>
-                          <p:cTn id="9" fill="hold">
-                            <p:stCondLst>
-                              <p:cond delay="0"/>
-                            </p:stCondLst>
-                            <p:childTnLst>
-                              <p:par>
-                                <p:cTn id="10" presetID="10" presetClass="entr" presetSubtype="0" fill="hold" grpId="0" nodeType="clickEffect">
-                                  <p:stCondLst>
-                                    <p:cond delay="0"/>
-                                  </p:stCondLst>
-                                  <p:childTnLst>
-                                    <p:set>
-                                      <p:cBhvr>
-                                        <p:cTn id="11" dur="1" fill="hold">
-                                          <p:stCondLst>
-                                            <p:cond delay="0"/>
-                                          </p:stCondLst>
-                                        </p:cTn>
-                                        <p:tgtEl>
-                                          <p:spTgt spid="3">
-                                            <p:txEl>
-                                              <p:pRg st="1" end="1"/>
-                                            </p:txEl>
-                                          </p:spTgt>
-                                        </p:tgtEl>
-                                        <p:attrNameLst>
-                                          <p:attrName>style.visibility</p:attrName>
-                                        </p:attrNameLst>
-                                      </p:cBhvr>
-                                      <p:to>
-                                        <p:strVal val="visible"/>
-                                      </p:to>
-                                    </p:set>
-                                    <p:animEffect transition="in" filter="fade">
-                                      <p:cBhvr>
-                                        <p:cTn id="12" dur="500"/>
-                                        <p:tgtEl>
-                                          <p:spTgt spid="3">
-                                            <p:txEl>
-                                              <p:pRg st="1" end="1"/>
-                                            </p:txEl>
-                                          </p:spTgt>
-                                        </p:tgtEl>
-                                      </p:cBhvr>
-                                    </p:animEffect>
-                                  </p:childTnLst>
-                                </p:cTn>
-                              </p:par>
-                              <p:par>
-                                <p:cTn id="13" presetID="10" presetClass="entr" presetSubtype="0" fill="hold" grpId="0" nodeType="withEffect">
-                                  <p:stCondLst>
-                                    <p:cond delay="0"/>
-                                  </p:stCondLst>
-                                  <p:childTnLst>
-                                    <p:set>
-                                      <p:cBhvr>
-                                        <p:cTn id="14" dur="1" fill="hold">
-                                          <p:stCondLst>
-                                            <p:cond delay="0"/>
-                                          </p:stCondLst>
-                                        </p:cTn>
-                                        <p:tgtEl>
-                                          <p:spTgt spid="3">
-                                            <p:txEl>
-                                              <p:pRg st="2" end="2"/>
-                                            </p:txEl>
-                                          </p:spTgt>
-                                        </p:tgtEl>
-                                        <p:attrNameLst>
-                                          <p:attrName>style.visibility</p:attrName>
-                                        </p:attrNameLst>
-                                      </p:cBhvr>
-                                      <p:to>
-                                        <p:strVal val="visible"/>
-                                      </p:to>
-                                    </p:set>
-                                    <p:animEffect transition="in" filter="fade">
-                                      <p:cBhvr>
-                                        <p:cTn id="15" dur="500"/>
-                                        <p:tgtEl>
-                                          <p:spTgt spid="3">
-                                            <p:txEl>
-                                              <p:pRg st="2" end="2"/>
-                                            </p:txEl>
-                                          </p:spTgt>
-                                        </p:tgtEl>
-                                      </p:cBhvr>
-                                    </p:animEffect>
-                                  </p:childTnLst>
-                                </p:cTn>
-                              </p:par>
-                            </p:childTnLst>
-                          </p:cTn>
-                        </p:par>
-                      </p:childTnLst>
-                    </p:cTn>
-                  </p:par>
-                  <p:par>
-                    <p:cTn id="16" fill="hold">
-                      <p:stCondLst>
-                        <p:cond delay="indefinite"/>
-                      </p:stCondLst>
-                      <p:childTnLst>
-                        <p:par>
-                          <p:cTn id="17" fill="hold">
-                            <p:stCondLst>
-                              <p:cond delay="0"/>
-                            </p:stCondLst>
-                            <p:childTnLst>
-                              <p:par>
-                                <p:cTn id="18" presetID="10" presetClass="entr" presetSubtype="0" fill="hold" grpId="0" nodeType="clickEffect">
-                                  <p:stCondLst>
-                                    <p:cond delay="0"/>
-                                  </p:stCondLst>
-                                  <p:childTnLst>
-                                    <p:set>
-                                      <p:cBhvr>
-                                        <p:cTn id="19" dur="1" fill="hold">
-                                          <p:stCondLst>
-                                            <p:cond delay="0"/>
-                                          </p:stCondLst>
-                                        </p:cTn>
-                                        <p:tgtEl>
-                                          <p:spTgt spid="3">
-                                            <p:txEl>
-                                              <p:pRg st="3" end="3"/>
-                                            </p:txEl>
-                                          </p:spTgt>
-                                        </p:tgtEl>
-                                        <p:attrNameLst>
-                                          <p:attrName>style.visibility</p:attrName>
-                                        </p:attrNameLst>
-                                      </p:cBhvr>
-                                      <p:to>
-                                        <p:strVal val="visible"/>
-                                      </p:to>
-                                    </p:set>
-                                    <p:animEffect transition="in" filter="fade">
-                                      <p:cBhvr>
-                                        <p:cTn id="20" dur="500"/>
-                                        <p:tgtEl>
-                                          <p:spTgt spid="3">
-                                            <p:txEl>
-                                              <p:pRg st="3" end="3"/>
-                                            </p:txEl>
-                                          </p:spTgt>
-                                        </p:tgtEl>
-                                      </p:cBhvr>
-                                    </p:animEffect>
-                                  </p:childTnLst>
-                                </p:cTn>
-                              </p:par>
-                            </p:childTnLst>
-                          </p:cTn>
-                        </p:par>
-                      </p:childTnLst>
-                    </p:cTn>
-                  </p:par>
-                  <p:par>
-                    <p:cTn id="21" fill="hold">
-                      <p:stCondLst>
-                        <p:cond delay="indefinite"/>
-                      </p:stCondLst>
-                      <p:childTnLst>
-                        <p:par>
-                          <p:cTn id="22" fill="hold">
-                            <p:stCondLst>
-                              <p:cond delay="0"/>
-                            </p:stCondLst>
-                            <p:childTnLst>
-                              <p:par>
-                                <p:cTn id="23" presetID="10" presetClass="entr" presetSubtype="0" fill="hold" grpId="0" nodeType="clickEffect">
-                                  <p:stCondLst>
-                                    <p:cond delay="0"/>
-                                  </p:stCondLst>
-                                  <p:childTnLst>
-                                    <p:set>
-                                      <p:cBhvr>
-                                        <p:cTn id="24" dur="1" fill="hold">
-                                          <p:stCondLst>
-                                            <p:cond delay="0"/>
-                                          </p:stCondLst>
-                                        </p:cTn>
-                                        <p:tgtEl>
-                                          <p:spTgt spid="3">
-                                            <p:txEl>
-                                              <p:pRg st="4" end="4"/>
-                                            </p:txEl>
-                                          </p:spTgt>
-                                        </p:tgtEl>
-                                        <p:attrNameLst>
-                                          <p:attrName>style.visibility</p:attrName>
-                                        </p:attrNameLst>
-                                      </p:cBhvr>
-                                      <p:to>
-                                        <p:strVal val="visible"/>
-                                      </p:to>
-                                    </p:set>
-                                    <p:animEffect transition="in" filter="fade">
-                                      <p:cBhvr>
-                                        <p:cTn id="25" dur="500"/>
-                                        <p:tgtEl>
-                                          <p:spTgt spid="3">
-                                            <p:txEl>
-                                              <p:pRg st="4" end="4"/>
-                                            </p:txEl>
-                                          </p:spTgt>
-                                        </p:tgtEl>
-                                      </p:cBhvr>
-                                    </p:animEffect>
-                                  </p:childTnLst>
-                                </p:cTn>
-                              </p:par>
-                            </p:childTnLst>
-                          </p:cTn>
-                        </p:par>
-                      </p:childTnLst>
-                    </p:cTn>
-                  </p:par>
-                  <p:par>
-                    <p:cTn id="26" fill="hold">
-                      <p:stCondLst>
-                        <p:cond delay="indefinite"/>
-                      </p:stCondLst>
-                      <p:childTnLst>
-                        <p:par>
-                          <p:cTn id="27" fill="hold">
-                            <p:stCondLst>
-                              <p:cond delay="0"/>
-                            </p:stCondLst>
-                            <p:childTnLst>
-                              <p:par>
-                                <p:cTn id="28" presetID="10" presetClass="entr" presetSubtype="0" fill="hold" grpId="0" nodeType="clickEffect">
-                                  <p:stCondLst>
-                                    <p:cond delay="0"/>
-                                  </p:stCondLst>
-                                  <p:childTnLst>
-                                    <p:set>
-                                      <p:cBhvr>
-                                        <p:cTn id="29" dur="1" fill="hold">
-                                          <p:stCondLst>
-                                            <p:cond delay="0"/>
-                                          </p:stCondLst>
-                                        </p:cTn>
-                                        <p:tgtEl>
-                                          <p:spTgt spid="3">
-                                            <p:txEl>
-                                              <p:pRg st="5" end="5"/>
-                                            </p:txEl>
-                                          </p:spTgt>
-                                        </p:tgtEl>
-                                        <p:attrNameLst>
-                                          <p:attrName>style.visibility</p:attrName>
-                                        </p:attrNameLst>
-                                      </p:cBhvr>
-                                      <p:to>
-                                        <p:strVal val="visible"/>
-                                      </p:to>
-                                    </p:set>
-                                    <p:animEffect transition="in" filter="fade">
-                                      <p:cBhvr>
-                                        <p:cTn id="30" dur="500"/>
-                                        <p:tgtEl>
-                                          <p:spTgt spid="3">
-                                            <p:txEl>
-                                              <p:pRg st="5" end="5"/>
-                                            </p:txEl>
-                                          </p:spTgt>
-                                        </p:tgtEl>
-                                      </p:cBhvr>
-                                    </p:animEffect>
-                                  </p:childTnLst>
-                                </p:cTn>
-                              </p:par>
-                            </p:childTnLst>
-                          </p:cTn>
-                        </p:par>
-                      </p:childTnLst>
-                    </p:cTn>
-                  </p:par>
-                </p:childTnLst>
-              </p:cTn>
-              <p:prevCondLst>
-                <p:cond evt="onPrev" delay="0">
-                  <p:tgtEl>
-                    <p:sldTgt/>
-                  </p:tgtEl>
-                </p:cond>
-              </p:prevCondLst>
-              <p:nextCondLst>
-                <p:cond evt="onNext" delay="0">
-                  <p:tgtEl>
-                    <p:sldTgt/>
-                  </p:tgtEl>
-                </p:cond>
-              </p:nextCondLst>
-            </p:seq>
-          </p:childTnLst>
-        </p:cTn>
+        <p:cTn id="1" dur="indefinite" restart="never" nodeType="tmRoot"/>
       </p:par>
     </p:tnLst>
-    <p:bldLst>
-      <p:bldP spid="3" grpId="0" build="p"/>
-    </p:bldLst>
   </p:timing>
 </p:sld>
 </file>
@@ -15614,7 +15231,15 @@
           <a:p>
             <a:r>
               <a:rPr lang="en-CA" dirty="0"/>
-              <a:t>Chosen Data Dow Jones Industrial Average</a:t>
+              <a:t>Chosen </a:t>
+            </a:r>
+            <a:r>
+              <a:rPr lang="en-CA" dirty="0" smtClean="0"/>
+              <a:t>Data: </a:t>
+            </a:r>
+            <a:r>
+              <a:rPr lang="en-CA" dirty="0"/>
+              <a:t>Dow Jones Industrial Average</a:t>
             </a:r>
           </a:p>
           <a:p>
@@ -15731,7 +15356,7 @@
                                         <p:tgtEl>
                                           <p:spTgt spid="3">
                                             <p:txEl>
-                                              <p:pRg st="0" end="0"/>
+                                              <p:pRg st="1" end="1"/>
                                             </p:txEl>
                                           </p:spTgt>
                                         </p:tgtEl>
@@ -15749,7 +15374,7 @@
                                         <p:tgtEl>
                                           <p:spTgt spid="3">
                                             <p:txEl>
-                                              <p:pRg st="0" end="0"/>
+                                              <p:pRg st="1" end="1"/>
                                             </p:txEl>
                                           </p:spTgt>
                                         </p:tgtEl>
@@ -15792,7 +15417,7 @@
                                         <p:tgtEl>
                                           <p:spTgt spid="3">
                                             <p:txEl>
-                                              <p:pRg st="1" end="1"/>
+                                              <p:pRg st="2" end="2"/>
                                             </p:txEl>
                                           </p:spTgt>
                                         </p:tgtEl>
@@ -15810,7 +15435,7 @@
                                         <p:tgtEl>
                                           <p:spTgt spid="3">
                                             <p:txEl>
-                                              <p:pRg st="1" end="1"/>
+                                              <p:pRg st="2" end="2"/>
                                             </p:txEl>
                                           </p:spTgt>
                                         </p:tgtEl>
@@ -15851,11 +15476,7 @@
                                           </p:stCondLst>
                                         </p:cTn>
                                         <p:tgtEl>
-                                          <p:spTgt spid="3">
-                                            <p:txEl>
-                                              <p:pRg st="2" end="2"/>
-                                            </p:txEl>
-                                          </p:spTgt>
+                                          <p:spTgt spid="4"/>
                                         </p:tgtEl>
                                         <p:attrNameLst>
                                           <p:attrName>style.visibility</p:attrName>
@@ -15869,11 +15490,7 @@
                                       <p:cBhvr>
                                         <p:cTn id="17" dur="500"/>
                                         <p:tgtEl>
-                                          <p:spTgt spid="3">
-                                            <p:txEl>
-                                              <p:pRg st="2" end="2"/>
-                                            </p:txEl>
-                                          </p:spTgt>
+                                          <p:spTgt spid="4"/>
                                         </p:tgtEl>
                                       </p:cBhvr>
                                     </p:animEffect>
@@ -15912,59 +15529,6 @@
                                           </p:stCondLst>
                                         </p:cTn>
                                         <p:tgtEl>
-                                          <p:spTgt spid="4"/>
-                                        </p:tgtEl>
-                                        <p:attrNameLst>
-                                          <p:attrName>style.visibility</p:attrName>
-                                        </p:attrNameLst>
-                                      </p:cBhvr>
-                                      <p:to>
-                                        <p:strVal val="visible"/>
-                                      </p:to>
-                                    </p:set>
-                                    <p:animEffect transition="in" filter="fade">
-                                      <p:cBhvr>
-                                        <p:cTn id="22" dur="500"/>
-                                        <p:tgtEl>
-                                          <p:spTgt spid="4"/>
-                                        </p:tgtEl>
-                                      </p:cBhvr>
-                                    </p:animEffect>
-                                  </p:childTnLst>
-                                </p:cTn>
-                              </p:par>
-                            </p:childTnLst>
-                          </p:cTn>
-                        </p:par>
-                      </p:childTnLst>
-                    </p:cTn>
-                  </p:par>
-                  <p:par>
-                    <p:cTn id="23" fill="hold">
-                      <p:stCondLst>
-                        <p:cond delay="indefinite"/>
-                      </p:stCondLst>
-                      <p:childTnLst>
-                        <p:par>
-                          <p:cTn id="24" fill="hold">
-                            <p:stCondLst>
-                              <p:cond delay="0"/>
-                            </p:stCondLst>
-                            <p:childTnLst>
-                              <p:par>
-                                <p:cTn id="25" presetID="10" presetClass="entr" presetSubtype="0" fill="hold" nodeType="clickEffect">
-                                  <p:stCondLst>
-                                    <p:cond delay="0"/>
-                                  </p:stCondLst>
-                                  <p:childTnLst>
-                                    <p:set>
-                                      <p:cBhvr>
-                                        <p:cTn id="26" dur="1" fill="hold">
-                                          <p:stCondLst>
-                                            <p:cond delay="0"/>
-                                          </p:stCondLst>
-                                        </p:cTn>
-                                        <p:tgtEl>
                                           <p:spTgt spid="3">
                                             <p:txEl>
                                               <p:pRg st="3" end="3"/>
@@ -15981,7 +15545,7 @@
                                     </p:set>
                                     <p:animEffect transition="in" filter="fade">
                                       <p:cBhvr>
-                                        <p:cTn id="27" dur="500"/>
+                                        <p:cTn id="22" dur="500"/>
                                         <p:tgtEl>
                                           <p:spTgt spid="3">
                                             <p:txEl>
@@ -16129,14 +15693,14 @@
                 <a:gridCol w="2489200">
                   <a:extLst>
                     <a:ext uri="{9D8B030D-6E8A-4147-A177-3AD203B41FA5}">
-                      <a16:colId xmlns:a16="http://schemas.microsoft.com/office/drawing/2014/main" val="3042923453"/>
+                      <a16:colId xmlns:a16="http://schemas.microsoft.com/office/drawing/2014/main" xmlns="" val="3042923453"/>
                     </a:ext>
                   </a:extLst>
                 </a:gridCol>
                 <a:gridCol w="2489200">
                   <a:extLst>
                     <a:ext uri="{9D8B030D-6E8A-4147-A177-3AD203B41FA5}">
-                      <a16:colId xmlns:a16="http://schemas.microsoft.com/office/drawing/2014/main" val="3668010245"/>
+                      <a16:colId xmlns:a16="http://schemas.microsoft.com/office/drawing/2014/main" xmlns="" val="3668010245"/>
                     </a:ext>
                   </a:extLst>
                 </a:gridCol>
@@ -16172,7 +15736,7 @@
                 </a:tc>
                 <a:extLst>
                   <a:ext uri="{0D108BD9-81ED-4DB2-BD59-A6C34878D82A}">
-                    <a16:rowId xmlns:a16="http://schemas.microsoft.com/office/drawing/2014/main" val="3599683607"/>
+                    <a16:rowId xmlns:a16="http://schemas.microsoft.com/office/drawing/2014/main" xmlns="" val="3599683607"/>
                   </a:ext>
                 </a:extLst>
               </a:tr>
@@ -16207,7 +15771,7 @@
                 </a:tc>
                 <a:extLst>
                   <a:ext uri="{0D108BD9-81ED-4DB2-BD59-A6C34878D82A}">
-                    <a16:rowId xmlns:a16="http://schemas.microsoft.com/office/drawing/2014/main" val="3871596754"/>
+                    <a16:rowId xmlns:a16="http://schemas.microsoft.com/office/drawing/2014/main" xmlns="" val="3871596754"/>
                   </a:ext>
                 </a:extLst>
               </a:tr>
@@ -16242,7 +15806,7 @@
                 </a:tc>
                 <a:extLst>
                   <a:ext uri="{0D108BD9-81ED-4DB2-BD59-A6C34878D82A}">
-                    <a16:rowId xmlns:a16="http://schemas.microsoft.com/office/drawing/2014/main" val="1511813508"/>
+                    <a16:rowId xmlns:a16="http://schemas.microsoft.com/office/drawing/2014/main" xmlns="" val="1511813508"/>
                   </a:ext>
                 </a:extLst>
               </a:tr>
@@ -16277,7 +15841,7 @@
                 </a:tc>
                 <a:extLst>
                   <a:ext uri="{0D108BD9-81ED-4DB2-BD59-A6C34878D82A}">
-                    <a16:rowId xmlns:a16="http://schemas.microsoft.com/office/drawing/2014/main" val="1970786246"/>
+                    <a16:rowId xmlns:a16="http://schemas.microsoft.com/office/drawing/2014/main" xmlns="" val="1970786246"/>
                   </a:ext>
                 </a:extLst>
               </a:tr>
@@ -16312,7 +15876,7 @@
                 </a:tc>
                 <a:extLst>
                   <a:ext uri="{0D108BD9-81ED-4DB2-BD59-A6C34878D82A}">
-                    <a16:rowId xmlns:a16="http://schemas.microsoft.com/office/drawing/2014/main" val="620376632"/>
+                    <a16:rowId xmlns:a16="http://schemas.microsoft.com/office/drawing/2014/main" xmlns="" val="620376632"/>
                   </a:ext>
                 </a:extLst>
               </a:tr>
@@ -16347,7 +15911,7 @@
                 </a:tc>
                 <a:extLst>
                   <a:ext uri="{0D108BD9-81ED-4DB2-BD59-A6C34878D82A}">
-                    <a16:rowId xmlns:a16="http://schemas.microsoft.com/office/drawing/2014/main" val="1613152120"/>
+                    <a16:rowId xmlns:a16="http://schemas.microsoft.com/office/drawing/2014/main" xmlns="" val="1613152120"/>
                   </a:ext>
                 </a:extLst>
               </a:tr>
@@ -16382,7 +15946,7 @@
                 </a:tc>
                 <a:extLst>
                   <a:ext uri="{0D108BD9-81ED-4DB2-BD59-A6C34878D82A}">
-                    <a16:rowId xmlns:a16="http://schemas.microsoft.com/office/drawing/2014/main" val="2745308558"/>
+                    <a16:rowId xmlns:a16="http://schemas.microsoft.com/office/drawing/2014/main" xmlns="" val="2745308558"/>
                   </a:ext>
                 </a:extLst>
               </a:tr>
@@ -16417,7 +15981,7 @@
                 </a:tc>
                 <a:extLst>
                   <a:ext uri="{0D108BD9-81ED-4DB2-BD59-A6C34878D82A}">
-                    <a16:rowId xmlns:a16="http://schemas.microsoft.com/office/drawing/2014/main" val="3619237203"/>
+                    <a16:rowId xmlns:a16="http://schemas.microsoft.com/office/drawing/2014/main" xmlns="" val="3619237203"/>
                   </a:ext>
                 </a:extLst>
               </a:tr>
@@ -16483,7 +16047,7 @@
                                         <p:tgtEl>
                                           <p:spTgt spid="3">
                                             <p:txEl>
-                                              <p:pRg st="0" end="0"/>
+                                              <p:pRg st="1" end="1"/>
                                             </p:txEl>
                                           </p:spTgt>
                                         </p:tgtEl>
@@ -16501,67 +16065,6 @@
                                         <p:tgtEl>
                                           <p:spTgt spid="3">
                                             <p:txEl>
-                                              <p:pRg st="0" end="0"/>
-                                            </p:txEl>
-                                          </p:spTgt>
-                                        </p:tgtEl>
-                                      </p:cBhvr>
-                                    </p:animEffect>
-                                  </p:childTnLst>
-                                </p:cTn>
-                              </p:par>
-                            </p:childTnLst>
-                          </p:cTn>
-                        </p:par>
-                      </p:childTnLst>
-                    </p:cTn>
-                  </p:par>
-                  <p:par>
-                    <p:cTn id="8" fill="hold">
-                      <p:stCondLst>
-                        <p:cond delay="indefinite"/>
-                      </p:stCondLst>
-                      <p:childTnLst>
-                        <p:par>
-                          <p:cTn id="9" fill="hold">
-                            <p:stCondLst>
-                              <p:cond delay="0"/>
-                            </p:stCondLst>
-                            <p:childTnLst>
-                              <p:par>
-                                <p:cTn id="10" presetID="10" presetClass="entr" presetSubtype="0" fill="hold" grpId="0" nodeType="clickEffect">
-                                  <p:stCondLst>
-                                    <p:cond delay="0"/>
-                                  </p:stCondLst>
-                                  <p:childTnLst>
-                                    <p:set>
-                                      <p:cBhvr>
-                                        <p:cTn id="11" dur="1" fill="hold">
-                                          <p:stCondLst>
-                                            <p:cond delay="0"/>
-                                          </p:stCondLst>
-                                        </p:cTn>
-                                        <p:tgtEl>
-                                          <p:spTgt spid="3">
-                                            <p:txEl>
-                                              <p:pRg st="1" end="1"/>
-                                            </p:txEl>
-                                          </p:spTgt>
-                                        </p:tgtEl>
-                                        <p:attrNameLst>
-                                          <p:attrName>style.visibility</p:attrName>
-                                        </p:attrNameLst>
-                                      </p:cBhvr>
-                                      <p:to>
-                                        <p:strVal val="visible"/>
-                                      </p:to>
-                                    </p:set>
-                                    <p:animEffect transition="in" filter="fade">
-                                      <p:cBhvr>
-                                        <p:cTn id="12" dur="500"/>
-                                        <p:tgtEl>
-                                          <p:spTgt spid="3">
-                                            <p:txEl>
                                               <p:pRg st="1" end="1"/>
                                             </p:txEl>
                                           </p:spTgt>
@@ -16572,14 +16075,14 @@
                                 </p:cTn>
                               </p:par>
                               <p:par>
-                                <p:cTn id="13" presetID="10" presetClass="entr" presetSubtype="0" fill="hold" nodeType="withEffect">
+                                <p:cTn id="8" presetID="10" presetClass="entr" presetSubtype="0" fill="hold" nodeType="withEffect">
                                   <p:stCondLst>
                                     <p:cond delay="0"/>
                                   </p:stCondLst>
                                   <p:childTnLst>
                                     <p:set>
                                       <p:cBhvr>
-                                        <p:cTn id="14" dur="1" fill="hold">
+                                        <p:cTn id="9" dur="1" fill="hold">
                                           <p:stCondLst>
                                             <p:cond delay="0"/>
                                           </p:stCondLst>
@@ -16597,7 +16100,7 @@
                                     </p:set>
                                     <p:animEffect transition="in" filter="fade">
                                       <p:cBhvr>
-                                        <p:cTn id="15" dur="500"/>
+                                        <p:cTn id="10" dur="500"/>
                                         <p:tgtEl>
                                           <p:spTgt spid="5"/>
                                         </p:tgtEl>
@@ -16634,7 +16137,7 @@
       </p:par>
     </p:tnLst>
     <p:bldLst>
-      <p:bldP spid="3" grpId="0" build="p"/>
+      <p:bldP spid="3" grpId="0" uiExpand="1" build="p"/>
     </p:bldLst>
   </p:timing>
 </p:sld>

</xml_diff>